<commit_message>
Updated the slides (english/french)
</commit_message>
<xml_diff>
--- a/Diapos_Suivit_projet.pptx
+++ b/Diapos_Suivit_projet.pptx
@@ -5,10 +5,10 @@
     <p:sldMasterId id="2147483648" r:id="rId1"/>
   </p:sldMasterIdLst>
   <p:notesMasterIdLst>
-    <p:notesMasterId r:id="rId13"/>
+    <p:notesMasterId r:id="rId14"/>
   </p:notesMasterIdLst>
   <p:handoutMasterIdLst>
-    <p:handoutMasterId r:id="rId14"/>
+    <p:handoutMasterId r:id="rId15"/>
   </p:handoutMasterIdLst>
   <p:sldIdLst>
     <p:sldId id="256" r:id="rId2"/>
@@ -17,11 +17,12 @@
     <p:sldId id="259" r:id="rId5"/>
     <p:sldId id="268" r:id="rId6"/>
     <p:sldId id="261" r:id="rId7"/>
-    <p:sldId id="269" r:id="rId8"/>
-    <p:sldId id="270" r:id="rId9"/>
-    <p:sldId id="271" r:id="rId10"/>
-    <p:sldId id="272" r:id="rId11"/>
-    <p:sldId id="273" r:id="rId12"/>
+    <p:sldId id="274" r:id="rId8"/>
+    <p:sldId id="269" r:id="rId9"/>
+    <p:sldId id="270" r:id="rId10"/>
+    <p:sldId id="271" r:id="rId11"/>
+    <p:sldId id="272" r:id="rId12"/>
+    <p:sldId id="273" r:id="rId13"/>
   </p:sldIdLst>
   <p:sldSz cx="12192000" cy="6858000"/>
   <p:notesSz cx="6858000" cy="9144000"/>
@@ -213,7 +214,7 @@
           <a:p>
             <a:fld id="{EC83963A-FCD1-4BA3-8F52-F2285ACE2A6A}" type="datetimeFigureOut">
               <a:rPr lang="fr-FR" smtClean="0"/>
-              <a:t>22/11/2019</a:t>
+              <a:t>09/12/2019</a:t>
             </a:fld>
             <a:endParaRPr lang="fr-FR"/>
           </a:p>
@@ -279,7 +280,7 @@
           <a:p>
             <a:fld id="{38717F5D-9B99-41E9-AAF0-B73531F5A10E}" type="slidenum">
               <a:rPr lang="fr-FR" smtClean="0"/>
-              <a:t>‹N°›</a:t>
+              <a:t>‹#›</a:t>
             </a:fld>
             <a:endParaRPr lang="fr-FR"/>
           </a:p>
@@ -378,7 +379,7 @@
           <a:p>
             <a:fld id="{12D3AF9D-FD63-43BA-9EB6-902B12D2DD5D}" type="datetimeFigureOut">
               <a:rPr lang="fr-FR" smtClean="0"/>
-              <a:t>22/11/2019</a:t>
+              <a:t>09/12/2019</a:t>
             </a:fld>
             <a:endParaRPr lang="fr-FR"/>
           </a:p>
@@ -537,7 +538,7 @@
           <a:p>
             <a:fld id="{049843D5-FBCC-450E-8A81-920AD1F49A83}" type="slidenum">
               <a:rPr lang="fr-FR" smtClean="0"/>
-              <a:t>‹N°›</a:t>
+              <a:t>‹#›</a:t>
             </a:fld>
             <a:endParaRPr lang="fr-FR"/>
           </a:p>
@@ -972,7 +973,7 @@
     </p:spTree>
     <p:extLst>
       <p:ext uri="{BB962C8B-B14F-4D97-AF65-F5344CB8AC3E}">
-        <p14:creationId xmlns:p14="http://schemas.microsoft.com/office/powerpoint/2010/main" val="1699594536"/>
+        <p14:creationId xmlns:p14="http://schemas.microsoft.com/office/powerpoint/2010/main" val="638253439"/>
       </p:ext>
     </p:extLst>
   </p:cSld>
@@ -1048,6 +1049,90 @@
             <a:fld id="{049843D5-FBCC-450E-8A81-920AD1F49A83}" type="slidenum">
               <a:rPr lang="fr-FR" smtClean="0"/>
               <a:t>7</a:t>
+            </a:fld>
+            <a:endParaRPr lang="fr-FR"/>
+          </a:p>
+        </p:txBody>
+      </p:sp>
+    </p:spTree>
+    <p:extLst>
+      <p:ext uri="{BB962C8B-B14F-4D97-AF65-F5344CB8AC3E}">
+        <p14:creationId xmlns:p14="http://schemas.microsoft.com/office/powerpoint/2010/main" val="1699594536"/>
+      </p:ext>
+    </p:extLst>
+  </p:cSld>
+  <p:clrMapOvr>
+    <a:masterClrMapping/>
+  </p:clrMapOvr>
+</p:notes>
+</file>
+
+<file path=ppt/notesSlides/notesSlide6.xml><?xml version="1.0" encoding="utf-8"?>
+<p:notes xmlns:a="http://schemas.openxmlformats.org/drawingml/2006/main" xmlns:r="http://schemas.openxmlformats.org/officeDocument/2006/relationships" xmlns:p="http://schemas.openxmlformats.org/presentationml/2006/main">
+  <p:cSld>
+    <p:spTree>
+      <p:nvGrpSpPr>
+        <p:cNvPr id="1" name=""/>
+        <p:cNvGrpSpPr/>
+        <p:nvPr/>
+      </p:nvGrpSpPr>
+      <p:grpSpPr>
+        <a:xfrm>
+          <a:off x="0" y="0"/>
+          <a:ext cx="0" cy="0"/>
+          <a:chOff x="0" y="0"/>
+          <a:chExt cx="0" cy="0"/>
+        </a:xfrm>
+      </p:grpSpPr>
+      <p:sp>
+        <p:nvSpPr>
+          <p:cNvPr id="2" name="Slide Image Placeholder 1"/>
+          <p:cNvSpPr>
+            <a:spLocks noGrp="1" noRot="1" noChangeAspect="1"/>
+          </p:cNvSpPr>
+          <p:nvPr>
+            <p:ph type="sldImg"/>
+          </p:nvPr>
+        </p:nvSpPr>
+        <p:spPr/>
+      </p:sp>
+      <p:sp>
+        <p:nvSpPr>
+          <p:cNvPr id="3" name="Notes Placeholder 2"/>
+          <p:cNvSpPr>
+            <a:spLocks noGrp="1"/>
+          </p:cNvSpPr>
+          <p:nvPr>
+            <p:ph type="body" idx="1"/>
+          </p:nvPr>
+        </p:nvSpPr>
+        <p:spPr/>
+        <p:txBody>
+          <a:bodyPr/>
+          <a:lstStyle/>
+          <a:p>
+            <a:endParaRPr lang="fr-FR"/>
+          </a:p>
+        </p:txBody>
+      </p:sp>
+      <p:sp>
+        <p:nvSpPr>
+          <p:cNvPr id="4" name="Slide Number Placeholder 3"/>
+          <p:cNvSpPr>
+            <a:spLocks noGrp="1"/>
+          </p:cNvSpPr>
+          <p:nvPr>
+            <p:ph type="sldNum" sz="quarter" idx="10"/>
+          </p:nvPr>
+        </p:nvSpPr>
+        <p:spPr/>
+        <p:txBody>
+          <a:bodyPr/>
+          <a:lstStyle/>
+          <a:p>
+            <a:fld id="{049843D5-FBCC-450E-8A81-920AD1F49A83}" type="slidenum">
+              <a:rPr lang="fr-FR" smtClean="0"/>
+              <a:t>8</a:t>
             </a:fld>
             <a:endParaRPr lang="fr-FR"/>
           </a:p>
@@ -1513,7 +1598,7 @@
             <a:fld id="{813506F1-DB5F-4FC9-88BA-B486F30FE4BF}" type="slidenum">
               <a:rPr lang="fr-FR" smtClean="0"/>
               <a:pPr/>
-              <a:t>‹N°›</a:t>
+              <a:t>‹#›</a:t>
             </a:fld>
             <a:endParaRPr lang="fr-FR" dirty="0"/>
           </a:p>
@@ -2180,6 +2265,606 @@
       </p:grpSpPr>
       <p:sp>
         <p:nvSpPr>
+          <p:cNvPr id="6" name="Slide Number Placeholder 5"/>
+          <p:cNvSpPr>
+            <a:spLocks noGrp="1"/>
+          </p:cNvSpPr>
+          <p:nvPr>
+            <p:ph type="sldNum" sz="quarter" idx="4"/>
+          </p:nvPr>
+        </p:nvSpPr>
+        <p:spPr/>
+        <p:txBody>
+          <a:bodyPr/>
+          <a:lstStyle/>
+          <a:p>
+            <a:fld id="{813506F1-DB5F-4FC9-88BA-B486F30FE4BF}" type="slidenum">
+              <a:rPr lang="fr-FR" smtClean="0"/>
+              <a:pPr/>
+              <a:t>9</a:t>
+            </a:fld>
+            <a:endParaRPr lang="fr-FR" dirty="0"/>
+          </a:p>
+        </p:txBody>
+      </p:sp>
+      <p:sp>
+        <p:nvSpPr>
+          <p:cNvPr id="7" name="Title 1"/>
+          <p:cNvSpPr txBox="1">
+            <a:spLocks/>
+          </p:cNvSpPr>
+          <p:nvPr/>
+        </p:nvSpPr>
+        <p:spPr>
+          <a:xfrm>
+            <a:off x="648394" y="2101646"/>
+            <a:ext cx="4460502" cy="733833"/>
+          </a:xfrm>
+          <a:prstGeom prst="rect">
+            <a:avLst/>
+          </a:prstGeom>
+        </p:spPr>
+        <p:txBody>
+          <a:bodyPr/>
+          <a:lstStyle>
+            <a:lvl1pPr algn="l" defTabSz="914400" rtl="0" eaLnBrk="1" latinLnBrk="0" hangingPunct="1">
+              <a:lnSpc>
+                <a:spcPct val="90000"/>
+              </a:lnSpc>
+              <a:spcBef>
+                <a:spcPct val="0"/>
+              </a:spcBef>
+              <a:buNone/>
+              <a:defRPr sz="4400" kern="1200">
+                <a:solidFill>
+                  <a:schemeClr val="tx1"/>
+                </a:solidFill>
+                <a:latin typeface="+mj-lt"/>
+                <a:ea typeface="+mj-ea"/>
+                <a:cs typeface="+mj-cs"/>
+              </a:defRPr>
+            </a:lvl1pPr>
+          </a:lstStyle>
+          <a:p>
+            <a:r>
+              <a:rPr lang="fr-FR" dirty="0"/>
+              <a:t>Tools</a:t>
+            </a:r>
+          </a:p>
+        </p:txBody>
+      </p:sp>
+      <p:sp>
+        <p:nvSpPr>
+          <p:cNvPr id="8" name="Content Placeholder 2"/>
+          <p:cNvSpPr txBox="1">
+            <a:spLocks/>
+          </p:cNvSpPr>
+          <p:nvPr/>
+        </p:nvSpPr>
+        <p:spPr>
+          <a:xfrm>
+            <a:off x="2436949" y="3216224"/>
+            <a:ext cx="4947531" cy="3190004"/>
+          </a:xfrm>
+          <a:prstGeom prst="rect">
+            <a:avLst/>
+          </a:prstGeom>
+        </p:spPr>
+        <p:txBody>
+          <a:bodyPr>
+            <a:normAutofit/>
+          </a:bodyPr>
+          <a:lstStyle>
+            <a:lvl1pPr marL="228600" indent="-228600" algn="l" defTabSz="914400" rtl="0" eaLnBrk="1" latinLnBrk="0" hangingPunct="1">
+              <a:lnSpc>
+                <a:spcPct val="90000"/>
+              </a:lnSpc>
+              <a:spcBef>
+                <a:spcPts val="1000"/>
+              </a:spcBef>
+              <a:buFont typeface="Arial" panose="020B0604020202020204" pitchFamily="34" charset="0"/>
+              <a:buChar char="•"/>
+              <a:defRPr sz="2800" kern="1200">
+                <a:solidFill>
+                  <a:schemeClr val="tx1"/>
+                </a:solidFill>
+                <a:latin typeface="+mn-lt"/>
+                <a:ea typeface="+mn-ea"/>
+                <a:cs typeface="+mn-cs"/>
+              </a:defRPr>
+            </a:lvl1pPr>
+            <a:lvl2pPr marL="685800" indent="-228600" algn="l" defTabSz="914400" rtl="0" eaLnBrk="1" latinLnBrk="0" hangingPunct="1">
+              <a:lnSpc>
+                <a:spcPct val="90000"/>
+              </a:lnSpc>
+              <a:spcBef>
+                <a:spcPts val="500"/>
+              </a:spcBef>
+              <a:buFont typeface="Arial" panose="020B0604020202020204" pitchFamily="34" charset="0"/>
+              <a:buChar char="•"/>
+              <a:defRPr sz="2400" kern="1200">
+                <a:solidFill>
+                  <a:schemeClr val="tx1"/>
+                </a:solidFill>
+                <a:latin typeface="+mn-lt"/>
+                <a:ea typeface="+mn-ea"/>
+                <a:cs typeface="+mn-cs"/>
+              </a:defRPr>
+            </a:lvl2pPr>
+            <a:lvl3pPr marL="1143000" indent="-228600" algn="l" defTabSz="914400" rtl="0" eaLnBrk="1" latinLnBrk="0" hangingPunct="1">
+              <a:lnSpc>
+                <a:spcPct val="90000"/>
+              </a:lnSpc>
+              <a:spcBef>
+                <a:spcPts val="500"/>
+              </a:spcBef>
+              <a:buFont typeface="Arial" panose="020B0604020202020204" pitchFamily="34" charset="0"/>
+              <a:buChar char="•"/>
+              <a:defRPr sz="2000" kern="1200">
+                <a:solidFill>
+                  <a:schemeClr val="tx1"/>
+                </a:solidFill>
+                <a:latin typeface="+mn-lt"/>
+                <a:ea typeface="+mn-ea"/>
+                <a:cs typeface="+mn-cs"/>
+              </a:defRPr>
+            </a:lvl3pPr>
+            <a:lvl4pPr marL="1600200" indent="-228600" algn="l" defTabSz="914400" rtl="0" eaLnBrk="1" latinLnBrk="0" hangingPunct="1">
+              <a:lnSpc>
+                <a:spcPct val="90000"/>
+              </a:lnSpc>
+              <a:spcBef>
+                <a:spcPts val="500"/>
+              </a:spcBef>
+              <a:buFont typeface="Arial" panose="020B0604020202020204" pitchFamily="34" charset="0"/>
+              <a:buChar char="•"/>
+              <a:defRPr sz="1800" kern="1200">
+                <a:solidFill>
+                  <a:schemeClr val="tx1"/>
+                </a:solidFill>
+                <a:latin typeface="+mn-lt"/>
+                <a:ea typeface="+mn-ea"/>
+                <a:cs typeface="+mn-cs"/>
+              </a:defRPr>
+            </a:lvl4pPr>
+            <a:lvl5pPr marL="2057400" indent="-228600" algn="l" defTabSz="914400" rtl="0" eaLnBrk="1" latinLnBrk="0" hangingPunct="1">
+              <a:lnSpc>
+                <a:spcPct val="90000"/>
+              </a:lnSpc>
+              <a:spcBef>
+                <a:spcPts val="500"/>
+              </a:spcBef>
+              <a:buFont typeface="Arial" panose="020B0604020202020204" pitchFamily="34" charset="0"/>
+              <a:buChar char="•"/>
+              <a:defRPr sz="1800" kern="1200">
+                <a:solidFill>
+                  <a:schemeClr val="tx1"/>
+                </a:solidFill>
+                <a:latin typeface="+mn-lt"/>
+                <a:ea typeface="+mn-ea"/>
+                <a:cs typeface="+mn-cs"/>
+              </a:defRPr>
+            </a:lvl5pPr>
+            <a:lvl6pPr marL="2514600" indent="-228600" algn="l" defTabSz="914400" rtl="0" eaLnBrk="1" latinLnBrk="0" hangingPunct="1">
+              <a:lnSpc>
+                <a:spcPct val="90000"/>
+              </a:lnSpc>
+              <a:spcBef>
+                <a:spcPts val="500"/>
+              </a:spcBef>
+              <a:buFont typeface="Arial" panose="020B0604020202020204" pitchFamily="34" charset="0"/>
+              <a:buChar char="•"/>
+              <a:defRPr sz="1800" kern="1200">
+                <a:solidFill>
+                  <a:schemeClr val="tx1"/>
+                </a:solidFill>
+                <a:latin typeface="+mn-lt"/>
+                <a:ea typeface="+mn-ea"/>
+                <a:cs typeface="+mn-cs"/>
+              </a:defRPr>
+            </a:lvl6pPr>
+            <a:lvl7pPr marL="2971800" indent="-228600" algn="l" defTabSz="914400" rtl="0" eaLnBrk="1" latinLnBrk="0" hangingPunct="1">
+              <a:lnSpc>
+                <a:spcPct val="90000"/>
+              </a:lnSpc>
+              <a:spcBef>
+                <a:spcPts val="500"/>
+              </a:spcBef>
+              <a:buFont typeface="Arial" panose="020B0604020202020204" pitchFamily="34" charset="0"/>
+              <a:buChar char="•"/>
+              <a:defRPr sz="1800" kern="1200">
+                <a:solidFill>
+                  <a:schemeClr val="tx1"/>
+                </a:solidFill>
+                <a:latin typeface="+mn-lt"/>
+                <a:ea typeface="+mn-ea"/>
+                <a:cs typeface="+mn-cs"/>
+              </a:defRPr>
+            </a:lvl7pPr>
+            <a:lvl8pPr marL="3429000" indent="-228600" algn="l" defTabSz="914400" rtl="0" eaLnBrk="1" latinLnBrk="0" hangingPunct="1">
+              <a:lnSpc>
+                <a:spcPct val="90000"/>
+              </a:lnSpc>
+              <a:spcBef>
+                <a:spcPts val="500"/>
+              </a:spcBef>
+              <a:buFont typeface="Arial" panose="020B0604020202020204" pitchFamily="34" charset="0"/>
+              <a:buChar char="•"/>
+              <a:defRPr sz="1800" kern="1200">
+                <a:solidFill>
+                  <a:schemeClr val="tx1"/>
+                </a:solidFill>
+                <a:latin typeface="+mn-lt"/>
+                <a:ea typeface="+mn-ea"/>
+                <a:cs typeface="+mn-cs"/>
+              </a:defRPr>
+            </a:lvl8pPr>
+            <a:lvl9pPr marL="3886200" indent="-228600" algn="l" defTabSz="914400" rtl="0" eaLnBrk="1" latinLnBrk="0" hangingPunct="1">
+              <a:lnSpc>
+                <a:spcPct val="90000"/>
+              </a:lnSpc>
+              <a:spcBef>
+                <a:spcPts val="500"/>
+              </a:spcBef>
+              <a:buFont typeface="Arial" panose="020B0604020202020204" pitchFamily="34" charset="0"/>
+              <a:buChar char="•"/>
+              <a:defRPr sz="1800" kern="1200">
+                <a:solidFill>
+                  <a:schemeClr val="tx1"/>
+                </a:solidFill>
+                <a:latin typeface="+mn-lt"/>
+                <a:ea typeface="+mn-ea"/>
+                <a:cs typeface="+mn-cs"/>
+              </a:defRPr>
+            </a:lvl9pPr>
+          </a:lstStyle>
+          <a:p>
+            <a:pPr marL="0" indent="0" algn="just">
+              <a:buNone/>
+            </a:pPr>
+            <a:r>
+              <a:rPr lang="fr-FR" sz="2400" dirty="0" err="1"/>
+              <a:t>Teamworking</a:t>
+            </a:r>
+            <a:endParaRPr lang="fr-FR" sz="2400" dirty="0"/>
+          </a:p>
+          <a:p>
+            <a:pPr marL="0" indent="0" algn="just">
+              <a:buNone/>
+            </a:pPr>
+            <a:endParaRPr lang="fr-FR" sz="1600" dirty="0"/>
+          </a:p>
+          <a:p>
+            <a:pPr marL="0" indent="0" algn="just">
+              <a:buNone/>
+            </a:pPr>
+            <a:endParaRPr lang="fr-FR" sz="1600" dirty="0"/>
+          </a:p>
+          <a:p>
+            <a:pPr marL="0" indent="0" algn="just">
+              <a:buNone/>
+            </a:pPr>
+            <a:r>
+              <a:rPr lang="fr-FR" sz="2400" dirty="0" err="1" smtClean="0"/>
+              <a:t>Programming</a:t>
+            </a:r>
+            <a:r>
+              <a:rPr lang="fr-FR" sz="2400" dirty="0" smtClean="0"/>
+              <a:t> </a:t>
+            </a:r>
+            <a:r>
+              <a:rPr lang="fr-FR" sz="2400" dirty="0" err="1" smtClean="0"/>
+              <a:t>language</a:t>
+            </a:r>
+            <a:r>
+              <a:rPr lang="fr-FR" sz="2400" dirty="0" smtClean="0"/>
+              <a:t> </a:t>
+            </a:r>
+            <a:r>
+              <a:rPr lang="fr-FR" sz="2400" dirty="0"/>
+              <a:t>for </a:t>
+            </a:r>
+            <a:r>
+              <a:rPr lang="fr-FR" sz="2400" dirty="0" err="1"/>
+              <a:t>statistical</a:t>
+            </a:r>
+            <a:r>
+              <a:rPr lang="fr-FR" sz="2400" dirty="0"/>
+              <a:t> </a:t>
+            </a:r>
+            <a:r>
+              <a:rPr lang="fr-FR" sz="2400" dirty="0" smtClean="0"/>
+              <a:t>analyses</a:t>
+            </a:r>
+            <a:endParaRPr lang="fr-FR" sz="2400" dirty="0"/>
+          </a:p>
+          <a:p>
+            <a:pPr marL="0" indent="0" algn="just">
+              <a:buNone/>
+            </a:pPr>
+            <a:r>
+              <a:rPr lang="fr-FR" sz="2000" dirty="0"/>
+              <a:t>Packages : </a:t>
+            </a:r>
+          </a:p>
+          <a:p>
+            <a:pPr marL="0" indent="0" algn="just">
+              <a:buNone/>
+            </a:pPr>
+            <a:r>
+              <a:rPr lang="fr-FR" sz="2000" dirty="0"/>
+              <a:t>	- DESeq2</a:t>
+            </a:r>
+          </a:p>
+        </p:txBody>
+      </p:sp>
+      <p:pic>
+        <p:nvPicPr>
+          <p:cNvPr id="2" name="Image 1"/>
+          <p:cNvPicPr>
+            <a:picLocks noChangeAspect="1"/>
+          </p:cNvPicPr>
+          <p:nvPr/>
+        </p:nvPicPr>
+        <p:blipFill>
+          <a:blip r:embed="rId2" cstate="print">
+            <a:extLst>
+              <a:ext uri="{28A0092B-C50C-407E-A947-70E740481C1C}">
+                <a14:useLocalDpi xmlns:a14="http://schemas.microsoft.com/office/drawing/2010/main" val="0"/>
+              </a:ext>
+            </a:extLst>
+          </a:blip>
+          <a:stretch>
+            <a:fillRect/>
+          </a:stretch>
+        </p:blipFill>
+        <p:spPr>
+          <a:xfrm>
+            <a:off x="1216981" y="2835479"/>
+            <a:ext cx="1220893" cy="1220893"/>
+          </a:xfrm>
+          <a:prstGeom prst="rect">
+            <a:avLst/>
+          </a:prstGeom>
+        </p:spPr>
+      </p:pic>
+      <p:pic>
+        <p:nvPicPr>
+          <p:cNvPr id="1026" name="Picture 2" descr="Résultat de recherche d'images pour &quot;R png logo&quot;&quot;"/>
+          <p:cNvPicPr>
+            <a:picLocks noChangeAspect="1" noChangeArrowheads="1"/>
+          </p:cNvPicPr>
+          <p:nvPr/>
+        </p:nvPicPr>
+        <p:blipFill>
+          <a:blip r:embed="rId3" cstate="print">
+            <a:extLst>
+              <a:ext uri="{28A0092B-C50C-407E-A947-70E740481C1C}">
+                <a14:useLocalDpi xmlns:a14="http://schemas.microsoft.com/office/drawing/2010/main" val="0"/>
+              </a:ext>
+            </a:extLst>
+          </a:blip>
+          <a:srcRect/>
+          <a:stretch>
+            <a:fillRect/>
+          </a:stretch>
+        </p:blipFill>
+        <p:spPr bwMode="auto">
+          <a:xfrm>
+            <a:off x="1311736" y="4390616"/>
+            <a:ext cx="1031382" cy="799178"/>
+          </a:xfrm>
+          <a:prstGeom prst="rect">
+            <a:avLst/>
+          </a:prstGeom>
+          <a:noFill/>
+          <a:extLst>
+            <a:ext uri="{909E8E84-426E-40DD-AFC4-6F175D3DCCD1}">
+              <a14:hiddenFill xmlns:a14="http://schemas.microsoft.com/office/drawing/2010/main">
+                <a:solidFill>
+                  <a:srgbClr val="FFFFFF"/>
+                </a:solidFill>
+              </a14:hiddenFill>
+            </a:ext>
+          </a:extLst>
+        </p:spPr>
+      </p:pic>
+      <p:pic>
+        <p:nvPicPr>
+          <p:cNvPr id="1030" name="Picture 6" descr="Résultat de recherche d'images pour &quot;logo html5 js php&quot;&quot;"/>
+          <p:cNvPicPr>
+            <a:picLocks noChangeAspect="1" noChangeArrowheads="1"/>
+          </p:cNvPicPr>
+          <p:nvPr/>
+        </p:nvPicPr>
+        <p:blipFill>
+          <a:blip r:embed="rId4">
+            <a:extLst>
+              <a:ext uri="{28A0092B-C50C-407E-A947-70E740481C1C}">
+                <a14:useLocalDpi xmlns:a14="http://schemas.microsoft.com/office/drawing/2010/main" val="0"/>
+              </a:ext>
+            </a:extLst>
+          </a:blip>
+          <a:srcRect/>
+          <a:stretch>
+            <a:fillRect/>
+          </a:stretch>
+        </p:blipFill>
+        <p:spPr bwMode="auto">
+          <a:xfrm>
+            <a:off x="7384480" y="2662534"/>
+            <a:ext cx="3704305" cy="1547092"/>
+          </a:xfrm>
+          <a:prstGeom prst="rect">
+            <a:avLst/>
+          </a:prstGeom>
+          <a:noFill/>
+          <a:extLst>
+            <a:ext uri="{909E8E84-426E-40DD-AFC4-6F175D3DCCD1}">
+              <a14:hiddenFill xmlns:a14="http://schemas.microsoft.com/office/drawing/2010/main">
+                <a:solidFill>
+                  <a:srgbClr val="FFFFFF"/>
+                </a:solidFill>
+              </a14:hiddenFill>
+            </a:ext>
+          </a:extLst>
+        </p:spPr>
+      </p:pic>
+      <p:pic>
+        <p:nvPicPr>
+          <p:cNvPr id="1032" name="Picture 8" descr="Résultat de recherche d'images pour &quot;odoo&quot;&quot;"/>
+          <p:cNvPicPr>
+            <a:picLocks noChangeAspect="1" noChangeArrowheads="1"/>
+          </p:cNvPicPr>
+          <p:nvPr/>
+        </p:nvPicPr>
+        <p:blipFill>
+          <a:blip r:embed="rId5" cstate="print">
+            <a:extLst>
+              <a:ext uri="{28A0092B-C50C-407E-A947-70E740481C1C}">
+                <a14:useLocalDpi xmlns:a14="http://schemas.microsoft.com/office/drawing/2010/main" val="0"/>
+              </a:ext>
+            </a:extLst>
+          </a:blip>
+          <a:srcRect/>
+          <a:stretch>
+            <a:fillRect/>
+          </a:stretch>
+        </p:blipFill>
+        <p:spPr bwMode="auto">
+          <a:xfrm>
+            <a:off x="7939311" y="3909111"/>
+            <a:ext cx="2594644" cy="1427054"/>
+          </a:xfrm>
+          <a:prstGeom prst="rect">
+            <a:avLst/>
+          </a:prstGeom>
+          <a:noFill/>
+          <a:extLst>
+            <a:ext uri="{909E8E84-426E-40DD-AFC4-6F175D3DCCD1}">
+              <a14:hiddenFill xmlns:a14="http://schemas.microsoft.com/office/drawing/2010/main">
+                <a:solidFill>
+                  <a:srgbClr val="FFFFFF"/>
+                </a:solidFill>
+              </a14:hiddenFill>
+            </a:ext>
+          </a:extLst>
+        </p:spPr>
+      </p:pic>
+      <p:pic>
+        <p:nvPicPr>
+          <p:cNvPr id="1034" name="Picture 10" descr="Résultat de recherche d'images pour &quot;google scholar logo&quot;&quot;"/>
+          <p:cNvPicPr>
+            <a:picLocks noChangeAspect="1" noChangeArrowheads="1"/>
+          </p:cNvPicPr>
+          <p:nvPr/>
+        </p:nvPicPr>
+        <p:blipFill>
+          <a:blip r:embed="rId6">
+            <a:extLst>
+              <a:ext uri="{28A0092B-C50C-407E-A947-70E740481C1C}">
+                <a14:useLocalDpi xmlns:a14="http://schemas.microsoft.com/office/drawing/2010/main" val="0"/>
+              </a:ext>
+            </a:extLst>
+          </a:blip>
+          <a:srcRect/>
+          <a:stretch>
+            <a:fillRect/>
+          </a:stretch>
+        </p:blipFill>
+        <p:spPr bwMode="auto">
+          <a:xfrm>
+            <a:off x="8033142" y="5137303"/>
+            <a:ext cx="2406980" cy="921997"/>
+          </a:xfrm>
+          <a:prstGeom prst="rect">
+            <a:avLst/>
+          </a:prstGeom>
+          <a:noFill/>
+          <a:extLst>
+            <a:ext uri="{909E8E84-426E-40DD-AFC4-6F175D3DCCD1}">
+              <a14:hiddenFill xmlns:a14="http://schemas.microsoft.com/office/drawing/2010/main">
+                <a:solidFill>
+                  <a:srgbClr val="FFFFFF"/>
+                </a:solidFill>
+              </a14:hiddenFill>
+            </a:ext>
+          </a:extLst>
+        </p:spPr>
+      </p:pic>
+      <p:pic>
+        <p:nvPicPr>
+          <p:cNvPr id="3" name="Picture 2" descr="Résultat de recherche d'images pour &quot;bioconductor logo&quot;&quot;"/>
+          <p:cNvPicPr>
+            <a:picLocks noChangeAspect="1" noChangeArrowheads="1"/>
+          </p:cNvPicPr>
+          <p:nvPr/>
+        </p:nvPicPr>
+        <p:blipFill>
+          <a:blip r:embed="rId7" cstate="print">
+            <a:extLst>
+              <a:ext uri="{28A0092B-C50C-407E-A947-70E740481C1C}">
+                <a14:useLocalDpi xmlns:a14="http://schemas.microsoft.com/office/drawing/2010/main" val="0"/>
+              </a:ext>
+            </a:extLst>
+          </a:blip>
+          <a:srcRect/>
+          <a:stretch>
+            <a:fillRect/>
+          </a:stretch>
+        </p:blipFill>
+        <p:spPr bwMode="auto">
+          <a:xfrm>
+            <a:off x="2633121" y="5664925"/>
+            <a:ext cx="692990" cy="684674"/>
+          </a:xfrm>
+          <a:prstGeom prst="rect">
+            <a:avLst/>
+          </a:prstGeom>
+          <a:noFill/>
+          <a:extLst>
+            <a:ext uri="{909E8E84-426E-40DD-AFC4-6F175D3DCCD1}">
+              <a14:hiddenFill xmlns:a14="http://schemas.microsoft.com/office/drawing/2010/main">
+                <a:solidFill>
+                  <a:srgbClr val="FFFFFF"/>
+                </a:solidFill>
+              </a14:hiddenFill>
+            </a:ext>
+          </a:extLst>
+        </p:spPr>
+      </p:pic>
+    </p:spTree>
+    <p:extLst>
+      <p:ext uri="{BB962C8B-B14F-4D97-AF65-F5344CB8AC3E}">
+        <p14:creationId xmlns:p14="http://schemas.microsoft.com/office/powerpoint/2010/main" val="2585248314"/>
+      </p:ext>
+    </p:extLst>
+  </p:cSld>
+  <p:clrMapOvr>
+    <a:masterClrMapping/>
+  </p:clrMapOvr>
+</p:sld>
+</file>
+
+<file path=ppt/slides/slide11.xml><?xml version="1.0" encoding="utf-8"?>
+<p:sld xmlns:a="http://schemas.openxmlformats.org/drawingml/2006/main" xmlns:r="http://schemas.openxmlformats.org/officeDocument/2006/relationships" xmlns:p="http://schemas.openxmlformats.org/presentationml/2006/main">
+  <p:cSld>
+    <p:spTree>
+      <p:nvGrpSpPr>
+        <p:cNvPr id="1" name=""/>
+        <p:cNvGrpSpPr/>
+        <p:nvPr/>
+      </p:nvGrpSpPr>
+      <p:grpSpPr>
+        <a:xfrm>
+          <a:off x="0" y="0"/>
+          <a:ext cx="0" cy="0"/>
+          <a:chOff x="0" y="0"/>
+          <a:chExt cx="0" cy="0"/>
+        </a:xfrm>
+      </p:grpSpPr>
+      <p:sp>
+        <p:nvSpPr>
           <p:cNvPr id="2" name="OTLSHAPE_TB_00000000000000000000000000000000_LeftEndCaps" hidden="1"/>
           <p:cNvSpPr txBox="1"/>
           <p:nvPr>
@@ -4987,13 +5672,13 @@
               <a:t> the package </a:t>
             </a:r>
             <a:r>
-              <a:rPr lang="fr-FR" sz="1100" b="1" dirty="0" err="1">
+              <a:rPr lang="fr-FR" sz="1100" b="1" dirty="0" smtClean="0">
                 <a:solidFill>
                   <a:schemeClr val="dk1"/>
                 </a:solidFill>
                 <a:latin typeface="Calibri" panose="020F0502020204030204" pitchFamily="34" charset="0"/>
               </a:rPr>
-              <a:t>ROntoTools</a:t>
+              <a:t>DESeq2</a:t>
             </a:r>
             <a:endParaRPr lang="fr-FR" sz="1100" b="1" dirty="0">
               <a:solidFill>
@@ -6622,7 +7307,7 @@
 </p:sld>
 </file>
 
-<file path=ppt/slides/slide11.xml><?xml version="1.0" encoding="utf-8"?>
+<file path=ppt/slides/slide12.xml><?xml version="1.0" encoding="utf-8"?>
 <p:sld xmlns:a="http://schemas.openxmlformats.org/drawingml/2006/main" xmlns:r="http://schemas.openxmlformats.org/officeDocument/2006/relationships" xmlns:p="http://schemas.openxmlformats.org/presentationml/2006/main">
   <p:cSld>
     <p:spTree>
@@ -6657,7 +7342,7 @@
             <a:fld id="{813506F1-DB5F-4FC9-88BA-B486F30FE4BF}" type="slidenum">
               <a:rPr lang="fr-FR" smtClean="0"/>
               <a:pPr/>
-              <a:t>10</a:t>
+              <a:t>11</a:t>
             </a:fld>
             <a:endParaRPr lang="fr-FR" dirty="0"/>
           </a:p>
@@ -8278,9 +8963,21 @@
           <a:p>
             <a:pPr algn="just"/>
             <a:r>
-              <a:rPr lang="fr-FR" sz="2000" dirty="0"/>
-              <a:t>Analyse ‘Topographique’ pour les voies canoniques.</a:t>
-            </a:r>
+              <a:rPr lang="fr-FR" sz="2000" dirty="0" smtClean="0"/>
+              <a:t>Identification des gènes ‘non-canonique’.</a:t>
+            </a:r>
+          </a:p>
+          <a:p>
+            <a:pPr algn="just"/>
+            <a:endParaRPr lang="fr-FR" sz="2000" dirty="0"/>
+          </a:p>
+          <a:p>
+            <a:pPr algn="just"/>
+            <a:r>
+              <a:rPr lang="fr-FR" sz="2000" dirty="0" smtClean="0"/>
+              <a:t>Interprétation des résultats.</a:t>
+            </a:r>
+            <a:endParaRPr lang="fr-FR" sz="2000" dirty="0"/>
           </a:p>
           <a:p>
             <a:pPr algn="just"/>
@@ -8633,21 +9330,15 @@
             </a:pPr>
             <a:r>
               <a:rPr lang="fr-FR" sz="2000" dirty="0"/>
-              <a:t>	- </a:t>
-            </a:r>
-            <a:r>
-              <a:rPr lang="fr-FR" sz="2000" dirty="0" err="1"/>
-              <a:t>ROntoTools</a:t>
-            </a:r>
-            <a:endParaRPr lang="fr-FR" sz="2000" dirty="0"/>
-          </a:p>
-          <a:p>
-            <a:pPr marL="0" indent="0" algn="just">
-              <a:buNone/>
-            </a:pPr>
+              <a:t>	</a:t>
+            </a:r>
+            <a:r>
+              <a:rPr lang="fr-FR" sz="2000" dirty="0" smtClean="0"/>
+              <a:t>- </a:t>
+            </a:r>
             <a:r>
               <a:rPr lang="fr-FR" sz="2000" dirty="0"/>
-              <a:t>	- DESeq2</a:t>
+              <a:t>DESeq2</a:t>
             </a:r>
           </a:p>
         </p:txBody>
@@ -11692,8 +12383,8 @@
         </p:nvSpPr>
         <p:spPr>
           <a:xfrm>
-            <a:off x="364051" y="2480225"/>
-            <a:ext cx="1130300" cy="341037"/>
+            <a:off x="364051" y="2481467"/>
+            <a:ext cx="1130300" cy="338554"/>
           </a:xfrm>
           <a:prstGeom prst="rect">
             <a:avLst/>
@@ -11717,13 +12408,13 @@
               <a:t>Comprendre l'outil </a:t>
             </a:r>
             <a:r>
-              <a:rPr lang="fr-FR" sz="1100" b="1" dirty="0" err="1">
+              <a:rPr lang="fr-FR" sz="1100" b="1" dirty="0" smtClean="0">
                 <a:solidFill>
                   <a:schemeClr val="dk1"/>
                 </a:solidFill>
                 <a:latin typeface="Calibri" panose="020F0502020204030204" pitchFamily="34" charset="0"/>
               </a:rPr>
-              <a:t>ROntoTools</a:t>
+              <a:t>DESeq2</a:t>
             </a:r>
             <a:endParaRPr lang="fr-FR" sz="1100" b="1" dirty="0">
               <a:solidFill>
@@ -13821,40 +14512,53 @@
       </p:grpSpPr>
       <p:sp>
         <p:nvSpPr>
-          <p:cNvPr id="7" name="Slide Number Placeholder 6"/>
+          <p:cNvPr id="4" name="Title 1"/>
           <p:cNvSpPr>
             <a:spLocks noGrp="1"/>
           </p:cNvSpPr>
           <p:nvPr>
-            <p:ph type="sldNum" sz="quarter" idx="4"/>
-          </p:nvPr>
-        </p:nvSpPr>
-        <p:spPr/>
-        <p:txBody>
-          <a:bodyPr/>
-          <a:lstStyle/>
-          <a:p>
-            <a:fld id="{813506F1-DB5F-4FC9-88BA-B486F30FE4BF}" type="slidenum">
-              <a:rPr lang="fr-FR" smtClean="0"/>
-              <a:pPr/>
-              <a:t>6</a:t>
-            </a:fld>
+            <p:ph type="ctrTitle" hasCustomPrompt="1"/>
+          </p:nvPr>
+        </p:nvSpPr>
+        <p:spPr>
+          <a:xfrm>
+            <a:off x="1507524" y="2075932"/>
+            <a:ext cx="9144000" cy="1153942"/>
+          </a:xfrm>
+          <a:prstGeom prst="rect">
+            <a:avLst/>
+          </a:prstGeom>
+        </p:spPr>
+        <p:txBody>
+          <a:bodyPr anchor="b"/>
+          <a:lstStyle>
+            <a:lvl1pPr algn="ctr">
+              <a:defRPr sz="6000"/>
+            </a:lvl1pPr>
+          </a:lstStyle>
+          <a:p>
+            <a:r>
+              <a:rPr lang="en-US" dirty="0"/>
+              <a:t>Metabolic Pathway Analysis</a:t>
+            </a:r>
             <a:endParaRPr lang="fr-FR" dirty="0"/>
           </a:p>
         </p:txBody>
       </p:sp>
       <p:sp>
         <p:nvSpPr>
-          <p:cNvPr id="9" name="Title 1"/>
-          <p:cNvSpPr txBox="1">
-            <a:spLocks/>
+          <p:cNvPr id="5" name="Subtitle 2"/>
+          <p:cNvSpPr>
+            <a:spLocks noGrp="1"/>
           </p:cNvSpPr>
-          <p:nvPr/>
-        </p:nvSpPr>
-        <p:spPr>
-          <a:xfrm>
-            <a:off x="648394" y="2101646"/>
-            <a:ext cx="4460502" cy="733833"/>
+          <p:nvPr>
+            <p:ph type="subTitle" idx="1" hasCustomPrompt="1"/>
+          </p:nvPr>
+        </p:nvSpPr>
+        <p:spPr>
+          <a:xfrm>
+            <a:off x="1507524" y="3321949"/>
+            <a:ext cx="9144000" cy="541594"/>
           </a:xfrm>
           <a:prstGeom prst="rect">
             <a:avLst/>
@@ -13863,747 +14567,47 @@
         <p:txBody>
           <a:bodyPr/>
           <a:lstStyle>
-            <a:lvl1pPr algn="l" defTabSz="914400" rtl="0" eaLnBrk="1" latinLnBrk="0" hangingPunct="1">
-              <a:lnSpc>
-                <a:spcPct val="90000"/>
-              </a:lnSpc>
-              <a:spcBef>
-                <a:spcPct val="0"/>
-              </a:spcBef>
+            <a:lvl1pPr marL="0" indent="0" algn="ctr">
               <a:buNone/>
-              <a:defRPr sz="4400" kern="1200">
-                <a:solidFill>
-                  <a:schemeClr val="tx1"/>
-                </a:solidFill>
-                <a:latin typeface="+mj-lt"/>
-                <a:ea typeface="+mj-ea"/>
-                <a:cs typeface="+mj-cs"/>
-              </a:defRPr>
+              <a:defRPr sz="2400" baseline="0"/>
             </a:lvl1pPr>
-          </a:lstStyle>
-          <a:p>
-            <a:r>
-              <a:rPr lang="fr-FR" dirty="0" err="1"/>
-              <a:t>Context</a:t>
-            </a:r>
-            <a:endParaRPr lang="fr-FR" dirty="0"/>
-          </a:p>
-        </p:txBody>
-      </p:sp>
-      <p:sp>
-        <p:nvSpPr>
-          <p:cNvPr id="10" name="Content Placeholder 2"/>
-          <p:cNvSpPr txBox="1">
-            <a:spLocks/>
-          </p:cNvSpPr>
-          <p:nvPr/>
-        </p:nvSpPr>
-        <p:spPr>
-          <a:xfrm>
-            <a:off x="1223983" y="3508579"/>
-            <a:ext cx="7403977" cy="2219121"/>
-          </a:xfrm>
-          <a:prstGeom prst="rect">
-            <a:avLst/>
-          </a:prstGeom>
-        </p:spPr>
-        <p:txBody>
-          <a:bodyPr>
-            <a:normAutofit/>
-          </a:bodyPr>
-          <a:lstStyle>
-            <a:lvl1pPr marL="228600" indent="-228600" algn="l" defTabSz="914400" rtl="0" eaLnBrk="1" latinLnBrk="0" hangingPunct="1">
-              <a:lnSpc>
-                <a:spcPct val="90000"/>
-              </a:lnSpc>
-              <a:spcBef>
-                <a:spcPts val="1000"/>
-              </a:spcBef>
-              <a:buFont typeface="Arial" panose="020B0604020202020204" pitchFamily="34" charset="0"/>
-              <a:buChar char="•"/>
-              <a:defRPr sz="2800" kern="1200">
-                <a:solidFill>
-                  <a:schemeClr val="tx1"/>
-                </a:solidFill>
-                <a:latin typeface="+mn-lt"/>
-                <a:ea typeface="+mn-ea"/>
-                <a:cs typeface="+mn-cs"/>
-              </a:defRPr>
-            </a:lvl1pPr>
-            <a:lvl2pPr marL="685800" indent="-228600" algn="l" defTabSz="914400" rtl="0" eaLnBrk="1" latinLnBrk="0" hangingPunct="1">
-              <a:lnSpc>
-                <a:spcPct val="90000"/>
-              </a:lnSpc>
-              <a:spcBef>
-                <a:spcPts val="500"/>
-              </a:spcBef>
-              <a:buFont typeface="Arial" panose="020B0604020202020204" pitchFamily="34" charset="0"/>
-              <a:buChar char="•"/>
-              <a:defRPr sz="2400" kern="1200">
-                <a:solidFill>
-                  <a:schemeClr val="tx1"/>
-                </a:solidFill>
-                <a:latin typeface="+mn-lt"/>
-                <a:ea typeface="+mn-ea"/>
-                <a:cs typeface="+mn-cs"/>
-              </a:defRPr>
+            <a:lvl2pPr marL="457200" indent="0" algn="ctr">
+              <a:buNone/>
+              <a:defRPr sz="2000"/>
             </a:lvl2pPr>
-            <a:lvl3pPr marL="1143000" indent="-228600" algn="l" defTabSz="914400" rtl="0" eaLnBrk="1" latinLnBrk="0" hangingPunct="1">
-              <a:lnSpc>
-                <a:spcPct val="90000"/>
-              </a:lnSpc>
-              <a:spcBef>
-                <a:spcPts val="500"/>
-              </a:spcBef>
-              <a:buFont typeface="Arial" panose="020B0604020202020204" pitchFamily="34" charset="0"/>
-              <a:buChar char="•"/>
-              <a:defRPr sz="2000" kern="1200">
-                <a:solidFill>
-                  <a:schemeClr val="tx1"/>
-                </a:solidFill>
-                <a:latin typeface="+mn-lt"/>
-                <a:ea typeface="+mn-ea"/>
-                <a:cs typeface="+mn-cs"/>
-              </a:defRPr>
+            <a:lvl3pPr marL="914400" indent="0" algn="ctr">
+              <a:buNone/>
+              <a:defRPr sz="1800"/>
             </a:lvl3pPr>
-            <a:lvl4pPr marL="1600200" indent="-228600" algn="l" defTabSz="914400" rtl="0" eaLnBrk="1" latinLnBrk="0" hangingPunct="1">
-              <a:lnSpc>
-                <a:spcPct val="90000"/>
-              </a:lnSpc>
-              <a:spcBef>
-                <a:spcPts val="500"/>
-              </a:spcBef>
-              <a:buFont typeface="Arial" panose="020B0604020202020204" pitchFamily="34" charset="0"/>
-              <a:buChar char="•"/>
-              <a:defRPr sz="1800" kern="1200">
-                <a:solidFill>
-                  <a:schemeClr val="tx1"/>
-                </a:solidFill>
-                <a:latin typeface="+mn-lt"/>
-                <a:ea typeface="+mn-ea"/>
-                <a:cs typeface="+mn-cs"/>
-              </a:defRPr>
+            <a:lvl4pPr marL="1371600" indent="0" algn="ctr">
+              <a:buNone/>
+              <a:defRPr sz="1600"/>
             </a:lvl4pPr>
-            <a:lvl5pPr marL="2057400" indent="-228600" algn="l" defTabSz="914400" rtl="0" eaLnBrk="1" latinLnBrk="0" hangingPunct="1">
-              <a:lnSpc>
-                <a:spcPct val="90000"/>
-              </a:lnSpc>
-              <a:spcBef>
-                <a:spcPts val="500"/>
-              </a:spcBef>
-              <a:buFont typeface="Arial" panose="020B0604020202020204" pitchFamily="34" charset="0"/>
-              <a:buChar char="•"/>
-              <a:defRPr sz="1800" kern="1200">
-                <a:solidFill>
-                  <a:schemeClr val="tx1"/>
-                </a:solidFill>
-                <a:latin typeface="+mn-lt"/>
-                <a:ea typeface="+mn-ea"/>
-                <a:cs typeface="+mn-cs"/>
-              </a:defRPr>
+            <a:lvl5pPr marL="1828800" indent="0" algn="ctr">
+              <a:buNone/>
+              <a:defRPr sz="1600"/>
             </a:lvl5pPr>
-            <a:lvl6pPr marL="2514600" indent="-228600" algn="l" defTabSz="914400" rtl="0" eaLnBrk="1" latinLnBrk="0" hangingPunct="1">
-              <a:lnSpc>
-                <a:spcPct val="90000"/>
-              </a:lnSpc>
-              <a:spcBef>
-                <a:spcPts val="500"/>
-              </a:spcBef>
-              <a:buFont typeface="Arial" panose="020B0604020202020204" pitchFamily="34" charset="0"/>
-              <a:buChar char="•"/>
-              <a:defRPr sz="1800" kern="1200">
-                <a:solidFill>
-                  <a:schemeClr val="tx1"/>
-                </a:solidFill>
-                <a:latin typeface="+mn-lt"/>
-                <a:ea typeface="+mn-ea"/>
-                <a:cs typeface="+mn-cs"/>
-              </a:defRPr>
+            <a:lvl6pPr marL="2286000" indent="0" algn="ctr">
+              <a:buNone/>
+              <a:defRPr sz="1600"/>
             </a:lvl6pPr>
-            <a:lvl7pPr marL="2971800" indent="-228600" algn="l" defTabSz="914400" rtl="0" eaLnBrk="1" latinLnBrk="0" hangingPunct="1">
-              <a:lnSpc>
-                <a:spcPct val="90000"/>
-              </a:lnSpc>
-              <a:spcBef>
-                <a:spcPts val="500"/>
-              </a:spcBef>
-              <a:buFont typeface="Arial" panose="020B0604020202020204" pitchFamily="34" charset="0"/>
-              <a:buChar char="•"/>
-              <a:defRPr sz="1800" kern="1200">
-                <a:solidFill>
-                  <a:schemeClr val="tx1"/>
-                </a:solidFill>
-                <a:latin typeface="+mn-lt"/>
-                <a:ea typeface="+mn-ea"/>
-                <a:cs typeface="+mn-cs"/>
-              </a:defRPr>
+            <a:lvl7pPr marL="2743200" indent="0" algn="ctr">
+              <a:buNone/>
+              <a:defRPr sz="1600"/>
             </a:lvl7pPr>
-            <a:lvl8pPr marL="3429000" indent="-228600" algn="l" defTabSz="914400" rtl="0" eaLnBrk="1" latinLnBrk="0" hangingPunct="1">
-              <a:lnSpc>
-                <a:spcPct val="90000"/>
-              </a:lnSpc>
-              <a:spcBef>
-                <a:spcPts val="500"/>
-              </a:spcBef>
-              <a:buFont typeface="Arial" panose="020B0604020202020204" pitchFamily="34" charset="0"/>
-              <a:buChar char="•"/>
-              <a:defRPr sz="1800" kern="1200">
-                <a:solidFill>
-                  <a:schemeClr val="tx1"/>
-                </a:solidFill>
-                <a:latin typeface="+mn-lt"/>
-                <a:ea typeface="+mn-ea"/>
-                <a:cs typeface="+mn-cs"/>
-              </a:defRPr>
+            <a:lvl8pPr marL="3200400" indent="0" algn="ctr">
+              <a:buNone/>
+              <a:defRPr sz="1600"/>
             </a:lvl8pPr>
-            <a:lvl9pPr marL="3886200" indent="-228600" algn="l" defTabSz="914400" rtl="0" eaLnBrk="1" latinLnBrk="0" hangingPunct="1">
-              <a:lnSpc>
-                <a:spcPct val="90000"/>
-              </a:lnSpc>
-              <a:spcBef>
-                <a:spcPts val="500"/>
-              </a:spcBef>
-              <a:buFont typeface="Arial" panose="020B0604020202020204" pitchFamily="34" charset="0"/>
-              <a:buChar char="•"/>
-              <a:defRPr sz="1800" kern="1200">
-                <a:solidFill>
-                  <a:schemeClr val="tx1"/>
-                </a:solidFill>
-                <a:latin typeface="+mn-lt"/>
-                <a:ea typeface="+mn-ea"/>
-                <a:cs typeface="+mn-cs"/>
-              </a:defRPr>
+            <a:lvl9pPr marL="3657600" indent="0" algn="ctr">
+              <a:buNone/>
+              <a:defRPr sz="1600"/>
             </a:lvl9pPr>
           </a:lstStyle>
           <a:p>
-            <a:pPr algn="just"/>
-            <a:r>
-              <a:rPr lang="fr-FR" sz="2000" dirty="0"/>
-              <a:t>No </a:t>
-            </a:r>
-            <a:r>
-              <a:rPr lang="fr-FR" sz="2000" dirty="0" err="1"/>
-              <a:t>tool</a:t>
-            </a:r>
-            <a:r>
-              <a:rPr lang="fr-FR" sz="2000" dirty="0"/>
-              <a:t> </a:t>
-            </a:r>
-            <a:r>
-              <a:rPr lang="fr-FR" sz="2000" dirty="0" err="1"/>
-              <a:t>already</a:t>
-            </a:r>
-            <a:r>
-              <a:rPr lang="fr-FR" sz="2000" dirty="0"/>
-              <a:t> </a:t>
-            </a:r>
-            <a:r>
-              <a:rPr lang="fr-FR" sz="2000" dirty="0" err="1"/>
-              <a:t>exists</a:t>
-            </a:r>
-            <a:r>
-              <a:rPr lang="fr-FR" sz="2000" dirty="0"/>
-              <a:t> for non-canonical </a:t>
-            </a:r>
-            <a:r>
-              <a:rPr lang="fr-FR" sz="2000" dirty="0" err="1"/>
-              <a:t>pathways</a:t>
-            </a:r>
-            <a:endParaRPr lang="fr-FR" sz="2000" dirty="0"/>
-          </a:p>
-          <a:p>
-            <a:pPr algn="just"/>
-            <a:endParaRPr lang="fr-FR" sz="2000" dirty="0"/>
-          </a:p>
-          <a:p>
-            <a:pPr algn="just"/>
-            <a:r>
-              <a:rPr lang="fr-FR" sz="2000" dirty="0"/>
-              <a:t>Non-canonical </a:t>
-            </a:r>
-            <a:r>
-              <a:rPr lang="fr-FR" sz="2000" dirty="0">
-                <a:sym typeface="Wingdings" panose="05000000000000000000" pitchFamily="2" charset="2"/>
-              </a:rPr>
-              <a:t> Non standard </a:t>
-            </a:r>
-            <a:r>
-              <a:rPr lang="fr-FR" sz="2000" dirty="0" err="1">
-                <a:sym typeface="Wingdings" panose="05000000000000000000" pitchFamily="2" charset="2"/>
-              </a:rPr>
-              <a:t>pathways</a:t>
-            </a:r>
-            <a:endParaRPr lang="fr-FR" sz="2000" dirty="0"/>
-          </a:p>
-          <a:p>
-            <a:pPr algn="just"/>
-            <a:endParaRPr lang="fr-FR" sz="2000" dirty="0"/>
-          </a:p>
-          <a:p>
-            <a:pPr algn="just"/>
-            <a:r>
-              <a:rPr lang="fr-FR" sz="2000" dirty="0" err="1"/>
-              <a:t>Example</a:t>
-            </a:r>
-            <a:r>
-              <a:rPr lang="fr-FR" sz="2000" dirty="0"/>
-              <a:t> : La </a:t>
-            </a:r>
-            <a:r>
-              <a:rPr lang="fr-FR" sz="2000" dirty="0" err="1"/>
-              <a:t>glycolysis</a:t>
-            </a:r>
-            <a:r>
-              <a:rPr lang="fr-FR" sz="2000" dirty="0"/>
-              <a:t> + Krebs’ cycle</a:t>
-            </a:r>
-          </a:p>
-        </p:txBody>
-      </p:sp>
-      <p:sp>
-        <p:nvSpPr>
-          <p:cNvPr id="2" name="ZoneTexte 1"/>
-          <p:cNvSpPr txBox="1"/>
-          <p:nvPr/>
-        </p:nvSpPr>
-        <p:spPr>
-          <a:xfrm>
-            <a:off x="9013978" y="2783989"/>
-            <a:ext cx="1062535" cy="369332"/>
-          </a:xfrm>
-          <a:prstGeom prst="rect">
-            <a:avLst/>
-          </a:prstGeom>
-          <a:noFill/>
-        </p:spPr>
-        <p:txBody>
-          <a:bodyPr wrap="none" rtlCol="0">
-            <a:spAutoFit/>
-          </a:bodyPr>
-          <a:lstStyle/>
-          <a:p>
-            <a:r>
-              <a:rPr lang="fr-FR" dirty="0"/>
-              <a:t>Glycolyse</a:t>
-            </a:r>
-          </a:p>
-        </p:txBody>
-      </p:sp>
-      <p:sp>
-        <p:nvSpPr>
-          <p:cNvPr id="6" name="ZoneTexte 5"/>
-          <p:cNvSpPr txBox="1"/>
-          <p:nvPr/>
-        </p:nvSpPr>
-        <p:spPr>
-          <a:xfrm>
-            <a:off x="9042400" y="4067379"/>
-            <a:ext cx="1009956" cy="369332"/>
-          </a:xfrm>
-          <a:prstGeom prst="rect">
-            <a:avLst/>
-          </a:prstGeom>
-          <a:noFill/>
-        </p:spPr>
-        <p:txBody>
-          <a:bodyPr wrap="none" rtlCol="0">
-            <a:spAutoFit/>
-          </a:bodyPr>
-          <a:lstStyle/>
-          <a:p>
-            <a:r>
-              <a:rPr lang="fr-FR" dirty="0"/>
-              <a:t>Pyruvate</a:t>
-            </a:r>
-          </a:p>
-        </p:txBody>
-      </p:sp>
-      <p:sp>
-        <p:nvSpPr>
-          <p:cNvPr id="8" name="ZoneTexte 7"/>
-          <p:cNvSpPr txBox="1"/>
-          <p:nvPr/>
-        </p:nvSpPr>
-        <p:spPr>
-          <a:xfrm>
-            <a:off x="9195230" y="5257475"/>
-            <a:ext cx="704295" cy="369332"/>
-          </a:xfrm>
-          <a:prstGeom prst="rect">
-            <a:avLst/>
-          </a:prstGeom>
-          <a:noFill/>
-        </p:spPr>
-        <p:txBody>
-          <a:bodyPr wrap="none" rtlCol="0">
-            <a:spAutoFit/>
-          </a:bodyPr>
-          <a:lstStyle/>
-          <a:p>
-            <a:r>
-              <a:rPr lang="fr-FR" dirty="0"/>
-              <a:t>Krebs</a:t>
-            </a:r>
-          </a:p>
-        </p:txBody>
-      </p:sp>
-      <p:sp>
-        <p:nvSpPr>
-          <p:cNvPr id="3" name="Flèche courbée vers la gauche 2"/>
-          <p:cNvSpPr/>
-          <p:nvPr/>
-        </p:nvSpPr>
-        <p:spPr>
-          <a:xfrm rot="10800000">
-            <a:off x="8390435" y="2835479"/>
-            <a:ext cx="647700" cy="1558222"/>
-          </a:xfrm>
-          <a:prstGeom prst="curvedLeftArrow">
-            <a:avLst>
-              <a:gd name="adj1" fmla="val 25000"/>
-              <a:gd name="adj2" fmla="val 57906"/>
-              <a:gd name="adj3" fmla="val 25000"/>
-            </a:avLst>
-          </a:prstGeom>
-          <a:solidFill>
-            <a:schemeClr val="accent4">
-              <a:lumMod val="60000"/>
-              <a:lumOff val="40000"/>
-            </a:schemeClr>
-          </a:solidFill>
-          <a:ln>
-            <a:solidFill>
-              <a:schemeClr val="tx1"/>
-            </a:solidFill>
-          </a:ln>
-        </p:spPr>
-        <p:style>
-          <a:lnRef idx="2">
-            <a:schemeClr val="accent1">
-              <a:shade val="50000"/>
-            </a:schemeClr>
-          </a:lnRef>
-          <a:fillRef idx="1">
-            <a:schemeClr val="accent1"/>
-          </a:fillRef>
-          <a:effectRef idx="0">
-            <a:schemeClr val="accent1"/>
-          </a:effectRef>
-          <a:fontRef idx="minor">
-            <a:schemeClr val="lt1"/>
-          </a:fontRef>
-        </p:style>
-        <p:txBody>
-          <a:bodyPr rtlCol="0" anchor="ctr"/>
-          <a:lstStyle/>
-          <a:p>
-            <a:pPr algn="ctr"/>
-            <a:endParaRPr lang="fr-FR">
-              <a:solidFill>
-                <a:schemeClr val="tx1"/>
-              </a:solidFill>
-            </a:endParaRPr>
-          </a:p>
-        </p:txBody>
-      </p:sp>
-      <p:sp>
-        <p:nvSpPr>
-          <p:cNvPr id="11" name="Flèche courbée vers la gauche 10"/>
-          <p:cNvSpPr/>
-          <p:nvPr/>
-        </p:nvSpPr>
-        <p:spPr>
-          <a:xfrm>
-            <a:off x="10052356" y="2933700"/>
-            <a:ext cx="647700" cy="1557190"/>
-          </a:xfrm>
-          <a:prstGeom prst="curvedLeftArrow">
-            <a:avLst>
-              <a:gd name="adj1" fmla="val 25000"/>
-              <a:gd name="adj2" fmla="val 57906"/>
-              <a:gd name="adj3" fmla="val 25000"/>
-            </a:avLst>
-          </a:prstGeom>
-          <a:solidFill>
-            <a:schemeClr val="accent4">
-              <a:lumMod val="60000"/>
-              <a:lumOff val="40000"/>
-            </a:schemeClr>
-          </a:solidFill>
-          <a:ln>
-            <a:solidFill>
-              <a:schemeClr val="tx1"/>
-            </a:solidFill>
-          </a:ln>
-        </p:spPr>
-        <p:style>
-          <a:lnRef idx="2">
-            <a:schemeClr val="accent1">
-              <a:shade val="50000"/>
-            </a:schemeClr>
-          </a:lnRef>
-          <a:fillRef idx="1">
-            <a:schemeClr val="accent1"/>
-          </a:fillRef>
-          <a:effectRef idx="0">
-            <a:schemeClr val="accent1"/>
-          </a:effectRef>
-          <a:fontRef idx="minor">
-            <a:schemeClr val="lt1"/>
-          </a:fontRef>
-        </p:style>
-        <p:txBody>
-          <a:bodyPr rtlCol="0" anchor="ctr"/>
-          <a:lstStyle/>
-          <a:p>
-            <a:pPr algn="ctr"/>
-            <a:endParaRPr lang="fr-FR">
-              <a:solidFill>
-                <a:schemeClr val="tx1"/>
-              </a:solidFill>
-            </a:endParaRPr>
-          </a:p>
-        </p:txBody>
-      </p:sp>
-      <p:sp>
-        <p:nvSpPr>
-          <p:cNvPr id="4" name="Flèche droite 3"/>
-          <p:cNvSpPr/>
-          <p:nvPr/>
-        </p:nvSpPr>
-        <p:spPr>
-          <a:xfrm rot="5400000">
-            <a:off x="9186671" y="4687578"/>
-            <a:ext cx="717147" cy="373210"/>
-          </a:xfrm>
-          <a:prstGeom prst="rightArrow">
-            <a:avLst/>
-          </a:prstGeom>
-          <a:solidFill>
-            <a:schemeClr val="accent4">
-              <a:lumMod val="60000"/>
-              <a:lumOff val="40000"/>
-            </a:schemeClr>
-          </a:solidFill>
-          <a:ln>
-            <a:solidFill>
-              <a:schemeClr val="tx1"/>
-            </a:solidFill>
-          </a:ln>
-        </p:spPr>
-        <p:style>
-          <a:lnRef idx="2">
-            <a:schemeClr val="accent1">
-              <a:shade val="50000"/>
-            </a:schemeClr>
-          </a:lnRef>
-          <a:fillRef idx="1">
-            <a:schemeClr val="accent1"/>
-          </a:fillRef>
-          <a:effectRef idx="0">
-            <a:schemeClr val="accent1"/>
-          </a:effectRef>
-          <a:fontRef idx="minor">
-            <a:schemeClr val="lt1"/>
-          </a:fontRef>
-        </p:style>
-        <p:txBody>
-          <a:bodyPr rtlCol="0" anchor="ctr"/>
-          <a:lstStyle/>
-          <a:p>
-            <a:pPr algn="ctr"/>
-            <a:endParaRPr lang="fr-FR"/>
-          </a:p>
-        </p:txBody>
-      </p:sp>
-      <p:sp>
-        <p:nvSpPr>
-          <p:cNvPr id="5" name="Bouée 4"/>
-          <p:cNvSpPr/>
-          <p:nvPr/>
-        </p:nvSpPr>
-        <p:spPr>
-          <a:xfrm>
-            <a:off x="9038135" y="5727700"/>
-            <a:ext cx="999403" cy="999403"/>
-          </a:xfrm>
-          <a:prstGeom prst="donut">
-            <a:avLst>
-              <a:gd name="adj" fmla="val 14834"/>
-            </a:avLst>
-          </a:prstGeom>
-          <a:solidFill>
-            <a:schemeClr val="accent4">
-              <a:lumMod val="60000"/>
-              <a:lumOff val="40000"/>
-            </a:schemeClr>
-          </a:solidFill>
-          <a:ln>
-            <a:solidFill>
-              <a:schemeClr val="tx1"/>
-            </a:solidFill>
-          </a:ln>
-        </p:spPr>
-        <p:style>
-          <a:lnRef idx="2">
-            <a:schemeClr val="accent1">
-              <a:shade val="50000"/>
-            </a:schemeClr>
-          </a:lnRef>
-          <a:fillRef idx="1">
-            <a:schemeClr val="accent1"/>
-          </a:fillRef>
-          <a:effectRef idx="0">
-            <a:schemeClr val="accent1"/>
-          </a:effectRef>
-          <a:fontRef idx="minor">
-            <a:schemeClr val="lt1"/>
-          </a:fontRef>
-        </p:style>
-        <p:txBody>
-          <a:bodyPr rtlCol="0" anchor="ctr"/>
-          <a:lstStyle/>
-          <a:p>
-            <a:pPr algn="ctr"/>
-            <a:endParaRPr lang="fr-FR">
-              <a:solidFill>
-                <a:schemeClr val="tx1"/>
-              </a:solidFill>
-            </a:endParaRPr>
-          </a:p>
-        </p:txBody>
-      </p:sp>
-      <p:sp>
-        <p:nvSpPr>
-          <p:cNvPr id="12" name="Triangle isocèle 11"/>
-          <p:cNvSpPr/>
-          <p:nvPr/>
-        </p:nvSpPr>
-        <p:spPr>
-          <a:xfrm rot="5400000">
-            <a:off x="9361095" y="5701263"/>
-            <a:ext cx="368300" cy="219388"/>
-          </a:xfrm>
-          <a:prstGeom prst="triangle">
-            <a:avLst/>
-          </a:prstGeom>
-          <a:solidFill>
-            <a:schemeClr val="accent4">
-              <a:lumMod val="60000"/>
-              <a:lumOff val="40000"/>
-            </a:schemeClr>
-          </a:solidFill>
-          <a:ln>
-            <a:solidFill>
-              <a:schemeClr val="tx1"/>
-            </a:solidFill>
-          </a:ln>
-        </p:spPr>
-        <p:style>
-          <a:lnRef idx="2">
-            <a:schemeClr val="accent1">
-              <a:shade val="50000"/>
-            </a:schemeClr>
-          </a:lnRef>
-          <a:fillRef idx="1">
-            <a:schemeClr val="accent1"/>
-          </a:fillRef>
-          <a:effectRef idx="0">
-            <a:schemeClr val="accent1"/>
-          </a:effectRef>
-          <a:fontRef idx="minor">
-            <a:schemeClr val="lt1"/>
-          </a:fontRef>
-        </p:style>
-        <p:txBody>
-          <a:bodyPr rtlCol="0" anchor="ctr"/>
-          <a:lstStyle/>
-          <a:p>
-            <a:pPr algn="ctr"/>
-            <a:endParaRPr lang="fr-FR"/>
-          </a:p>
-        </p:txBody>
-      </p:sp>
-      <p:sp>
-        <p:nvSpPr>
-          <p:cNvPr id="13" name="Virage 12"/>
-          <p:cNvSpPr/>
-          <p:nvPr/>
-        </p:nvSpPr>
-        <p:spPr>
-          <a:xfrm rot="10800000" flipH="1">
-            <a:off x="9731851" y="4515609"/>
-            <a:ext cx="1379588" cy="737886"/>
-          </a:xfrm>
-          <a:prstGeom prst="bentArrow">
-            <a:avLst/>
-          </a:prstGeom>
-          <a:solidFill>
-            <a:schemeClr val="accent4">
-              <a:lumMod val="60000"/>
-              <a:lumOff val="40000"/>
-            </a:schemeClr>
-          </a:solidFill>
-          <a:ln>
-            <a:solidFill>
-              <a:schemeClr val="tx1"/>
-            </a:solidFill>
-          </a:ln>
-        </p:spPr>
-        <p:style>
-          <a:lnRef idx="2">
-            <a:schemeClr val="accent1">
-              <a:shade val="50000"/>
-            </a:schemeClr>
-          </a:lnRef>
-          <a:fillRef idx="1">
-            <a:schemeClr val="accent1"/>
-          </a:fillRef>
-          <a:effectRef idx="0">
-            <a:schemeClr val="accent1"/>
-          </a:effectRef>
-          <a:fontRef idx="minor">
-            <a:schemeClr val="lt1"/>
-          </a:fontRef>
-        </p:style>
-        <p:txBody>
-          <a:bodyPr rtlCol="0" anchor="ctr"/>
-          <a:lstStyle/>
-          <a:p>
-            <a:pPr algn="ctr"/>
-            <a:endParaRPr lang="fr-FR">
-              <a:solidFill>
-                <a:schemeClr val="tx1"/>
-              </a:solidFill>
-            </a:endParaRPr>
-          </a:p>
-        </p:txBody>
-      </p:sp>
-      <p:sp>
-        <p:nvSpPr>
-          <p:cNvPr id="14" name="ZoneTexte 13"/>
-          <p:cNvSpPr txBox="1"/>
-          <p:nvPr/>
-        </p:nvSpPr>
-        <p:spPr>
-          <a:xfrm>
-            <a:off x="11155763" y="4863424"/>
-            <a:ext cx="731290" cy="369332"/>
-          </a:xfrm>
-          <a:prstGeom prst="rect">
-            <a:avLst/>
-          </a:prstGeom>
-          <a:noFill/>
-        </p:spPr>
-        <p:txBody>
-          <a:bodyPr wrap="none" rtlCol="0">
-            <a:spAutoFit/>
-          </a:bodyPr>
-          <a:lstStyle/>
-          <a:p>
-            <a:r>
-              <a:rPr lang="fr-FR" dirty="0" err="1"/>
-              <a:t>Other</a:t>
+            <a:r>
+              <a:rPr lang="en-US" dirty="0"/>
+              <a:t>DUPIS Alexis, VIDAL Ugo, TERRIEN Marie, LEFOL Yohan</a:t>
             </a:r>
             <a:endParaRPr lang="fr-FR" dirty="0"/>
           </a:p>
@@ -14612,7 +14616,7 @@
     </p:spTree>
     <p:extLst>
       <p:ext uri="{BB962C8B-B14F-4D97-AF65-F5344CB8AC3E}">
-        <p14:creationId xmlns:p14="http://schemas.microsoft.com/office/powerpoint/2010/main" val="384720552"/>
+        <p14:creationId xmlns:p14="http://schemas.microsoft.com/office/powerpoint/2010/main" val="80153394"/>
       </p:ext>
     </p:extLst>
   </p:cSld>
@@ -14641,7 +14645,7 @@
       </p:grpSpPr>
       <p:sp>
         <p:nvSpPr>
-          <p:cNvPr id="9" name="Slide Number Placeholder 8"/>
+          <p:cNvPr id="7" name="Slide Number Placeholder 6"/>
           <p:cNvSpPr>
             <a:spLocks noGrp="1"/>
           </p:cNvSpPr>
@@ -14665,7 +14669,7 @@
       </p:sp>
       <p:sp>
         <p:nvSpPr>
-          <p:cNvPr id="11" name="Title 1"/>
+          <p:cNvPr id="9" name="Title 1"/>
           <p:cNvSpPr txBox="1">
             <a:spLocks/>
           </p:cNvSpPr>
@@ -14703,15 +14707,16 @@
           </a:lstStyle>
           <a:p>
             <a:r>
-              <a:rPr lang="fr-FR" dirty="0"/>
-              <a:t>Goals</a:t>
-            </a:r>
-          </a:p>
-        </p:txBody>
-      </p:sp>
-      <p:sp>
-        <p:nvSpPr>
-          <p:cNvPr id="12" name="Content Placeholder 2"/>
+              <a:rPr lang="fr-FR" dirty="0" err="1"/>
+              <a:t>Context</a:t>
+            </a:r>
+            <a:endParaRPr lang="fr-FR" dirty="0"/>
+          </a:p>
+        </p:txBody>
+      </p:sp>
+      <p:sp>
+        <p:nvSpPr>
+          <p:cNvPr id="10" name="Content Placeholder 2"/>
           <p:cNvSpPr txBox="1">
             <a:spLocks/>
           </p:cNvSpPr>
@@ -14719,8 +14724,8 @@
         </p:nvSpPr>
         <p:spPr>
           <a:xfrm>
-            <a:off x="1236683" y="2835479"/>
-            <a:ext cx="7403977" cy="3842158"/>
+            <a:off x="1223983" y="3508579"/>
+            <a:ext cx="7403977" cy="2219121"/>
           </a:xfrm>
           <a:prstGeom prst="rect">
             <a:avLst/>
@@ -14897,67 +14902,38 @@
           <a:p>
             <a:pPr algn="just"/>
             <a:r>
+              <a:rPr lang="fr-FR" sz="2000" dirty="0"/>
+              <a:t>No </a:t>
+            </a:r>
+            <a:r>
               <a:rPr lang="fr-FR" sz="2000" dirty="0" err="1"/>
-              <a:t>Create</a:t>
-            </a:r>
-            <a:r>
-              <a:rPr lang="fr-FR" sz="2000" dirty="0"/>
-              <a:t> an user </a:t>
-            </a:r>
-            <a:r>
-              <a:rPr lang="fr-FR" sz="2000" dirty="0" err="1"/>
-              <a:t>friendly</a:t>
+              <a:t>tool</a:t>
             </a:r>
             <a:r>
               <a:rPr lang="fr-FR" sz="2000" dirty="0"/>
               <a:t> </a:t>
             </a:r>
             <a:r>
+              <a:rPr lang="fr-FR" sz="2000" dirty="0" err="1" smtClean="0"/>
+              <a:t>currently</a:t>
+            </a:r>
+            <a:r>
+              <a:rPr lang="fr-FR" sz="2000" dirty="0" smtClean="0"/>
+              <a:t> </a:t>
+            </a:r>
+            <a:r>
               <a:rPr lang="fr-FR" sz="2000" dirty="0" err="1"/>
-              <a:t>tool</a:t>
+              <a:t>exists</a:t>
+            </a:r>
+            <a:r>
+              <a:rPr lang="fr-FR" sz="2000" dirty="0"/>
+              <a:t> for non-canonical </a:t>
+            </a:r>
+            <a:r>
+              <a:rPr lang="fr-FR" sz="2000" dirty="0" err="1"/>
+              <a:t>pathways</a:t>
             </a:r>
             <a:endParaRPr lang="fr-FR" sz="2000" dirty="0"/>
-          </a:p>
-          <a:p>
-            <a:pPr marL="0" indent="0" algn="just">
-              <a:buNone/>
-            </a:pPr>
-            <a:endParaRPr lang="fr-FR" sz="2000" dirty="0"/>
-          </a:p>
-          <a:p>
-            <a:pPr algn="just"/>
-            <a:r>
-              <a:rPr lang="fr-FR" sz="2000" dirty="0" err="1"/>
-              <a:t>Results</a:t>
-            </a:r>
-            <a:r>
-              <a:rPr lang="fr-FR" sz="2000" dirty="0"/>
-              <a:t> </a:t>
-            </a:r>
-            <a:r>
-              <a:rPr lang="fr-FR" sz="2000" dirty="0" err="1"/>
-              <a:t>clear</a:t>
-            </a:r>
-            <a:r>
-              <a:rPr lang="fr-FR" sz="2000" dirty="0"/>
-              <a:t> and </a:t>
-            </a:r>
-            <a:r>
-              <a:rPr lang="fr-FR" sz="2000" dirty="0" err="1"/>
-              <a:t>publishable</a:t>
-            </a:r>
-            <a:r>
-              <a:rPr lang="fr-FR" sz="2000" dirty="0"/>
-              <a:t> in </a:t>
-            </a:r>
-            <a:r>
-              <a:rPr lang="fr-FR" sz="2000" dirty="0" err="1"/>
-              <a:t>scientific</a:t>
-            </a:r>
-            <a:r>
-              <a:rPr lang="fr-FR" sz="2000" dirty="0"/>
-              <a:t> publication</a:t>
-            </a:r>
           </a:p>
           <a:p>
             <a:pPr algn="just"/>
@@ -14966,23 +14942,19 @@
           <a:p>
             <a:pPr algn="just"/>
             <a:r>
-              <a:rPr lang="fr-FR" sz="2000" dirty="0" err="1"/>
-              <a:t>Topographic</a:t>
-            </a:r>
-            <a:r>
               <a:rPr lang="fr-FR" sz="2000" dirty="0"/>
-              <a:t> </a:t>
-            </a:r>
-            <a:r>
-              <a:rPr lang="fr-FR" sz="2000" dirty="0" err="1"/>
-              <a:t>analysis</a:t>
-            </a:r>
-            <a:r>
-              <a:rPr lang="fr-FR" sz="2000" dirty="0"/>
-              <a:t> for canonical </a:t>
-            </a:r>
-            <a:r>
-              <a:rPr lang="fr-FR" sz="2000" dirty="0" err="1"/>
+              <a:t>Non-canonical </a:t>
+            </a:r>
+            <a:r>
+              <a:rPr lang="fr-FR" sz="2000" dirty="0">
+                <a:sym typeface="Wingdings" panose="05000000000000000000" pitchFamily="2" charset="2"/>
+              </a:rPr>
+              <a:t> Non standard </a:t>
+            </a:r>
+            <a:r>
+              <a:rPr lang="fr-FR" sz="2000" dirty="0" err="1">
+                <a:sym typeface="Wingdings" panose="05000000000000000000" pitchFamily="2" charset="2"/>
+              </a:rPr>
               <a:t>pathways</a:t>
             </a:r>
             <a:endParaRPr lang="fr-FR" sz="2000" dirty="0"/>
@@ -14994,53 +14966,481 @@
           <a:p>
             <a:pPr algn="just"/>
             <a:r>
+              <a:rPr lang="fr-FR" sz="2000" dirty="0" err="1"/>
+              <a:t>Example</a:t>
+            </a:r>
+            <a:r>
               <a:rPr lang="fr-FR" sz="2000" dirty="0"/>
-              <a:t>On the </a:t>
-            </a:r>
-            <a:r>
-              <a:rPr lang="fr-FR" sz="2000" dirty="0" err="1"/>
-              <a:t>client’s</a:t>
+              <a:t> : </a:t>
+            </a:r>
+            <a:r>
+              <a:rPr lang="fr-FR" sz="2000" dirty="0" err="1" smtClean="0"/>
+              <a:t>Glycolysis</a:t>
+            </a:r>
+            <a:r>
+              <a:rPr lang="fr-FR" sz="2000" dirty="0" smtClean="0"/>
+              <a:t> + Krebs </a:t>
             </a:r>
             <a:r>
               <a:rPr lang="fr-FR" sz="2000" dirty="0"/>
-              <a:t> </a:t>
-            </a:r>
-            <a:r>
-              <a:rPr lang="fr-FR" sz="2000" dirty="0" err="1"/>
-              <a:t>website</a:t>
-            </a:r>
-            <a:r>
-              <a:rPr lang="fr-FR" sz="2000" dirty="0"/>
-              <a:t> (</a:t>
-            </a:r>
-            <a:r>
-              <a:rPr lang="fr-FR" sz="2000" dirty="0" err="1"/>
-              <a:t>Cellomet</a:t>
-            </a:r>
-            <a:r>
-              <a:rPr lang="fr-FR" sz="2000" dirty="0"/>
-              <a:t>)</a:t>
-            </a:r>
-          </a:p>
-          <a:p>
-            <a:pPr marL="0" indent="0" algn="just">
-              <a:buNone/>
-            </a:pPr>
-            <a:endParaRPr lang="fr-FR" sz="2000" dirty="0"/>
-          </a:p>
-          <a:p>
-            <a:pPr marL="0" indent="0" algn="just">
-              <a:buFont typeface="Arial" panose="020B0604020202020204" pitchFamily="34" charset="0"/>
-              <a:buNone/>
-            </a:pPr>
-            <a:endParaRPr lang="fr-FR" sz="2000" dirty="0"/>
+              <a:t>cycle</a:t>
+            </a:r>
+          </a:p>
+        </p:txBody>
+      </p:sp>
+      <p:sp>
+        <p:nvSpPr>
+          <p:cNvPr id="2" name="ZoneTexte 1"/>
+          <p:cNvSpPr txBox="1"/>
+          <p:nvPr/>
+        </p:nvSpPr>
+        <p:spPr>
+          <a:xfrm>
+            <a:off x="9013978" y="2783989"/>
+            <a:ext cx="1062535" cy="369332"/>
+          </a:xfrm>
+          <a:prstGeom prst="rect">
+            <a:avLst/>
+          </a:prstGeom>
+          <a:noFill/>
+        </p:spPr>
+        <p:txBody>
+          <a:bodyPr wrap="none" rtlCol="0">
+            <a:spAutoFit/>
+          </a:bodyPr>
+          <a:lstStyle/>
+          <a:p>
+            <a:r>
+              <a:rPr lang="fr-FR" dirty="0"/>
+              <a:t>Glycolyse</a:t>
+            </a:r>
+          </a:p>
+        </p:txBody>
+      </p:sp>
+      <p:sp>
+        <p:nvSpPr>
+          <p:cNvPr id="6" name="ZoneTexte 5"/>
+          <p:cNvSpPr txBox="1"/>
+          <p:nvPr/>
+        </p:nvSpPr>
+        <p:spPr>
+          <a:xfrm>
+            <a:off x="9042400" y="4067379"/>
+            <a:ext cx="1009956" cy="369332"/>
+          </a:xfrm>
+          <a:prstGeom prst="rect">
+            <a:avLst/>
+          </a:prstGeom>
+          <a:noFill/>
+        </p:spPr>
+        <p:txBody>
+          <a:bodyPr wrap="none" rtlCol="0">
+            <a:spAutoFit/>
+          </a:bodyPr>
+          <a:lstStyle/>
+          <a:p>
+            <a:r>
+              <a:rPr lang="fr-FR" dirty="0"/>
+              <a:t>Pyruvate</a:t>
+            </a:r>
+          </a:p>
+        </p:txBody>
+      </p:sp>
+      <p:sp>
+        <p:nvSpPr>
+          <p:cNvPr id="8" name="ZoneTexte 7"/>
+          <p:cNvSpPr txBox="1"/>
+          <p:nvPr/>
+        </p:nvSpPr>
+        <p:spPr>
+          <a:xfrm>
+            <a:off x="9195230" y="5257475"/>
+            <a:ext cx="704295" cy="369332"/>
+          </a:xfrm>
+          <a:prstGeom prst="rect">
+            <a:avLst/>
+          </a:prstGeom>
+          <a:noFill/>
+        </p:spPr>
+        <p:txBody>
+          <a:bodyPr wrap="none" rtlCol="0">
+            <a:spAutoFit/>
+          </a:bodyPr>
+          <a:lstStyle/>
+          <a:p>
+            <a:r>
+              <a:rPr lang="fr-FR" dirty="0"/>
+              <a:t>Krebs</a:t>
+            </a:r>
+          </a:p>
+        </p:txBody>
+      </p:sp>
+      <p:sp>
+        <p:nvSpPr>
+          <p:cNvPr id="3" name="Flèche courbée vers la gauche 2"/>
+          <p:cNvSpPr/>
+          <p:nvPr/>
+        </p:nvSpPr>
+        <p:spPr>
+          <a:xfrm rot="10800000">
+            <a:off x="8390435" y="2835479"/>
+            <a:ext cx="647700" cy="1558222"/>
+          </a:xfrm>
+          <a:prstGeom prst="curvedLeftArrow">
+            <a:avLst>
+              <a:gd name="adj1" fmla="val 25000"/>
+              <a:gd name="adj2" fmla="val 57906"/>
+              <a:gd name="adj3" fmla="val 25000"/>
+            </a:avLst>
+          </a:prstGeom>
+          <a:solidFill>
+            <a:schemeClr val="accent4">
+              <a:lumMod val="60000"/>
+              <a:lumOff val="40000"/>
+            </a:schemeClr>
+          </a:solidFill>
+          <a:ln>
+            <a:solidFill>
+              <a:schemeClr val="tx1"/>
+            </a:solidFill>
+          </a:ln>
+        </p:spPr>
+        <p:style>
+          <a:lnRef idx="2">
+            <a:schemeClr val="accent1">
+              <a:shade val="50000"/>
+            </a:schemeClr>
+          </a:lnRef>
+          <a:fillRef idx="1">
+            <a:schemeClr val="accent1"/>
+          </a:fillRef>
+          <a:effectRef idx="0">
+            <a:schemeClr val="accent1"/>
+          </a:effectRef>
+          <a:fontRef idx="minor">
+            <a:schemeClr val="lt1"/>
+          </a:fontRef>
+        </p:style>
+        <p:txBody>
+          <a:bodyPr rtlCol="0" anchor="ctr"/>
+          <a:lstStyle/>
+          <a:p>
+            <a:pPr algn="ctr"/>
+            <a:endParaRPr lang="fr-FR">
+              <a:solidFill>
+                <a:schemeClr val="tx1"/>
+              </a:solidFill>
+            </a:endParaRPr>
+          </a:p>
+        </p:txBody>
+      </p:sp>
+      <p:sp>
+        <p:nvSpPr>
+          <p:cNvPr id="11" name="Flèche courbée vers la gauche 10"/>
+          <p:cNvSpPr/>
+          <p:nvPr/>
+        </p:nvSpPr>
+        <p:spPr>
+          <a:xfrm>
+            <a:off x="10052356" y="2933700"/>
+            <a:ext cx="647700" cy="1557190"/>
+          </a:xfrm>
+          <a:prstGeom prst="curvedLeftArrow">
+            <a:avLst>
+              <a:gd name="adj1" fmla="val 25000"/>
+              <a:gd name="adj2" fmla="val 57906"/>
+              <a:gd name="adj3" fmla="val 25000"/>
+            </a:avLst>
+          </a:prstGeom>
+          <a:solidFill>
+            <a:schemeClr val="accent4">
+              <a:lumMod val="60000"/>
+              <a:lumOff val="40000"/>
+            </a:schemeClr>
+          </a:solidFill>
+          <a:ln>
+            <a:solidFill>
+              <a:schemeClr val="tx1"/>
+            </a:solidFill>
+          </a:ln>
+        </p:spPr>
+        <p:style>
+          <a:lnRef idx="2">
+            <a:schemeClr val="accent1">
+              <a:shade val="50000"/>
+            </a:schemeClr>
+          </a:lnRef>
+          <a:fillRef idx="1">
+            <a:schemeClr val="accent1"/>
+          </a:fillRef>
+          <a:effectRef idx="0">
+            <a:schemeClr val="accent1"/>
+          </a:effectRef>
+          <a:fontRef idx="minor">
+            <a:schemeClr val="lt1"/>
+          </a:fontRef>
+        </p:style>
+        <p:txBody>
+          <a:bodyPr rtlCol="0" anchor="ctr"/>
+          <a:lstStyle/>
+          <a:p>
+            <a:pPr algn="ctr"/>
+            <a:endParaRPr lang="fr-FR">
+              <a:solidFill>
+                <a:schemeClr val="tx1"/>
+              </a:solidFill>
+            </a:endParaRPr>
+          </a:p>
+        </p:txBody>
+      </p:sp>
+      <p:sp>
+        <p:nvSpPr>
+          <p:cNvPr id="4" name="Flèche droite 3"/>
+          <p:cNvSpPr/>
+          <p:nvPr/>
+        </p:nvSpPr>
+        <p:spPr>
+          <a:xfrm rot="5400000">
+            <a:off x="9186671" y="4687578"/>
+            <a:ext cx="717147" cy="373210"/>
+          </a:xfrm>
+          <a:prstGeom prst="rightArrow">
+            <a:avLst/>
+          </a:prstGeom>
+          <a:solidFill>
+            <a:schemeClr val="accent4">
+              <a:lumMod val="60000"/>
+              <a:lumOff val="40000"/>
+            </a:schemeClr>
+          </a:solidFill>
+          <a:ln>
+            <a:solidFill>
+              <a:schemeClr val="tx1"/>
+            </a:solidFill>
+          </a:ln>
+        </p:spPr>
+        <p:style>
+          <a:lnRef idx="2">
+            <a:schemeClr val="accent1">
+              <a:shade val="50000"/>
+            </a:schemeClr>
+          </a:lnRef>
+          <a:fillRef idx="1">
+            <a:schemeClr val="accent1"/>
+          </a:fillRef>
+          <a:effectRef idx="0">
+            <a:schemeClr val="accent1"/>
+          </a:effectRef>
+          <a:fontRef idx="minor">
+            <a:schemeClr val="lt1"/>
+          </a:fontRef>
+        </p:style>
+        <p:txBody>
+          <a:bodyPr rtlCol="0" anchor="ctr"/>
+          <a:lstStyle/>
+          <a:p>
+            <a:pPr algn="ctr"/>
+            <a:endParaRPr lang="fr-FR"/>
+          </a:p>
+        </p:txBody>
+      </p:sp>
+      <p:sp>
+        <p:nvSpPr>
+          <p:cNvPr id="5" name="Bouée 4"/>
+          <p:cNvSpPr/>
+          <p:nvPr/>
+        </p:nvSpPr>
+        <p:spPr>
+          <a:xfrm>
+            <a:off x="9038135" y="5727700"/>
+            <a:ext cx="999403" cy="999403"/>
+          </a:xfrm>
+          <a:prstGeom prst="donut">
+            <a:avLst>
+              <a:gd name="adj" fmla="val 14834"/>
+            </a:avLst>
+          </a:prstGeom>
+          <a:solidFill>
+            <a:schemeClr val="accent4">
+              <a:lumMod val="60000"/>
+              <a:lumOff val="40000"/>
+            </a:schemeClr>
+          </a:solidFill>
+          <a:ln>
+            <a:solidFill>
+              <a:schemeClr val="tx1"/>
+            </a:solidFill>
+          </a:ln>
+        </p:spPr>
+        <p:style>
+          <a:lnRef idx="2">
+            <a:schemeClr val="accent1">
+              <a:shade val="50000"/>
+            </a:schemeClr>
+          </a:lnRef>
+          <a:fillRef idx="1">
+            <a:schemeClr val="accent1"/>
+          </a:fillRef>
+          <a:effectRef idx="0">
+            <a:schemeClr val="accent1"/>
+          </a:effectRef>
+          <a:fontRef idx="minor">
+            <a:schemeClr val="lt1"/>
+          </a:fontRef>
+        </p:style>
+        <p:txBody>
+          <a:bodyPr rtlCol="0" anchor="ctr"/>
+          <a:lstStyle/>
+          <a:p>
+            <a:pPr algn="ctr"/>
+            <a:endParaRPr lang="fr-FR">
+              <a:solidFill>
+                <a:schemeClr val="tx1"/>
+              </a:solidFill>
+            </a:endParaRPr>
+          </a:p>
+        </p:txBody>
+      </p:sp>
+      <p:sp>
+        <p:nvSpPr>
+          <p:cNvPr id="12" name="Triangle isocèle 11"/>
+          <p:cNvSpPr/>
+          <p:nvPr/>
+        </p:nvSpPr>
+        <p:spPr>
+          <a:xfrm rot="5400000">
+            <a:off x="9361095" y="5701263"/>
+            <a:ext cx="368300" cy="219388"/>
+          </a:xfrm>
+          <a:prstGeom prst="triangle">
+            <a:avLst/>
+          </a:prstGeom>
+          <a:solidFill>
+            <a:schemeClr val="accent4">
+              <a:lumMod val="60000"/>
+              <a:lumOff val="40000"/>
+            </a:schemeClr>
+          </a:solidFill>
+          <a:ln>
+            <a:solidFill>
+              <a:schemeClr val="tx1"/>
+            </a:solidFill>
+          </a:ln>
+        </p:spPr>
+        <p:style>
+          <a:lnRef idx="2">
+            <a:schemeClr val="accent1">
+              <a:shade val="50000"/>
+            </a:schemeClr>
+          </a:lnRef>
+          <a:fillRef idx="1">
+            <a:schemeClr val="accent1"/>
+          </a:fillRef>
+          <a:effectRef idx="0">
+            <a:schemeClr val="accent1"/>
+          </a:effectRef>
+          <a:fontRef idx="minor">
+            <a:schemeClr val="lt1"/>
+          </a:fontRef>
+        </p:style>
+        <p:txBody>
+          <a:bodyPr rtlCol="0" anchor="ctr"/>
+          <a:lstStyle/>
+          <a:p>
+            <a:pPr algn="ctr"/>
+            <a:endParaRPr lang="fr-FR"/>
+          </a:p>
+        </p:txBody>
+      </p:sp>
+      <p:sp>
+        <p:nvSpPr>
+          <p:cNvPr id="13" name="Virage 12"/>
+          <p:cNvSpPr/>
+          <p:nvPr/>
+        </p:nvSpPr>
+        <p:spPr>
+          <a:xfrm rot="10800000" flipH="1">
+            <a:off x="9731851" y="4515609"/>
+            <a:ext cx="1379588" cy="737886"/>
+          </a:xfrm>
+          <a:prstGeom prst="bentArrow">
+            <a:avLst/>
+          </a:prstGeom>
+          <a:solidFill>
+            <a:schemeClr val="accent4">
+              <a:lumMod val="60000"/>
+              <a:lumOff val="40000"/>
+            </a:schemeClr>
+          </a:solidFill>
+          <a:ln>
+            <a:solidFill>
+              <a:schemeClr val="tx1"/>
+            </a:solidFill>
+          </a:ln>
+        </p:spPr>
+        <p:style>
+          <a:lnRef idx="2">
+            <a:schemeClr val="accent1">
+              <a:shade val="50000"/>
+            </a:schemeClr>
+          </a:lnRef>
+          <a:fillRef idx="1">
+            <a:schemeClr val="accent1"/>
+          </a:fillRef>
+          <a:effectRef idx="0">
+            <a:schemeClr val="accent1"/>
+          </a:effectRef>
+          <a:fontRef idx="minor">
+            <a:schemeClr val="lt1"/>
+          </a:fontRef>
+        </p:style>
+        <p:txBody>
+          <a:bodyPr rtlCol="0" anchor="ctr"/>
+          <a:lstStyle/>
+          <a:p>
+            <a:pPr algn="ctr"/>
+            <a:endParaRPr lang="fr-FR">
+              <a:solidFill>
+                <a:schemeClr val="tx1"/>
+              </a:solidFill>
+            </a:endParaRPr>
+          </a:p>
+        </p:txBody>
+      </p:sp>
+      <p:sp>
+        <p:nvSpPr>
+          <p:cNvPr id="14" name="ZoneTexte 13"/>
+          <p:cNvSpPr txBox="1"/>
+          <p:nvPr/>
+        </p:nvSpPr>
+        <p:spPr>
+          <a:xfrm>
+            <a:off x="11155763" y="4863424"/>
+            <a:ext cx="731290" cy="369332"/>
+          </a:xfrm>
+          <a:prstGeom prst="rect">
+            <a:avLst/>
+          </a:prstGeom>
+          <a:noFill/>
+        </p:spPr>
+        <p:txBody>
+          <a:bodyPr wrap="none" rtlCol="0">
+            <a:spAutoFit/>
+          </a:bodyPr>
+          <a:lstStyle/>
+          <a:p>
+            <a:r>
+              <a:rPr lang="fr-FR" dirty="0" err="1"/>
+              <a:t>Other</a:t>
+            </a:r>
+            <a:endParaRPr lang="fr-FR" dirty="0"/>
           </a:p>
         </p:txBody>
       </p:sp>
     </p:spTree>
     <p:extLst>
       <p:ext uri="{BB962C8B-B14F-4D97-AF65-F5344CB8AC3E}">
-        <p14:creationId xmlns:p14="http://schemas.microsoft.com/office/powerpoint/2010/main" val="2955838202"/>
+        <p14:creationId xmlns:p14="http://schemas.microsoft.com/office/powerpoint/2010/main" val="384720552"/>
       </p:ext>
     </p:extLst>
   </p:cSld>
@@ -15069,7 +15469,7 @@
       </p:grpSpPr>
       <p:sp>
         <p:nvSpPr>
-          <p:cNvPr id="6" name="Slide Number Placeholder 5"/>
+          <p:cNvPr id="9" name="Slide Number Placeholder 8"/>
           <p:cNvSpPr>
             <a:spLocks noGrp="1"/>
           </p:cNvSpPr>
@@ -15093,7 +15493,7 @@
       </p:sp>
       <p:sp>
         <p:nvSpPr>
-          <p:cNvPr id="7" name="Title 1"/>
+          <p:cNvPr id="11" name="Title 1"/>
           <p:cNvSpPr txBox="1">
             <a:spLocks/>
           </p:cNvSpPr>
@@ -15132,14 +15532,14 @@
           <a:p>
             <a:r>
               <a:rPr lang="fr-FR" dirty="0"/>
-              <a:t>Tools</a:t>
-            </a:r>
-          </a:p>
-        </p:txBody>
-      </p:sp>
-      <p:sp>
-        <p:nvSpPr>
-          <p:cNvPr id="8" name="Content Placeholder 2"/>
+              <a:t>Goals</a:t>
+            </a:r>
+          </a:p>
+        </p:txBody>
+      </p:sp>
+      <p:sp>
+        <p:nvSpPr>
+          <p:cNvPr id="12" name="Content Placeholder 2"/>
           <p:cNvSpPr txBox="1">
             <a:spLocks/>
           </p:cNvSpPr>
@@ -15147,8 +15547,8 @@
         </p:nvSpPr>
         <p:spPr>
           <a:xfrm>
-            <a:off x="2436949" y="3216224"/>
-            <a:ext cx="4947531" cy="3190004"/>
+            <a:off x="1236683" y="2835479"/>
+            <a:ext cx="7403977" cy="3842158"/>
           </a:xfrm>
           <a:prstGeom prst="rect">
             <a:avLst/>
@@ -15323,330 +15723,176 @@
             </a:lvl9pPr>
           </a:lstStyle>
           <a:p>
+            <a:pPr algn="just"/>
+            <a:r>
+              <a:rPr lang="fr-FR" sz="2000" dirty="0" err="1"/>
+              <a:t>Create</a:t>
+            </a:r>
+            <a:r>
+              <a:rPr lang="fr-FR" sz="2000" dirty="0"/>
+              <a:t> an user </a:t>
+            </a:r>
+            <a:r>
+              <a:rPr lang="fr-FR" sz="2000" dirty="0" err="1"/>
+              <a:t>friendly</a:t>
+            </a:r>
+            <a:r>
+              <a:rPr lang="fr-FR" sz="2000" dirty="0"/>
+              <a:t> </a:t>
+            </a:r>
+            <a:r>
+              <a:rPr lang="fr-FR" sz="2000" dirty="0" err="1"/>
+              <a:t>tool</a:t>
+            </a:r>
+            <a:endParaRPr lang="fr-FR" sz="2000" dirty="0"/>
+          </a:p>
+          <a:p>
             <a:pPr marL="0" indent="0" algn="just">
               <a:buNone/>
             </a:pPr>
-            <a:r>
-              <a:rPr lang="fr-FR" sz="2400" dirty="0" err="1"/>
-              <a:t>Teamworking</a:t>
-            </a:r>
-            <a:endParaRPr lang="fr-FR" sz="2400" dirty="0"/>
+            <a:endParaRPr lang="fr-FR" sz="2000" dirty="0"/>
+          </a:p>
+          <a:p>
+            <a:pPr algn="just"/>
+            <a:r>
+              <a:rPr lang="fr-FR" sz="2000" dirty="0" err="1"/>
+              <a:t>Results</a:t>
+            </a:r>
+            <a:r>
+              <a:rPr lang="fr-FR" sz="2000" dirty="0"/>
+              <a:t> </a:t>
+            </a:r>
+            <a:r>
+              <a:rPr lang="fr-FR" sz="2000" dirty="0" err="1"/>
+              <a:t>clear</a:t>
+            </a:r>
+            <a:r>
+              <a:rPr lang="fr-FR" sz="2000" dirty="0"/>
+              <a:t> and </a:t>
+            </a:r>
+            <a:r>
+              <a:rPr lang="fr-FR" sz="2000" dirty="0" err="1"/>
+              <a:t>publishable</a:t>
+            </a:r>
+            <a:r>
+              <a:rPr lang="fr-FR" sz="2000" dirty="0"/>
+              <a:t> in </a:t>
+            </a:r>
+            <a:r>
+              <a:rPr lang="fr-FR" sz="2000" dirty="0" err="1"/>
+              <a:t>scientific</a:t>
+            </a:r>
+            <a:r>
+              <a:rPr lang="fr-FR" sz="2000" dirty="0"/>
+              <a:t> publication</a:t>
+            </a:r>
+          </a:p>
+          <a:p>
+            <a:pPr algn="just"/>
+            <a:endParaRPr lang="fr-FR" sz="2000" dirty="0"/>
+          </a:p>
+          <a:p>
+            <a:pPr algn="just"/>
+            <a:r>
+              <a:rPr lang="fr-FR" sz="2000" dirty="0" smtClean="0"/>
+              <a:t>Identification of non-canonical </a:t>
+            </a:r>
+            <a:r>
+              <a:rPr lang="fr-FR" sz="2000" dirty="0" err="1" smtClean="0"/>
+              <a:t>genes</a:t>
+            </a:r>
+            <a:endParaRPr lang="fr-FR" sz="2000" dirty="0"/>
+          </a:p>
+          <a:p>
+            <a:pPr algn="just"/>
+            <a:endParaRPr lang="fr-FR" sz="2000" dirty="0"/>
+          </a:p>
+          <a:p>
+            <a:pPr algn="just"/>
+            <a:r>
+              <a:rPr lang="fr-FR" sz="2000" dirty="0" err="1" smtClean="0"/>
+              <a:t>Interpretation</a:t>
+            </a:r>
+            <a:r>
+              <a:rPr lang="fr-FR" sz="2000" dirty="0" smtClean="0"/>
+              <a:t> of </a:t>
+            </a:r>
+            <a:r>
+              <a:rPr lang="fr-FR" sz="2000" dirty="0" err="1" smtClean="0"/>
+              <a:t>results</a:t>
+            </a:r>
+            <a:endParaRPr lang="fr-FR" sz="2000" dirty="0"/>
+          </a:p>
+          <a:p>
+            <a:pPr algn="just"/>
+            <a:endParaRPr lang="fr-FR" sz="2000" dirty="0"/>
+          </a:p>
+          <a:p>
+            <a:pPr algn="just"/>
+            <a:r>
+              <a:rPr lang="fr-FR" sz="2000" dirty="0" smtClean="0"/>
+              <a:t>Host the </a:t>
+            </a:r>
+            <a:r>
+              <a:rPr lang="fr-FR" sz="2000" dirty="0" err="1" smtClean="0"/>
+              <a:t>tool</a:t>
+            </a:r>
+            <a:r>
+              <a:rPr lang="fr-FR" sz="2000" dirty="0" smtClean="0"/>
+              <a:t> o</a:t>
+            </a:r>
+            <a:r>
+              <a:rPr lang="fr-FR" sz="2000" dirty="0" smtClean="0"/>
+              <a:t>n </a:t>
+            </a:r>
+            <a:r>
+              <a:rPr lang="fr-FR" sz="2000" dirty="0"/>
+              <a:t>the </a:t>
+            </a:r>
+            <a:r>
+              <a:rPr lang="fr-FR" sz="2000" dirty="0" err="1"/>
+              <a:t>client’s</a:t>
+            </a:r>
+            <a:r>
+              <a:rPr lang="fr-FR" sz="2000" dirty="0"/>
+              <a:t> </a:t>
+            </a:r>
+            <a:r>
+              <a:rPr lang="fr-FR" sz="2000" dirty="0" err="1"/>
+              <a:t>website</a:t>
+            </a:r>
+            <a:r>
+              <a:rPr lang="fr-FR" sz="2000" dirty="0"/>
+              <a:t> (</a:t>
+            </a:r>
+            <a:r>
+              <a:rPr lang="fr-FR" sz="2000" dirty="0" err="1"/>
+              <a:t>Cellomet</a:t>
+            </a:r>
+            <a:r>
+              <a:rPr lang="fr-FR" sz="2000" dirty="0"/>
+              <a:t>)</a:t>
+            </a:r>
           </a:p>
           <a:p>
             <a:pPr marL="0" indent="0" algn="just">
               <a:buNone/>
             </a:pPr>
-            <a:endParaRPr lang="fr-FR" sz="1600" dirty="0"/>
+            <a:endParaRPr lang="fr-FR" sz="2000" dirty="0"/>
           </a:p>
           <a:p>
             <a:pPr marL="0" indent="0" algn="just">
+              <a:buFont typeface="Arial" panose="020B0604020202020204" pitchFamily="34" charset="0"/>
               <a:buNone/>
             </a:pPr>
-            <a:endParaRPr lang="fr-FR" sz="1600" dirty="0"/>
-          </a:p>
-          <a:p>
-            <a:pPr marL="0" indent="0" algn="just">
-              <a:buNone/>
-            </a:pPr>
-            <a:r>
-              <a:rPr lang="fr-FR" sz="2400" dirty="0"/>
-              <a:t>Programmation </a:t>
-            </a:r>
-            <a:r>
-              <a:rPr lang="fr-FR" sz="2400" dirty="0" err="1"/>
-              <a:t>language</a:t>
-            </a:r>
-            <a:r>
-              <a:rPr lang="fr-FR" sz="2400" dirty="0"/>
-              <a:t> for </a:t>
-            </a:r>
-            <a:r>
-              <a:rPr lang="fr-FR" sz="2400" dirty="0" err="1"/>
-              <a:t>statistical</a:t>
-            </a:r>
-            <a:r>
-              <a:rPr lang="fr-FR" sz="2400" dirty="0"/>
-              <a:t> </a:t>
-            </a:r>
-            <a:r>
-              <a:rPr lang="fr-FR" sz="2400" dirty="0" err="1"/>
-              <a:t>analysis</a:t>
-            </a:r>
-            <a:endParaRPr lang="fr-FR" sz="2400" dirty="0"/>
-          </a:p>
-          <a:p>
-            <a:pPr marL="0" indent="0" algn="just">
-              <a:buNone/>
-            </a:pPr>
-            <a:r>
-              <a:rPr lang="fr-FR" sz="2000" dirty="0"/>
-              <a:t>Packages : </a:t>
-            </a:r>
-          </a:p>
-          <a:p>
-            <a:pPr marL="0" indent="0" algn="just">
-              <a:buNone/>
-            </a:pPr>
-            <a:r>
-              <a:rPr lang="fr-FR" sz="2000" dirty="0"/>
-              <a:t>	- </a:t>
-            </a:r>
-            <a:r>
-              <a:rPr lang="fr-FR" sz="2000" dirty="0" err="1"/>
-              <a:t>ROntoTools</a:t>
-            </a:r>
             <a:endParaRPr lang="fr-FR" sz="2000" dirty="0"/>
           </a:p>
-          <a:p>
-            <a:pPr marL="0" indent="0" algn="just">
-              <a:buNone/>
-            </a:pPr>
-            <a:r>
-              <a:rPr lang="fr-FR" sz="2000" dirty="0"/>
-              <a:t>	- DESeq2</a:t>
-            </a:r>
-          </a:p>
-        </p:txBody>
-      </p:sp>
-      <p:pic>
-        <p:nvPicPr>
-          <p:cNvPr id="2" name="Image 1"/>
-          <p:cNvPicPr>
-            <a:picLocks noChangeAspect="1"/>
-          </p:cNvPicPr>
-          <p:nvPr/>
-        </p:nvPicPr>
-        <p:blipFill>
-          <a:blip r:embed="rId2" cstate="print">
-            <a:extLst>
-              <a:ext uri="{28A0092B-C50C-407E-A947-70E740481C1C}">
-                <a14:useLocalDpi xmlns:a14="http://schemas.microsoft.com/office/drawing/2010/main" val="0"/>
-              </a:ext>
-            </a:extLst>
-          </a:blip>
-          <a:stretch>
-            <a:fillRect/>
-          </a:stretch>
-        </p:blipFill>
-        <p:spPr>
-          <a:xfrm>
-            <a:off x="1216981" y="2835479"/>
-            <a:ext cx="1220893" cy="1220893"/>
-          </a:xfrm>
-          <a:prstGeom prst="rect">
-            <a:avLst/>
-          </a:prstGeom>
-        </p:spPr>
-      </p:pic>
-      <p:pic>
-        <p:nvPicPr>
-          <p:cNvPr id="1026" name="Picture 2" descr="Résultat de recherche d'images pour &quot;R png logo&quot;&quot;"/>
-          <p:cNvPicPr>
-            <a:picLocks noChangeAspect="1" noChangeArrowheads="1"/>
-          </p:cNvPicPr>
-          <p:nvPr/>
-        </p:nvPicPr>
-        <p:blipFill>
-          <a:blip r:embed="rId3" cstate="print">
-            <a:extLst>
-              <a:ext uri="{28A0092B-C50C-407E-A947-70E740481C1C}">
-                <a14:useLocalDpi xmlns:a14="http://schemas.microsoft.com/office/drawing/2010/main" val="0"/>
-              </a:ext>
-            </a:extLst>
-          </a:blip>
-          <a:srcRect/>
-          <a:stretch>
-            <a:fillRect/>
-          </a:stretch>
-        </p:blipFill>
-        <p:spPr bwMode="auto">
-          <a:xfrm>
-            <a:off x="1311736" y="4390616"/>
-            <a:ext cx="1031382" cy="799178"/>
-          </a:xfrm>
-          <a:prstGeom prst="rect">
-            <a:avLst/>
-          </a:prstGeom>
-          <a:noFill/>
-          <a:extLst>
-            <a:ext uri="{909E8E84-426E-40DD-AFC4-6F175D3DCCD1}">
-              <a14:hiddenFill xmlns:a14="http://schemas.microsoft.com/office/drawing/2010/main">
-                <a:solidFill>
-                  <a:srgbClr val="FFFFFF"/>
-                </a:solidFill>
-              </a14:hiddenFill>
-            </a:ext>
-          </a:extLst>
-        </p:spPr>
-      </p:pic>
-      <p:pic>
-        <p:nvPicPr>
-          <p:cNvPr id="1030" name="Picture 6" descr="Résultat de recherche d'images pour &quot;logo html5 js php&quot;&quot;"/>
-          <p:cNvPicPr>
-            <a:picLocks noChangeAspect="1" noChangeArrowheads="1"/>
-          </p:cNvPicPr>
-          <p:nvPr/>
-        </p:nvPicPr>
-        <p:blipFill>
-          <a:blip r:embed="rId4">
-            <a:extLst>
-              <a:ext uri="{28A0092B-C50C-407E-A947-70E740481C1C}">
-                <a14:useLocalDpi xmlns:a14="http://schemas.microsoft.com/office/drawing/2010/main" val="0"/>
-              </a:ext>
-            </a:extLst>
-          </a:blip>
-          <a:srcRect/>
-          <a:stretch>
-            <a:fillRect/>
-          </a:stretch>
-        </p:blipFill>
-        <p:spPr bwMode="auto">
-          <a:xfrm>
-            <a:off x="7384480" y="2662534"/>
-            <a:ext cx="3704305" cy="1547092"/>
-          </a:xfrm>
-          <a:prstGeom prst="rect">
-            <a:avLst/>
-          </a:prstGeom>
-          <a:noFill/>
-          <a:extLst>
-            <a:ext uri="{909E8E84-426E-40DD-AFC4-6F175D3DCCD1}">
-              <a14:hiddenFill xmlns:a14="http://schemas.microsoft.com/office/drawing/2010/main">
-                <a:solidFill>
-                  <a:srgbClr val="FFFFFF"/>
-                </a:solidFill>
-              </a14:hiddenFill>
-            </a:ext>
-          </a:extLst>
-        </p:spPr>
-      </p:pic>
-      <p:pic>
-        <p:nvPicPr>
-          <p:cNvPr id="1032" name="Picture 8" descr="Résultat de recherche d'images pour &quot;odoo&quot;&quot;"/>
-          <p:cNvPicPr>
-            <a:picLocks noChangeAspect="1" noChangeArrowheads="1"/>
-          </p:cNvPicPr>
-          <p:nvPr/>
-        </p:nvPicPr>
-        <p:blipFill>
-          <a:blip r:embed="rId5" cstate="print">
-            <a:extLst>
-              <a:ext uri="{28A0092B-C50C-407E-A947-70E740481C1C}">
-                <a14:useLocalDpi xmlns:a14="http://schemas.microsoft.com/office/drawing/2010/main" val="0"/>
-              </a:ext>
-            </a:extLst>
-          </a:blip>
-          <a:srcRect/>
-          <a:stretch>
-            <a:fillRect/>
-          </a:stretch>
-        </p:blipFill>
-        <p:spPr bwMode="auto">
-          <a:xfrm>
-            <a:off x="7939311" y="3909111"/>
-            <a:ext cx="2594644" cy="1427054"/>
-          </a:xfrm>
-          <a:prstGeom prst="rect">
-            <a:avLst/>
-          </a:prstGeom>
-          <a:noFill/>
-          <a:extLst>
-            <a:ext uri="{909E8E84-426E-40DD-AFC4-6F175D3DCCD1}">
-              <a14:hiddenFill xmlns:a14="http://schemas.microsoft.com/office/drawing/2010/main">
-                <a:solidFill>
-                  <a:srgbClr val="FFFFFF"/>
-                </a:solidFill>
-              </a14:hiddenFill>
-            </a:ext>
-          </a:extLst>
-        </p:spPr>
-      </p:pic>
-      <p:pic>
-        <p:nvPicPr>
-          <p:cNvPr id="1034" name="Picture 10" descr="Résultat de recherche d'images pour &quot;google scholar logo&quot;&quot;"/>
-          <p:cNvPicPr>
-            <a:picLocks noChangeAspect="1" noChangeArrowheads="1"/>
-          </p:cNvPicPr>
-          <p:nvPr/>
-        </p:nvPicPr>
-        <p:blipFill>
-          <a:blip r:embed="rId6">
-            <a:extLst>
-              <a:ext uri="{28A0092B-C50C-407E-A947-70E740481C1C}">
-                <a14:useLocalDpi xmlns:a14="http://schemas.microsoft.com/office/drawing/2010/main" val="0"/>
-              </a:ext>
-            </a:extLst>
-          </a:blip>
-          <a:srcRect/>
-          <a:stretch>
-            <a:fillRect/>
-          </a:stretch>
-        </p:blipFill>
-        <p:spPr bwMode="auto">
-          <a:xfrm>
-            <a:off x="8033142" y="5137303"/>
-            <a:ext cx="2406980" cy="921997"/>
-          </a:xfrm>
-          <a:prstGeom prst="rect">
-            <a:avLst/>
-          </a:prstGeom>
-          <a:noFill/>
-          <a:extLst>
-            <a:ext uri="{909E8E84-426E-40DD-AFC4-6F175D3DCCD1}">
-              <a14:hiddenFill xmlns:a14="http://schemas.microsoft.com/office/drawing/2010/main">
-                <a:solidFill>
-                  <a:srgbClr val="FFFFFF"/>
-                </a:solidFill>
-              </a14:hiddenFill>
-            </a:ext>
-          </a:extLst>
-        </p:spPr>
-      </p:pic>
-      <p:pic>
-        <p:nvPicPr>
-          <p:cNvPr id="3" name="Picture 2" descr="Résultat de recherche d'images pour &quot;bioconductor logo&quot;&quot;"/>
-          <p:cNvPicPr>
-            <a:picLocks noChangeAspect="1" noChangeArrowheads="1"/>
-          </p:cNvPicPr>
-          <p:nvPr/>
-        </p:nvPicPr>
-        <p:blipFill>
-          <a:blip r:embed="rId7" cstate="print">
-            <a:extLst>
-              <a:ext uri="{28A0092B-C50C-407E-A947-70E740481C1C}">
-                <a14:useLocalDpi xmlns:a14="http://schemas.microsoft.com/office/drawing/2010/main" val="0"/>
-              </a:ext>
-            </a:extLst>
-          </a:blip>
-          <a:srcRect/>
-          <a:stretch>
-            <a:fillRect/>
-          </a:stretch>
-        </p:blipFill>
-        <p:spPr bwMode="auto">
-          <a:xfrm>
-            <a:off x="2633121" y="5664925"/>
-            <a:ext cx="692990" cy="684674"/>
-          </a:xfrm>
-          <a:prstGeom prst="rect">
-            <a:avLst/>
-          </a:prstGeom>
-          <a:noFill/>
-          <a:extLst>
-            <a:ext uri="{909E8E84-426E-40DD-AFC4-6F175D3DCCD1}">
-              <a14:hiddenFill xmlns:a14="http://schemas.microsoft.com/office/drawing/2010/main">
-                <a:solidFill>
-                  <a:srgbClr val="FFFFFF"/>
-                </a:solidFill>
-              </a14:hiddenFill>
-            </a:ext>
-          </a:extLst>
-        </p:spPr>
-      </p:pic>
+        </p:txBody>
+      </p:sp>
     </p:spTree>
     <p:extLst>
       <p:ext uri="{BB962C8B-B14F-4D97-AF65-F5344CB8AC3E}">
-        <p14:creationId xmlns:p14="http://schemas.microsoft.com/office/powerpoint/2010/main" val="2585248314"/>
+        <p14:creationId xmlns:p14="http://schemas.microsoft.com/office/powerpoint/2010/main" val="2955838202"/>
       </p:ext>
     </p:extLst>
   </p:cSld>

</xml_diff>

<commit_message>
Mise a jour du Gantt
</commit_message>
<xml_diff>
--- a/Diapos_Suivit_projet.pptx
+++ b/Diapos_Suivit_projet.pptx
@@ -2716,8 +2716,8 @@
   </dgm:ptLst>
   <dgm:cxnLst>
     <dgm:cxn modelId="{5DC2DB55-F097-4294-8B9E-72B598743DA3}" srcId="{8BEA78FF-204F-4428-9092-659961DC247C}" destId="{850DD825-7D08-4BBC-94B9-7E217910F9A2}" srcOrd="1" destOrd="0" parTransId="{D847AE72-61FF-43C4-BFB0-3E6EC0A79B26}" sibTransId="{DD66B6EB-9ADC-44F2-A7C2-DA4869ECDFFE}"/>
+    <dgm:cxn modelId="{8232CE46-097B-4790-9B07-F6CE16252DFF}" type="presOf" srcId="{DCE41F30-8A4B-4090-95D5-6CBD1CFA1EEC}" destId="{A67A60E5-5291-49E4-B3E5-53A58B528285}" srcOrd="0" destOrd="0" presId="urn:microsoft.com/office/officeart/2005/8/layout/cycle4"/>
     <dgm:cxn modelId="{61191D9C-E95A-4D05-8EB5-50675A3F154F}" srcId="{DCE41F30-8A4B-4090-95D5-6CBD1CFA1EEC}" destId="{AE8D8FFF-9AF0-4B15-AF81-01A130F2BD02}" srcOrd="1" destOrd="0" parTransId="{09A1B763-003F-4D1E-A0CA-D45779C90106}" sibTransId="{16409495-689E-4EF6-90A7-12E4E2621B22}"/>
-    <dgm:cxn modelId="{8232CE46-097B-4790-9B07-F6CE16252DFF}" type="presOf" srcId="{DCE41F30-8A4B-4090-95D5-6CBD1CFA1EEC}" destId="{A67A60E5-5291-49E4-B3E5-53A58B528285}" srcOrd="0" destOrd="0" presId="urn:microsoft.com/office/officeart/2005/8/layout/cycle4"/>
     <dgm:cxn modelId="{37AF687D-1A9E-4298-90CF-E8DBC4CFFF13}" type="presOf" srcId="{62885FA7-E7FB-4933-9935-6A8AA90289B4}" destId="{8128ED5B-798D-45C7-BB11-A0996A8BF223}" srcOrd="1" destOrd="2" presId="urn:microsoft.com/office/officeart/2005/8/layout/cycle4"/>
     <dgm:cxn modelId="{B8D0FEE6-0B19-4981-B1D0-192621027BC2}" type="presOf" srcId="{49454F30-2B75-445A-845F-7473D893477D}" destId="{431C4C2F-7F42-4D62-8EEF-918E7AD22EA0}" srcOrd="0" destOrd="0" presId="urn:microsoft.com/office/officeart/2005/8/layout/cycle4"/>
     <dgm:cxn modelId="{5F7AD9D5-E7E6-4F46-A4C5-3A0CE6F62C8E}" srcId="{8FEE133A-1A79-4187-9AFD-4F06B42A70BC}" destId="{35F1F2D2-FC47-4990-98DB-731AFE036343}" srcOrd="0" destOrd="0" parTransId="{D8C3661F-62F4-45E8-BB01-35BAAF924AEB}" sibTransId="{4EFE689A-014D-4F95-82DA-3254DF013F6C}"/>
@@ -2730,14 +2730,14 @@
     <dgm:cxn modelId="{5E45B507-1330-428C-A195-37581AAE5A63}" srcId="{8FEE133A-1A79-4187-9AFD-4F06B42A70BC}" destId="{21C7A246-DDB5-40DD-9118-CC4963BF878A}" srcOrd="1" destOrd="0" parTransId="{CD9E23AD-A863-49AB-83BE-431D89C28AF8}" sibTransId="{9EFEBC15-1E66-4CAC-95AE-73B08C514600}"/>
     <dgm:cxn modelId="{F3DC86B6-474F-4BE6-A324-3FE9F9B8844A}" srcId="{CC293B1C-4CF8-4FF0-BBC7-4942ED2D7F88}" destId="{8FEE133A-1A79-4187-9AFD-4F06B42A70BC}" srcOrd="0" destOrd="0" parTransId="{7D947A46-F0B2-4D95-921D-7768A2A81535}" sibTransId="{A16446F1-3DF9-49B1-92C9-2E546FABE218}"/>
     <dgm:cxn modelId="{2A677A01-58EB-4E82-B607-502F6E54B8C1}" type="presOf" srcId="{9B35DA45-8824-4EE3-89F0-3F4E07F980E3}" destId="{68AC0C8C-6683-4490-8F38-983C8CB47C3F}" srcOrd="0" destOrd="0" presId="urn:microsoft.com/office/officeart/2005/8/layout/cycle4"/>
+    <dgm:cxn modelId="{5609CD83-B1C1-43ED-B394-2FA9B46CDE9D}" type="presOf" srcId="{8BEA78FF-204F-4428-9092-659961DC247C}" destId="{C0852406-3DC0-4222-A1F8-184593FC4596}" srcOrd="0" destOrd="0" presId="urn:microsoft.com/office/officeart/2005/8/layout/cycle4"/>
     <dgm:cxn modelId="{78CBA1FA-F343-43EE-ADD5-CB825EA63CDE}" type="presOf" srcId="{21C7A246-DDB5-40DD-9118-CC4963BF878A}" destId="{8128ED5B-798D-45C7-BB11-A0996A8BF223}" srcOrd="1" destOrd="1" presId="urn:microsoft.com/office/officeart/2005/8/layout/cycle4"/>
-    <dgm:cxn modelId="{5609CD83-B1C1-43ED-B394-2FA9B46CDE9D}" type="presOf" srcId="{8BEA78FF-204F-4428-9092-659961DC247C}" destId="{C0852406-3DC0-4222-A1F8-184593FC4596}" srcOrd="0" destOrd="0" presId="urn:microsoft.com/office/officeart/2005/8/layout/cycle4"/>
     <dgm:cxn modelId="{B72AD70C-1119-4CD1-A715-69F95E790449}" type="presOf" srcId="{AE8D8FFF-9AF0-4B15-AF81-01A130F2BD02}" destId="{FFCC9154-8E22-496A-ADF8-EA81D4AB5D77}" srcOrd="1" destOrd="1" presId="urn:microsoft.com/office/officeart/2005/8/layout/cycle4"/>
     <dgm:cxn modelId="{719CEA49-80B9-42FF-8E65-C86BF4F8FDF9}" type="presOf" srcId="{49454F30-2B75-445A-845F-7473D893477D}" destId="{53088BBF-CDFB-43AD-88FA-A16B4FDD4AEA}" srcOrd="1" destOrd="0" presId="urn:microsoft.com/office/officeart/2005/8/layout/cycle4"/>
     <dgm:cxn modelId="{8777DA17-1BC6-4954-8AF7-1123B39EE091}" type="presOf" srcId="{AE8D8FFF-9AF0-4B15-AF81-01A130F2BD02}" destId="{05478942-E273-4856-8553-F0FD8F015AA2}" srcOrd="0" destOrd="1" presId="urn:microsoft.com/office/officeart/2005/8/layout/cycle4"/>
-    <dgm:cxn modelId="{94C690E3-99CA-4908-89AA-C2EB5855A793}" type="presOf" srcId="{CC293B1C-4CF8-4FF0-BBC7-4942ED2D7F88}" destId="{39401A14-B365-4553-9A3D-A401D3183747}" srcOrd="0" destOrd="0" presId="urn:microsoft.com/office/officeart/2005/8/layout/cycle4"/>
     <dgm:cxn modelId="{2C0CC1A6-087D-4CF6-88BB-4358110FD673}" type="presOf" srcId="{7FF71154-70C1-47DE-91E2-5DB90307E807}" destId="{68AC0C8C-6683-4490-8F38-983C8CB47C3F}" srcOrd="0" destOrd="1" presId="urn:microsoft.com/office/officeart/2005/8/layout/cycle4"/>
     <dgm:cxn modelId="{54460A03-1998-40A7-8046-EA57DF9F5AF7}" type="presOf" srcId="{7FF71154-70C1-47DE-91E2-5DB90307E807}" destId="{60120B91-D76F-4101-857D-B9B656863593}" srcOrd="1" destOrd="1" presId="urn:microsoft.com/office/officeart/2005/8/layout/cycle4"/>
+    <dgm:cxn modelId="{94C690E3-99CA-4908-89AA-C2EB5855A793}" type="presOf" srcId="{CC293B1C-4CF8-4FF0-BBC7-4942ED2D7F88}" destId="{39401A14-B365-4553-9A3D-A401D3183747}" srcOrd="0" destOrd="0" presId="urn:microsoft.com/office/officeart/2005/8/layout/cycle4"/>
     <dgm:cxn modelId="{F918012F-B6C2-4CA7-9692-CC38EC5453D1}" type="presOf" srcId="{1981BF8C-ABB4-462F-BD54-45D3229B3478}" destId="{FFCC9154-8E22-496A-ADF8-EA81D4AB5D77}" srcOrd="1" destOrd="0" presId="urn:microsoft.com/office/officeart/2005/8/layout/cycle4"/>
     <dgm:cxn modelId="{2F545677-CE33-4761-99ED-0F7D3431F1B7}" srcId="{DCE41F30-8A4B-4090-95D5-6CBD1CFA1EEC}" destId="{1981BF8C-ABB4-462F-BD54-45D3229B3478}" srcOrd="0" destOrd="0" parTransId="{420AF548-7339-428B-B062-F64CBEBA21A3}" sibTransId="{314ADFC2-8DB9-4517-A22A-D1F9C188BEE4}"/>
     <dgm:cxn modelId="{09011A2A-56A6-4D15-98B3-D063B21B8177}" type="presOf" srcId="{850DD825-7D08-4BBC-94B9-7E217910F9A2}" destId="{53088BBF-CDFB-43AD-88FA-A16B4FDD4AEA}" srcOrd="1" destOrd="1" presId="urn:microsoft.com/office/officeart/2005/8/layout/cycle4"/>
@@ -3608,8 +3608,8 @@
     <dgm:cxn modelId="{6484E426-69AA-42DF-977B-A67A73203BD9}" srcId="{8BEA78FF-204F-4428-9092-659961DC247C}" destId="{49454F30-2B75-445A-845F-7473D893477D}" srcOrd="0" destOrd="0" parTransId="{347F498C-146E-4A53-8576-856FB00E3649}" sibTransId="{FAF60BDA-D885-4200-9740-D21B994BE362}"/>
     <dgm:cxn modelId="{856CCC98-4D42-4940-9913-BB20C5217489}" srcId="{CC293B1C-4CF8-4FF0-BBC7-4942ED2D7F88}" destId="{DCE41F30-8A4B-4090-95D5-6CBD1CFA1EEC}" srcOrd="1" destOrd="0" parTransId="{480265E7-8542-40B5-95A1-EC04B55B8C68}" sibTransId="{005E5E72-5BE1-4DC4-AD1C-48C242521B93}"/>
     <dgm:cxn modelId="{558EB1E9-7D3B-4CFB-91ED-0AE5FFB267A1}" type="presOf" srcId="{850DD825-7D08-4BBC-94B9-7E217910F9A2}" destId="{431C4C2F-7F42-4D62-8EEF-918E7AD22EA0}" srcOrd="0" destOrd="1" presId="urn:microsoft.com/office/officeart/2005/8/layout/cycle4"/>
+    <dgm:cxn modelId="{A5D3F3DB-629E-46CD-AA76-C52C0C251A66}" srcId="{CC293B1C-4CF8-4FF0-BBC7-4942ED2D7F88}" destId="{8BEA78FF-204F-4428-9092-659961DC247C}" srcOrd="3" destOrd="0" parTransId="{41090789-956B-42C9-B909-44B2D62666F5}" sibTransId="{F0DB2DD3-51DB-4551-8E87-8440876EF808}"/>
     <dgm:cxn modelId="{E10831DF-BE5F-4779-B0A8-5C9716C52F17}" type="presOf" srcId="{21C7A246-DDB5-40DD-9118-CC4963BF878A}" destId="{8128ED5B-798D-45C7-BB11-A0996A8BF223}" srcOrd="1" destOrd="1" presId="urn:microsoft.com/office/officeart/2005/8/layout/cycle4"/>
-    <dgm:cxn modelId="{A5D3F3DB-629E-46CD-AA76-C52C0C251A66}" srcId="{CC293B1C-4CF8-4FF0-BBC7-4942ED2D7F88}" destId="{8BEA78FF-204F-4428-9092-659961DC247C}" srcOrd="3" destOrd="0" parTransId="{41090789-956B-42C9-B909-44B2D62666F5}" sibTransId="{F0DB2DD3-51DB-4551-8E87-8440876EF808}"/>
     <dgm:cxn modelId="{A2830668-E8D8-479D-BDD1-DDDBB0D25879}" type="presOf" srcId="{DCE41F30-8A4B-4090-95D5-6CBD1CFA1EEC}" destId="{A67A60E5-5291-49E4-B3E5-53A58B528285}" srcOrd="0" destOrd="0" presId="urn:microsoft.com/office/officeart/2005/8/layout/cycle4"/>
     <dgm:cxn modelId="{822B2CC5-3F61-47E6-A8CF-F020DE610282}" type="presParOf" srcId="{39401A14-B365-4553-9A3D-A401D3183747}" destId="{D7E58549-68A7-4F21-BF0D-84F7636DCD92}" srcOrd="0" destOrd="0" presId="urn:microsoft.com/office/officeart/2005/8/layout/cycle4"/>
     <dgm:cxn modelId="{36CA4649-6ADC-4F65-B2F0-0B78942CAAD0}" type="presParOf" srcId="{D7E58549-68A7-4F21-BF0D-84F7636DCD92}" destId="{5D458377-8CFE-43EB-BDF2-7CB3F0D876C1}" srcOrd="0" destOrd="0" presId="urn:microsoft.com/office/officeart/2005/8/layout/cycle4"/>
@@ -9514,7 +9514,7 @@
           <a:p>
             <a:fld id="{38717F5D-9B99-41E9-AAF0-B73531F5A10E}" type="slidenum">
               <a:rPr lang="fr-FR" smtClean="0"/>
-              <a:t>‹#›</a:t>
+              <a:t>‹N°›</a:t>
             </a:fld>
             <a:endParaRPr lang="fr-FR"/>
           </a:p>
@@ -9772,7 +9772,7 @@
           <a:p>
             <a:fld id="{049843D5-FBCC-450E-8A81-920AD1F49A83}" type="slidenum">
               <a:rPr lang="fr-FR" smtClean="0"/>
-              <a:t>‹#›</a:t>
+              <a:t>‹N°›</a:t>
             </a:fld>
             <a:endParaRPr lang="fr-FR"/>
           </a:p>
@@ -10832,7 +10832,7 @@
             <a:fld id="{813506F1-DB5F-4FC9-88BA-B486F30FE4BF}" type="slidenum">
               <a:rPr lang="fr-FR" smtClean="0"/>
               <a:pPr/>
-              <a:t>‹#›</a:t>
+              <a:t>‹N°›</a:t>
             </a:fld>
             <a:endParaRPr lang="fr-FR" dirty="0"/>
           </a:p>
@@ -13874,7 +13874,7 @@
         <p:spPr>
           <a:xfrm>
             <a:off x="844465" y="5143500"/>
-            <a:ext cx="1435100" cy="381000"/>
+            <a:ext cx="2667000" cy="381000"/>
           </a:xfrm>
           <a:prstGeom prst="rect">
             <a:avLst/>
@@ -13949,7 +13949,7 @@
         <p:spPr>
           <a:xfrm>
             <a:off x="844465" y="2480225"/>
-            <a:ext cx="1435100" cy="2663275"/>
+            <a:ext cx="2667000" cy="2663275"/>
           </a:xfrm>
           <a:prstGeom prst="rect">
             <a:avLst/>
@@ -14027,7 +14027,7 @@
         </p:nvSpPr>
         <p:spPr>
           <a:xfrm>
-            <a:off x="2221142" y="5524500"/>
+            <a:off x="3446997" y="5524500"/>
             <a:ext cx="114300" cy="127000"/>
           </a:xfrm>
           <a:prstGeom prst="triangle">
@@ -14093,7 +14093,7 @@
         </p:nvSpPr>
         <p:spPr>
           <a:xfrm>
-            <a:off x="2095443" y="5651500"/>
+            <a:off x="3321298" y="5651500"/>
             <a:ext cx="368300" cy="186055"/>
           </a:xfrm>
           <a:prstGeom prst="rect">
@@ -15320,8 +15320,8 @@
         </p:nvSpPr>
         <p:spPr>
           <a:xfrm>
-            <a:off x="282839" y="2481467"/>
-            <a:ext cx="1211512" cy="338554"/>
+            <a:off x="364051" y="2480225"/>
+            <a:ext cx="1130300" cy="341037"/>
           </a:xfrm>
           <a:prstGeom prst="rect">
             <a:avLst/>
@@ -15335,24 +15335,6 @@
           <a:lstStyle/>
           <a:p>
             <a:pPr algn="r"/>
-            <a:r>
-              <a:rPr lang="fr-FR" sz="1100" b="1" dirty="0" err="1">
-                <a:solidFill>
-                  <a:schemeClr val="dk1"/>
-                </a:solidFill>
-                <a:latin typeface="Calibri" panose="020F0502020204030204" pitchFamily="34" charset="0"/>
-              </a:rPr>
-              <a:t>Understand</a:t>
-            </a:r>
-            <a:r>
-              <a:rPr lang="fr-FR" sz="1100" b="1" dirty="0">
-                <a:solidFill>
-                  <a:schemeClr val="dk1"/>
-                </a:solidFill>
-                <a:latin typeface="Calibri" panose="020F0502020204030204" pitchFamily="34" charset="0"/>
-              </a:rPr>
-              <a:t> the package </a:t>
-            </a:r>
             <a:r>
               <a:rPr lang="fr-FR" sz="1100" b="1" dirty="0" smtClean="0">
                 <a:solidFill>
@@ -15360,7 +15342,16 @@
                 </a:solidFill>
                 <a:latin typeface="Calibri" panose="020F0502020204030204" pitchFamily="34" charset="0"/>
               </a:rPr>
-              <a:t>DESeq2</a:t>
+              <a:t>Comprendre l'outil </a:t>
+            </a:r>
+            <a:r>
+              <a:rPr lang="fr-FR" sz="1100" b="1" dirty="0" err="1" smtClean="0">
+                <a:solidFill>
+                  <a:schemeClr val="dk1"/>
+                </a:solidFill>
+                <a:latin typeface="Calibri" panose="020F0502020204030204" pitchFamily="34" charset="0"/>
+              </a:rPr>
+              <a:t>ROntoTools</a:t>
             </a:r>
             <a:endParaRPr lang="fr-FR" sz="1100" b="1" dirty="0">
               <a:solidFill>
@@ -15590,8 +15581,8 @@
         </p:nvSpPr>
         <p:spPr>
           <a:xfrm>
-            <a:off x="282839" y="2855186"/>
-            <a:ext cx="1206500" cy="338554"/>
+            <a:off x="2314907" y="2939203"/>
+            <a:ext cx="1206500" cy="170519"/>
           </a:xfrm>
           <a:prstGeom prst="rect">
             <a:avLst/>
@@ -15604,25 +15595,22 @@
           </a:bodyPr>
           <a:lstStyle/>
           <a:p>
-            <a:pPr algn="r"/>
+            <a:pPr algn="ctr"/>
             <a:r>
-              <a:rPr lang="fr-FR" sz="1100" b="1" spc="-6" dirty="0" err="1">
+              <a:rPr lang="fr-FR" sz="1100" b="1" spc="-6" smtClean="0">
                 <a:solidFill>
                   <a:schemeClr val="dk1"/>
                 </a:solidFill>
                 <a:latin typeface="Calibri" panose="020F0502020204030204" pitchFamily="34" charset="0"/>
               </a:rPr>
-              <a:t>Create</a:t>
+              <a:t>Créer l'interface web</a:t>
             </a:r>
-            <a:r>
-              <a:rPr lang="fr-FR" sz="1100" b="1" spc="-6" dirty="0">
-                <a:solidFill>
-                  <a:schemeClr val="dk1"/>
-                </a:solidFill>
-                <a:latin typeface="Calibri" panose="020F0502020204030204" pitchFamily="34" charset="0"/>
-              </a:rPr>
-              <a:t> the web interface</a:t>
-            </a:r>
+            <a:endParaRPr lang="fr-FR" sz="1100" b="1" spc="-6" dirty="0">
+              <a:solidFill>
+                <a:schemeClr val="dk1"/>
+              </a:solidFill>
+              <a:latin typeface="Calibri" panose="020F0502020204030204" pitchFamily="34" charset="0"/>
+            </a:endParaRPr>
           </a:p>
         </p:txBody>
       </p:sp>
@@ -15762,8 +15750,8 @@
         </p:nvSpPr>
         <p:spPr>
           <a:xfrm>
-            <a:off x="-7424" y="3313543"/>
-            <a:ext cx="1498600" cy="169277"/>
+            <a:off x="-7424" y="3227663"/>
+            <a:ext cx="1498600" cy="341037"/>
           </a:xfrm>
           <a:prstGeom prst="rect">
             <a:avLst/>
@@ -15778,32 +15766,20 @@
           <a:p>
             <a:pPr algn="r"/>
             <a:r>
-              <a:rPr lang="fr-FR" sz="1100" b="1" spc="-6" dirty="0">
+              <a:rPr lang="fr-FR" sz="1100" b="1" spc="-6" smtClean="0">
                 <a:solidFill>
                   <a:schemeClr val="dk1"/>
                 </a:solidFill>
                 <a:latin typeface="Calibri" panose="020F0502020204030204" pitchFamily="34" charset="0"/>
               </a:rPr>
-              <a:t>Write </a:t>
+              <a:t>Écrire les différents script fonctionnels </a:t>
             </a:r>
-            <a:r>
-              <a:rPr lang="fr-FR" sz="1100" b="1" spc="-6" dirty="0" err="1">
-                <a:solidFill>
-                  <a:schemeClr val="dk1"/>
-                </a:solidFill>
-                <a:latin typeface="Calibri" panose="020F0502020204030204" pitchFamily="34" charset="0"/>
-              </a:rPr>
-              <a:t>functional</a:t>
-            </a:r>
-            <a:r>
-              <a:rPr lang="fr-FR" sz="1100" b="1" spc="-6" dirty="0">
-                <a:solidFill>
-                  <a:schemeClr val="dk1"/>
-                </a:solidFill>
-                <a:latin typeface="Calibri" panose="020F0502020204030204" pitchFamily="34" charset="0"/>
-              </a:rPr>
-              <a:t> scripts </a:t>
-            </a:r>
+            <a:endParaRPr lang="fr-FR" sz="1100" b="1" spc="-6" dirty="0">
+              <a:solidFill>
+                <a:schemeClr val="dk1"/>
+              </a:solidFill>
+              <a:latin typeface="Calibri" panose="020F0502020204030204" pitchFamily="34" charset="0"/>
+            </a:endParaRPr>
           </a:p>
         </p:txBody>
       </p:sp>
@@ -16035,23 +16011,20 @@
           <a:p>
             <a:pPr algn="r"/>
             <a:r>
-              <a:rPr lang="fr-FR" sz="1100" b="1" spc="-4" dirty="0" err="1">
+              <a:rPr lang="fr-FR" sz="1100" b="1" spc="-4" smtClean="0">
                 <a:solidFill>
                   <a:schemeClr val="dk1"/>
                 </a:solidFill>
                 <a:latin typeface="Calibri" panose="020F0502020204030204" pitchFamily="34" charset="0"/>
               </a:rPr>
-              <a:t>Gather</a:t>
+              <a:t>Réunir les scripts en un seul </a:t>
             </a:r>
-            <a:r>
-              <a:rPr lang="fr-FR" sz="1100" b="1" spc="-4" dirty="0">
-                <a:solidFill>
-                  <a:schemeClr val="dk1"/>
-                </a:solidFill>
-                <a:latin typeface="Calibri" panose="020F0502020204030204" pitchFamily="34" charset="0"/>
-              </a:rPr>
-              <a:t> all R scripts</a:t>
-            </a:r>
+            <a:endParaRPr lang="fr-FR" sz="1100" b="1" spc="-4" dirty="0">
+              <a:solidFill>
+                <a:schemeClr val="dk1"/>
+              </a:solidFill>
+              <a:latin typeface="Calibri" panose="020F0502020204030204" pitchFamily="34" charset="0"/>
+            </a:endParaRPr>
           </a:p>
         </p:txBody>
       </p:sp>
@@ -16245,32 +16218,20 @@
           <a:p>
             <a:pPr algn="r"/>
             <a:r>
-              <a:rPr lang="fr-FR" sz="1100" b="1" spc="-4" dirty="0">
+              <a:rPr lang="fr-FR" sz="1100" b="1" spc="-4" smtClean="0">
                 <a:solidFill>
                   <a:schemeClr val="dk1"/>
                 </a:solidFill>
                 <a:latin typeface="Calibri" panose="020F0502020204030204" pitchFamily="34" charset="0"/>
               </a:rPr>
-              <a:t>Link </a:t>
+              <a:t>Faire le lien entre l'interface web et les scripts R </a:t>
             </a:r>
-            <a:r>
-              <a:rPr lang="fr-FR" sz="1100" b="1" spc="-4" dirty="0" err="1">
-                <a:solidFill>
-                  <a:schemeClr val="dk1"/>
-                </a:solidFill>
-                <a:latin typeface="Calibri" panose="020F0502020204030204" pitchFamily="34" charset="0"/>
-              </a:rPr>
-              <a:t>between</a:t>
-            </a:r>
-            <a:r>
-              <a:rPr lang="fr-FR" sz="1100" b="1" spc="-4" dirty="0">
-                <a:solidFill>
-                  <a:schemeClr val="dk1"/>
-                </a:solidFill>
-                <a:latin typeface="Calibri" panose="020F0502020204030204" pitchFamily="34" charset="0"/>
-              </a:rPr>
-              <a:t> web interface and R scripts</a:t>
-            </a:r>
+            <a:endParaRPr lang="fr-FR" sz="1100" b="1" spc="-4" dirty="0">
+              <a:solidFill>
+                <a:schemeClr val="dk1"/>
+              </a:solidFill>
+              <a:latin typeface="Calibri" panose="020F0502020204030204" pitchFamily="34" charset="0"/>
+            </a:endParaRPr>
           </a:p>
         </p:txBody>
       </p:sp>
@@ -16626,59 +16587,20 @@
           <a:p>
             <a:pPr algn="r"/>
             <a:r>
-              <a:rPr lang="fr-FR" sz="1100" b="1" spc="-4" dirty="0" err="1">
+              <a:rPr lang="fr-FR" sz="1100" b="1" spc="-4" smtClean="0">
                 <a:solidFill>
                   <a:schemeClr val="dk1"/>
                 </a:solidFill>
                 <a:latin typeface="Calibri" panose="020F0502020204030204" pitchFamily="34" charset="0"/>
               </a:rPr>
-              <a:t>Implement</a:t>
+              <a:t>Implémenter l'outils sur le serveur client</a:t>
             </a:r>
-            <a:r>
-              <a:rPr lang="fr-FR" sz="1100" b="1" spc="-4" dirty="0">
-                <a:solidFill>
-                  <a:schemeClr val="dk1"/>
-                </a:solidFill>
-                <a:latin typeface="Calibri" panose="020F0502020204030204" pitchFamily="34" charset="0"/>
-              </a:rPr>
-              <a:t> the </a:t>
-            </a:r>
-            <a:r>
-              <a:rPr lang="fr-FR" sz="1100" b="1" spc="-4" dirty="0" err="1">
-                <a:solidFill>
-                  <a:schemeClr val="dk1"/>
-                </a:solidFill>
-                <a:latin typeface="Calibri" panose="020F0502020204030204" pitchFamily="34" charset="0"/>
-              </a:rPr>
-              <a:t>tool</a:t>
-            </a:r>
-            <a:r>
-              <a:rPr lang="fr-FR" sz="1100" b="1" spc="-4" dirty="0">
-                <a:solidFill>
-                  <a:schemeClr val="dk1"/>
-                </a:solidFill>
-                <a:latin typeface="Calibri" panose="020F0502020204030204" pitchFamily="34" charset="0"/>
-              </a:rPr>
-              <a:t> on </a:t>
-            </a:r>
-            <a:r>
-              <a:rPr lang="fr-FR" sz="1100" b="1" spc="-4" dirty="0" err="1">
-                <a:solidFill>
-                  <a:schemeClr val="dk1"/>
-                </a:solidFill>
-                <a:latin typeface="Calibri" panose="020F0502020204030204" pitchFamily="34" charset="0"/>
-              </a:rPr>
-              <a:t>client’s</a:t>
-            </a:r>
-            <a:r>
-              <a:rPr lang="fr-FR" sz="1100" b="1" spc="-4" dirty="0">
-                <a:solidFill>
-                  <a:schemeClr val="dk1"/>
-                </a:solidFill>
-                <a:latin typeface="Calibri" panose="020F0502020204030204" pitchFamily="34" charset="0"/>
-              </a:rPr>
-              <a:t> server</a:t>
-            </a:r>
+            <a:endParaRPr lang="fr-FR" sz="1100" b="1" spc="-4" dirty="0">
+              <a:solidFill>
+                <a:schemeClr val="dk1"/>
+              </a:solidFill>
+              <a:latin typeface="Calibri" panose="020F0502020204030204" pitchFamily="34" charset="0"/>
+            </a:endParaRPr>
           </a:p>
         </p:txBody>
       </p:sp>
@@ -16828,7 +16750,7 @@
         </p:nvSpPr>
         <p:spPr>
           <a:xfrm>
-            <a:off x="3835282" y="4361115"/>
+            <a:off x="6273458" y="4372440"/>
             <a:ext cx="2006600" cy="170519"/>
           </a:xfrm>
           <a:prstGeom prst="rect">
@@ -16842,33 +16764,15 @@
           </a:bodyPr>
           <a:lstStyle/>
           <a:p>
-            <a:pPr algn="r"/>
+            <a:pPr algn="ctr"/>
             <a:r>
-              <a:rPr lang="fr-FR" sz="1100" b="1" spc="-2" dirty="0" err="1">
+              <a:rPr lang="fr-FR" sz="1100" b="1" spc="-2" smtClean="0">
                 <a:solidFill>
                   <a:schemeClr val="dk1"/>
                 </a:solidFill>
                 <a:latin typeface="Calibri" panose="020F0502020204030204" pitchFamily="34" charset="0"/>
               </a:rPr>
-              <a:t>Add</a:t>
-            </a:r>
-            <a:r>
-              <a:rPr lang="fr-FR" sz="1100" b="1" spc="-2" dirty="0">
-                <a:solidFill>
-                  <a:schemeClr val="dk1"/>
-                </a:solidFill>
-                <a:latin typeface="Calibri" panose="020F0502020204030204" pitchFamily="34" charset="0"/>
-              </a:rPr>
-              <a:t> non-canonical </a:t>
-            </a:r>
-            <a:r>
-              <a:rPr lang="fr-FR" sz="1100" b="1" spc="-2" dirty="0" err="1">
-                <a:solidFill>
-                  <a:schemeClr val="dk1"/>
-                </a:solidFill>
-                <a:latin typeface="Calibri" panose="020F0502020204030204" pitchFamily="34" charset="0"/>
-              </a:rPr>
-              <a:t>pathways</a:t>
+              <a:t>Ajouter des voies non-canoniques </a:t>
             </a:r>
             <a:endParaRPr lang="fr-FR" sz="1100" b="1" spc="-2" dirty="0">
               <a:solidFill>
@@ -17103,6 +17007,47 @@
           </a:graphicData>
         </a:graphic>
       </p:graphicFrame>
+      <p:pic>
+        <p:nvPicPr>
+          <p:cNvPr id="5" name="Picture 2" descr="Résultat de recherche d'images pour &quot;risk management logo&quot;"/>
+          <p:cNvPicPr>
+            <a:picLocks noChangeAspect="1" noChangeArrowheads="1"/>
+          </p:cNvPicPr>
+          <p:nvPr/>
+        </p:nvPicPr>
+        <p:blipFill>
+          <a:blip r:embed="rId7">
+            <a:extLst>
+              <a:ext uri="{28A0092B-C50C-407E-A947-70E740481C1C}">
+                <a14:useLocalDpi xmlns:a14="http://schemas.microsoft.com/office/drawing/2010/main" val="0"/>
+              </a:ext>
+            </a:extLst>
+          </a:blip>
+          <a:srcRect/>
+          <a:stretch>
+            <a:fillRect/>
+          </a:stretch>
+        </p:blipFill>
+        <p:spPr bwMode="auto">
+          <a:xfrm>
+            <a:off x="8864655" y="3524746"/>
+            <a:ext cx="2406720" cy="2406721"/>
+          </a:xfrm>
+          <a:prstGeom prst="rect">
+            <a:avLst/>
+          </a:prstGeom>
+          <a:noFill/>
+          <a:extLst>
+            <a:ext uri="{909E8E84-426E-40DD-AFC4-6F175D3DCCD1}">
+              <a14:hiddenFill xmlns:a14="http://schemas.microsoft.com/office/drawing/2010/main">
+                <a:solidFill>
+                  <a:srgbClr val="FFFFFF"/>
+                </a:solidFill>
+              </a14:hiddenFill>
+            </a:ext>
+          </a:extLst>
+        </p:spPr>
+      </p:pic>
     </p:spTree>
     <p:extLst>
       <p:ext uri="{BB962C8B-B14F-4D97-AF65-F5344CB8AC3E}">
@@ -20746,7 +20691,7 @@
         <p:spPr>
           <a:xfrm>
             <a:off x="844465" y="5143500"/>
-            <a:ext cx="1435100" cy="381000"/>
+            <a:ext cx="2667000" cy="381000"/>
           </a:xfrm>
           <a:prstGeom prst="rect">
             <a:avLst/>
@@ -20821,7 +20766,7 @@
         <p:spPr>
           <a:xfrm>
             <a:off x="844465" y="2480225"/>
-            <a:ext cx="1435100" cy="2663275"/>
+            <a:ext cx="2667000" cy="2663275"/>
           </a:xfrm>
           <a:prstGeom prst="rect">
             <a:avLst/>
@@ -20899,7 +20844,7 @@
         </p:nvSpPr>
         <p:spPr>
           <a:xfrm>
-            <a:off x="2221142" y="5524500"/>
+            <a:off x="3446985" y="5524500"/>
             <a:ext cx="114300" cy="127000"/>
           </a:xfrm>
           <a:prstGeom prst="triangle">
@@ -20965,8 +20910,8 @@
         </p:nvSpPr>
         <p:spPr>
           <a:xfrm>
-            <a:off x="1921228" y="5652194"/>
-            <a:ext cx="716735" cy="184666"/>
+            <a:off x="3321285" y="5651500"/>
+            <a:ext cx="368300" cy="186055"/>
           </a:xfrm>
           <a:prstGeom prst="rect">
             <a:avLst/>
@@ -20981,14 +20926,20 @@
           <a:p>
             <a:pPr algn="ctr"/>
             <a:r>
-              <a:rPr lang="fr-FR" sz="1200" spc="-12" dirty="0">
+              <a:rPr lang="fr-FR" sz="1200" spc="-12" smtClean="0">
                 <a:solidFill>
                   <a:schemeClr val="dk1"/>
                 </a:solidFill>
                 <a:latin typeface="Calibri" panose="020F0502020204030204" pitchFamily="34" charset="0"/>
               </a:rPr>
-              <a:t>Aujourd’hui</a:t>
+              <a:t>Today</a:t>
             </a:r>
+            <a:endParaRPr lang="fr-FR" sz="1200" spc="-12" dirty="0">
+              <a:solidFill>
+                <a:schemeClr val="dk1"/>
+              </a:solidFill>
+              <a:latin typeface="Calibri" panose="020F0502020204030204" pitchFamily="34" charset="0"/>
+            </a:endParaRPr>
           </a:p>
         </p:txBody>
       </p:sp>
@@ -22192,8 +22143,8 @@
         </p:nvSpPr>
         <p:spPr>
           <a:xfrm>
-            <a:off x="364051" y="2481467"/>
-            <a:ext cx="1130300" cy="338554"/>
+            <a:off x="364051" y="2480225"/>
+            <a:ext cx="1130300" cy="341037"/>
           </a:xfrm>
           <a:prstGeom prst="rect">
             <a:avLst/>
@@ -22208,22 +22159,13 @@
           <a:p>
             <a:pPr algn="r"/>
             <a:r>
-              <a:rPr lang="fr-FR" sz="1100" b="1" dirty="0">
+              <a:rPr lang="fr-FR" sz="1100" b="1" smtClean="0">
                 <a:solidFill>
                   <a:schemeClr val="dk1"/>
                 </a:solidFill>
                 <a:latin typeface="Calibri" panose="020F0502020204030204" pitchFamily="34" charset="0"/>
               </a:rPr>
-              <a:t>Comprendre l'outil </a:t>
-            </a:r>
-            <a:r>
-              <a:rPr lang="fr-FR" sz="1100" b="1" dirty="0" smtClean="0">
-                <a:solidFill>
-                  <a:schemeClr val="dk1"/>
-                </a:solidFill>
-                <a:latin typeface="Calibri" panose="020F0502020204030204" pitchFamily="34" charset="0"/>
-              </a:rPr>
-              <a:t>DESeq2</a:t>
+              <a:t>Comprendre l'outil ROntoTools</a:t>
             </a:r>
             <a:endParaRPr lang="fr-FR" sz="1100" b="1" dirty="0">
               <a:solidFill>
@@ -22430,23 +22372,20 @@
           <a:lstStyle/>
           <a:p>
             <a:r>
-              <a:rPr lang="fr-FR" sz="1000" spc="-4" dirty="0" err="1">
+              <a:rPr lang="fr-FR" sz="1000" spc="-4" smtClean="0">
                 <a:solidFill>
                   <a:schemeClr val="dk2"/>
                 </a:solidFill>
                 <a:latin typeface="Calibri" panose="020F0502020204030204" pitchFamily="34" charset="0"/>
               </a:rPr>
-              <a:t>Nov</a:t>
+              <a:t>Nov 11 - Dec 20</a:t>
             </a:r>
-            <a:r>
-              <a:rPr lang="fr-FR" sz="1000" spc="-4" dirty="0">
-                <a:solidFill>
-                  <a:schemeClr val="dk2"/>
-                </a:solidFill>
-                <a:latin typeface="Calibri" panose="020F0502020204030204" pitchFamily="34" charset="0"/>
-              </a:rPr>
-              <a:t> 11 - Déc 20</a:t>
-            </a:r>
+            <a:endParaRPr lang="fr-FR" sz="1000" spc="-4" dirty="0">
+              <a:solidFill>
+                <a:schemeClr val="dk2"/>
+              </a:solidFill>
+              <a:latin typeface="Calibri" panose="020F0502020204030204" pitchFamily="34" charset="0"/>
+            </a:endParaRPr>
           </a:p>
         </p:txBody>
       </p:sp>
@@ -22462,7 +22401,7 @@
         </p:nvSpPr>
         <p:spPr>
           <a:xfrm>
-            <a:off x="282839" y="2939203"/>
+            <a:off x="2314907" y="2939203"/>
             <a:ext cx="1206500" cy="170519"/>
           </a:xfrm>
           <a:prstGeom prst="rect">
@@ -22476,7 +22415,7 @@
           </a:bodyPr>
           <a:lstStyle/>
           <a:p>
-            <a:pPr algn="r"/>
+            <a:pPr algn="ctr"/>
             <a:r>
               <a:rPr lang="fr-FR" sz="1100" b="1" spc="-6" dirty="0">
                 <a:solidFill>
@@ -22641,14 +22580,20 @@
           <a:p>
             <a:pPr algn="r"/>
             <a:r>
-              <a:rPr lang="fr-FR" sz="1100" b="1" spc="-6" dirty="0">
+              <a:rPr lang="fr-FR" sz="1100" b="1" spc="-6" smtClean="0">
                 <a:solidFill>
                   <a:schemeClr val="dk1"/>
                 </a:solidFill>
                 <a:latin typeface="Calibri" panose="020F0502020204030204" pitchFamily="34" charset="0"/>
               </a:rPr>
-              <a:t>Écrire les différents scripts fonctionnels </a:t>
+              <a:t>Écrire les différents script fonctionnels </a:t>
             </a:r>
+            <a:endParaRPr lang="fr-FR" sz="1100" b="1" spc="-6" dirty="0">
+              <a:solidFill>
+                <a:schemeClr val="dk1"/>
+              </a:solidFill>
+              <a:latin typeface="Calibri" panose="020F0502020204030204" pitchFamily="34" charset="0"/>
+            </a:endParaRPr>
           </a:p>
         </p:txBody>
       </p:sp>
@@ -22918,14 +22863,20 @@
           <a:lstStyle/>
           <a:p>
             <a:r>
-              <a:rPr lang="fr-FR" sz="1000" spc="-4" dirty="0">
+              <a:rPr lang="fr-FR" sz="1000" spc="-4" smtClean="0">
                 <a:solidFill>
                   <a:schemeClr val="dk2"/>
                 </a:solidFill>
                 <a:latin typeface="Calibri" panose="020F0502020204030204" pitchFamily="34" charset="0"/>
               </a:rPr>
-              <a:t>Déc 9 - Déc 20</a:t>
+              <a:t>Dec 9 - Dec 20</a:t>
             </a:r>
+            <a:endParaRPr lang="fr-FR" sz="1000" spc="-4" dirty="0">
+              <a:solidFill>
+                <a:schemeClr val="dk2"/>
+              </a:solidFill>
+              <a:latin typeface="Calibri" panose="020F0502020204030204" pitchFamily="34" charset="0"/>
+            </a:endParaRPr>
           </a:p>
         </p:txBody>
       </p:sp>
@@ -23119,32 +23070,20 @@
           <a:lstStyle/>
           <a:p>
             <a:r>
-              <a:rPr lang="fr-FR" sz="1000" spc="-4" dirty="0">
+              <a:rPr lang="fr-FR" sz="1000" spc="-4" smtClean="0">
                 <a:solidFill>
                   <a:schemeClr val="dk2"/>
                 </a:solidFill>
                 <a:latin typeface="Calibri" panose="020F0502020204030204" pitchFamily="34" charset="0"/>
               </a:rPr>
-              <a:t>Jan 13 - </a:t>
+              <a:t>Jan 13 - Feb 21</a:t>
             </a:r>
-            <a:r>
-              <a:rPr lang="fr-FR" sz="1000" spc="-4" dirty="0" err="1">
-                <a:solidFill>
-                  <a:schemeClr val="dk2"/>
-                </a:solidFill>
-                <a:latin typeface="Calibri" panose="020F0502020204030204" pitchFamily="34" charset="0"/>
-              </a:rPr>
-              <a:t>Fév</a:t>
-            </a:r>
-            <a:r>
-              <a:rPr lang="fr-FR" sz="1000" spc="-4" dirty="0">
-                <a:solidFill>
-                  <a:schemeClr val="dk2"/>
-                </a:solidFill>
-                <a:latin typeface="Calibri" panose="020F0502020204030204" pitchFamily="34" charset="0"/>
-              </a:rPr>
-              <a:t> 21</a:t>
-            </a:r>
+            <a:endParaRPr lang="fr-FR" sz="1000" spc="-4" dirty="0">
+              <a:solidFill>
+                <a:schemeClr val="dk2"/>
+              </a:solidFill>
+              <a:latin typeface="Calibri" panose="020F0502020204030204" pitchFamily="34" charset="0"/>
+            </a:endParaRPr>
           </a:p>
         </p:txBody>
       </p:sp>
@@ -23284,8 +23223,8 @@
         </p:nvSpPr>
         <p:spPr>
           <a:xfrm>
-            <a:off x="8703420" y="4366568"/>
-            <a:ext cx="876871" cy="153888"/>
+            <a:off x="8703421" y="4380188"/>
+            <a:ext cx="774700" cy="155025"/>
           </a:xfrm>
           <a:prstGeom prst="rect">
             <a:avLst/>
@@ -23299,32 +23238,20 @@
           <a:lstStyle/>
           <a:p>
             <a:r>
-              <a:rPr lang="fr-FR" sz="1000" spc="-4" dirty="0">
+              <a:rPr lang="fr-FR" sz="1000" spc="-4" smtClean="0">
                 <a:solidFill>
                   <a:schemeClr val="dk2"/>
                 </a:solidFill>
                 <a:latin typeface="Calibri" panose="020F0502020204030204" pitchFamily="34" charset="0"/>
               </a:rPr>
-              <a:t>Jan 13 – </a:t>
+              <a:t>Jan 13 - Feb 21</a:t>
             </a:r>
-            <a:r>
-              <a:rPr lang="fr-FR" sz="1000" spc="-4" dirty="0" err="1">
-                <a:solidFill>
-                  <a:schemeClr val="dk2"/>
-                </a:solidFill>
-                <a:latin typeface="Calibri" panose="020F0502020204030204" pitchFamily="34" charset="0"/>
-              </a:rPr>
-              <a:t>Fév</a:t>
-            </a:r>
-            <a:r>
-              <a:rPr lang="fr-FR" sz="1000" spc="-4" dirty="0">
-                <a:solidFill>
-                  <a:schemeClr val="dk2"/>
-                </a:solidFill>
-                <a:latin typeface="Calibri" panose="020F0502020204030204" pitchFamily="34" charset="0"/>
-              </a:rPr>
-              <a:t> 21</a:t>
-            </a:r>
+            <a:endParaRPr lang="fr-FR" sz="1000" spc="-4" dirty="0">
+              <a:solidFill>
+                <a:schemeClr val="dk2"/>
+              </a:solidFill>
+              <a:latin typeface="Calibri" panose="020F0502020204030204" pitchFamily="34" charset="0"/>
+            </a:endParaRPr>
           </a:p>
         </p:txBody>
       </p:sp>
@@ -23480,14 +23407,20 @@
           <a:p>
             <a:pPr algn="r"/>
             <a:r>
-              <a:rPr lang="fr-FR" sz="1100" b="1" spc="-4" dirty="0">
+              <a:rPr lang="fr-FR" sz="1100" b="1" spc="-4" smtClean="0">
                 <a:solidFill>
                   <a:schemeClr val="dk1"/>
                 </a:solidFill>
                 <a:latin typeface="Calibri" panose="020F0502020204030204" pitchFamily="34" charset="0"/>
               </a:rPr>
-              <a:t>Implémenter l'outil sur le serveur client</a:t>
+              <a:t>Implémenter l'outils sur le serveur client</a:t>
             </a:r>
+            <a:endParaRPr lang="fr-FR" sz="1100" b="1" spc="-4" dirty="0">
+              <a:solidFill>
+                <a:schemeClr val="dk1"/>
+              </a:solidFill>
+              <a:latin typeface="Calibri" panose="020F0502020204030204" pitchFamily="34" charset="0"/>
+            </a:endParaRPr>
           </a:p>
         </p:txBody>
       </p:sp>
@@ -23637,7 +23570,7 @@
         </p:nvSpPr>
         <p:spPr>
           <a:xfrm>
-            <a:off x="3835282" y="4361115"/>
+            <a:off x="6273458" y="4372440"/>
             <a:ext cx="2006600" cy="170519"/>
           </a:xfrm>
           <a:prstGeom prst="rect">
@@ -23651,7 +23584,7 @@
           </a:bodyPr>
           <a:lstStyle/>
           <a:p>
-            <a:pPr algn="r"/>
+            <a:pPr algn="ctr"/>
             <a:r>
               <a:rPr lang="fr-FR" sz="1100" b="1" spc="-2" dirty="0">
                 <a:solidFill>
@@ -23883,6 +23816,47 @@
           </a:graphicData>
         </a:graphic>
       </p:graphicFrame>
+      <p:pic>
+        <p:nvPicPr>
+          <p:cNvPr id="1026" name="Picture 2" descr="Résultat de recherche d'images pour &quot;risk management logo&quot;"/>
+          <p:cNvPicPr>
+            <a:picLocks noChangeAspect="1" noChangeArrowheads="1"/>
+          </p:cNvPicPr>
+          <p:nvPr/>
+        </p:nvPicPr>
+        <p:blipFill>
+          <a:blip r:embed="rId7">
+            <a:extLst>
+              <a:ext uri="{28A0092B-C50C-407E-A947-70E740481C1C}">
+                <a14:useLocalDpi xmlns:a14="http://schemas.microsoft.com/office/drawing/2010/main" val="0"/>
+              </a:ext>
+            </a:extLst>
+          </a:blip>
+          <a:srcRect/>
+          <a:stretch>
+            <a:fillRect/>
+          </a:stretch>
+        </p:blipFill>
+        <p:spPr bwMode="auto">
+          <a:xfrm>
+            <a:off x="8864655" y="3524746"/>
+            <a:ext cx="2406720" cy="2406721"/>
+          </a:xfrm>
+          <a:prstGeom prst="rect">
+            <a:avLst/>
+          </a:prstGeom>
+          <a:noFill/>
+          <a:extLst>
+            <a:ext uri="{909E8E84-426E-40DD-AFC4-6F175D3DCCD1}">
+              <a14:hiddenFill xmlns:a14="http://schemas.microsoft.com/office/drawing/2010/main">
+                <a:solidFill>
+                  <a:srgbClr val="FFFFFF"/>
+                </a:solidFill>
+              </a14:hiddenFill>
+            </a:ext>
+          </a:extLst>
+        </p:spPr>
+      </p:pic>
     </p:spTree>
     <p:extLst>
       <p:ext uri="{BB962C8B-B14F-4D97-AF65-F5344CB8AC3E}">
@@ -25383,7 +25357,7 @@
 
 <file path=ppt/tags/tag1.xml><?xml version="1.0" encoding="utf-8"?>
 <p:tagLst xmlns:a="http://schemas.openxmlformats.org/drawingml/2006/main" xmlns:r="http://schemas.openxmlformats.org/officeDocument/2006/relationships" xmlns:p="http://schemas.openxmlformats.org/presentationml/2006/main">
-  <p:tag name="__PART_0" val="eyIkaWQiOiIxIiwiQ3VsdHVyZUluZm9OYW1lIjoiZW4tVVMiLCJTdHlsZU5hbWUiOm51bGwsIlZlcnNpb24iOnsiJGlkIjoiMiIsIlZlcnNpb24iOiIzLjIuMCIsIk9yaWdpbmFsQXNzZW1ibHlWZXJzaW9uIjoiNC4wMS4wMC4wMCIsIkVkaXRpb24iOiJGcmVlIiwiSXNQbHVzRWRpdGlvbiI6ZmFsc2UsIklzUHJvRWRpdGlvbiI6ZmFsc2V9LCJFZmZlY3QiOjEsIlN0eWxlIjp7IiRpZCI6IjMiLCJUaW1lYmFuZFN0eWxlIjp7IiRpZCI6IjQiLCJTY2FsZU1hcmtpbmciOjAsIlNoYXBlIjozLCJTaGFwZVN0eWxlIjp7IiRpZCI6IjUiLCJNYXJnaW4iOnsiJGlkIjoiNiIsIlRvcCI6MCwiTGVmdCI6MTAsIlJpZ2h0IjoxMCwiQm90dG9tIjowfSwiUGFkZGluZyI6eyIkaWQiOiI3IiwiVG9wIjozLCJMZWZ0IjowLCJSaWdodCI6MCwiQm90dG9tIjozfSwiQmFja2dyb3VuZCI6eyIkaWQiOiI4IiwiQ29sb3IiOnsiJGlkIjoiOSIsIkEiOjI1NSwiUiI6MTc4LCJHIjoxNzgsIkIiOjE3OH19LCJJc1Zpc2libGUiOnRydWUsIldpZHRoIjowLjAsIkhlaWdodCI6MzAuMCwiQm9yZGVyU3R5bGUiOnsiJGlkIjoiMTAiLCJMaW5lQ29sb3IiOnsiJGlkIjoiMTEiLCIkdHlwZSI6Ik5MUkUuQ29tbW9uLkRvbS5Tb2xpZENvbG9yQnJ1c2gsIE5MUkUuQ29tbW9uIiwiQ29sb3IiOnsiJGlkIjoiMTIiLCJBIjoyNTUsIlIiOjI1NSwiRyI6MCwiQiI6MH19LCJMaW5lV2VpZ2h0IjowLjAsIkxpbmVUeXBlIjowLCJQYXJlbnRTdHlsZSI6bnVsbH0sIlBhcmVudFN0eWxlIjpudWxsfSwiUmlnaHRFbmRDYXBzU3R5bGUiOnsiJGlkIjoiMTMiLCJGb250U2V0dGluZ3MiOnsiJGlkIjoiMTQiLCJGb250U2l6ZSI6MTgsIkZvbnROYW1lIjoiQ2FsaWJyaSIsIklzQm9sZCI6dHJ1ZSwiSXNJdGFsaWMiOmZhbHNlLCJJc1VuZGVybGluZWQiOmZhbHNlLCJQYXJlbnRTdHlsZSI6bnVsbH0sIkF1dG9TaXplIjowLCJGb3JlZ3JvdW5kIjp7IiRpZCI6IjE1IiwiQ29sb3IiOnsiJGlkIjoiMTYiLCJBIjoyNTUsIlIiOjIzNywiRyI6MTI1LCJCIjo0OX19LCJNYXhXaWR0aCI6IkluZmluaXR5IiwiTWF4SGVpZ2h0IjoiSW5maW5pdHkiLCJTbWFydEZvcmVncm91bmRJc0FjdGl2ZSI6ZmFsc2UsIkhvcml6b250YWxBbGlnbm1lbnQiOjAsIlZlcnRpY2FsQWxpZ25tZW50IjowLCJTbWFydEZvcmVncm91bmQiOm51bGwsIkJhY2tncm91bmRGaWxsVHlwZSI6MCwiTWFyZ2luIjp7IiRpZCI6IjE3IiwiVG9wIjowLCJMZWZ0IjowLCJSaWdodCI6MjAsIkJvdHRvbSI6MH0sIlBhZGRpbmciOnsiJGlkIjoiMTgiLCJUb3AiOjAsIkxlZnQiOjAsIlJpZ2h0IjowLCJCb3R0b20iOjB9LCJCYWNrZ3JvdW5kIjp7IiRpZCI6IjE5IiwiQ29sb3IiOnsiJGlkIjoiMjAiLCJBIjowLCJSIjowLCJHIjowLCJCIjowfX0sIklzVmlzaWJsZSI6dHJ1ZSwiV2lkdGgiOjAuMCwiSGVpZ2h0IjowLjAsIkJvcmRlclN0eWxlIjpudWxsLCJQYXJlbnRTdHlsZSI6bnVsbH0sIkxlZnRFbmRDYXBzU3R5bGUiOnsiJGlkIjoiMjEiLCJGb250U2V0dGluZ3MiOnsiJGlkIjoiMjIiLCJGb250U2l6ZSI6MTgsIkZvbnROYW1lIjoiQ2FsaWJyaSIsIklzQm9sZCI6dHJ1ZSwiSXNJdGFsaWMiOmZhbHNlLCJJc1VuZGVybGluZWQiOmZhbHNlLCJQYXJlbnRTdHlsZSI6bnVsbH0sIkF1dG9TaXplIjowLCJGb3JlZ3JvdW5kIjp7IiRpZCI6IjIzIiwiQ29sb3IiOnsiJGlkIjoiMjQiLCJBIjoyNTUsIlIiOjIzNywiRyI6MTI1LCJCIjo0OX19LCJNYXhXaWR0aCI6IkluZmluaXR5IiwiTWF4SGVpZ2h0IjoiSW5maW5pdHkiLCJTbWFydEZvcmVncm91bmRJc0FjdGl2ZSI6ZmFsc2UsIkhvcml6b250YWxBbGlnbm1lbnQiOjAsIlZlcnRpY2FsQWxpZ25tZW50IjowLCJTbWFydEZvcmVncm91bmQiOm51bGwsIkJhY2tncm91bmRGaWxsVHlwZSI6MCwiTWFyZ2luIjp7IiRpZCI6IjI1IiwiVG9wIjowLCJMZWZ0IjoyMCwiUmlnaHQiOjAsIkJvdHRvbSI6MH0sIlBhZGRpbmciOnsiJGlkIjoiMjYiLCJUb3AiOjAsIkxlZnQiOjAsIlJpZ2h0IjowLCJCb3R0b20iOjB9LCJCYWNrZ3JvdW5kIjp7IiRpZCI6IjI3IiwiQ29sb3IiOnsiJHJlZiI6IjIwIn19LCJJc1Zpc2libGUiOmZhbHNlLCJXaWR0aCI6MC4wLCJIZWlnaHQiOjAuMCwiQm9yZGVyU3R5bGUiOm51bGwsIlBhcmVudFN0eWxlIjpudWxsfSwiVG9kYXlUZXh0U3R5bGUiOnsiJGlkIjoiMjgiLCJGb250U2V0dGluZ3MiOnsiJGlkIjoiMjkiLCJGb250U2l6ZSI6MTIsIkZvbnROYW1lIjoiQ2FsaWJyaSIsIklzQm9sZCI6ZmFsc2UsIklzSXRhbGljIjpmYWxzZSwiSXNVbmRlcmxpbmVkIjpmYWxzZSwiUGFyZW50U3R5bGUiOm51bGx9LCJBdXRvU2l6ZSI6MCwiRm9yZWdyb3VuZCI6eyIkaWQiOiIzMCIsIkNvbG9yIjp7IiRpZCI6IjMxIiwiQSI6MjU1LCJSIjowLCJHIjowLCJCIjowfX0sIk1heFdpZHRoIjoyMDAuMCwiTWF4SGVpZ2h0IjoiSW5maW5pdHkiLCJTbWFydEZvcmVncm91bmRJc0FjdGl2ZSI6ZmFsc2UsIkhvcml6b250YWxBbGlnbm1lbnQiOjAsIlZlcnRpY2FsQWxpZ25tZW50IjowLCJTbWFydEZvcmVncm91bmQiOm51bGwsIkJhY2tncm91bmRGaWxsVHlwZSI6MCwiTWFyZ2luIjp7IiRpZCI6IjMyIiwiVG9wIjowLCJMZWZ0IjowLCJSaWdodCI6MCwiQm90dG9tIjowfSwiUGFkZGluZyI6eyIkaWQiOiIzMyIsIlRvcCI6MCwiTGVmdCI6MCwiUmlnaHQiOjAsIkJvdHRvbSI6MH0sIkJhY2tncm91bmQiOnsiJGlkIjoiMzQiLCJDb2xvciI6eyIkcmVmIjoiMjAifX0sIklzVmlzaWJsZSI6dHJ1ZSwiV2lkdGgiOjAuMCwiSGVpZ2h0IjowLjAsIkJvcmRlclN0eWxlIjpudWxsLCJQYXJlbnRTdHlsZSI6bnVsbH0sIlRvZGF5TWFya2VyU3R5bGUiOnsiJGlkIjoiMzUiLCJNYXJnaW4iOnsiJGlkIjoiMzYiLCJUb3AiOjAsIkxlZnQiOjAsIlJpZ2h0IjowLCJCb3R0b20iOjB9LCJQYWRkaW5nIjp7IiRpZCI6IjM3IiwiVG9wIjowLCJMZWZ0IjowLCJSaWdodCI6MCwiQm90dG9tIjowfSwiQmFja2dyb3VuZCI6eyIkaWQiOiIzOCIsIkNvbG9yIjp7IiRpZCI6IjM5IiwiQSI6MjU1LCJSIjoyNTUsIkciOjAsIkIiOjB9fSwiSXNWaXNpYmxlIjp0cnVlLCJXaWR0aCI6MC4wLCJIZWlnaHQiOjAuMCwiQm9yZGVyU3R5bGUiOm51bGwsIlBhcmVudFN0eWxlIjpudWxsfSwiU2NhbGVTdHlsZSI6eyIkaWQiOiI0MCIsIlNob3dTZWdtZW50U2VwYXJhdG9ycyI6ZmFsc2UsIlNlZ21lbnRTZXBhcmF0b3JPcGFjaXR5IjozMCwiRm9udFNldHRpbmdzIjp7IiRpZCI6IjQxIiwiRm9udFNpemUiOjEyLCJGb250TmFtZSI6IkNhbGlicmkiLCJJc0JvbGQiOmZhbHNlLCJJc0l0YWxpYyI6ZmFsc2UsIklzVW5kZXJsaW5lZCI6ZmFsc2UsIlBhcmVudFN0eWxlIjpudWxsfSwiQXV0b1NpemUiOjAsIkZvcmVncm91bmQiOnsiJGlkIjoiNDIiLCJDb2xvciI6eyIkaWQiOiI0MyIsIkEiOjI1NSwiUiI6MCwiRyI6MCwiQiI6MH19LCJNYXhXaWR0aCI6MjAwLjAsIk1heEhlaWdodCI6IkluZmluaXR5IiwiU21hcnRGb3JlZ3JvdW5kSXNBY3RpdmUiOmZhbHNlLCJIb3Jpem9udGFsQWxpZ25tZW50IjowLCJWZXJ0aWNhbEFsaWdubWVudCI6MSwiU21hcnRGb3JlZ3JvdW5kIjpudWxsLCJCYWNrZ3JvdW5kRmlsbFR5cGUiOjAsIk1hcmdpbiI6eyIkaWQiOiI0NCIsIlRvcCI6MCwiTGVmdCI6NSwiUmlnaHQiOjAsIkJvdHRvbSI6MH0sIlBhZGRpbmciOnsiJGlkIjoiNDUiLCJUb3AiOjAsIkxlZnQiOjAsIlJpZ2h0IjowLCJCb3R0b20iOjB9LCJCYWNrZ3JvdW5kIjp7IiRpZCI6IjQ2IiwiQ29sb3IiOnsiJHJlZiI6IjIwIn19LCJJc1Zpc2libGUiOnRydWUsIldpZHRoIjowLjAsIkhlaWdodCI6MC4wLCJCb3JkZXJTdHlsZSI6bnVsbCwiUGFyZW50U3R5bGUiOm51bGx9LCJFbGFwc2VkVGltZUJhY2tncm91bmQiOnsiJGlkIjoiNDciLCJDb2xvciI6eyIkaWQiOiI0OCIsIkEiOjc3LCJSIjoyNTUsIkciOjE5MiwiQiI6MH19LCJBcHBlbmRZZWFyT25ZZWFyQ2hhbmdlIjp0cnVlLCJFbGFwc2VkVGltZUZvcm1hdCI6MSwiVG9kYXlNYXJrZXJQb3NpdGlvbiI6MywiUXVpY2tQb3NpdGlvbiI6MiwiQWJzb2x1dGVQb3NpdGlvbiI6NDA1LjAsIk1hcmdpbiI6eyIkaWQiOiI0OSIsIlRvcCI6MCwiTGVmdCI6MTAsIlJpZ2h0IjoxMCwiQm90dG9tIjowfSwiUGFkZGluZyI6eyIkaWQiOiI1MCIsIlRvcCI6MCwiTGVmdCI6MCwiUmlnaHQiOjAsIkJvdHRvbSI6MH0sIkJhY2tncm91bmQiOnsiJGlkIjoiNTEiLCJDb2xvciI6eyIkaWQiOiI1MiIsIkEiOjI1NSwiUiI6MTc4LCJHIjoxNzgsIkIiOjE3OH19LCJJc1Zpc2libGUiOnRydWUsIldpZHRoIjowLjAsIkhlaWdodCI6MC4wLCJCb3JkZXJTdHlsZSI6bnVsbCwiUGFyZW50U3R5bGUiOm51bGx9LCJEZWZhdWx0TWlsZXN0b25lU3R5bGUiOnsiJGlkIjoiNTMiLCJTaGFwZSI6NywiQ29ubmVjdG9yTWFyZ2luIjp7IiRpZCI6IjU0IiwiVG9wIjowLCJMZWZ0IjoyLCJSaWdodCI6MiwiQm90dG9tIjowfSwiQ29ubmVjdG9yU3R5bGUiOnsiJGlkIjoiNTUiLCJMaW5lQ29sb3IiOnsiJGlkIjoiNTYiLCIkdHlwZSI6Ik5MUkUuQ29tbW9uLkRvbS5Tb2xpZENvbG9yQnJ1c2gsIE5MUkUuQ29tbW9uIiwiQ29sb3IiOnsiJGlkIjoiNTciLCJBIjoxMjcsIlIiOjMxLCJHIjo3MywiQiI6MTI2fX0sIkxpbmVXZWlnaHQiOjEuMCwiTGluZVR5cGUiOjAsIlBhcmVudFN0eWxlIjpudWxsfSwiSXNCZWxvd1RpbWViYW5kIjpmYWxzZSwiUG9zaXRpb25PblRhc2siOjAsIkhpZGVEYXRlIjpmYWxzZSwiU2hhcGVTaXplIjoxLCJTcGFjaW5nIjoyLjAsIlBhZGRpbmciOnsiJGlkIjoiNTgiLCJUb3AiOjcsIkxlZnQiOjMsIlJpZ2h0IjowLCJCb3R0b20iOjJ9LCJTaGFwZVN0eWxlIjp7IiRpZCI6IjU5IiwiTWFyZ2luIjp7IiRpZCI6IjYwIiwiVG9wIjowLCJMZWZ0IjowLCJSaWdodCI6MCwiQm90dG9tIjowfSwiUGFkZGluZyI6eyIkaWQiOiI2MSIsIlRvcCI6MCwiTGVmdCI6MCwiUmlnaHQiOjAsIkJvdHRvbSI6MH0sIkJhY2tncm91bmQiOnsiJGlkIjoiNjIiLCJDb2xvciI6eyIkaWQiOiI2MyIsIkEiOjI1NSwiUiI6MCwiRyI6MTE0LCJCIjoxODh9fSwiSXNWaXNpYmxlIjp0cnVlLCJXaWR0aCI6MTguMCwiSGVpZ2h0IjoyMC4wLCJCb3JkZXJTdHlsZSI6eyIkaWQiOiI2NCIsIkxpbmVDb2xvciI6eyIkaWQiOiI2NSIsIiR0eXBlIjoiTkxSRS5Db21tb24uRG9tLlNvbGlkQ29sb3JCcnVzaCwgTkxSRS5Db21tb24iLCJDb2xvciI6eyIkaWQiOiI2NiIsIkEiOjI1NSwiUiI6MjU1LCJHIjowLCJCIjowfX0sIkxpbmVXZWlnaHQiOjAuMCwiTGluZVR5cGUiOjAsIlBhcmVudFN0eWxlIjpudWxsfSwiUGFyZW50U3R5bGUiOm51bGx9LCJUaXRsZVN0eWxlIjp7IiRpZCI6IjY3IiwiRm9udFNldHRpbmdzIjp7IiRpZCI6IjY4IiwiRm9udFNpemUiOjExLCJGb250TmFtZSI6IkNhbGlicmkiLCJJc0JvbGQiOnRydWUsIklzSXRhbGljIjpmYWxzZSwiSXNVbmRlcmxpbmVkIjpmYWxzZSwiUGFyZW50U3R5bGUiOm51bGx9LCJBdXRvU2l6ZSI6MCwiRm9yZWdyb3VuZCI6eyIkaWQiOiI2OSIsIkNvbG9yIjp7IiRpZCI6IjcwIiwiQSI6MjU1LCJSIjowLCJHIjowLCJCIjowfX0sIk1heFdpZHRoIjoyMDAuMCwiTWF4SGVpZ2h0IjoiSW5maW5pdHkiLCJTbWFydEZvcmVncm91bmRJc0FjdGl2ZSI6ZmFsc2UsIkhvcml6b250YWxBbGlnbm1lbnQiOjEsIlZlcnRpY2FsQWxpZ25tZW50IjowLCJTbWFydEZvcmVncm91bmQiOm51bGwsIkJhY2tncm91bmRGaWxsVHlwZSI6MCwiTWFyZ2luIjp7IiRpZCI6IjcxIiwiVG9wIjowLCJMZWZ0IjowLCJSaWdodCI6MCwiQm90dG9tIjowfSwiUGFkZGluZyI6eyIkaWQiOiI3MiIsIlRvcCI6MCwiTGVmdCI6MCwiUmlnaHQiOjAsIkJvdHRvbSI6MH0sIkJhY2tncm91bmQiOnsiJGlkIjoiNzMiLCJDb2xvciI6eyIkcmVmIjoiMjAifX0sIklzVmlzaWJsZSI6dHJ1ZSwiV2lkdGgiOjAuMCwiSGVpZ2h0IjowLjAsIkJvcmRlclN0eWxlIjpudWxsLCJQYXJlbnRTdHlsZSI6bnVsbH0sIkRhdGVTdHlsZSI6eyIkaWQiOiI3NCIsIkZvbnRTZXR0aW5ncyI6eyIkaWQiOiI3NSIsIkZvbnRTaXplIjoxMCwiRm9udE5hbWUiOiJDYWxpYnJpIiwiSXNCb2xkIjpmYWxzZSwiSXNJdGFsaWMiOmZhbHNlLCJJc1VuZGVybGluZWQiOmZhbHNlLCJQYXJlbnRTdHlsZSI6bnVsbH0sIkF1dG9TaXplIjowLCJGb3JlZ3JvdW5kIjp7IiRpZCI6Ijc2IiwiQ29sb3IiOnsiJGlkIjoiNzciLCJBIjoyNTUsIlIiOjY4LCJHIjo4NCwiQiI6MTA2fX0sIk1heFdpZHRoIjoyMDAuMCwiTWF4SGVpZ2h0IjoiSW5maW5pdHkiLCJTbWFydEZvcmVncm91bmRJc0FjdGl2ZSI6ZmFsc2UsIkhvcml6b250YWxBbGlnbm1lbnQiOjAsIlZlcnRpY2FsQWxpZ25tZW50IjowLCJTbWFydEZvcmVncm91bmQiOm51bGwsIkJhY2tncm91bmRGaWxsVHlwZSI6MCwiTWFyZ2luIjp7IiRpZCI6Ijc4IiwiVG9wIjowLCJMZWZ0IjowLCJSaWdodCI6MCwiQm90dG9tIjowfSwiUGFkZGluZyI6eyIkaWQiOiI3OSIsIlRvcCI6MCwiTGVmdCI6MCwiUmlnaHQiOjAsIkJvdHRvbSI6MH0sIkJhY2tncm91bmQiOnsiJGlkIjoiODAiLCJDb2xvciI6eyIkcmVmIjoiMjAifX0sIklzVmlzaWJsZSI6dHJ1ZSwiV2lkdGgiOjAuMCwiSGVpZ2h0IjowLjAsIkJvcmRlclN0eWxlIjpudWxsLCJQYXJlbnRTdHlsZSI6bnVsbH0sIkRhdGVGb3JtYXQiOnsiJGlkIjoiODEiLCJGb3JtYXRTdHJpbmciOiJNTU0gZCIsIlNlcGFyYXRvciI6Ii8iLCJVc2VJbnRlcm5hdGlvbmFsRGF0ZUZvcm1hdCI6ZmFsc2UsIkRhdGVJc1Zpc2libGUiOnRydWUsIlRpbWVJc1Zpc2libGUiOmZhbHNlLCJIb3VyRGlnaXRzIjoxLCJBbVBtRGVzaWduYXRvciI6MiwiVHJpbTAwTWludXRlcyI6ZmFsc2UsIkxhc3RLbm93blZpc2liaWxpdHlTdGF0ZSI6bnVsbH0sIklzVmlzaWJsZSI6dHJ1ZSwiUGFyZW50U3R5bGUiOm51bGx9LCJEZWZhdWx0VGFza1N0eWxlIjp7IiRpZCI6IjgyIiwiU2hhcGUiOjAsIlNoYXBlVGhpY2tuZXNzIjoyLCJEdXJhdGlvbkZvcm1hdCI6MCwiSW5jbHVkZU5vbldvcmtpbmdEYXlzSW5EdXJhdGlvbiI6ZmFsc2UsIlBlcmNlbnRhZ2VDb21wbGV0ZVN0eWxlIjp7IiRpZCI6IjgzIiwiRm9udFNldHRpbmdzIjp7IiRpZCI6Ijg0IiwiRm9udFNpemUiOjEwLCJGb250TmFtZSI6IkNhbGlicmkiLCJJc0JvbGQiOmZhbHNlLCJJc0l0YWxpYyI6ZmFsc2UsIklzVW5kZXJsaW5lZCI6ZmFsc2UsIlBhcmVudFN0eWxlIjpudWxsfSwiQXV0b1NpemUiOjAsIkZvcmVncm91bmQiOnsiJGlkIjoiODUiLCJDb2xvciI6eyIkaWQiOiI4NiIsIkEiOjI1NSwiUiI6MjM4LCJHIjoyMzYsIkIiOjIyNX19LCJNYXhXaWR0aCI6MjAwLjAsIk1heEhlaWdodCI6IkluZmluaXR5IiwiU21hcnRGb3JlZ3JvdW5kSXNBY3RpdmUiOmZhbHNlLCJIb3Jpem9udGFsQWxpZ25tZW50IjoxLCJWZXJ0aWNhbEFsaWdubWVudCI6MCwiU21hcnRGb3JlZ3JvdW5kIjpudWxsLCJCYWNrZ3JvdW5kRmlsbFR5cGUiOjAsIk1hcmdpbiI6eyIkaWQiOiI4NyIsIlRvcCI6MCwiTGVmdCI6MCwiUmlnaHQiOjAsIkJvdHRvbSI6MH0sIlBhZGRpbmciOnsiJGlkIjoiODgiLCJUb3AiOjAsIkxlZnQiOjAsIlJpZ2h0IjowLCJCb3R0b20iOjB9LCJCYWNrZ3JvdW5kIjp7IiRpZCI6Ijg5IiwiQ29sb3IiOnsiJHJlZiI6IjIwIn19LCJJc1Zpc2libGUiOnRydWUsIldpZHRoIjowLjAsIkhlaWdodCI6MC4wLCJCb3JkZXJTdHlsZSI6bnVsbCwiUGFyZW50U3R5bGUiOm51bGx9LCJEdXJhdGlvblN0eWxlIjp7IiRpZCI6IjkwIiwiRm9udFNldHRpbmdzIjp7IiRpZCI6IjkxIiwiRm9udFNpemUiOjEwLCJGb250TmFtZSI6IkNhbGlicmkiLCJJc0JvbGQiOmZhbHNlLCJJc0l0YWxpYyI6ZmFsc2UsIklzVW5kZXJsaW5lZCI6ZmFsc2UsIlBhcmVudFN0eWxlIjpudWxsfSwiQXV0b1NpemUiOjAsIkZvcmVncm91bmQiOnsiJGlkIjoiOTIiLCJDb2xvciI6eyIkaWQiOiI5MyIsIkEiOjI1NSwiUiI6MjM3LCJHIjoxMjUsIkIiOjQ5fX0sIk1heFdpZHRoIjoyMDAuMCwiTWF4SGVpZ2h0IjoiSW5maW5pdHkiLCJTbWFydEZvcmVncm91bmRJc0FjdGl2ZSI6ZmFsc2UsIkhvcml6b250YWxBbGlnbm1lbnQiOjAsIlZlcnRpY2FsQWxpZ25tZW50IjowLCJTbWFydEZvcmVncm91bmQiOm51bGwsIkJhY2tncm91bmRGaWxsVHlwZSI6MCwiTWFyZ2luIjp7IiRpZCI6Ijk0IiwiVG9wIjowLCJMZWZ0IjowLCJSaWdodCI6MCwiQm90dG9tIjowfSwiUGFkZGluZyI6eyIkaWQiOiI5NSIsIlRvcCI6MCwiTGVmdCI6MCwiUmlnaHQiOjAsIkJvdHRvbSI6MH0sIkJhY2tncm91bmQiOnsiJGlkIjoiOTYiLCJDb2xvciI6eyIkcmVmIjoiMjAifX0sIklzVmlzaWJsZSI6dHJ1ZSwiV2lkdGgiOjAuMCwiSGVpZ2h0IjowLjAsIkJvcmRlclN0eWxlIjpudWxsLCJQYXJlbnRTdHlsZSI6bnVsbH0sIkhvcml6b250YWxDb25uZWN0b3JTdHlsZSI6eyIkaWQiOiI5NyIsIkxpbmVDb2xvciI6eyIkaWQiOiI5OCIsIiR0eXBlIjoiTkxSRS5Db21tb24uRG9tLlNvbGlkQ29sb3JCcnVzaCwgTkxSRS5Db21tb24iLCJDb2xvciI6eyIkaWQiOiI5OSIsIkEiOjI1NSwiUiI6MjA0LCJHIjoyMDQsIkIiOjIwNH19LCJMaW5lV2VpZ2h0IjoxLjAsIkxpbmVUeXBlIjowLCJQYXJlbnRTdHlsZSI6bnVsbH0sIlZlcnRpY2FsQ29ubmVjdG9yU3R5bGUiOnsiJGlkIjoiMTAwIiwiTGluZUNvbG9yIjp7IiRpZCI6IjEwMSIsIiR0eXBlIjoiTkxSRS5Db21tb24uRG9tLlNvbGlkQ29sb3JCcnVzaCwgTkxSRS5Db21tb24iLCJDb2xvciI6eyIkaWQiOiIxMDIiLCJBIjoyNTUsIlIiOjIwNCwiRyI6MjA0LCJCIjoyMDR9fSwiTGluZVdlaWdodCI6MS4wLCJMaW5lVHlwZSI6MCwiUGFyZW50U3R5bGUiOm51bGx9LCJNYXJnaW4iOm51bGwsIlN0YXJ0RGF0ZVBvc2l0aW9uIjo0LCJFbmREYXRlUG9zaXRpb24iOjQsIkRhdGVJc1Zpc2libGUiOnRydWUsIlRpdGxlUG9zaXRpb24iOjIsIkR1cmF0aW9uUG9zaXRpb24iOjYsIlBlcmNlbnRhZ2VDb21wbGV0ZWRQb3NpdGlvbiI6MiwiU3BhY2luZyI6NSwiSXNCZWxvd1RpbWViYW5kIjpmYWxzZSwiUGVyY2VudGFnZUNvbXBsZXRlU2hhcGVPcGFjaXR5IjozNSwiU2hhcGVTdHlsZSI6eyIkaWQiOiIxMDMiLCJNYXJnaW4iOnsiJGlkIjoiMTA0IiwiVG9wIjowLCJMZWZ0Ijo0LCJSaWdodCI6NCwiQm90dG9tIjowfSwiUGFkZGluZyI6eyIkaWQiOiIxMDUiLCJUb3AiOjAsIkxlZnQiOjAsIlJpZ2h0IjowLCJCb3R0b20iOjB9LCJCYWNrZ3JvdW5kIjp7IiRpZCI6IjEwNiIsIkNvbG9yIjp7IiRpZCI6IjEwNyIsIkEiOjI1NSwiUiI6MCwiRyI6MTE0LCJCIjoxODh9fSwiSXNWaXNpYmxlIjp0cnVlLCJXaWR0aCI6MC4wLCJIZWlnaHQiOjIyLjAsIkJvcmRlclN0eWxlIjp7IiRpZCI6IjEwOCIsIkxpbmVDb2xvciI6eyIkaWQiOiIxMDkiLCIkdHlwZSI6Ik5MUkUuQ29tbW9uLkRvbS5Tb2xpZENvbG9yQnJ1c2gsIE5MUkUuQ29tbW9uIiwiQ29sb3IiOnsiJGlkIjoiMTEwIiwiQSI6MjU1LCJSIjoyNTUsIkciOjAsIkIiOjB9fSwiTGluZVdlaWdodCI6MC4wLCJMaW5lVHlwZSI6MCwiUGFyZW50U3R5bGUiOm51bGx9LCJQYXJlbnRTdHlsZSI6bnVsbH0sIlRpdGxlU3R5bGUiOnsiJGlkIjoiMTExIiwiRm9udFNldHRpbmdzIjp7IiRpZCI6IjExMiIsIkZvbnRTaXplIjoxMSwiRm9udE5hbWUiOiJDYWxpYnJpIiwiSXNCb2xkIjp0cnVlLCJJc0l0YWxpYyI6ZmFsc2UsIklzVW5kZXJsaW5lZCI6ZmFsc2UsIlBhcmVudFN0eWxlIjpudWxsfSwiQXV0b1NpemUiOjAsIkZvcmVncm91bmQiOnsiJGlkIjoiMTEzIiwiQ29sb3IiOnsiJGlkIjoiMTE0IiwiQSI6MjU1LCJSIjowLCJHIjowLCJCIjowfX0sIk1heFdpZHRoIjo5NjAuMCwiTWF4SGVpZ2h0IjoiSW5maW5pdHkiLCJTbWFydEZvcmVncm91bmRJc0FjdGl2ZSI6ZmFsc2UsIkhvcml6b250YWxBbGlnbm1lbnQiOjEsIlZlcnRpY2FsQWxpZ25tZW50IjowLCJTbWFydEZvcmVncm91bmQiOm51bGwsIkJhY2tncm91bmRGaWxsVHlwZSI6MCwiTWFyZ2luIjp7IiRpZCI6IjExNSIsIlRvcCI6MCwiTGVmdCI6MCwiUmlnaHQiOjAsIkJvdHRvbSI6MH0sIlBhZGRpbmciOnsiJGlkIjoiMTE2IiwiVG9wIjowLCJMZWZ0IjowLCJSaWdodCI6MCwiQm90dG9tIjowfSwiQmFja2dyb3VuZCI6eyIkaWQiOiIxMTciLCJDb2xvciI6eyIkcmVmIjoiMjAifX0sIklzVmlzaWJsZSI6dHJ1ZSwiV2lkdGgiOjAuMCwiSGVpZ2h0IjowLjAsIkJvcmRlclN0eWxlIjpudWxsLCJQYXJlbnRTdHlsZSI6bnVsbH0sIkRhdGVTdHlsZSI6eyIkaWQiOiIxMTgiLCJGb250U2V0dGluZ3MiOnsiJGlkIjoiMTE5IiwiRm9udFNpemUiOjEwLCJGb250TmFtZSI6IkNhbGlicmkiLCJJc0JvbGQiOmZhbHNlLCJJc0l0YWxpYyI6ZmFsc2UsIklzVW5kZXJsaW5lZCI6ZmFsc2UsIlBhcmVudFN0eWxlIjpudWxsfSwiQXV0b1NpemUiOjAsIkZvcmVncm91bmQiOnsiJGlkIjoiMTIwIiwiQ29sb3IiOnsiJGlkIjoiMTIxIiwiQSI6MjU1LCJSIjo2OCwiRyI6ODQsIkIiOjEwNn19LCJNYXhXaWR0aCI6MjAwLjAsIk1heEhlaWdodCI6IkluZmluaXR5IiwiU21hcnRGb3JlZ3JvdW5kSXNBY3RpdmUiOmZhbHNlLCJIb3Jpem9udGFsQWxpZ25tZW50IjowLCJWZXJ0aWNhbEFsaWdubWVudCI6MCwiU21hcnRGb3JlZ3JvdW5kIjpudWxsLCJCYWNrZ3JvdW5kRmlsbFR5cGUiOjAsIk1hcmdpbiI6eyIkaWQiOiIxMjIiLCJUb3AiOjAsIkxlZnQiOjAsIlJpZ2h0IjowLCJCb3R0b20iOjB9LCJQYWRkaW5nIjp7IiRpZCI6IjEyMyIsIlRvcCI6MCwiTGVmdCI6MCwiUmlnaHQiOjAsIkJvdHRvbSI6MH0sIkJhY2tncm91bmQiOnsiJGlkIjoiMTI0IiwiQ29sb3IiOnsiJHJlZiI6IjIwIn19LCJJc1Zpc2libGUiOnRydWUsIldpZHRoIjowLjAsIkhlaWdodCI6MC4wLCJCb3JkZXJTdHlsZSI6bnVsbCwiUGFyZW50U3R5bGUiOm51bGx9LCJEYXRlRm9ybWF0Ijp7IiRpZCI6IjEyNSIsIkZvcm1hdFN0cmluZyI6Ik1NTSBkIiwiU2VwYXJhdG9yIjoiLyIsIlVzZUludGVybmF0aW9uYWxEYXRlRm9ybWF0IjpmYWxzZSwiRGF0ZUlzVmlzaWJsZSI6dHJ1ZSwiVGltZUlzVmlzaWJsZSI6ZmFsc2UsIkhvdXJEaWdpdHMiOjEsIkFtUG1EZXNpZ25hdG9yIjoyLCJUcmltMDBNaW51dGVzIjpmYWxzZSwiTGFzdEtub3duVmlzaWJpbGl0eVN0YXRlIjpudWxsfSwiSXNWaXNpYmxlIjp0cnVlLCJQYXJlbnRTdHlsZSI6bnVsbCwiX2V4cGxpY2l0bHlTZXQiOnsiJGlkIjoiMTI2IiwiU2hhcGVTdHlsZSI6ZmFsc2UsIlRpdGxlU3R5bGUiOmZhbHNlLCJEYXRlU3R5bGUiOmZhbHNlLCJIb3Jpem9udGFsQ29ubmVjdG9yU3R5bGUiOmZhbHNlLCJWZXJ0aWNhbENvbm5lY3RvclN0eWxlIjpmYWxzZSwiUGVyY2VudGFnZUNvbXBsZXRlU2hhcGVPcGFjaXR5IjpmYWxzZSwiRHVyYXRpb25Gb3JtYXQiOmZhbHNlLCJEdXJhdGlvblBvc2l0aW9uIjpmYWxzZSwiRW5kRGF0ZVBvc2l0aW9uIjpmYWxzZSwiSXNCZWxvd1RpbWViYW5kIjpmYWxzZSwiUGVyY2VudGFnZUNvbXBsZXRlZFBvc2l0aW9uIjpmYWxzZSwiU2hhcGUiOmZhbHNlLCJTaGFwZVRoaWNrbmVzcyI6ZmFsc2UsIlNwYWNpbmciOmZhbHNlLCJTdGFydERhdGVQb3NpdGlvbiI6ZmFsc2UsIlRpdGxlUG9zaXRpb24iOmZhbHNlLCJEYXRlRm9ybWF0IjpmYWxzZSwiSXNWaXNpYmxlIjpmYWxzZSwiTWFyZ2luIjpmYWxzZX19LCJHcmlkbGluZVBhbmVsU3R5bGUiOnsiJGlkIjoiMTI3IiwiR3JpZGxpbmVTdHlsZSI6eyIkaWQiOiIxMjgiLCJMaW5lQ29sb3IiOnsiJGlkIjoiMTI5IiwiJHR5cGUiOiJOTFJFLkNvbW1vbi5Eb20uU29saWRDb2xvckJydXNoLCBOTFJFLkNvbW1vbiIsIkNvbG9yIjp7IiRpZCI6IjEzMCIsIkEiOjM4LCJSIjo5MSwiRyI6MTU1LCJCIjoyMTN9fSwiTGluZVdlaWdodCI6MS4wLCJMaW5lVHlwZSI6MCwiUGFyZW50U3R5bGUiOm51bGx9LCJNYXJnaW4iOnsiJGlkIjoiMTMxIiwiVG9wIjowLCJMZWZ0IjowLCJSaWdodCI6MCwiQm90dG9tIjowfSwiUGFkZGluZyI6eyIkaWQiOiIxMzIiLCJUb3AiOjAsIkxlZnQiOjAsIlJpZ2h0IjowLCJCb3R0b20iOjB9LCJCYWNrZ3JvdW5kIjpudWxsLCJJc1Zpc2libGUiOnRydWUsIldpZHRoIjowLjAsIkhlaWdodCI6MC4wLCJCb3JkZXJTdHlsZSI6eyIkaWQiOiIxMzMiLCJMaW5lQ29sb3IiOm51bGwsIkxpbmVXZWlnaHQiOjAuMCwiTGluZVR5cGUiOjAsIlBhcmVudFN0eWxlIjpudWxsfSwiUGFyZW50U3R5bGUiOm51bGx9LCJTaG93RWxhcHNlZFRpbWVHcmFkaWVudFN0eWxlIjp0cnVlLCJEZWZhdWx0U3dpbWxhbmVTdHlsZSI6eyIkaWQiOiIxMzQiLCJIZWFkZXJTdHlsZSI6eyIkaWQiOiIxMzUiLCJUZXh0U3R5bGUiOnsiJGlkIjoiMTM2IiwiRm9udFNldHRpbmdzIjp7IiRpZCI6IjEzNyIsIkZvbnRTaXplIjoxMiwiRm9udE5hbWUiOiJDYWxpYnJpIiwiSXNCb2xkIjpmYWxzZSwiSXNJdGFsaWMiOmZhbHNlLCJJc1VuZGVybGluZWQiOmZhbHNlLCJQYXJlbnRTdHlsZSI6bnVsbH0sIkF1dG9TaXplIjowLCJGb3JlZ3JvdW5kIjp7IiRpZCI6IjEzOCIsIkNvbG9yIjp7IiRpZCI6IjEzOSIsIkEiOjI1NSwiUiI6MzIsIkciOjU2LCJCIjoxMDB9fSwiTWF4V2lkdGgiOjAuMCwiTWF4SGVpZ2h0IjowLjAsIlNtYXJ0Rm9yZWdyb3VuZElzQWN0aXZlIjpmYWxzZSwiSG9yaXpvbnRhbEFsaWdubWVudCI6MCwiVmVydGljYWxBbGlnbm1lbnQiOjAsIlNtYXJ0Rm9yZWdyb3VuZCI6bnVsbCwiQmFja2dyb3VuZEZpbGxUeXBlIjowLCJNYXJnaW4iOnsiJGlkIjoiMTQwIiwiVG9wIjowLCJMZWZ0IjowLCJSaWdodCI6MCwiQm90dG9tIjowfSwiUGFkZGluZyI6eyIkaWQiOiIxNDEiLCJUb3AiOjAsIkxlZnQiOjAsIlJpZ2h0IjowLCJCb3R0b20iOjB9LCJCYWNrZ3JvdW5kIjpudWxsLCJJc1Zpc2libGUiOmZhbHNlLCJXaWR0aCI6MC4wLCJIZWlnaHQiOjAuMCwiQm9yZGVyU3R5bGUiOm51bGwsIlBhcmVudFN0eWxlIjpudWxsfSwiUmVjdGFuZ2xlU3R5bGUiOnsiJGlkIjoiMTQyIiwiTWFyZ2luIjp7IiRpZCI6IjE0MyIsIlRvcCI6MCwiTGVmdCI6MCwiUmlnaHQiOjAsIkJvdHRvbSI6MH0sIlBhZGRpbmciOnsiJGlkIjoiMTQ0IiwiVG9wIjowLCJMZWZ0IjowLCJSaWdodCI6MCwiQm90dG9tIjowfSwiQmFja2dyb3VuZCI6eyIkaWQiOiIxNDUiLCJDb2xvciI6eyIkaWQiOiIxNDYiLCJBIjoxMjcsIlIiOjkxLCJHIjoxNTUsIkIiOjIxM319LCJJc1Zpc2libGUiOmZhbHNlLCJXaWR0aCI6MC4wLCJIZWlnaHQiOjAuMCwiQm9yZGVyU3R5bGUiOnsiJGlkIjoiMTQ3IiwiTGluZUNvbG9yIjp7IiRpZCI6IjE0OCIsIiR0eXBlIjoiTkxSRS5Db21tb24uRG9tLlNvbGlkQ29sb3JCcnVzaCwgTkxSRS5Db21tb24iLCJDb2xvciI6eyIkaWQiOiIxNDkiLCJBIjoyNTUsIlIiOjI1NSwiRyI6MCwiQiI6MH19LCJMaW5lV2VpZ2h0IjowLjAsIkxpbmVUeXBlIjowLCJQYXJlbnRTdHlsZSI6bnVsbH0sIlBhcmVudFN0eWxlIjpudWxsfSwiTWFyZ2luIjp7IiRpZCI6IjE1MCIsIlRvcCI6MCwiTGVmdCI6MCwiUmlnaHQiOjAsIkJvdHRvbSI6MH0sIlBhZGRpbmciOnsiJGlkIjoiMTUxIiwiVG9wIjowLCJMZWZ0IjowLCJSaWdodCI6MCwiQm90dG9tIjowfSwiQmFja2dyb3VuZCI6bnVsbCwiSXNWaXNpYmxlIjp0cnVlLCJXaWR0aCI6MC4wLCJIZWlnaHQiOjAuMCwiQm9yZGVyU3R5bGUiOm51bGwsIlBhcmVudFN0eWxlIjpudWxsfSwiQmFja2dyb3VuZFN0eWxlIjp7IiRpZCI6IjE1MiIsIk1hcmdpbiI6eyIkaWQiOiIxNTMiLCJUb3AiOjAsIkxlZnQiOjAsIlJpZ2h0IjowLCJCb3R0b20iOjB9LCJQYWRkaW5nIjp7IiRpZCI6IjE1NCIsIlRvcCI6MCwiTGVmdCI6MCwiUmlnaHQiOjAsIkJvdHRvbSI6MH0sIkJhY2tncm91bmQiOnsiJGlkIjoiMTU1IiwiQ29sb3IiOnsiJGlkIjoiMTU2IiwiQSI6MzgsIlIiOjkxLCJHIjoxNTUsIkIiOjIxM319LCJJc1Zpc2libGUiOnRydWUsIldpZHRoIjowLjAsIkhlaWdodCI6MC4wLCJCb3JkZXJTdHlsZSI6eyIkaWQiOiIxNTciLCJMaW5lQ29sb3IiOnsiJGlkIjoiMTU4IiwiJHR5cGUiOiJOTFJFLkNvbW1vbi5Eb20uU29saWRDb2xvckJydXNoLCBOTFJFLkNvbW1vbiIsIkNvbG9yIjp7IiRpZCI6IjE1OSIsIkEiOjI1NSwiUiI6MjU1LCJHIjowLCJCIjowfX0sIkxpbmVXZWlnaHQiOjAuMCwiTGluZVR5cGUiOjAsIlBhcmVudFN0eWxlIjpudWxsfSwiUGFyZW50U3R5bGUiOm51bGx9LCJJc0Fib3ZlVGltZWJhbmQiOmZhbHNlLCJNYXJnaW4iOnsiJGlkIjoiMTYwIiwiVG9wIjowLCJMZWZ0IjowLCJSaWdodCI6MCwiQm90dG9tIjowfSwiUGFkZGluZyI6eyIkaWQiOiIxNjEiLCJUb3AiOjAsIkxlZnQiOjAsIlJpZ2h0IjowLCJCb3R0b20iOjB9LCJJc1Zpc2libGUiOnRydWUsIldpZHRoIjowLjAsIkhlaWdodCI6MC4wLCJCb3JkZXJTdHlsZSI6bnVsbCwiUGFyZW50U3R5bGUiOm51bGx9fSwiU2NhbGUiOnsiJGlkIjoiMTYyIiwiU3RhcnREYXRlIjoiMDAwMS0wMS0wMVQwMDowMDowMCIsIkVuZERhdGUiOiIyMDIwLTAzLTIwVDIzOjU5OjAwIiwiRm9ybWF0IjoiTU1NIiwiVHlwZSI6MiwiQXV0b0RhdGVSYW5nZSI6dHJ1ZSwiV29ya2luZ0RheXMiOjMxLCJUb2RheU1hcmtlclRleHQiOiJUb2RheSIsIkF1dG9TY2FsZVR5cGUiOnRydWV9LCJNaWxlc3RvbmVzIjpbXSwiVGFza3MiOlt7IiRpZCI6IjE2MyIsIkdyb3VwTmFtZSI6bnVsbCwiU3RhcnREYXRlIjoiMjAxOS0xMS0xMVQwMDowMDowMCIsIkVuZERhdGUiOiIyMDE5LTExLTIyVDIzOjU5OjAwIiwiUGVyY2VudGFnZUNvbXBsZXRlIjoxMDAuMCwiU3R5bGUiOnsiJGlkIjoiMTY0IiwiU2hhcGUiOjAsIlNoYXBlVGhpY2tuZXNzIjoyLCJEdXJhdGlvbkZvcm1hdCI6MCwiSW5jbHVkZU5vbldvcmtpbmdEYXlzSW5EdXJhdGlvbiI6ZmFsc2UsIlBlcmNlbnRhZ2VDb21wbGV0ZVN0eWxlIjp7IiRpZCI6IjE2NSIsIkZvbnRTZXR0aW5ncyI6eyIkaWQiOiIxNjYiLCJGb250U2l6ZSI6MTAsIkZvbnROYW1lIjoiQ2FsaWJyaSIsIklzQm9sZCI6ZmFsc2UsIklzSXRhbGljIjpmYWxzZSwiSXNVbmRlcmxpbmVkIjpmYWxzZSwiUGFyZW50U3R5bGUiOm51bGx9LCJBdXRvU2l6ZSI6MCwiRm9yZWdyb3VuZCI6eyIkcmVmIjoiODUifSwiTWF4V2lkdGgiOjIwMC4wLCJNYXhIZWlnaHQiOiJJbmZpbml0eSIsIlNtYXJ0Rm9yZWdyb3VuZElzQWN0aXZlIjpmYWxzZSwiSG9yaXpvbnRhbEFsaWdubWVudCI6MCwiVmVydGljYWxBbGlnbm1lbnQiOjAsIlNtYXJ0Rm9yZWdyb3VuZCI6bnVsbCwiQmFja2dyb3VuZEZpbGxUeXBlIjowLCJNYXJnaW4iOnsiJGlkIjoiMTY3IiwiVG9wIjowLCJMZWZ0IjowLCJSaWdodCI6MCwiQm90dG9tIjowfSwiUGFkZGluZyI6eyIkaWQiOiIxNjgiLCJUb3AiOjAsIkxlZnQiOjAsIlJpZ2h0IjowLCJCb3R0b20iOjB9LCJCYWNrZ3JvdW5kIjp7IiRyZWYiOiI4OSJ9LCJJc1Zpc2libGUiOnRydWUsIldpZHRoIjowLjAsIkhlaWdodCI6MC4wLCJCb3JkZXJTdHlsZSI6eyIkaWQiOiIxNjkiLCJMaW5lQ29sb3IiOm51bGwsIkxpbmVXZWlnaHQiOjAuMCwiTGluZVR5cGUiOjAsIlBhcmVudFN0eWxlIjpudWxsfSwiUGFyZW50U3R5bGUiOm51bGx9LCJEdXJhdGlvblN0eWxlIjp7IiRpZCI6IjE3MCIsIkZvbnRTZXR0aW5ncyI6eyIkaWQiOiIxNzEiLCJGb250U2l6ZSI6MTAsIkZvbnROYW1lIjoiQ2FsaWJyaSIsIklzQm9sZCI6ZmFsc2UsIklzSXRhbGljIjpmYWxzZSwiSXNVbmRlcmxpbmVkIjpmYWxzZSwiUGFyZW50U3R5bGUiOm51bGx9LCJBdXRvU2l6ZSI6MCwiRm9yZWdyb3VuZCI6eyIkaWQiOiIxNzIiLCJDb2xvciI6eyIkcmVmIjoiOTMifX0sIk1heFdpZHRoIjoyMDAuMCwiTWF4SGVpZ2h0IjoiSW5maW5pdHkiLCJTbWFydEZvcmVncm91bmRJc0FjdGl2ZSI6ZmFsc2UsIkhvcml6b250YWxBbGlnbm1lbnQiOjAsIlZlcnRpY2FsQWxpZ25tZW50IjowLCJTbWFydEZvcmVncm91bmQiOm51bGwsIkJhY2tncm91bmRGaWxsVHlwZSI6MCwiTWFyZ2luIjp7IiRpZCI6IjE3MyIsIlRvcCI6MCwiTGVmdCI6MCwiUmlnaHQiOjAsIkJvdHRvbSI6MH0sIlBhZGRpbmciOnsiJGlkIjoiMTc0IiwiVG9wIjowLCJMZWZ0IjowLCJSaWdodCI6MCwiQm90dG9tIjowfSwiQmFja2dyb3VuZCI6eyIkcmVmIjoiOTYifSwiSXNWaXNpYmxlIjp0cnVlLCJXaWR0aCI6MC4wLCJIZWlnaHQiOjAuMCwiQm9yZGVyU3R5bGUiOnsiJGlkIjoiMTc1IiwiTGluZUNvbG9yIjpudWxsLCJMaW5lV2VpZ2h0IjowLjAsIkxpbmVUeXBlIjowLCJQYXJlbnRTdHlsZSI6bnVsbH0sIlBhcmVudFN0eWxlIjpudWxsfSwiSG9yaXpvbnRhbENvbm5lY3RvclN0eWxlIjp7IiRpZCI6IjE3NiIsIkxpbmVDb2xvciI6eyIkcmVmIjoiOTgifSwiTGluZVdlaWdodCI6MS4wLCJMaW5lVHlwZSI6MCwiUGFyZW50U3R5bGUiOm51bGx9LCJWZXJ0aWNhbENvbm5lY3RvclN0eWxlIjp7IiRpZCI6IjE3NyIsIkxpbmVDb2xvciI6eyIkcmVmIjoiMTAxIn0sIkxpbmVXZWlnaHQiOjEuMCwiTGluZVR5cGUiOjAsIlBhcmVudFN0eWxlIjpudWxsfSwiTWFyZ2luIjpudWxsLCJTdGFydERhdGVQb3NpdGlvbiI6NCwiRW5kRGF0ZVBvc2l0aW9uIjo0LCJEYXRlSXNWaXNpYmxlIjp0cnVlLCJUaXRsZVBvc2l0aW9uIjozLCJEdXJhdGlvblBvc2l0aW9uIjo2LCJQZXJjZW50YWdlQ29tcGxldGVkUG9zaXRpb24iOjIsIlNwYWNpbmciOjUsIklzQmVsb3dUaW1lYmFuZCI6ZmFsc2UsIlBlcmNlbnRhZ2VDb21wbGV0ZVNoYXBlT3BhY2l0eSI6MzUsIlNoYXBlU3R5bGUiOnsiJGlkIjoiMTc4IiwiTWFyZ2luIjp7IiRpZCI6IjE3OSIsIlRvcCI6MCwiTGVmdCI6NCwiUmlnaHQiOjQsIkJvdHRvbSI6MH0sIlBhZGRpbmciOnsiJGlkIjoiMTgwIiwiVG9wIjowLCJMZWZ0IjowLCJSaWdodCI6MCwiQm90dG9tIjowfSwiQmFja2dyb3VuZCI6eyIkaWQiOiIxODEiLCJDb2xvciI6eyIkaWQiOiIxODIiLCJBIjoyNTUsIlIiOjIzNywiRyI6MTI1LCJCIjo0OX19LCJJc1Zpc2libGUiOnRydWUsIldpZHRoIjowLjAsIkhlaWdodCI6MjIuMCwiQm9yZGVyU3R5bGUiOnsiJGlkIjoiMTgzIiwiTGluZUNvbG9yIjp7IiRyZWYiOiIxMDkifSwiTGluZVdlaWdodCI6MC4wLCJMaW5lVHlwZSI6MCwiUGFyZW50U3R5bGUiOm51bGx9LCJQYXJlbnRTdHlsZSI6bnVsbH0sIlRpdGxlU3R5bGUiOnsiJGlkIjoiMTg0IiwiRm9udFNldHRpbmdzIjp7IiRpZCI6IjE4NSIsIkZvbnRTaXplIjoxMSwiRm9udE5hbWUiOiJDYWxpYnJpIiwiSXNCb2xkIjp0cnVlLCJJc0l0YWxpYyI6ZmFsc2UsIklzVW5kZXJsaW5lZCI6ZmFsc2UsIlBhcmVudFN0eWxlIjpudWxsfSwiQXV0b1NpemUiOjAsIkZvcmVncm91bmQiOnsiJGlkIjoiMTg2IiwiQ29sb3IiOnsiJHJlZiI6IjExNCJ9fSwiTWF4V2lkdGgiOjcyMC4wLCJNYXhIZWlnaHQiOiJJbmZpbml0eSIsIlNtYXJ0Rm9yZWdyb3VuZElzQWN0aXZlIjpmYWxzZSwiSG9yaXpvbnRhbEFsaWdubWVudCI6MiwiVmVydGljYWxBbGlnbm1lbnQiOjAsIlNtYXJ0Rm9yZWdyb3VuZCI6bnVsbCwiQmFja2dyb3VuZEZpbGxUeXBlIjowLCJNYXJnaW4iOnsiJGlkIjoiMTg3IiwiVG9wIjowLCJMZWZ0IjowLCJSaWdodCI6MCwiQm90dG9tIjowfSwiUGFkZGluZyI6eyIkaWQiOiIxODgiLCJUb3AiOjAsIkxlZnQiOjAsIlJpZ2h0IjowLCJCb3R0b20iOjB9LCJCYWNrZ3JvdW5kIjp7IiRyZWYiOiIxMTcifSwiSXNWaXNpYmxlIjp0cnVlLCJXaWR0aCI6MC4wLCJIZWlnaHQiOjAuMCwiQm9yZGVyU3R5bGUiOnsiJGlkIjoiMTg5IiwiTGluZUNvbG9yIjpudWxsLCJMaW5lV2VpZ2h0IjowLjAsIkxpbmVUeXBlIjowLCJQYXJlbnRTdHlsZSI6bnVsbH0sIlBhcmVudFN0eWxlIjpudWxsfSwiRGF0ZVN0eWxlIjp7IiRpZCI6IjE5MCIsIkZvbnRTZXR0aW5ncyI6eyIkaWQiOiIxOTEiLCJGb250U2l6ZSI6MTAsIkZvbnROYW1lIjoiQ2FsaWJyaSIsIklzQm9sZCI6ZmFsc2UsIklzSXRhbGljIjpmYWxzZSwiSXNVbmRlcmxpbmVkIjpmYWxzZSwiUGFyZW50U3R5bGUiOm51bGx9LCJBdXRvU2l6ZSI6MCwiRm9yZWdyb3VuZCI6eyIkaWQiOiIxOTIiLCJDb2xvciI6eyIkcmVmIjoiMTIxIn19LCJNYXhXaWR0aCI6MjAwLjAsIk1heEhlaWdodCI6IkluZmluaXR5IiwiU21hcnRGb3JlZ3JvdW5kSXNBY3RpdmUiOmZhbHNlLCJIb3Jpem9udGFsQWxpZ25tZW50IjowLCJWZXJ0aWNhbEFsaWdubWVudCI6MCwiU21hcnRGb3JlZ3JvdW5kIjpudWxsLCJCYWNrZ3JvdW5kRmlsbFR5cGUiOjAsIk1hcmdpbiI6eyIkaWQiOiIxOTMiLCJUb3AiOjAsIkxlZnQiOjAsIlJpZ2h0IjowLCJCb3R0b20iOjB9LCJQYWRkaW5nIjp7IiRpZCI6IjE5NCIsIlRvcCI6MCwiTGVmdCI6MCwiUmlnaHQiOjAsIkJvdHRvbSI6MH0sIkJhY2tncm91bmQiOnsiJHJlZiI6IjEyNCJ9LCJJc1Zpc2libGUiOnRydWUsIldpZHRoIjowLjAsIkhlaWdodCI6MC4wLCJCb3JkZXJTdHlsZSI6eyIkaWQiOiIxOTUiLCJMaW5lQ29sb3IiOm51bGwsIkxpbmVXZWlnaHQiOjAuMCwiTGluZVR5cGUiOjAsIlBhcmVudFN0eWxlIjpudWxsfSwiUGFyZW50U3R5bGUiOm51bGx9LCJEYXRlRm9ybWF0Ijp7IiRpZCI6IjE5NiIsIkZvcm1hdFN0cmluZyI6Ik1NTSBkIiwiU2VwYXJhdG9yIjoiLyIsIlVzZUludGVybmF0aW9uYWxEYXRlRm9ybWF0IjpmYWxzZSwiRGF0ZUlzVmlzaWJsZSI6dHJ1ZSwiVGltZUlzVmlzaWJsZSI6ZmFsc2UsIkhvdXJEaWdpdHMiOjEsIkFtUG1EZXNpZ25hdG9yIjoyLCJUcmltMDBNaW51dGVzIjpmYWxzZSwiTGFzdEtub3duVmlzaWJpbGl0eVN0YXRlIjpudWxsfSwiSXNWaXNpYmxlIjp0cnVlLCJQYXJlbnRTdHlsZSI6bnVsbH0sIkluZGV4IjowLCJTbWFydER1cmF0aW9uQWN0aXZhdGVkIjpmYWxzZSwiRGF0ZUZvcm1hdCI6eyIkcmVmIjoiMTk2In0sIklkIjoiY2UwMTkzMzctZjIzOS00YzNjLTk1NmUtOTU0MzFmNGQxMTdkIiwiSW1wb3J0SWQiOm51bGwsIlRpdGxlIjoiQ29tcHJlbmRyZSBsJ291dGlsIFJPbnRvVG9vbHMiLCJOb3RlIjpudWxsLCJIeXBlcmxpbmsiOnsiJGlkIjoiMTk3IiwiQWRkcmVzcyI6IiIsIlN1YkFkZHJlc3MiOiIifSwiSXNDaGFuZ2VkIjpmYWxzZSwiSXNOZXciOmZhbHNlfSx7IiRpZCI6IjE5OCIsIkdyb3VwTmFtZSI6bnVsbCwiU3RhcnREYXRlIjoiMjAxOS0xMS0xMVQwMDowMDowMCIsIkVuZERhdGUiOiIyMDE5LTEyLTIwVDIzOjU5OjAwIiwiUGVyY2VudGFnZUNvbXBsZXRlIjoyMC4wLCJTdHlsZSI6eyIkaWQiOiIxOTkiLCJTaGFwZSI6MCwiU2hhcGVUaGlja25lc3MiOjIsIkR1cmF0aW9uRm9ybWF0IjowLCJJbmNsdWRlTm9uV29ya2luZ0RheXNJbkR1cmF0aW9uIjpmYWxzZSwiUGVyY2VudGFnZUNvbXBsZXRlU3R5bGUiOnsiJGlkIjoiMjAwIiwiRm9udFNldHRpbmdzIjp7IiRpZCI6IjIwMSIsIkZvbnRTaXplIjoxMCwiRm9udE5hbWUiOiJDYWxpYnJpIiwiSXNCb2xkIjpmYWxzZSwiSXNJdGFsaWMiOmZhbHNlLCJJc1VuZGVybGluZWQiOmZhbHNlLCJQYXJlbnRTdHlsZSI6bnVsbH0sIkF1dG9TaXplIjowLCJGb3JlZ3JvdW5kIjp7IiRyZWYiOiI4NSJ9LCJNYXhXaWR0aCI6MjAwLjAsIk1heEhlaWdodCI6IkluZmluaXR5IiwiU21hcnRGb3JlZ3JvdW5kSXNBY3RpdmUiOmZhbHNlLCJIb3Jpem9udGFsQWxpZ25tZW50IjowLCJWZXJ0aWNhbEFsaWdubWVudCI6MCwiU21hcnRGb3JlZ3JvdW5kIjpudWxsLCJCYWNrZ3JvdW5kRmlsbFR5cGUiOjAsIk1hcmdpbiI6eyIkaWQiOiIyMDIiLCJUb3AiOjAsIkxlZnQiOjAsIlJpZ2h0IjowLCJCb3R0b20iOjB9LCJQYWRkaW5nIjp7IiRpZCI6IjIwMyIsIlRvcCI6MCwiTGVmdCI6MCwiUmlnaHQiOjAsIkJvdHRvbSI6MH0sIkJhY2tncm91bmQiOnsiJHJlZiI6Ijg5In0sIklzVmlzaWJsZSI6dHJ1ZSwiV2lkdGgiOjAuMCwiSGVpZ2h0IjowLjAsIkJvcmRlclN0eWxlIjp7IiRpZCI6IjIwNCIsIkxpbmVDb2xvciI6bnVsbCwiTGluZVdlaWdodCI6MC4wLCJMaW5lVHlwZSI6MCwiUGFyZW50U3R5bGUiOm51bGx9LCJQYXJlbnRTdHlsZSI6bnVsbH0sIkR1cmF0aW9uU3R5bGUiOnsiJGlkIjoiMjA1IiwiRm9udFNldHRpbmdzIjp7IiRpZCI6IjIwNiIsIkZvbnRTaXplIjoxMCwiRm9udE5hbWUiOiJDYWxpYnJpIiwiSXNCb2xkIjpmYWxzZSwiSXNJdGFsaWMiOmZhbHNlLCJJc1VuZGVybGluZWQiOmZhbHNlLCJQYXJlbnRTdHlsZSI6bnVsbH0sIkF1dG9TaXplIjowLCJGb3JlZ3JvdW5kIjp7IiRpZCI6IjIwNyIsIkNvbG9yIjp7IiRyZWYiOiI5MyJ9fSwiTWF4V2lkdGgiOjIwMC4wLCJNYXhIZWlnaHQiOiJJbmZpbml0eSIsIlNtYXJ0Rm9yZWdyb3VuZElzQWN0aXZlIjpmYWxzZSwiSG9yaXpvbnRhbEFsaWdubWVudCI6MCwiVmVydGljYWxBbGlnbm1lbnQiOjAsIlNtYXJ0Rm9yZWdyb3VuZCI6bnVsbCwiQmFja2dyb3VuZEZpbGxUeXBlIjowLCJNYXJnaW4iOnsiJGlkIjoiMjA4IiwiVG9wIjowLCJMZWZ0IjowLCJSaWdodCI6MCwiQm90dG9tIjowfSwiUGFkZGluZyI6eyIkaWQiOiIyMDkiLCJUb3AiOjAsIkxlZnQiOjAsIlJpZ2h0IjowLCJCb3R0b20iOjB9LCJCYWNrZ3JvdW5kIjp7IiRyZWYiOiI5NiJ9LCJJc1Zpc2libGUiOnRydWUsIldpZHRoIjowLjAsIkhlaWdodCI6MC4wLCJCb3JkZXJTdHlsZSI6eyIkaWQiOiIyMTAiLCJMaW5lQ29sb3IiOm51bGwsIkxpbmVXZWlnaHQiOjAuMCwiTGluZVR5cGUiOjAsIlBhcmVudFN0eWxlIjpudWxsfSwiUGFyZW50U3R5bGUiOm51bGx9LCJIb3Jpem9udGFsQ29ubmVjdG9yU3R5bGUiOnsiJGlkIjoiMjExIiwiTGluZUNvbG9yIjp7IiRyZWYiOiI5OCJ9LCJMaW5lV2VpZ2h0IjoxLjAsIkxpbmVUeXBlIjowLCJQYXJlbnRTdHlsZSI6bnVsbH0sIlZlcnRpY2FsQ29ubmVjdG9yU3R5bGUiOnsiJGlkIjoiMjEyIiwiTGluZUNvbG9yIjp7IiRyZWYiOiIxMDEifSwiTGluZVdlaWdodCI6MS4wLCJMaW5lVHlwZSI6MCwiUGFyZW50U3R5bGUiOm51bGx9LCJNYXJnaW4iOm51bGwsIlN0YXJ0RGF0ZVBvc2l0aW9uIjo0LCJFbmREYXRlUG9zaXRpb24iOjQsIkRhdGVJc1Zpc2libGUiOnRydWUsIlRpdGxlUG9zaXRpb24iOjIsIkR1cmF0aW9uUG9zaXRpb24iOjYsIlBlcmNlbnRhZ2VDb21wbGV0ZWRQb3NpdGlvbiI6MiwiU3BhY2luZyI6NSwiSXNCZWxvd1RpbWViYW5kIjpmYWxzZSwiUGVyY2VudGFnZUNvbXBsZXRlU2hhcGVPcGFjaXR5IjozNSwiU2hhcGVTdHlsZSI6eyIkaWQiOiIyMTMiLCJNYXJnaW4iOnsiJGlkIjoiMjE0IiwiVG9wIjowLCJMZWZ0Ijo0LCJSaWdodCI6NCwiQm90dG9tIjowfSwiUGFkZGluZyI6eyIkaWQiOiIyMTUiLCJUb3AiOjAsIkxlZnQiOjAsIlJpZ2h0IjowLCJCb3R0b20iOjB9LCJCYWNrZ3JvdW5kIjp7IiRpZCI6IjIxNiIsIkNvbG9yIjp7IiRpZCI6IjIxNyIsIkEiOjI1NSwiUiI6OTEsIkciOjE1NSwiQiI6MjEzfX0sIklzVmlzaWJsZSI6dHJ1ZSwiV2lkdGgiOjAuMCwiSGVpZ2h0IjoyMi4wLCJCb3JkZXJTdHlsZSI6eyIkaWQiOiIyMTgiLCJMaW5lQ29sb3IiOnsiJHJlZiI6IjEwOSJ9LCJMaW5lV2VpZ2h0IjowLjAsIkxpbmVUeXBlIjowLCJQYXJlbnRTdHlsZSI6bnVsbH0sIlBhcmVudFN0eWxlIjpudWxsfSwiVGl0bGVTdHlsZSI6eyIkaWQiOiIyMTkiLCJGb250U2V0dGluZ3MiOnsiJGlkIjoiMjIwIiwiRm9udFNpemUiOjExLCJGb250TmFtZSI6IkNhbGlicmkiLCJJc0JvbGQiOnRydWUsIklzSXRhbGljIjpmYWxzZSwiSXNVbmRlcmxpbmVkIjpmYWxzZSwiUGFyZW50U3R5bGUiOm51bGx9LCJBdXRvU2l6ZSI6MCwiRm9yZWdyb3VuZCI6eyIkaWQiOiIyMjEiLCJDb2xvciI6eyIkcmVmIjoiMTE0In19LCJNYXhXaWR0aCI6NzIwLjAsIk1heEhlaWdodCI6IkluZmluaXR5IiwiU21hcnRGb3JlZ3JvdW5kSXNBY3RpdmUiOmZhbHNlLCJIb3Jpem9udGFsQWxpZ25tZW50IjoxLCJWZXJ0aWNhbEFsaWdubWVudCI6MCwiU21hcnRGb3JlZ3JvdW5kIjpudWxsLCJCYWNrZ3JvdW5kRmlsbFR5cGUiOjAsIk1hcmdpbiI6eyIkaWQiOiIyMjIiLCJUb3AiOjAsIkxlZnQiOjAsIlJpZ2h0IjowLCJCb3R0b20iOjB9LCJQYWRkaW5nIjp7IiRpZCI6IjIyMyIsIlRvcCI6MCwiTGVmdCI6MCwiUmlnaHQiOjAsIkJvdHRvbSI6MH0sIkJhY2tncm91bmQiOnsiJHJlZiI6IjExNyJ9LCJJc1Zpc2libGUiOnRydWUsIldpZHRoIjowLjAsIkhlaWdodCI6MC4wLCJCb3JkZXJTdHlsZSI6eyIkaWQiOiIyMjQiLCJMaW5lQ29sb3IiOm51bGwsIkxpbmVXZWlnaHQiOjAuMCwiTGluZVR5cGUiOjAsIlBhcmVudFN0eWxlIjpudWxsfSwiUGFyZW50U3R5bGUiOm51bGx9LCJEYXRlU3R5bGUiOnsiJGlkIjoiMjI1IiwiRm9udFNldHRpbmdzIjp7IiRpZCI6IjIyNiIsIkZvbnRTaXplIjoxMCwiRm9udE5hbWUiOiJDYWxpYnJpIiwiSXNCb2xkIjpmYWxzZSwiSXNJdGFsaWMiOmZhbHNlLCJJc1VuZGVybGluZWQiOmZhbHNlLCJQYXJlbnRTdHlsZSI6bnVsbH0sIkF1dG9TaXplIjowLCJGb3JlZ3JvdW5kIjp7IiRpZCI6IjIyNyIsIkNvbG9yIjp7IiRyZWYiOiIxMjEifX0sIk1heFdpZHRoIjoyMDAuMCwiTWF4SGVpZ2h0IjoiSW5maW5pdHkiLCJTbWFydEZvcmVncm91bmRJc0FjdGl2ZSI6ZmFsc2UsIkhvcml6b250YWxBbGlnbm1lbnQiOjAsIlZlcnRpY2FsQWxpZ25tZW50IjowLCJTbWFydEZvcmVncm91bmQiOm51bGwsIkJhY2tncm91bmRGaWxsVHlwZSI6MCwiTWFyZ2luIjp7IiRpZCI6IjIyOCIsIlRvcCI6MCwiTGVmdCI6MCwiUmlnaHQiOjAsIkJvdHRvbSI6MH0sIlBhZGRpbmciOnsiJGlkIjoiMjI5IiwiVG9wIjowLCJMZWZ0IjowLCJSaWdodCI6MCwiQm90dG9tIjowfSwiQmFja2dyb3VuZCI6eyIkcmVmIjoiMTI0In0sIklzVmlzaWJsZSI6dHJ1ZSwiV2lkdGgiOjAuMCwiSGVpZ2h0IjowLjAsIkJvcmRlclN0eWxlIjp7IiRpZCI6IjIzMCIsIkxpbmVDb2xvciI6bnVsbCwiTGluZVdlaWdodCI6MC4wLCJMaW5lVHlwZSI6MCwiUGFyZW50U3R5bGUiOm51bGx9LCJQYXJlbnRTdHlsZSI6bnVsbH0sIkRhdGVGb3JtYXQiOnsiJGlkIjoiMjMxIiwiRm9ybWF0U3RyaW5nIjoiTU1NIGQiLCJTZXBhcmF0b3IiOiIvIiwiVXNlSW50ZXJuYXRpb25hbERhdGVGb3JtYXQiOmZhbHNlLCJEYXRlSXNWaXNpYmxlIjp0cnVlLCJUaW1lSXNWaXNpYmxlIjpmYWxzZSwiSG91ckRpZ2l0cyI6MSwiQW1QbURlc2lnbmF0b3IiOjIsIlRyaW0wME1pbnV0ZXMiOmZhbHNlLCJMYXN0S25vd25WaXNpYmlsaXR5U3RhdGUiOm51bGx9LCJJc1Zpc2libGUiOnRydWUsIlBhcmVudFN0eWxlIjpudWxsfSwiSW5kZXgiOjEsIlNtYXJ0RHVyYXRpb25BY3RpdmF0ZWQiOmZhbHNlLCJEYXRlRm9ybWF0Ijp7IiRyZWYiOiIyMzEifSwiSWQiOiIxNjg0MmYzMi1lYmQzLTQxM2UtYTBiZS05YTEwYmUzZTdlZTkiLCJJbXBvcnRJZCI6bnVsbCwiVGl0bGUiOiJDcsOpZXIgbCdpbnRlcmZhY2Ugd2ViIiwiTm90ZSI6bnVsbCwiSHlwZXJsaW5rIjp7IiRpZCI6IjIzMiIsIkFkZHJlc3MiOiIiLCJTdWJBZGRyZXNzIjoiIn0sIklzQ2hhbmdlZCI6ZmFsc2UsIklzTmV3IjpmYWxzZX0seyIkaWQiOiIyMzMiLCJHcm91cE5hbWUiOm51bGwsIlN0YXJ0RGF0ZSI6IjIwMTktMTEtMTFUMDA6MDA6MDAiLCJFbmREYXRlIjoiMjAxOS0xMS0yMlQyMzo1OTowMCIsIlBlcmNlbnRhZ2VDb21wbGV0ZSI6MTAwLjAsIlN0eWxlIjp7IiRpZCI6IjIzNCIsIlNoYXBlIjowLCJTaGFwZVRoaWNrbmVzcyI6MiwiRHVyYXRpb25Gb3JtYXQiOjAsIkluY2x1ZGVOb25Xb3JraW5nRGF5c0luRHVyYXRpb24iOmZhbHNlLCJQZXJjZW50YWdlQ29tcGxldGVTdHlsZSI6eyIkaWQiOiIyMzUiLCJGb250U2V0dGluZ3MiOnsiJGlkIjoiMjM2IiwiRm9udFNpemUiOjEwLCJGb250TmFtZSI6IkNhbGlicmkiLCJJc0JvbGQiOmZhbHNlLCJJc0l0YWxpYyI6ZmFsc2UsIklzVW5kZXJsaW5lZCI6ZmFsc2UsIlBhcmVudFN0eWxlIjpudWxsfSwiQXV0b1NpemUiOjAsIkZvcmVncm91bmQiOnsiJHJlZiI6Ijg1In0sIk1heFdpZHRoIjoyMDAuMCwiTWF4SGVpZ2h0IjoiSW5maW5pdHkiLCJTbWFydEZvcmVncm91bmRJc0FjdGl2ZSI6ZmFsc2UsIkhvcml6b250YWxBbGlnbm1lbnQiOjAsIlZlcnRpY2FsQWxpZ25tZW50IjowLCJTbWFydEZvcmVncm91bmQiOm51bGwsIkJhY2tncm91bmRGaWxsVHlwZSI6MCwiTWFyZ2luIjp7IiRpZCI6IjIzNyIsIlRvcCI6MCwiTGVmdCI6MCwiUmlnaHQiOjAsIkJvdHRvbSI6MH0sIlBhZGRpbmciOnsiJGlkIjoiMjM4IiwiVG9wIjowLCJMZWZ0IjowLCJSaWdodCI6MCwiQm90dG9tIjowfSwiQmFja2dyb3VuZCI6eyIkcmVmIjoiODkifSwiSXNWaXNpYmxlIjp0cnVlLCJXaWR0aCI6MC4wLCJIZWlnaHQiOjAuMCwiQm9yZGVyU3R5bGUiOnsiJGlkIjoiMjM5IiwiTGluZUNvbG9yIjpudWxsLCJMaW5lV2VpZ2h0IjowLjAsIkxpbmVUeXBlIjowLCJQYXJlbnRTdHlsZSI6bnVsbH0sIlBhcmVudFN0eWxlIjpudWxsfSwiRHVyYXRpb25TdHlsZSI6eyIkaWQiOiIyNDAiLCJGb250U2V0dGluZ3MiOnsiJGlkIjoiMjQxIiwiRm9udFNpemUiOjEwLCJGb250TmFtZSI6IkNhbGlicmkiLCJJc0JvbGQiOmZhbHNlLCJJc0l0YWxpYyI6ZmFsc2UsIklzVW5kZXJsaW5lZCI6ZmFsc2UsIlBhcmVudFN0eWxlIjpudWxsfSwiQXV0b1NpemUiOjAsIkZvcmVncm91bmQiOnsiJGlkIjoiMjQyIiwiQ29sb3IiOnsiJHJlZiI6IjkzIn19LCJNYXhXaWR0aCI6MjAwLjAsIk1heEhlaWdodCI6IkluZmluaXR5IiwiU21hcnRGb3JlZ3JvdW5kSXNBY3RpdmUiOmZhbHNlLCJIb3Jpem9udGFsQWxpZ25tZW50IjowLCJWZXJ0aWNhbEFsaWdubWVudCI6MCwiU21hcnRGb3JlZ3JvdW5kIjpudWxsLCJCYWNrZ3JvdW5kRmlsbFR5cGUiOjAsIk1hcmdpbiI6eyIkaWQiOiIyNDMiLCJUb3AiOjAsIkxlZnQiOjAsIlJpZ2h0IjowLCJCb3R0b20iOjB9LCJQYWRkaW5nIjp7IiRpZCI6IjI0NCIsIlRvcCI6MCwiTGVmdCI6MCwiUmlnaHQiOjAsIkJvdHRvbSI6MH0sIkJhY2tncm91bmQiOnsiJHJlZiI6Ijk2In0sIklzVmlzaWJsZSI6dHJ1ZSwiV2lkdGgiOjAuMCwiSGVpZ2h0IjowLjAsIkJvcmRlclN0eWxlIjp7IiRpZCI6IjI0NSIsIkxpbmVDb2xvciI6bnVsbCwiTGluZVdlaWdodCI6MC4wLCJMaW5lVHlwZSI6MCwiUGFyZW50U3R5bGUiOm51bGx9LCJQYXJlbnRTdHlsZSI6bnVsbH0sIkhvcml6b250YWxDb25uZWN0b3JTdHlsZSI6eyIkaWQiOiIyNDYiLCJMaW5lQ29sb3IiOnsiJHJlZiI6Ijk4In0sIkxpbmVXZWlnaHQiOjEuMCwiTGluZVR5cGUiOjAsIlBhcmVudFN0eWxlIjpudWxsfSwiVmVydGljYWxDb25uZWN0b3JTdHlsZSI6eyIkaWQiOiIyNDciLCJMaW5lQ29sb3IiOnsiJHJlZiI6IjEwMSJ9LCJMaW5lV2VpZ2h0IjoxLjAsIkxpbmVUeXBlIjowLCJQYXJlbnRTdHlsZSI6bnVsbH0sIk1hcmdpbiI6bnVsbCwiU3RhcnREYXRlUG9zaXRpb24iOjQsIkVuZERhdGVQb3NpdGlvbiI6NCwiRGF0ZUlzVmlzaWJsZSI6dHJ1ZSwiVGl0bGVQb3NpdGlvbiI6MywiRHVyYXRpb25Qb3NpdGlvbiI6NiwiUGVyY2VudGFnZUNvbXBsZXRlZFBvc2l0aW9uIjoyLCJTcGFjaW5nIjo1LCJJc0JlbG93VGltZWJhbmQiOmZhbHNlLCJQZXJjZW50YWdlQ29tcGxldGVTaGFwZU9wYWNpdHkiOjM1LCJTaGFwZVN0eWxlIjp7IiRpZCI6IjI0OCIsIk1hcmdpbiI6eyIkaWQiOiIyNDkiLCJUb3AiOjAsIkxlZnQiOjQsIlJpZ2h0Ijo0LCJCb3R0b20iOjB9LCJQYWRkaW5nIjp7IiRpZCI6IjI1MCIsIlRvcCI6MCwiTGVmdCI6MCwiUmlnaHQiOjAsIkJvdHRvbSI6MH0sIkJhY2tncm91bmQiOnsiJGlkIjoiMjUxIiwiQ29sb3IiOnsiJGlkIjoiMjUyIiwiQSI6MjU1LCJSIjoyMzcsIkciOjEyNSwiQiI6NDl9fSwiSXNWaXNpYmxlIjp0cnVlLCJXaWR0aCI6MC4wLCJIZWlnaHQiOjIyLjAsIkJvcmRlclN0eWxlIjp7IiRpZCI6IjI1MyIsIkxpbmVDb2xvciI6eyIkcmVmIjoiMTA5In0sIkxpbmVXZWlnaHQiOjAuMCwiTGluZVR5cGUiOjAsIlBhcmVudFN0eWxlIjpudWxsfSwiUGFyZW50U3R5bGUiOm51bGx9LCJUaXRsZVN0eWxlIjp7IiRpZCI6IjI1NCIsIkZvbnRTZXR0aW5ncyI6eyIkaWQiOiIyNTUiLCJGb250U2l6ZSI6MTEsIkZvbnROYW1lIjoiQ2FsaWJyaSIsIklzQm9sZCI6dHJ1ZSwiSXNJdGFsaWMiOmZhbHNlLCJJc1VuZGVybGluZWQiOmZhbHNlLCJQYXJlbnRTdHlsZSI6bnVsbH0sIkF1dG9TaXplIjowLCJGb3JlZ3JvdW5kIjp7IiRpZCI6IjI1NiIsIkNvbG9yIjp7IiRyZWYiOiIxMTQifX0sIk1heFdpZHRoIjo3MjAuMCwiTWF4SGVpZ2h0IjoiSW5maW5pdHkiLCJTbWFydEZvcmVncm91bmRJc0FjdGl2ZSI6ZmFsc2UsIkhvcml6b250YWxBbGlnbm1lbnQiOjIsIlZlcnRpY2FsQWxpZ25tZW50IjowLCJTbWFydEZvcmVncm91bmQiOm51bGwsIkJhY2tncm91bmRGaWxsVHlwZSI6MCwiTWFyZ2luIjp7IiRpZCI6IjI1NyIsIlRvcCI6MCwiTGVmdCI6MCwiUmlnaHQiOjAsIkJvdHRvbSI6MH0sIlBhZGRpbmciOnsiJGlkIjoiMjU4IiwiVG9wIjowLCJMZWZ0IjowLCJSaWdodCI6MCwiQm90dG9tIjowfSwiQmFja2dyb3VuZCI6eyIkcmVmIjoiMTE3In0sIklzVmlzaWJsZSI6dHJ1ZSwiV2lkdGgiOjAuMCwiSGVpZ2h0IjowLjAsIkJvcmRlclN0eWxlIjp7IiRpZCI6IjI1OSIsIkxpbmVDb2xvciI6bnVsbCwiTGluZVdlaWdodCI6MC4wLCJMaW5lVHlwZSI6MCwiUGFyZW50U3R5bGUiOm51bGx9LCJQYXJlbnRTdHlsZSI6bnVsbH0sIkRhdGVTdHlsZSI6eyIkaWQiOiIyNjAiLCJGb250U2V0dGluZ3MiOnsiJGlkIjoiMjYxIiwiRm9udFNpemUiOjEwLCJGb250TmFtZSI6IkNhbGlicmkiLCJJc0JvbGQiOmZhbHNlLCJJc0l0YWxpYyI6ZmFsc2UsIklzVW5kZXJsaW5lZCI6ZmFsc2UsIlBhcmVudFN0eWxlIjpudWxsfSwiQXV0b1NpemUiOjAsIkZvcmVncm91bmQiOnsiJGlkIjoiMjYyIiwiQ29sb3IiOnsiJHJlZiI6IjEyMSJ9fSwiTWF4V2lkdGgiOjIwMC4wLCJNYXhIZWlnaHQiOiJJbmZpbml0eSIsIlNtYXJ0Rm9yZWdyb3VuZElzQWN0aXZlIjpmYWxzZSwiSG9yaXpvbnRhbEFsaWdubWVudCI6MCwiVmVydGljYWxBbGlnbm1lbnQiOjAsIlNtYXJ0Rm9yZWdyb3VuZCI6bnVsbCwiQmFja2dyb3VuZEZpbGxUeXBlIjowLCJNYXJnaW4iOnsiJGlkIjoiMjYzIiwiVG9wIjowLCJMZWZ0IjowLCJSaWdodCI6MCwiQm90dG9tIjowfSwiUGFkZGluZyI6eyIkaWQiOiIyNjQiLCJUb3AiOjAsIkxlZnQiOjAsIlJpZ2h0IjowLCJCb3R0b20iOjB9LCJCYWNrZ3JvdW5kIjp7IiRyZWYiOiIxMjQifSwiSXNWaXNpYmxlIjp0cnVlLCJXaWR0aCI6MC4wLCJIZWlnaHQiOjAuMCwiQm9yZGVyU3R5bGUiOnsiJGlkIjoiMjY1IiwiTGluZUNvbG9yIjpudWxsLCJMaW5lV2VpZ2h0IjowLjAsIkxpbmVUeXBlIjowLCJQYXJlbnRTdHlsZSI6bnVsbH0sIlBhcmVudFN0eWxlIjpudWxsfSwiRGF0ZUZvcm1hdCI6eyIkaWQiOiIyNjYiLCJGb3JtYXRTdHJpbmciOiJNTU0gZCIsIlNlcGFyYXRvciI6Ii8iLCJVc2VJbnRlcm5hdGlvbmFsRGF0ZUZvcm1hdCI6ZmFsc2UsIkRhdGVJc1Zpc2libGUiOnRydWUsIlRpbWVJc1Zpc2libGUiOmZhbHNlLCJIb3VyRGlnaXRzIjoxLCJBbVBtRGVzaWduYXRvciI6MiwiVHJpbTAwTWludXRlcyI6ZmFsc2UsIkxhc3RLbm93blZpc2liaWxpdHlTdGF0ZSI6bnVsbH0sIklzVmlzaWJsZSI6dHJ1ZSwiUGFyZW50U3R5bGUiOm51bGx9LCJJbmRleCI6MiwiU21hcnREdXJhdGlvbkFjdGl2YXRlZCI6ZmFsc2UsIkRhdGVGb3JtYXQiOnsiJHJlZiI6IjI2NiJ9LCJJZCI6IjQ2MzRlZmZkLTEwM2YtNDRiMC04NjI2LTVlOWQ1NjM1NjM0MCIsIkltcG9ydElkIjpudWxsLCJUaXRsZSI6IsOJY3JpcmUgbGVzIGRpZmbDqXJlbnRzIHNjcmlwdCBmb25jdGlvbm5lbHMgIiwiTm90ZSI6ImUxeHlkR1l4WEdGdWMybGNZVzV6YVdOd1p6RXlOVEpjZFdNeFhHaDBiV0YxZEhOd1hHUmxabVl5ZTF4bWIyNTBkR0pzZTF4bU1GeG1ZMmhoY25ObGREQWdWR2x0WlhNZ1RtVjNJRkp2YldGdU8zMTdYR1l5WEdaamFHRnljMlYwTUNCVFpXZHZaU0JWU1R0OWZYdGNZMjlzYjNKMFlteGNjbVZrTUZ4bmNtVmxiakJjWW14MVpUQTdYSEpsWkRJMU5WeG5jbVZsYmpJMU5WeGliSFZsTWpVMU8xeHlaV1ExTVZ4bmNtVmxialV4WEdKc2RXVTFNVHQ5WEd4dlkyaGNhR2xqYUZ4a1ltTm9YSEJoY21SY2NHeGhhVzVjYkhSeWNHRnlYR2wwWVhBd2UxeHNZVzVuTVRBek0xeG1jekU0WEdZeVhHTm1NaUJjWTJZeVhIRnNlMXhtTWlCN1hHeGhibWN4TURNMlhHeDBjbU5vSURJZ2MyVnRZV2x1WlhOOVhHeHBNRnh5YVRCY2MyRXdYSE5pTUZ4bWFUQmNjV3hjY0dGeWZRMEtmUTBLZlE9PSIsIkh5cGVybGluayI6eyIkaWQiOiIyNjciLCJBZGRyZXNzIjoiIiwiU3ViQWRkcmVzcyI6IiJ9LCJJc0NoYW5nZWQiOmZhbHNlLCJJc05ldyI6ZmFsc2V9LHsiJGlkIjoiMjY4IiwiR3JvdXBOYW1lIjpudWxsLCJTdGFydERhdGUiOiIyMDE5LTEyLTA5VDAwOjAwOjAwWiIsIkVuZERhdGUiOiIyMDE5LTEyLTIwVDIzOjU5OjAwIiwiUGVyY2VudGFnZUNvbXBsZXRlIjpudWxsLCJTdHlsZSI6eyIkaWQiOiIyNjkiLCJTaGFwZSI6MCwiU2hhcGVUaGlja25lc3MiOjIsIkR1cmF0aW9uRm9ybWF0IjowLCJJbmNsdWRlTm9uV29ya2luZ0RheXNJbkR1cmF0aW9uIjpmYWxzZSwiUGVyY2VudGFnZUNvbXBsZXRlU3R5bGUiOnsiJGlkIjoiMjcwIiwiRm9udFNldHRpbmdzIjp7IiRpZCI6IjI3MSIsIkZvbnRTaXplIjoxMCwiRm9udE5hbWUiOiJDYWxpYnJpIiwiSXNCb2xkIjpmYWxzZSwiSXNJdGFsaWMiOmZhbHNlLCJJc1VuZGVybGluZWQiOmZhbHNlLCJQYXJlbnRTdHlsZSI6bnVsbH0sIkF1dG9TaXplIjowLCJGb3JlZ3JvdW5kIjp7IiRyZWYiOiI4NSJ9LCJNYXhXaWR0aCI6MjAwLjAsIk1heEhlaWdodCI6IkluZmluaXR5IiwiU21hcnRGb3JlZ3JvdW5kSXNBY3RpdmUiOmZhbHNlLCJIb3Jpem9udGFsQWxpZ25tZW50IjowLCJWZXJ0aWNhbEFsaWdubWVudCI6MCwiU21hcnRGb3JlZ3JvdW5kIjpudWxsLCJCYWNrZ3JvdW5kRmlsbFR5cGUiOjAsIk1hcmdpbiI6eyIkaWQiOiIyNzIiLCJUb3AiOjAsIkxlZnQiOjAsIlJpZ2h0IjowLCJCb3R0b20iOjB9LCJQYWRkaW5nIjp7IiRpZCI6IjI3MyIsIlRvcCI6MCwiTGVmdCI6MCwiUmlnaHQiOjAsIkJvdHRvbSI6MH0sIkJhY2tncm91bmQiOnsiJHJlZiI6Ijg5In0sIklzVmlzaWJsZSI6dHJ1ZSwiV2lkdGgiOjAuMCwiSGVpZ2h0IjowLjAsIkJvcmRlclN0eWxlIjp7IiRpZCI6IjI3NCIsIkxpbmVDb2xvciI6bnVsbCwiTGluZVdlaWdodCI6MC4wLCJMaW5lVHlwZSI6MCwiUGFyZW50U3R5bGUiOm51bGx9LCJQYXJlbnRTdHlsZSI6bnVsbH0sIkR1cmF0aW9uU3R5bGUiOnsiJGlkIjoiMjc1IiwiRm9udFNldHRpbmdzIjp7IiRpZCI6IjI3NiIsIkZvbnRTaXplIjoxMCwiRm9udE5hbWUiOiJDYWxpYnJpIiwiSXNCb2xkIjpmYWxzZSwiSXNJdGFsaWMiOmZhbHNlLCJJc1VuZGVybGluZWQiOmZhbHNlLCJQYXJlbnRTdHlsZSI6bnVsbH0sIkF1dG9TaXplIjowLCJGb3JlZ3JvdW5kIjp7IiRpZCI6IjI3NyIsIkNvbG9yIjp7IiRyZWYiOiI5MyJ9fSwiTWF4V2lkdGgiOjIwMC4wLCJNYXhIZWlnaHQiOiJJbmZpbml0eSIsIlNtYXJ0Rm9yZWdyb3VuZElzQWN0aXZlIjpmYWxzZSwiSG9yaXpvbnRhbEFsaWdubWVudCI6MCwiVmVydGljYWxBbGlnbm1lbnQiOjAsIlNtYXJ0Rm9yZWdyb3VuZCI6bnVsbCwiQmFja2dyb3VuZEZpbGxUeXBlIjowLCJNYXJnaW4iOnsiJGlkIjoiMjc4IiwiVG9wIjowLCJMZWZ0IjowLCJSaWdodCI6MCwiQm90dG9tIjowfSwiUGFkZGluZyI6eyIkaWQiOiIyNzkiLCJUb3AiOjAsIkxlZnQiOjAsIlJpZ2h0IjowLCJCb3R0b20iOjB9LCJCYWNrZ3JvdW5kIjp7IiRyZWYiOiI5NiJ9LCJJc1Zpc2libGUiOnRydWUsIldpZHRoIjowLjAsIkhlaWdodCI6MC4wLCJCb3JkZXJTdHlsZSI6eyIkaWQiOiIyODAiLCJMaW5lQ29sb3IiOm51bGwsIkxpbmVXZWlnaHQiOjAuMCwiTGluZVR5cGUiOjAsIlBhcmVudFN0eWxlIjpudWxsfSwiUGFyZW50U3R5bGUiOm51bGx9LCJIb3Jpem9udGFsQ29ubmVjdG9yU3R5bGUiOnsiJGlkIjoiMjgxIiwiTGluZUNvbG9yIjp7IiRyZWYiOiI5OCJ9LCJMaW5lV2VpZ2h0IjoxLjAsIkxpbmVUeXBlIjowLCJQYXJlbnRTdHlsZSI6bnVsbH0sIlZlcnRpY2FsQ29ubmVjdG9yU3R5bGUiOnsiJGlkIjoiMjgyIiwiTGluZUNvbG9yIjp7IiRyZWYiOiIxMDEifSwiTGluZVdlaWdodCI6MS4wLCJMaW5lVHlwZSI6MCwiUGFyZW50U3R5bGUiOm51bGx9LCJNYXJnaW4iOm51bGwsIlN0YXJ0RGF0ZVBvc2l0aW9uIjo0LCJFbmREYXRlUG9zaXRpb24iOjQsIkRhdGVJc1Zpc2libGUiOnRydWUsIlRpdGxlUG9zaXRpb24iOjMsIkR1cmF0aW9uUG9zaXRpb24iOjYsIlBlcmNlbnRhZ2VDb21wbGV0ZWRQb3NpdGlvbiI6NiwiU3BhY2luZyI6NSwiSXNCZWxvd1RpbWViYW5kIjpmYWxzZSwiUGVyY2VudGFnZUNvbXBsZXRlU2hhcGVPcGFjaXR5IjozNSwiU2hhcGVTdHlsZSI6eyIkaWQiOiIyODMiLCJNYXJnaW4iOnsiJGlkIjoiMjg0IiwiVG9wIjowLCJMZWZ0Ijo0LCJSaWdodCI6NCwiQm90dG9tIjowfSwiUGFkZGluZyI6eyIkaWQiOiIyODUiLCJUb3AiOjAsIkxlZnQiOjAsIlJpZ2h0IjowLCJCb3R0b20iOjB9LCJCYWNrZ3JvdW5kIjp7IiRpZCI6IjI4NiIsIkNvbG9yIjp7IiRpZCI6IjI4NyIsIkEiOjI1NSwiUiI6MjM3LCJHIjoxMjUsIkIiOjQ5fX0sIklzVmlzaWJsZSI6dHJ1ZSwiV2lkdGgiOjAuMCwiSGVpZ2h0IjoyMi4wLCJCb3JkZXJTdHlsZSI6eyIkaWQiOiIyODgiLCJMaW5lQ29sb3IiOnsiJHJlZiI6IjEwOSJ9LCJMaW5lV2VpZ2h0IjowLjAsIkxpbmVUeXBlIjowLCJQYXJlbnRTdHlsZSI6bnVsbH0sIlBhcmVudFN0eWxlIjpudWxsfSwiVGl0bGVTdHlsZSI6eyIkaWQiOiIyODkiLCJGb250U2V0dGluZ3MiOnsiJGlkIjoiMjkwIiwiRm9udFNpemUiOjExLCJGb250TmFtZSI6IkNhbGlicmkiLCJJc0JvbGQiOnRydWUsIklzSXRhbGljIjpmYWxzZSwiSXNVbmRlcmxpbmVkIjpmYWxzZSwiUGFyZW50U3R5bGUiOm51bGx9LCJBdXRvU2l6ZSI6MCwiRm9yZWdyb3VuZCI6eyIkaWQiOiIyOTEiLCJDb2xvciI6eyIkcmVmIjoiMTE0In19LCJNYXhXaWR0aCI6NzIwLjAsIk1heEhlaWdodCI6IkluZmluaXR5IiwiU21hcnRGb3JlZ3JvdW5kSXNBY3RpdmUiOmZhbHNlLCJIb3Jpem9udGFsQWxpZ25tZW50IjoyLCJWZXJ0aWNhbEFsaWdubWVudCI6MCwiU21hcnRGb3JlZ3JvdW5kIjpudWxsLCJCYWNrZ3JvdW5kRmlsbFR5cGUiOjAsIk1hcmdpbiI6eyIkaWQiOiIyOTIiLCJUb3AiOjAsIkxlZnQiOjAsIlJpZ2h0IjowLCJCb3R0b20iOjB9LCJQYWRkaW5nIjp7IiRpZCI6IjI5MyIsIlRvcCI6MCwiTGVmdCI6MCwiUmlnaHQiOjAsIkJvdHRvbSI6MH0sIkJhY2tncm91bmQiOnsiJHJlZiI6IjExNyJ9LCJJc1Zpc2libGUiOnRydWUsIldpZHRoIjowLjAsIkhlaWdodCI6MC4wLCJCb3JkZXJTdHlsZSI6eyIkaWQiOiIyOTQiLCJMaW5lQ29sb3IiOm51bGwsIkxpbmVXZWlnaHQiOjAuMCwiTGluZVR5cGUiOjAsIlBhcmVudFN0eWxlIjpudWxsfSwiUGFyZW50U3R5bGUiOm51bGx9LCJEYXRlU3R5bGUiOnsiJGlkIjoiMjk1IiwiRm9udFNldHRpbmdzIjp7IiRpZCI6IjI5NiIsIkZvbnRTaXplIjoxMCwiRm9udE5hbWUiOiJDYWxpYnJpIiwiSXNCb2xkIjpmYWxzZSwiSXNJdGFsaWMiOmZhbHNlLCJJc1VuZGVybGluZWQiOmZhbHNlLCJQYXJlbnRTdHlsZSI6bnVsbH0sIkF1dG9TaXplIjowLCJGb3JlZ3JvdW5kIjp7IiRpZCI6IjI5NyIsIkNvbG9yIjp7IiRyZWYiOiIxMjEifX0sIk1heFdpZHRoIjoyMDAuMCwiTWF4SGVpZ2h0IjoiSW5maW5pdHkiLCJTbWFydEZvcmVncm91bmRJc0FjdGl2ZSI6ZmFsc2UsIkhvcml6b250YWxBbGlnbm1lbnQiOjAsIlZlcnRpY2FsQWxpZ25tZW50IjowLCJTbWFydEZvcmVncm91bmQiOm51bGwsIkJhY2tncm91bmRGaWxsVHlwZSI6MCwiTWFyZ2luIjp7IiRpZCI6IjI5OCIsIlRvcCI6MCwiTGVmdCI6MCwiUmlnaHQiOjAsIkJvdHRvbSI6MH0sIlBhZGRpbmciOnsiJGlkIjoiMjk5IiwiVG9wIjowLCJMZWZ0IjowLCJSaWdodCI6MCwiQm90dG9tIjowfSwiQmFja2dyb3VuZCI6eyIkcmVmIjoiMTI0In0sIklzVmlzaWJsZSI6dHJ1ZSwiV2lkdGgiOjAuMCwiSGVpZ2h0IjowLjAsIkJvcmRlclN0eWxlIjp7IiRpZCI6IjMwMCIsIkxpbmVDb2xvciI6bnVsbCwiTGluZVdlaWdodCI6MC4wLCJMaW5lVHlwZSI6MCwiUGFyZW50U3R5bGUiOm51bGx9LCJQYXJlbnRTdHlsZSI6bnVsbH0sIkRhdGVGb3JtYXQiOnsiJGlkIjoiMzAxIiwiRm9ybWF0U3RyaW5nIjoiTU1NIGQiLCJTZXBhcmF0b3IiOiIvIiwiVXNlSW50ZXJuYXRpb25hbERhdGVGb3JtYXQiOmZhbHNlLCJEYXRlSXNWaXNpYmxlIjp0cnVlLCJUaW1lSXNWaXNpYmxlIjpmYWxzZSwiSG91ckRpZ2l0cyI6MSwiQW1QbURlc2lnbmF0b3IiOjIsIlRyaW0wME1pbnV0ZXMiOmZhbHNlLCJMYXN0S25vd25WaXNpYmlsaXR5U3RhdGUiOm51bGx9LCJJc1Zpc2libGUiOnRydWUsIlBhcmVudFN0eWxlIjpudWxsfSwiSW5kZXgiOjMsIlNtYXJ0RHVyYXRpb25BY3RpdmF0ZWQiOmZhbHNlLCJEYXRlRm9ybWF0Ijp7IiRyZWYiOiIzMDEifSwiSWQiOiJlYWVhOGFiMy1kN2I4LTRlYzAtOTMzYi00Nzg5ZTBjNWRjZTMiLCJJbXBvcnRJZCI6bnVsbCwiVGl0bGUiOiJSw6l1bmlyIGxlcyBzY3JpcHRzIGVuIHVuIHNldWwgIiwiTm90ZSI6bnVsbCwiSHlwZXJsaW5rIjp7IiRpZCI6IjMwMiIsIkFkZHJlc3MiOiIiLCJTdWJBZGRyZXNzIjoiIn0sIklzQ2hhbmdlZCI6ZmFsc2UsIklzTmV3IjpmYWxzZX0seyIkaWQiOiIzMDMiLCJHcm91cE5hbWUiOm51bGwsIlN0YXJ0RGF0ZSI6IjIwMjAtMDEtMTNUMDA6MDA6MDBaIiwiRW5kRGF0ZSI6IjIwMjAtMDItMjFUMjM6NTk6MDAiLCJQZXJjZW50YWdlQ29tcGxldGUiOm51bGwsIlN0eWxlIjp7IiRpZCI6IjMwNCIsIlNoYXBlIjowLCJTaGFwZVRoaWNrbmVzcyI6MiwiRHVyYXRpb25Gb3JtYXQiOjAsIkluY2x1ZGVOb25Xb3JraW5nRGF5c0luRHVyYXRpb24iOmZhbHNlLCJQZXJjZW50YWdlQ29tcGxldGVTdHlsZSI6eyIkaWQiOiIzMDUiLCJGb250U2V0dGluZ3MiOnsiJGlkIjoiMzA2IiwiRm9udFNpemUiOjEwLCJGb250TmFtZSI6IkNhbGlicmkiLCJJc0JvbGQiOmZhbHNlLCJJc0l0YWxpYyI6ZmFsc2UsIklzVW5kZXJsaW5lZCI6ZmFsc2UsIlBhcmVudFN0eWxlIjpudWxsfSwiQXV0b1NpemUiOjAsIkZvcmVncm91bmQiOnsiJHJlZiI6Ijg1In0sIk1heFdpZHRoIjoyMDAuMCwiTWF4SGVpZ2h0IjoiSW5maW5pdHkiLCJTbWFydEZvcmVncm91bmRJc0FjdGl2ZSI6ZmFsc2UsIkhvcml6b250YWxBbGlnbm1lbnQiOjAsIlZlcnRpY2FsQWxpZ25tZW50IjowLCJTbWFydEZvcmVncm91bmQiOm51bGwsIkJhY2tncm91bmRGaWxsVHlwZSI6MCwiTWFyZ2luIjp7IiRpZCI6IjMwNyIsIlRvcCI6MCwiTGVmdCI6MCwiUmlnaHQiOjAsIkJvdHRvbSI6MH0sIlBhZGRpbmciOnsiJGlkIjoiMzA4IiwiVG9wIjowLCJMZWZ0IjowLCJSaWdodCI6MCwiQm90dG9tIjowfSwiQmFja2dyb3VuZCI6eyIkcmVmIjoiODkifSwiSXNWaXNpYmxlIjp0cnVlLCJXaWR0aCI6MC4wLCJIZWlnaHQiOjAuMCwiQm9yZGVyU3R5bGUiOnsiJGlkIjoiMzA5IiwiTGluZUNvbG9yIjpudWxsLCJMaW5lV2VpZ2h0IjowLjAsIkxpbmVUeXBlIjowLCJQYXJlbnRTdHlsZSI6bnVsbH0sIlBhcmVudFN0eWxlIjpudWxsfSwiRHVyYXRpb25TdHlsZSI6eyIkaWQiOiIzMTAiLCJGb250U2V0dGluZ3MiOnsiJGlkIjoiMzExIiwiRm9udFNpemUiOjEwLCJGb250TmFtZSI6IkNhbGlicmkiLCJJc0JvbGQiOmZhbHNlLCJJc0l0YWxpYyI6ZmFsc2UsIklzVW5kZXJsaW5lZCI6ZmFsc2UsIlBhcmVudFN0eWxlIjpudWxsfSwiQXV0b1NpemUiOjAsIkZvcmVncm91bmQiOnsiJGlkIjoiMzEyIiwiQ29sb3IiOnsiJHJlZiI6IjkzIn19LCJNYXhXaWR0aCI6MjAwLjAsIk1heEhlaWdodCI6IkluZmluaXR5IiwiU21hcnRGb3JlZ3JvdW5kSXNBY3RpdmUiOmZhbHNlLCJIb3Jpem9udGFsQWxpZ25tZW50IjowLCJWZXJ0aWNhbEFsaWdubWVudCI6MCwiU21hcnRGb3JlZ3JvdW5kIjpudWxsLCJCYWNrZ3JvdW5kRmlsbFR5cGUiOjAsIk1hcmdpbiI6eyIkaWQiOiIzMTMiLCJUb3AiOjAsIkxlZnQiOjAsIlJpZ2h0IjowLCJCb3R0b20iOjB9LCJQYWRkaW5nIjp7IiRpZCI6IjMxNCIsIlRvcCI6MCwiTGVmdCI6MCwiUmlnaHQiOjAsIkJvdHRvbSI6MH0sIkJhY2tncm91bmQiOnsiJHJlZiI6Ijk2In0sIklzVmlzaWJsZSI6dHJ1ZSwiV2lkdGgiOjAuMCwiSGVpZ2h0IjowLjAsIkJvcmRlclN0eWxlIjp7IiRpZCI6IjMxNSIsIkxpbmVDb2xvciI6bnVsbCwiTGluZVdlaWdodCI6MC4wLCJMaW5lVHlwZSI6MCwiUGFyZW50U3R5bGUiOm51bGx9LCJQYXJlbnRTdHlsZSI6bnVsbH0sIkhvcml6b250YWxDb25uZWN0b3JTdHlsZSI6eyIkaWQiOiIzMTYiLCJMaW5lQ29sb3IiOnsiJHJlZiI6Ijk4In0sIkxpbmVXZWlnaHQiOjEuMCwiTGluZVR5cGUiOjAsIlBhcmVudFN0eWxlIjpudWxsfSwiVmVydGljYWxDb25uZWN0b3JTdHlsZSI6eyIkaWQiOiIzMTciLCJMaW5lQ29sb3IiOnsiJHJlZiI6IjEwMSJ9LCJMaW5lV2VpZ2h0IjoxLjAsIkxpbmVUeXBlIjowLCJQYXJlbnRTdHlsZSI6bnVsbH0sIk1hcmdpbiI6bnVsbCwiU3RhcnREYXRlUG9zaXRpb24iOjQsIkVuZERhdGVQb3NpdGlvbiI6NCwiRGF0ZUlzVmlzaWJsZSI6dHJ1ZSwiVGl0bGVQb3NpdGlvbiI6MywiRHVyYXRpb25Qb3NpdGlvbiI6NiwiUGVyY2VudGFnZUNvbXBsZXRlZFBvc2l0aW9uIjo2LCJTcGFjaW5nIjo1LCJJc0JlbG93VGltZWJhbmQiOmZhbHNlLCJQZXJjZW50YWdlQ29tcGxldGVTaGFwZU9wYWNpdHkiOjM1LCJTaGFwZVN0eWxlIjp7IiRpZCI6IjMxOCIsIk1hcmdpbiI6eyIkaWQiOiIzMTkiLCJUb3AiOjAsIkxlZnQiOjQsIlJpZ2h0Ijo0LCJCb3R0b20iOjB9LCJQYWRkaW5nIjp7IiRpZCI6IjMyMCIsIlRvcCI6MCwiTGVmdCI6MCwiUmlnaHQiOjAsIkJvdHRvbSI6MH0sIkJhY2tncm91bmQiOnsiJGlkIjoiMzIxIiwiQ29sb3IiOnsiJGlkIjoiMzIyIiwiQSI6MjU1LCJSIjoxMTIsIkciOjE3MywiQiI6NzF9fSwiSXNWaXNpYmxlIjp0cnVlLCJXaWR0aCI6MC4wLCJIZWlnaHQiOjIyLjAsIkJvcmRlclN0eWxlIjp7IiRpZCI6IjMyMyIsIkxpbmVDb2xvciI6eyIkcmVmIjoiMTA5In0sIkxpbmVXZWlnaHQiOjAuMCwiTGluZVR5cGUiOjAsIlBhcmVudFN0eWxlIjpudWxsfSwiUGFyZW50U3R5bGUiOm51bGx9LCJUaXRsZVN0eWxlIjp7IiRpZCI6IjMyNCIsIkZvbnRTZXR0aW5ncyI6eyIkaWQiOiIzMjUiLCJGb250U2l6ZSI6MTEsIkZvbnROYW1lIjoiQ2FsaWJyaSIsIklzQm9sZCI6dHJ1ZSwiSXNJdGFsaWMiOmZhbHNlLCJJc1VuZGVybGluZWQiOmZhbHNlLCJQYXJlbnRTdHlsZSI6bnVsbH0sIkF1dG9TaXplIjowLCJGb3JlZ3JvdW5kIjp7IiRpZCI6IjMyNiIsIkNvbG9yIjp7IiRyZWYiOiIxMTQifX0sIk1heFdpZHRoIjo3MjAuMCwiTWF4SGVpZ2h0IjoiSW5maW5pdHkiLCJTbWFydEZvcmVncm91bmRJc0FjdGl2ZSI6ZmFsc2UsIkhvcml6b250YWxBbGlnbm1lbnQiOjIsIlZlcnRpY2FsQWxpZ25tZW50IjowLCJTbWFydEZvcmVncm91bmQiOm51bGwsIkJhY2tncm91bmRGaWxsVHlwZSI6MCwiTWFyZ2luIjp7IiRpZCI6IjMyNyIsIlRvcCI6MCwiTGVmdCI6MCwiUmlnaHQiOjAsIkJvdHRvbSI6MH0sIlBhZGRpbmciOnsiJGlkIjoiMzI4IiwiVG9wIjowLCJMZWZ0IjowLCJSaWdodCI6MCwiQm90dG9tIjowfSwiQmFja2dyb3VuZCI6eyIkcmVmIjoiMTE3In0sIklzVmlzaWJsZSI6dHJ1ZSwiV2lkdGgiOjAuMCwiSGVpZ2h0IjowLjAsIkJvcmRlclN0eWxlIjp7IiRpZCI6IjMyOSIsIkxpbmVDb2xvciI6bnVsbCwiTGluZVdlaWdodCI6MC4wLCJMaW5lVHlwZSI6MCwiUGFyZW50U3R5bGUiOm51bGx9LCJQYXJlbnRTdHlsZSI6bnVsbH0sIkRhdGVTdHlsZSI6eyIkaWQiOiIzMzAiLCJGb250U2V0dGluZ3MiOnsiJGlkIjoiMzMxIiwiRm9udFNpemUiOjEwLCJGb250TmFtZSI6IkNhbGlicmkiLCJJc0JvbGQiOmZhbHNlLCJJc0l0YWxpYyI6ZmFsc2UsIklzVW5kZXJsaW5lZCI6ZmFsc2UsIlBhcmVudFN0eWxlIjpudWxsfSwiQXV0b1NpemUiOjAsIkZvcmVncm91bmQiOnsiJGlkIjoiMzMyIiwiQ29sb3IiOnsiJHJlZiI6IjEyMSJ9fSwiTWF4V2lkdGgiOjIwMC4wLCJNYXhIZWlnaHQiOiJJbmZpbml0eSIsIlNtYXJ0Rm9yZWdyb3VuZElzQWN0aXZlIjpmYWxzZSwiSG9yaXpvbnRhbEFsaWdubWVudCI6MCwiVmVydGljYWxBbGlnbm1lbnQiOjAsIlNtYXJ0Rm9yZWdyb3VuZCI6bnVsbCwiQmFja2dyb3VuZEZpbGxUeXBlIjowLCJNYXJnaW4iOnsiJGlkIjoiMzMzIiwiVG9wIjowLCJMZWZ0IjowLCJSaWdodCI6MCwiQm90dG9tIjowfSwiUGFkZGluZyI6eyIkaWQiOiIzMzQiLCJUb3AiOjAsIkxlZnQiOjAsIlJpZ2h0IjowLCJCb3R0b20iOjB9LCJCYWNrZ3JvdW5kIjp7IiRyZWYiOiIxMjQifSwiSXNWaXNpYmxlIjp0cnVlLCJXaWR0aCI6MC4wLCJIZWlnaHQiOjAuMCwiQm9yZGVyU3R5bGUiOnsiJGlkIjoiMzM1IiwiTGluZUNvbG9yIjpudWxsLCJMaW5lV2VpZ2h0IjowLjAsIkxpbmVUeXBlIjowLCJQYXJlbnRTdHlsZSI6bnVsbH0sIlBhcmVudFN0eWxlIjpudWxsfSwiRGF0ZUZvcm1hdCI6eyIkaWQiOiIzMzYiLCJGb3JtYXRTdHJpbmciOiJNTU0gZCIsIlNlcGFyYXRvciI6Ii8iLCJVc2VJbnRlcm5hdGlvbmFsRGF0ZUZvcm1hdCI6ZmFsc2UsIkRhdGVJc1Zpc2libGUiOnRydWUsIlRpbWVJc1Zpc2libGUiOmZhbHNlLCJIb3VyRGlnaXRzIjoxLCJBbVBtRGVzaWduYXRvciI6MiwiVHJpbTAwTWludXRlcyI6ZmFsc2UsIkxhc3RLbm93blZpc2liaWxpdHlTdGF0ZSI6bnVsbH0sIklzVmlzaWJsZSI6dHJ1ZSwiUGFyZW50U3R5bGUiOm51bGx9LCJJbmRleCI6NCwiU21hcnREdXJhdGlvbkFjdGl2YXRlZCI6ZmFsc2UsIkRhdGVGb3JtYXQiOnsiJHJlZiI6IjMzNiJ9LCJJZCI6IjY0NGE1Yzc4LWExODItNGNhNS1iYTc5LTNjZTRjZmI3YjMyMCIsIkltcG9ydElkIjpudWxsLCJUaXRsZSI6IkZhaXJlIGxlIGxpZW4gZW50cmUgbCdpbnRlcmZhY2Ugd2ViIGV0IGxlcyBzY3JpcHRzIFIgIiwiTm90ZSI6bnVsbCwiSHlwZXJsaW5rIjp7IiRpZCI6IjMzNyIsIkFkZHJlc3MiOiIiLCJTdWJBZGRyZXNzIjoiIn0sIklzQ2hhbmdlZCI6ZmFsc2UsIklzTmV3IjpmYWxzZX0seyIkaWQiOiIzMzgiLCJHcm91cE5hbWUiOm51bGwsIlN0YXJ0RGF0ZSI6IjIwMjAtMDEtMTNUMDA6MDA6MDBaIiwiRW5kRGF0ZSI6IjIwMjAtMDItMjFUMjM6NTk6MDAiLCJQZXJjZW50YWdlQ29tcGxldGUiOm51bGwsIlN0eWxlIjp7IiRpZCI6IjMzOSIsIlNoYXBlIjowLCJTaGFwZVRoaWNrbmVzcyI6MiwiRHVyYXRpb25Gb3JtYXQiOjAsIkluY2x1ZGVOb25Xb3JraW5nRGF5c0luRHVyYXRpb24iOmZhbHNlLCJQZXJjZW50YWdlQ29tcGxldGVTdHlsZSI6eyIkaWQiOiIzNDAiLCJGb250U2V0dGluZ3MiOnsiJGlkIjoiMzQxIiwiRm9udFNpemUiOjEwLCJGb250TmFtZSI6IkNhbGlicmkiLCJJc0JvbGQiOmZhbHNlLCJJc0l0YWxpYyI6ZmFsc2UsIklzVW5kZXJsaW5lZCI6ZmFsc2UsIlBhcmVudFN0eWxlIjpudWxsfSwiQXV0b1NpemUiOjAsIkZvcmVncm91bmQiOnsiJHJlZiI6Ijg1In0sIk1heFdpZHRoIjoyMDAuMCwiTWF4SGVpZ2h0IjoiSW5maW5pdHkiLCJTbWFydEZvcmVncm91bmRJc0FjdGl2ZSI6ZmFsc2UsIkhvcml6b250YWxBbGlnbm1lbnQiOjAsIlZlcnRpY2FsQWxpZ25tZW50IjowLCJTbWFydEZvcmVncm91bmQiOm51bGwsIkJhY2tncm91bmRGaWxsVHlwZSI6MCwiTWFyZ2luIjp7IiRpZCI6IjM0MiIsIlRvcCI6MCwiTGVmdCI6MCwiUmlnaHQiOjAsIkJvdHRvbSI6MH0sIlBhZGRpbmciOnsiJGlkIjoiMzQzIiwiVG9wIjowLCJMZWZ0IjowLCJSaWdodCI6MCwiQm90dG9tIjowfSwiQmFja2dyb3VuZCI6eyIkcmVmIjoiODkifSwiSXNWaXNpYmxlIjp0cnVlLCJXaWR0aCI6MC4wLCJIZWlnaHQiOjAuMCwiQm9yZGVyU3R5bGUiOnsiJGlkIjoiMzQ0IiwiTGluZUNvbG9yIjpudWxsLCJMaW5lV2VpZ2h0IjowLjAsIkxpbmVUeXBlIjowLCJQYXJlbnRTdHlsZSI6bnVsbH0sIlBhcmVudFN0eWxlIjpudWxsfSwiRHVyYXRpb25TdHlsZSI6eyIkaWQiOiIzNDUiLCJGb250U2V0dGluZ3MiOnsiJGlkIjoiMzQ2IiwiRm9udFNpemUiOjEwLCJGb250TmFtZSI6IkNhbGlicmkiLCJJc0JvbGQiOmZhbHNlLCJJc0l0YWxpYyI6ZmFsc2UsIklzVW5kZXJsaW5lZCI6ZmFsc2UsIlBhcmVudFN0eWxlIjpudWxsfSwiQXV0b1NpemUiOjAsIkZvcmVncm91bmQiOnsiJGlkIjoiMzQ3IiwiQ29sb3IiOnsiJHJlZiI6IjkzIn19LCJNYXhXaWR0aCI6MjAwLjAsIk1heEhlaWdodCI6IkluZmluaXR5IiwiU21hcnRGb3JlZ3JvdW5kSXNBY3RpdmUiOmZhbHNlLCJIb3Jpem9udGFsQWxpZ25tZW50IjowLCJWZXJ0aWNhbEFsaWdubWVudCI6MCwiU21hcnRGb3JlZ3JvdW5kIjpudWxsLCJCYWNrZ3JvdW5kRmlsbFR5cGUiOjAsIk1hcmdpbiI6eyIkaWQiOiIzNDgiLCJUb3AiOjAsIkxlZnQiOjAsIlJpZ2h0IjowLCJCb3R0b20iOjB9LCJQYWRkaW5nIjp7IiRpZCI6IjM0OSIsIlRvcCI6MCwiTGVmdCI6MCwiUmlnaHQiOjAsIkJvdHRvbSI6MH0sIkJhY2tncm91bmQiOnsiJHJlZiI6Ijk2In0sIklzVmlzaWJsZSI6dHJ1ZSwiV2lkdGgiOjAuMCwiSGVpZ2h0IjowLjAsIkJvcmRlclN0eWxlIjp7IiRpZCI6IjM1MCIsIkxpbmVDb2xvciI6bnVsbCwiTGluZVdlaWdodCI6MC4wLCJMaW5lVHlwZSI6MCwiUGFyZW50U3R5bGUiOm51bGx9LCJQYXJlbnRTdHlsZSI6bnVsbH0sIkhvcml6b250YWxDb25uZWN0b3JTdHlsZSI6eyIkaWQiOiIzNTEiLCJMaW5lQ29sb3IiOnsiJHJlZiI6Ijk4In0sIkxpbmVXZWlnaHQiOjEuMCwiTGluZVR5cGUiOjAsIlBhcmVudFN0eWxlIjpudWxsfSwiVmVydGljYWxDb25uZWN0b3JTdHlsZSI6eyIkaWQiOiIzNTIiLCJMaW5lQ29sb3IiOnsiJHJlZiI6IjEwMSJ9LCJMaW5lV2VpZ2h0IjoxLjAsIkxpbmVUeXBlIjowLCJQYXJlbnRTdHlsZSI6bnVsbH0sIk1hcmdpbiI6bnVsbCwiU3RhcnREYXRlUG9zaXRpb24iOjQsIkVuZERhdGVQb3NpdGlvbiI6NCwiRGF0ZUlzVmlzaWJsZSI6dHJ1ZSwiVGl0bGVQb3NpdGlvbiI6MiwiRHVyYXRpb25Qb3NpdGlvbiI6NiwiUGVyY2VudGFnZUNvbXBsZXRlZFBvc2l0aW9uIjo2LCJTcGFjaW5nIjo1LCJJc0JlbG93VGltZWJhbmQiOmZhbHNlLCJQZXJjZW50YWdlQ29tcGxldGVTaGFwZU9wYWNpdHkiOjM1LCJTaGFwZVN0eWxlIjp7IiRpZCI6IjM1MyIsIk1hcmdpbiI6eyIkaWQiOiIzNTQiLCJUb3AiOjAsIkxlZnQiOjQsIlJpZ2h0Ijo0LCJCb3R0b20iOjB9LCJQYWRkaW5nIjp7IiRpZCI6IjM1NSIsIlRvcCI6MCwiTGVmdCI6MCwiUmlnaHQiOjAsIkJvdHRvbSI6MH0sIkJhY2tncm91bmQiOnsiJGlkIjoiMzU2IiwiQ29sb3IiOnsiJGlkIjoiMzU3IiwiQSI6MjU1LCJSIjo5MSwiRyI6MTU1LCJCIjoyMTN9fSwiSXNWaXNpYmxlIjp0cnVlLCJXaWR0aCI6MC4wLCJIZWlnaHQiOjIyLjAsIkJvcmRlclN0eWxlIjp7IiRpZCI6IjM1OCIsIkxpbmVDb2xvciI6eyIkcmVmIjoiMTA5In0sIkxpbmVXZWlnaHQiOjAuMCwiTGluZVR5cGUiOjAsIlBhcmVudFN0eWxlIjpudWxsfSwiUGFyZW50U3R5bGUiOm51bGx9LCJUaXRsZVN0eWxlIjp7IiRpZCI6IjM1OSIsIkZvbnRTZXR0aW5ncyI6eyIkaWQiOiIzNjAiLCJGb250U2l6ZSI6MTEsIkZvbnROYW1lIjoiQ2FsaWJyaSIsIklzQm9sZCI6dHJ1ZSwiSXNJdGFsaWMiOmZhbHNlLCJJc1VuZGVybGluZWQiOmZhbHNlLCJQYXJlbnRTdHlsZSI6bnVsbH0sIkF1dG9TaXplIjowLCJGb3JlZ3JvdW5kIjp7IiRpZCI6IjM2MSIsIkNvbG9yIjp7IiRyZWYiOiIxMTQifX0sIk1heFdpZHRoIjo3MjAuMCwiTWF4SGVpZ2h0IjoiSW5maW5pdHkiLCJTbWFydEZvcmVncm91bmRJc0FjdGl2ZSI6ZmFsc2UsIkhvcml6b250YWxBbGlnbm1lbnQiOjEsIlZlcnRpY2FsQWxpZ25tZW50IjowLCJTbWFydEZvcmVncm91bmQiOm51bGwsIkJhY2tncm91bmRGaWxsVHlwZSI6MCwiTWFyZ2luIjp7IiRpZCI6IjM2MiIsIlRvcCI6MCwiTGVmdCI6MCwiUmlnaHQiOjAsIkJvdHRvbSI6MH0sIlBhZGRpbmciOnsiJGlkIjoiMzYzIiwiVG9wIjowLCJMZWZ0IjowLCJSaWdodCI6MCwiQm90dG9tIjowfSwiQmFja2dyb3VuZCI6eyIkcmVmIjoiMTE3In0sIklzVmlzaWJsZSI6dHJ1ZSwiV2lkdGgiOjAuMCwiSGVpZ2h0IjowLjAsIkJvcmRlclN0eWxlIjp7IiRpZCI6IjM2NCIsIkxpbmVDb2xvciI6bnVsbCwiTGluZVdlaWdodCI6MC4wLCJMaW5lVHlwZSI6MCwiUGFyZW50U3R5bGUiOm51bGx9LCJQYXJlbnRTdHlsZSI6bnVsbH0sIkRhdGVTdHlsZSI6eyIkaWQiOiIzNjUiLCJGb250U2V0dGluZ3MiOnsiJGlkIjoiMzY2IiwiRm9udFNpemUiOjEwLCJGb250TmFtZSI6IkNhbGlicmkiLCJJc0JvbGQiOmZhbHNlLCJJc0l0YWxpYyI6ZmFsc2UsIklzVW5kZXJsaW5lZCI6ZmFsc2UsIlBhcmVudFN0eWxlIjpudWxsfSwiQXV0b1NpemUiOjAsIkZvcmVncm91bmQiOnsiJGlkIjoiMzY3IiwiQ29sb3IiOnsiJHJlZiI6IjEyMSJ9fSwiTWF4V2lkdGgiOjIwMC4wLCJNYXhIZWlnaHQiOiJJbmZpbml0eSIsIlNtYXJ0Rm9yZWdyb3VuZElzQWN0aXZlIjpmYWxzZSwiSG9yaXpvbnRhbEFsaWdubWVudCI6MCwiVmVydGljYWxBbGlnbm1lbnQiOjAsIlNtYXJ0Rm9yZWdyb3VuZCI6bnVsbCwiQmFja2dyb3VuZEZpbGxUeXBlIjowLCJNYXJnaW4iOnsiJGlkIjoiMzY4IiwiVG9wIjowLCJMZWZ0IjowLCJSaWdodCI6MCwiQm90dG9tIjowfSwiUGFkZGluZyI6eyIkaWQiOiIzNjkiLCJUb3AiOjAsIkxlZnQiOjAsIlJpZ2h0IjowLCJCb3R0b20iOjB9LCJCYWNrZ3JvdW5kIjp7IiRyZWYiOiIxMjQifSwiSXNWaXNpYmxlIjp0cnVlLCJXaWR0aCI6MC4wLCJIZWlnaHQiOjAuMCwiQm9yZGVyU3R5bGUiOnsiJGlkIjoiMzcwIiwiTGluZUNvbG9yIjpudWxsLCJMaW5lV2VpZ2h0IjowLjAsIkxpbmVUeXBlIjowLCJQYXJlbnRTdHlsZSI6bnVsbH0sIlBhcmVudFN0eWxlIjpudWxsfSwiRGF0ZUZvcm1hdCI6eyIkaWQiOiIzNzEiLCJGb3JtYXRTdHJpbmciOiJNTU0gZCIsIlNlcGFyYXRvciI6Ii8iLCJVc2VJbnRlcm5hdGlvbmFsRGF0ZUZvcm1hdCI6ZmFsc2UsIkRhdGVJc1Zpc2libGUiOnRydWUsIlRpbWVJc1Zpc2libGUiOmZhbHNlLCJIb3VyRGlnaXRzIjoxLCJBbVBtRGVzaWduYXRvciI6MiwiVHJpbTAwTWludXRlcyI6ZmFsc2UsIkxhc3RLbm93blZpc2liaWxpdHlTdGF0ZSI6bnVsbH0sIklzVmlzaWJsZSI6dHJ1ZSwiUGFyZW50U3R5bGUiOm51bGx9LCJJbmRleCI6NSwiU21hcnREdXJhdGlvbkFjdGl2YXRlZCI6ZmFsc2UsIkRhdGVGb3JtYXQiOnsiJHJlZiI6IjM3MSJ9LCJJZCI6ImY1Y2UyZTJjLTZhYTUtNDI1My04NTAwLWUzMzljOGY4NGNmNSIsIkltcG9ydElkIjpudWxsLCJUaXRsZSI6IkFqb3V0ZXIgZGVzIHZvaWVzIG5vbi1jYW5vbmlxdWVzICIsIk5vdGUiOm51bGwsIkh5cGVybGluayI6eyIkaWQiOiIzNzIiLCJBZGRyZXNzIjoiIiwiU3ViQWRkcmVzcyI6IiJ9LCJJc0NoYW5nZWQiOmZhbHNlLCJJc05ldyI6ZmFsc2V9LHsiJGlkIjoiMzczIiwiR3JvdXBOYW1lIjpudWxsLCJTdGFydERhdGUiOiIyMDIwLTAzLTA5VDAwOjAwOjAwWiIsIkVuZERhdGUiOiIyMDIwLTAzLTIwVDIzOjU5OjAwIiwiUGVyY2VudGFnZUNvbXBsZXRlIjpudWxsLCJTdHlsZSI6eyIkaWQiOiIzNzQiLCJTaGFwZSI6MCwiU2hhcGVUaGlja25lc3MiOjIsIkR1cmF0aW9uRm9ybWF0IjowLCJJbmNsdWRlTm9uV29ya2luZ0RheXNJbkR1cmF0aW9uIjpmYWxzZSwiUGVyY2VudGFnZUNvbXBsZXRlU3R5bGUiOnsiJGlkIjoiMzc1IiwiRm9udFNldHRpbmdzIjp7IiRpZCI6IjM3NiIsIkZvbnRTaXplIjoxMCwiRm9udE5hbWUiOiJDYWxpYnJpIiwiSXNCb2xkIjpmYWxzZSwiSXNJdGFsaWMiOmZhbHNlLCJJc1VuZGVybGluZWQiOmZhbHNlLCJQYXJlbnRTdHlsZSI6bnVsbH0sIkF1dG9TaXplIjowLCJGb3JlZ3JvdW5kIjp7IiRyZWYiOiI4NSJ9LCJNYXhXaWR0aCI6MjAwLjAsIk1heEhlaWdodCI6IkluZmluaXR5IiwiU21hcnRGb3JlZ3JvdW5kSXNBY3RpdmUiOmZhbHNlLCJIb3Jpem9udGFsQWxpZ25tZW50IjowLCJWZXJ0aWNhbEFsaWdubWVudCI6MCwiU21hcnRGb3JlZ3JvdW5kIjpudWxsLCJCYWNrZ3JvdW5kRmlsbFR5cGUiOjAsIk1hcmdpbiI6eyIkaWQiOiIzNzciLCJUb3AiOjAsIkxlZnQiOjAsIlJpZ2h0IjowLCJCb3R0b20iOjB9LCJQYWRkaW5nIjp7IiRpZCI6IjM3OCIsIlRvcCI6MCwiTGVmdCI6MCwiUmlnaHQiOjAsIkJvdHRvbSI6MH0sIkJhY2tncm91bmQiOnsiJHJlZiI6Ijg5In0sIklzVmlzaWJsZSI6dHJ1ZSwiV2lkdGgiOjAuMCwiSGVpZ2h0IjowLjAsIkJvcmRlclN0eWxlIjp7IiRpZCI6IjM3OSIsIkxpbmVDb2xvciI6bnVsbCwiTGluZVdlaWdodCI6MC4wLCJMaW5lVHlwZSI6MCwiUGFyZW50U3R5bGUiOm51bGx9LCJQYXJlbnRTdHlsZSI6bnVsbH0sIkR1cmF0aW9uU3R5bGUiOnsiJGlkIjoiMzgwIiwiRm9udFNldHRpbmdzIjp7IiRpZCI6IjM4MSIsIkZvbnRTaXplIjoxMCwiRm9udE5hbWUiOiJDYWxpYnJpIiwiSXNCb2xkIjpmYWxzZSwiSXNJdGFsaWMiOmZhbHNlLCJJc1VuZGVybGluZWQiOmZhbHNlLCJQYXJlbnRTdHlsZSI6bnVsbH0sIkF1dG9TaXplIjowLCJGb3JlZ3JvdW5kIjp7IiRpZCI6IjM4MiIsIkNvbG9yIjp7IiRyZWYiOiI5MyJ9fSwiTWF4V2lkdGgiOjIwMC4wLCJNYXhIZWlnaHQiOiJJbmZpbml0eSIsIlNtYXJ0Rm9yZWdyb3VuZElzQWN0aXZlIjpmYWxzZSwiSG9yaXpvbnRhbEFsaWdubWVudCI6MCwiVmVydGljYWxBbGlnbm1lbnQiOjAsIlNtYXJ0Rm9yZWdyb3VuZCI6bnVsbCwiQmFja2dyb3VuZEZpbGxUeXBlIjowLCJNYXJnaW4iOnsiJGlkIjoiMzgzIiwiVG9wIjowLCJMZWZ0IjowLCJSaWdodCI6MCwiQm90dG9tIjowfSwiUGFkZGluZyI6eyIkaWQiOiIzODQiLCJUb3AiOjAsIkxlZnQiOjAsIlJpZ2h0IjowLCJCb3R0b20iOjB9LCJCYWNrZ3JvdW5kIjp7IiRyZWYiOiI5NiJ9LCJJc1Zpc2libGUiOnRydWUsIldpZHRoIjowLjAsIkhlaWdodCI6MC4wLCJCb3JkZXJTdHlsZSI6eyIkaWQiOiIzODUiLCJMaW5lQ29sb3IiOm51bGwsIkxpbmVXZWlnaHQiOjAuMCwiTGluZVR5cGUiOjAsIlBhcmVudFN0eWxlIjpudWxsfSwiUGFyZW50U3R5bGUiOm51bGx9LCJIb3Jpem9udGFsQ29ubmVjdG9yU3R5bGUiOnsiJGlkIjoiMzg2IiwiTGluZUNvbG9yIjp7IiRyZWYiOiI5OCJ9LCJMaW5lV2VpZ2h0IjoxLjAsIkxpbmVUeXBlIjowLCJQYXJlbnRTdHlsZSI6bnVsbH0sIlZlcnRpY2FsQ29ubmVjdG9yU3R5bGUiOnsiJGlkIjoiMzg3IiwiTGluZUNvbG9yIjp7IiRyZWYiOiIxMDEifSwiTGluZVdlaWdodCI6MS4wLCJMaW5lVHlwZSI6MCwiUGFyZW50U3R5bGUiOm51bGx9LCJNYXJnaW4iOm51bGwsIlN0YXJ0RGF0ZVBvc2l0aW9uIjo0LCJFbmREYXRlUG9zaXRpb24iOjQsIkRhdGVJc1Zpc2libGUiOnRydWUsIlRpdGxlUG9zaXRpb24iOjMsIkR1cmF0aW9uUG9zaXRpb24iOjYsIlBlcmNlbnRhZ2VDb21wbGV0ZWRQb3NpdGlvbiI6NiwiU3BhY2luZyI6NSwiSXNCZWxvd1RpbWViYW5kIjpmYWxzZSwiUGVyY2VudGFnZUNvbXBsZXRlU2hhcGVPcGFjaXR5IjozNSwiU2hhcGVTdHlsZSI6eyIkaWQiOiIzODgiLCJNYXJnaW4iOnsiJGlkIjoiMzg5IiwiVG9wIjowLCJMZWZ0Ijo0LCJSaWdodCI6NCwiQm90dG9tIjowfSwiUGFkZGluZyI6eyIkaWQiOiIzOTAiLCJUb3AiOjAsIkxlZnQiOjAsIlJpZ2h0IjowLCJCb3R0b20iOjB9LCJCYWNrZ3JvdW5kIjp7IiRpZCI6IjM5MSIsIkNvbG9yIjp7IiRpZCI6IjM5MiIsIkEiOjI1NSwiUiI6OTEsIkciOjE1NSwiQiI6MjEzfX0sIklzVmlzaWJsZSI6dHJ1ZSwiV2lkdGgiOjAuMCwiSGVpZ2h0IjoyMi4wLCJCb3JkZXJTdHlsZSI6eyIkaWQiOiIzOTMiLCJMaW5lQ29sb3IiOnsiJHJlZiI6IjEwOSJ9LCJMaW5lV2VpZ2h0IjowLjAsIkxpbmVUeXBlIjowLCJQYXJlbnRTdHlsZSI6bnVsbH0sIlBhcmVudFN0eWxlIjpudWxsfSwiVGl0bGVTdHlsZSI6eyIkaWQiOiIzOTQiLCJGb250U2V0dGluZ3MiOnsiJGlkIjoiMzk1IiwiRm9udFNpemUiOjExLCJGb250TmFtZSI6IkNhbGlicmkiLCJJc0JvbGQiOnRydWUsIklzSXRhbGljIjpmYWxzZSwiSXNVbmRlcmxpbmVkIjpmYWxzZSwiUGFyZW50U3R5bGUiOm51bGx9LCJBdXRvU2l6ZSI6MCwiRm9yZWdyb3VuZCI6eyIkaWQiOiIzOTYiLCJDb2xvciI6eyIkcmVmIjoiMTE0In19LCJNYXhXaWR0aCI6NzIwLjAsIk1heEhlaWdodCI6IkluZmluaXR5IiwiU21hcnRGb3JlZ3JvdW5kSXNBY3RpdmUiOmZhbHNlLCJIb3Jpem9udGFsQWxpZ25tZW50IjoyLCJWZXJ0aWNhbEFsaWdubWVudCI6MCwiU21hcnRGb3JlZ3JvdW5kIjpudWxsLCJCYWNrZ3JvdW5kRmlsbFR5cGUiOjAsIk1hcmdpbiI6eyIkaWQiOiIzOTciLCJUb3AiOjAsIkxlZnQiOjAsIlJpZ2h0IjowLCJCb3R0b20iOjB9LCJQYWRkaW5nIjp7IiRpZCI6IjM5OCIsIlRvcCI6MCwiTGVmdCI6MCwiUmlnaHQiOjAsIkJvdHRvbSI6MH0sIkJhY2tncm91bmQiOnsiJHJlZiI6IjExNyJ9LCJJc1Zpc2libGUiOnRydWUsIldpZHRoIjowLjAsIkhlaWdodCI6MC4wLCJCb3JkZXJTdHlsZSI6eyIkaWQiOiIzOTkiLCJMaW5lQ29sb3IiOm51bGwsIkxpbmVXZWlnaHQiOjAuMCwiTGluZVR5cGUiOjAsIlBhcmVudFN0eWxlIjpudWxsfSwiUGFyZW50U3R5bGUiOm51bGx9LCJEYXRlU3R5bGUiOnsiJGlkIjoiNDAwIiwiRm9udFNldHRpbmdzIjp7IiRpZCI6IjQwMSIsIkZvbnRTaXplIjoxMCwiRm9udE5hbWUiOiJDYWxpYnJpIiwiSXNCb2xkIjpmYWxzZSwiSXNJdGFsaWMiOmZhbHNlLCJJc1VuZGVybGluZWQiOmZhbHNlLCJQYXJlbnRTdHlsZSI6bnVsbH0sIkF1dG9TaXplIjowLCJGb3JlZ3JvdW5kIjp7IiRpZCI6IjQwMiIsIkNvbG9yIjp7IiRyZWYiOiIxMjEifX0sIk1heFdpZHRoIjoyMDAuMCwiTWF4SGVpZ2h0IjoiSW5maW5pdHkiLCJTbWFydEZvcmVncm91bmRJc0FjdGl2ZSI6ZmFsc2UsIkhvcml6b250YWxBbGlnbm1lbnQiOjAsIlZlcnRpY2FsQWxpZ25tZW50IjowLCJTbWFydEZvcmVncm91bmQiOm51bGwsIkJhY2tncm91bmRGaWxsVHlwZSI6MCwiTWFyZ2luIjp7IiRpZCI6IjQwMyIsIlRvcCI6MCwiTGVmdCI6MCwiUmlnaHQiOjAsIkJvdHRvbSI6MH0sIlBhZGRpbmciOnsiJGlkIjoiNDA0IiwiVG9wIjowLCJMZWZ0IjowLCJSaWdodCI6MCwiQm90dG9tIjowfSwiQmFja2dyb3VuZCI6eyIkcmVmIjoiMTI0In0sIklzVmlzaWJsZSI6dHJ1ZSwiV2lkdGgiOjAuMCwiSGVpZ2h0IjowLjAsIkJvcmRlclN0eWxlIjp7IiRpZCI6IjQwNSIsIkxpbmVDb2xvciI6bnVsbCwiTGluZVdlaWdodCI6MC4wLCJMaW5lVHlwZSI6MCwiUGFyZW50U3R5bGUiOm51bGx9LCJQYXJlbnRTdHlsZSI6bnVsbH0sIkRhdGVGb3JtYXQiOnsiJGlkIjoiNDA2IiwiRm9ybWF0U3RyaW5nIjoiTU1NIGQiLCJTZXBhcmF0b3IiOiIvIiwiVXNlSW50ZXJuYXRpb25hbERhdGVGb3JtYXQiOmZhbHNlLCJEYXRlSXNWaXNpYmxlIjp0cnVlLCJUaW1lSXNWaXNpYmxlIjpmYWxzZSwiSG91ckRpZ2l0cyI6MSwiQW1QbURlc2lnbmF0b3IiOjIsIlRyaW0wME1pbnV0ZXMiOmZhbHNlLCJMYXN0S25vd25WaXNpYmlsaXR5U3RhdGUiOm51bGx9LCJJc1Zpc2libGUiOnRydWUsIlBhcmVudFN0eWxlIjpudWxsfSwiSW5kZXgiOjYsIlNtYXJ0RHVyYXRpb25BY3RpdmF0ZWQiOmZhbHNlLCJEYXRlRm9ybWF0Ijp7IiRyZWYiOiI0MDYifSwiSWQiOiJlOWZlZDBmOS0yYTMwLTQ3MTgtODNkNy1lYjFmN2I5NGYyYzgiLCJJbXBvcnRJZCI6bnVsbCwiVGl0bGUiOiJJbXBsw6ltZW50ZXIgbCdvdXRpbHMgc3VyIGxlIHNlcnZldXIgY2xpZW50IiwiTm90ZSI6bnVsbCwiSHlwZXJsaW5rIjp7IiRpZCI6IjQwNyIsIkFkZHJlc3MiOiIiLCJTdWJBZGRyZXNzIjoiIn0sIklzQ2hhbmdlZCI6ZmFsc2UsIklzTmV3IjpmYWxzZX1dLCJTd2ltbGFuZXMiOltdLCJNc1Byb2plY3RJdGVtc1RyZWUiOnsiJGlkIjoiNDA4IiwiUm9vdCI6eyJJbXBvcnRJZCI6bnVsbCwiSXNJbXBvcnRlZCI6ZmFsc2UsIkNoaWxkcmVuIjpbXX19LCJNZXRhZGF0YSI6eyIkaWQiOiI0MDkiLCJSZWNlbnRDb2xvcnNDb2xsZWN0aW9uIjoiW1wiI0ZGRUQ3RDMxXCIsXCIjRkY3MEFENDdcIixcIiNGRkVBMTYxRVwiXSJ9LCJTZXR0aW5ncyI6eyIkaWQiOiI0MTAiLCJJbXBhT3B0aW9ucyI6eyIkaWQiOiI0MTEiLCJMZWZ0VG9SaWdodCI6ZmFsc2UsIlBheWxvYWRPcHRpb25zIjoyfSwiVXNlQ29tcHJlc3Npb24iOmZhbHNlLCJDb21wcmVzaW9uUGVyY2VudGFnZSI6NTAuMCwiSW5hY3RpdmVJbnRlcnZhbFdpZHRoVGhyZXNob2xkIjozMC4wLCJJbmFjdGl2ZUludGVydmFsV2lkdGgiOjEuMCwiU3BsaXRUYXNrcyI6ZmFsc2UsIlVzZUNsdXN0ZXIiOmZhbHNlLCJFcHNpbG9uIjo1LjAsIk1pblBvaW50c1RvRm9ybUFDbHVzdGVyIjoyLCJHZW5lcmF0ZUludmlzaWJsZVNoYXBlcyI6ZmFsc2UsIlNtYXJ0VGltZWxpbmVUYXNrUGVyY2VudGFnZUZpdCI6ZmFsc2V9LCJJc05ldyI6ZmFsc2UsIkltcG9ydFR5cGUiOjAsIkZpbGVQYXRoIjpudWxsLCJUaW1lQ29uZmlndXJhdGlvbiI6eyIkaWQiOiI0MTIiLCJVc2VUaW1lIjpmYWxzZSwiV29ya0RheVN0YXJ0IjoiMDA6MDA6MDAiLCJXb3JrRGF5RW5kIjoiMjM6NTk6MDAifSwiTGFzdFVzZWRUZW1wbGF0ZUlkIjoiOTVmYmYwZjctY2E2Yy00YmI5LWFlNzgtMWFhZjJjYTk2MGViIn0="/>
+  <p:tag name="__PART_0" val="eyIkaWQiOiIxIiwiQ3VsdHVyZUluZm9OYW1lIjoiZW4tVVMiLCJTdHlsZU5hbWUiOm51bGwsIlZlcnNpb24iOnsiJGlkIjoiMiIsIlZlcnNpb24iOiIzLjIuMCIsIk9yaWdpbmFsQXNzZW1ibHlWZXJzaW9uIjoiNC4wMS4wMC4wMCIsIkVkaXRpb24iOiJGcmVlIiwiSXNQbHVzRWRpdGlvbiI6ZmFsc2UsIklzUHJvRWRpdGlvbiI6ZmFsc2V9LCJFZmZlY3QiOjEsIlN0eWxlIjp7IiRpZCI6IjMiLCJUaW1lYmFuZFN0eWxlIjp7IiRpZCI6IjQiLCJTY2FsZU1hcmtpbmciOjAsIlNoYXBlIjozLCJTaGFwZVN0eWxlIjp7IiRpZCI6IjUiLCJNYXJnaW4iOnsiJGlkIjoiNiIsIlRvcCI6MCwiTGVmdCI6MTAsIlJpZ2h0IjoxMCwiQm90dG9tIjowfSwiUGFkZGluZyI6eyIkaWQiOiI3IiwiVG9wIjozLCJMZWZ0IjowLCJSaWdodCI6MCwiQm90dG9tIjozfSwiQmFja2dyb3VuZCI6eyIkaWQiOiI4IiwiQ29sb3IiOnsiJGlkIjoiOSIsIkEiOjI1NSwiUiI6MTc4LCJHIjoxNzgsIkIiOjE3OH19LCJJc1Zpc2libGUiOnRydWUsIldpZHRoIjowLjAsIkhlaWdodCI6MzAuMCwiQm9yZGVyU3R5bGUiOnsiJGlkIjoiMTAiLCJMaW5lQ29sb3IiOnsiJGlkIjoiMTEiLCIkdHlwZSI6Ik5MUkUuQ29tbW9uLkRvbS5Tb2xpZENvbG9yQnJ1c2gsIE5MUkUuQ29tbW9uIiwiQ29sb3IiOnsiJGlkIjoiMTIiLCJBIjoyNTUsIlIiOjI1NSwiRyI6MCwiQiI6MH19LCJMaW5lV2VpZ2h0IjowLjAsIkxpbmVUeXBlIjowLCJQYXJlbnRTdHlsZSI6bnVsbH0sIlBhcmVudFN0eWxlIjpudWxsfSwiUmlnaHRFbmRDYXBzU3R5bGUiOnsiJGlkIjoiMTMiLCJGb250U2V0dGluZ3MiOnsiJGlkIjoiMTQiLCJGb250U2l6ZSI6MTgsIkZvbnROYW1lIjoiQ2FsaWJyaSIsIklzQm9sZCI6dHJ1ZSwiSXNJdGFsaWMiOmZhbHNlLCJJc1VuZGVybGluZWQiOmZhbHNlLCJQYXJlbnRTdHlsZSI6bnVsbH0sIkF1dG9TaXplIjowLCJGb3JlZ3JvdW5kIjp7IiRpZCI6IjE1IiwiQ29sb3IiOnsiJGlkIjoiMTYiLCJBIjoyNTUsIlIiOjIzNywiRyI6MTI1LCJCIjo0OX19LCJNYXhXaWR0aCI6IkluZmluaXR5IiwiTWF4SGVpZ2h0IjoiSW5maW5pdHkiLCJTbWFydEZvcmVncm91bmRJc0FjdGl2ZSI6ZmFsc2UsIkhvcml6b250YWxBbGlnbm1lbnQiOjAsIlZlcnRpY2FsQWxpZ25tZW50IjowLCJTbWFydEZvcmVncm91bmQiOm51bGwsIkJhY2tncm91bmRGaWxsVHlwZSI6MCwiTWFyZ2luIjp7IiRpZCI6IjE3IiwiVG9wIjowLCJMZWZ0IjowLCJSaWdodCI6MjAsIkJvdHRvbSI6MH0sIlBhZGRpbmciOnsiJGlkIjoiMTgiLCJUb3AiOjAsIkxlZnQiOjAsIlJpZ2h0IjowLCJCb3R0b20iOjB9LCJCYWNrZ3JvdW5kIjp7IiRpZCI6IjE5IiwiQ29sb3IiOnsiJGlkIjoiMjAiLCJBIjo4OSwiUiI6MCwiRyI6MCwiQiI6MH19LCJJc1Zpc2libGUiOnRydWUsIldpZHRoIjowLjAsIkhlaWdodCI6MC4wLCJCb3JkZXJTdHlsZSI6bnVsbCwiUGFyZW50U3R5bGUiOm51bGx9LCJMZWZ0RW5kQ2Fwc1N0eWxlIjp7IiRpZCI6IjIxIiwiRm9udFNldHRpbmdzIjp7IiRpZCI6IjIyIiwiRm9udFNpemUiOjE4LCJGb250TmFtZSI6IkNhbGlicmkiLCJJc0JvbGQiOnRydWUsIklzSXRhbGljIjpmYWxzZSwiSXNVbmRlcmxpbmVkIjpmYWxzZSwiUGFyZW50U3R5bGUiOm51bGx9LCJBdXRvU2l6ZSI6MCwiRm9yZWdyb3VuZCI6eyIkaWQiOiIyMyIsIkNvbG9yIjp7IiRpZCI6IjI0IiwiQSI6MjU1LCJSIjoyMzcsIkciOjEyNSwiQiI6NDl9fSwiTWF4V2lkdGgiOiJJbmZpbml0eSIsIk1heEhlaWdodCI6IkluZmluaXR5IiwiU21hcnRGb3JlZ3JvdW5kSXNBY3RpdmUiOmZhbHNlLCJIb3Jpem9udGFsQWxpZ25tZW50IjowLCJWZXJ0aWNhbEFsaWdubWVudCI6MCwiU21hcnRGb3JlZ3JvdW5kIjpudWxsLCJCYWNrZ3JvdW5kRmlsbFR5cGUiOjAsIk1hcmdpbiI6eyIkaWQiOiIyNSIsIlRvcCI6MCwiTGVmdCI6MjAsIlJpZ2h0IjowLCJCb3R0b20iOjB9LCJQYWRkaW5nIjp7IiRpZCI6IjI2IiwiVG9wIjowLCJMZWZ0IjowLCJSaWdodCI6MCwiQm90dG9tIjowfSwiQmFja2dyb3VuZCI6eyIkaWQiOiIyNyIsIkNvbG9yIjp7IiRyZWYiOiIyMCJ9fSwiSXNWaXNpYmxlIjpmYWxzZSwiV2lkdGgiOjAuMCwiSGVpZ2h0IjowLjAsIkJvcmRlclN0eWxlIjpudWxsLCJQYXJlbnRTdHlsZSI6bnVsbH0sIlRvZGF5VGV4dFN0eWxlIjp7IiRpZCI6IjI4IiwiRm9udFNldHRpbmdzIjp7IiRpZCI6IjI5IiwiRm9udFNpemUiOjEyLCJGb250TmFtZSI6IkNhbGlicmkiLCJJc0JvbGQiOmZhbHNlLCJJc0l0YWxpYyI6ZmFsc2UsIklzVW5kZXJsaW5lZCI6ZmFsc2UsIlBhcmVudFN0eWxlIjpudWxsfSwiQXV0b1NpemUiOjAsIkZvcmVncm91bmQiOnsiJGlkIjoiMzAiLCJDb2xvciI6eyIkaWQiOiIzMSIsIkEiOjI1NSwiUiI6MCwiRyI6MCwiQiI6MH19LCJNYXhXaWR0aCI6MjAwLjAsIk1heEhlaWdodCI6IkluZmluaXR5IiwiU21hcnRGb3JlZ3JvdW5kSXNBY3RpdmUiOmZhbHNlLCJIb3Jpem9udGFsQWxpZ25tZW50IjowLCJWZXJ0aWNhbEFsaWdubWVudCI6MCwiU21hcnRGb3JlZ3JvdW5kIjpudWxsLCJCYWNrZ3JvdW5kRmlsbFR5cGUiOjAsIk1hcmdpbiI6eyIkaWQiOiIzMiIsIlRvcCI6MCwiTGVmdCI6MCwiUmlnaHQiOjAsIkJvdHRvbSI6MH0sIlBhZGRpbmciOnsiJGlkIjoiMzMiLCJUb3AiOjAsIkxlZnQiOjAsIlJpZ2h0IjowLCJCb3R0b20iOjB9LCJCYWNrZ3JvdW5kIjp7IiRpZCI6IjM0IiwiQ29sb3IiOnsiJHJlZiI6IjIwIn19LCJJc1Zpc2libGUiOnRydWUsIldpZHRoIjowLjAsIkhlaWdodCI6MC4wLCJCb3JkZXJTdHlsZSI6bnVsbCwiUGFyZW50U3R5bGUiOm51bGx9LCJUb2RheU1hcmtlclN0eWxlIjp7IiRpZCI6IjM1IiwiTWFyZ2luIjp7IiRpZCI6IjM2IiwiVG9wIjowLCJMZWZ0IjowLCJSaWdodCI6MCwiQm90dG9tIjowfSwiUGFkZGluZyI6eyIkaWQiOiIzNyIsIlRvcCI6MCwiTGVmdCI6MCwiUmlnaHQiOjAsIkJvdHRvbSI6MH0sIkJhY2tncm91bmQiOnsiJGlkIjoiMzgiLCJDb2xvciI6eyIkaWQiOiIzOSIsIkEiOjI1NSwiUiI6MjU1LCJHIjowLCJCIjowfX0sIklzVmlzaWJsZSI6dHJ1ZSwiV2lkdGgiOjAuMCwiSGVpZ2h0IjowLjAsIkJvcmRlclN0eWxlIjpudWxsLCJQYXJlbnRTdHlsZSI6bnVsbH0sIlNjYWxlU3R5bGUiOnsiJGlkIjoiNDAiLCJTaG93U2VnbWVudFNlcGFyYXRvcnMiOmZhbHNlLCJTZWdtZW50U2VwYXJhdG9yT3BhY2l0eSI6MzAsIkZvbnRTZXR0aW5ncyI6eyIkaWQiOiI0MSIsIkZvbnRTaXplIjoxMiwiRm9udE5hbWUiOiJDYWxpYnJpIiwiSXNCb2xkIjpmYWxzZSwiSXNJdGFsaWMiOmZhbHNlLCJJc1VuZGVybGluZWQiOmZhbHNlLCJQYXJlbnRTdHlsZSI6bnVsbH0sIkF1dG9TaXplIjowLCJGb3JlZ3JvdW5kIjp7IiRpZCI6IjQyIiwiQ29sb3IiOnsiJGlkIjoiNDMiLCJBIjoyNTUsIlIiOjAsIkciOjAsIkIiOjB9fSwiTWF4V2lkdGgiOjIwMC4wLCJNYXhIZWlnaHQiOiJJbmZpbml0eSIsIlNtYXJ0Rm9yZWdyb3VuZElzQWN0aXZlIjpmYWxzZSwiSG9yaXpvbnRhbEFsaWdubWVudCI6MCwiVmVydGljYWxBbGlnbm1lbnQiOjEsIlNtYXJ0Rm9yZWdyb3VuZCI6bnVsbCwiQmFja2dyb3VuZEZpbGxUeXBlIjowLCJNYXJnaW4iOnsiJGlkIjoiNDQiLCJUb3AiOjAsIkxlZnQiOjUsIlJpZ2h0IjowLCJCb3R0b20iOjB9LCJQYWRkaW5nIjp7IiRpZCI6IjQ1IiwiVG9wIjowLCJMZWZ0IjowLCJSaWdodCI6MCwiQm90dG9tIjowfSwiQmFja2dyb3VuZCI6eyIkaWQiOiI0NiIsIkNvbG9yIjp7IiRyZWYiOiIyMCJ9fSwiSXNWaXNpYmxlIjp0cnVlLCJXaWR0aCI6MC4wLCJIZWlnaHQiOjAuMCwiQm9yZGVyU3R5bGUiOm51bGwsIlBhcmVudFN0eWxlIjpudWxsfSwiRWxhcHNlZFRpbWVCYWNrZ3JvdW5kIjp7IiRpZCI6IjQ3IiwiQ29sb3IiOnsiJGlkIjoiNDgiLCJBIjo3NywiUiI6MjU1LCJHIjoxOTIsIkIiOjB9fSwiQXBwZW5kWWVhck9uWWVhckNoYW5nZSI6dHJ1ZSwiRWxhcHNlZFRpbWVGb3JtYXQiOjEsIlRvZGF5TWFya2VyUG9zaXRpb24iOjMsIlF1aWNrUG9zaXRpb24iOjIsIkFic29sdXRlUG9zaXRpb24iOjQwNS4wLCJNYXJnaW4iOnsiJGlkIjoiNDkiLCJUb3AiOjAsIkxlZnQiOjEwLCJSaWdodCI6MTAsIkJvdHRvbSI6MH0sIlBhZGRpbmciOnsiJGlkIjoiNTAiLCJUb3AiOjAsIkxlZnQiOjAsIlJpZ2h0IjowLCJCb3R0b20iOjB9LCJCYWNrZ3JvdW5kIjp7IiRpZCI6IjUxIiwiQ29sb3IiOnsiJGlkIjoiNTIiLCJBIjoyNTUsIlIiOjE3OCwiRyI6MTc4LCJCIjoxNzh9fSwiSXNWaXNpYmxlIjp0cnVlLCJXaWR0aCI6MC4wLCJIZWlnaHQiOjAuMCwiQm9yZGVyU3R5bGUiOm51bGwsIlBhcmVudFN0eWxlIjpudWxsfSwiRGVmYXVsdE1pbGVzdG9uZVN0eWxlIjp7IiRpZCI6IjUzIiwiU2hhcGUiOjcsIkNvbm5lY3Rvck1hcmdpbiI6eyIkaWQiOiI1NCIsIlRvcCI6MCwiTGVmdCI6MiwiUmlnaHQiOjIsIkJvdHRvbSI6MH0sIkNvbm5lY3RvclN0eWxlIjp7IiRpZCI6IjU1IiwiTGluZUNvbG9yIjp7IiRpZCI6IjU2IiwiJHR5cGUiOiJOTFJFLkNvbW1vbi5Eb20uU29saWRDb2xvckJydXNoLCBOTFJFLkNvbW1vbiIsIkNvbG9yIjp7IiRpZCI6IjU3IiwiQSI6MTI3LCJSIjozMSwiRyI6NzMsIkIiOjEyNn19LCJMaW5lV2VpZ2h0IjoxLjAsIkxpbmVUeXBlIjowLCJQYXJlbnRTdHlsZSI6bnVsbH0sIklzQmVsb3dUaW1lYmFuZCI6ZmFsc2UsIlBvc2l0aW9uT25UYXNrIjowLCJIaWRlRGF0ZSI6ZmFsc2UsIlNoYXBlU2l6ZSI6MSwiU3BhY2luZyI6Mi4wLCJQYWRkaW5nIjp7IiRpZCI6IjU4IiwiVG9wIjo3LCJMZWZ0IjozLCJSaWdodCI6MCwiQm90dG9tIjoyfSwiU2hhcGVTdHlsZSI6eyIkaWQiOiI1OSIsIk1hcmdpbiI6eyIkaWQiOiI2MCIsIlRvcCI6MCwiTGVmdCI6MCwiUmlnaHQiOjAsIkJvdHRvbSI6MH0sIlBhZGRpbmciOnsiJGlkIjoiNjEiLCJUb3AiOjAsIkxlZnQiOjAsIlJpZ2h0IjowLCJCb3R0b20iOjB9LCJCYWNrZ3JvdW5kIjp7IiRpZCI6IjYyIiwiQ29sb3IiOnsiJGlkIjoiNjMiLCJBIjoyNTUsIlIiOjAsIkciOjExNCwiQiI6MTg4fX0sIklzVmlzaWJsZSI6dHJ1ZSwiV2lkdGgiOjE4LjAsIkhlaWdodCI6MjAuMCwiQm9yZGVyU3R5bGUiOnsiJGlkIjoiNjQiLCJMaW5lQ29sb3IiOnsiJGlkIjoiNjUiLCIkdHlwZSI6Ik5MUkUuQ29tbW9uLkRvbS5Tb2xpZENvbG9yQnJ1c2gsIE5MUkUuQ29tbW9uIiwiQ29sb3IiOnsiJGlkIjoiNjYiLCJBIjoyNTUsIlIiOjI1NSwiRyI6MCwiQiI6MH19LCJMaW5lV2VpZ2h0IjowLjAsIkxpbmVUeXBlIjowLCJQYXJlbnRTdHlsZSI6bnVsbH0sIlBhcmVudFN0eWxlIjpudWxsfSwiVGl0bGVTdHlsZSI6eyIkaWQiOiI2NyIsIkZvbnRTZXR0aW5ncyI6eyIkaWQiOiI2OCIsIkZvbnRTaXplIjoxMSwiRm9udE5hbWUiOiJDYWxpYnJpIiwiSXNCb2xkIjp0cnVlLCJJc0l0YWxpYyI6ZmFsc2UsIklzVW5kZXJsaW5lZCI6ZmFsc2UsIlBhcmVudFN0eWxlIjpudWxsfSwiQXV0b1NpemUiOjAsIkZvcmVncm91bmQiOnsiJGlkIjoiNjkiLCJDb2xvciI6eyIkaWQiOiI3MCIsIkEiOjI1NSwiUiI6MCwiRyI6MCwiQiI6MH19LCJNYXhXaWR0aCI6MjAwLjAsIk1heEhlaWdodCI6IkluZmluaXR5IiwiU21hcnRGb3JlZ3JvdW5kSXNBY3RpdmUiOmZhbHNlLCJIb3Jpem9udGFsQWxpZ25tZW50IjoxLCJWZXJ0aWNhbEFsaWdubWVudCI6MCwiU21hcnRGb3JlZ3JvdW5kIjpudWxsLCJCYWNrZ3JvdW5kRmlsbFR5cGUiOjAsIk1hcmdpbiI6eyIkaWQiOiI3MSIsIlRvcCI6MCwiTGVmdCI6MCwiUmlnaHQiOjAsIkJvdHRvbSI6MH0sIlBhZGRpbmciOnsiJGlkIjoiNzIiLCJUb3AiOjAsIkxlZnQiOjAsIlJpZ2h0IjowLCJCb3R0b20iOjB9LCJCYWNrZ3JvdW5kIjp7IiRpZCI6IjczIiwiQ29sb3IiOnsiJHJlZiI6IjIwIn19LCJJc1Zpc2libGUiOnRydWUsIldpZHRoIjowLjAsIkhlaWdodCI6MC4wLCJCb3JkZXJTdHlsZSI6bnVsbCwiUGFyZW50U3R5bGUiOm51bGx9LCJEYXRlU3R5bGUiOnsiJGlkIjoiNzQiLCJGb250U2V0dGluZ3MiOnsiJGlkIjoiNzUiLCJGb250U2l6ZSI6MTAsIkZvbnROYW1lIjoiQ2FsaWJyaSIsIklzQm9sZCI6ZmFsc2UsIklzSXRhbGljIjpmYWxzZSwiSXNVbmRlcmxpbmVkIjpmYWxzZSwiUGFyZW50U3R5bGUiOm51bGx9LCJBdXRvU2l6ZSI6MCwiRm9yZWdyb3VuZCI6eyIkaWQiOiI3NiIsIkNvbG9yIjp7IiRpZCI6Ijc3IiwiQSI6MjU1LCJSIjo2OCwiRyI6ODQsIkIiOjEwNn19LCJNYXhXaWR0aCI6MjAwLjAsIk1heEhlaWdodCI6IkluZmluaXR5IiwiU21hcnRGb3JlZ3JvdW5kSXNBY3RpdmUiOmZhbHNlLCJIb3Jpem9udGFsQWxpZ25tZW50IjowLCJWZXJ0aWNhbEFsaWdubWVudCI6MCwiU21hcnRGb3JlZ3JvdW5kIjpudWxsLCJCYWNrZ3JvdW5kRmlsbFR5cGUiOjAsIk1hcmdpbiI6eyIkaWQiOiI3OCIsIlRvcCI6MCwiTGVmdCI6MCwiUmlnaHQiOjAsIkJvdHRvbSI6MH0sIlBhZGRpbmciOnsiJGlkIjoiNzkiLCJUb3AiOjAsIkxlZnQiOjAsIlJpZ2h0IjowLCJCb3R0b20iOjB9LCJCYWNrZ3JvdW5kIjp7IiRpZCI6IjgwIiwiQ29sb3IiOnsiJHJlZiI6IjIwIn19LCJJc1Zpc2libGUiOnRydWUsIldpZHRoIjowLjAsIkhlaWdodCI6MC4wLCJCb3JkZXJTdHlsZSI6bnVsbCwiUGFyZW50U3R5bGUiOm51bGx9LCJEYXRlRm9ybWF0Ijp7IiRpZCI6IjgxIiwiRm9ybWF0U3RyaW5nIjoiTU1NIGQiLCJTZXBhcmF0b3IiOiIvIiwiVXNlSW50ZXJuYXRpb25hbERhdGVGb3JtYXQiOmZhbHNlLCJEYXRlSXNWaXNpYmxlIjp0cnVlLCJUaW1lSXNWaXNpYmxlIjpmYWxzZSwiSG91ckRpZ2l0cyI6MSwiQW1QbURlc2lnbmF0b3IiOjIsIlRyaW0wME1pbnV0ZXMiOmZhbHNlLCJMYXN0S25vd25WaXNpYmlsaXR5U3RhdGUiOm51bGx9LCJJc1Zpc2libGUiOnRydWUsIlBhcmVudFN0eWxlIjpudWxsfSwiRGVmYXVsdFRhc2tTdHlsZSI6eyIkaWQiOiI4MiIsIlNoYXBlIjowLCJTaGFwZVRoaWNrbmVzcyI6MiwiRHVyYXRpb25Gb3JtYXQiOjAsIkluY2x1ZGVOb25Xb3JraW5nRGF5c0luRHVyYXRpb24iOmZhbHNlLCJQZXJjZW50YWdlQ29tcGxldGVTdHlsZSI6eyIkaWQiOiI4MyIsIkZvbnRTZXR0aW5ncyI6eyIkaWQiOiI4NCIsIkZvbnRTaXplIjoxMCwiRm9udE5hbWUiOiJDYWxpYnJpIiwiSXNCb2xkIjpmYWxzZSwiSXNJdGFsaWMiOmZhbHNlLCJJc1VuZGVybGluZWQiOmZhbHNlLCJQYXJlbnRTdHlsZSI6bnVsbH0sIkF1dG9TaXplIjowLCJGb3JlZ3JvdW5kIjp7IiRpZCI6Ijg1IiwiQ29sb3IiOnsiJGlkIjoiODYiLCJBIjoyNTUsIlIiOjIzOCwiRyI6MjM2LCJCIjoyMjV9fSwiTWF4V2lkdGgiOjIwMC4wLCJNYXhIZWlnaHQiOiJJbmZpbml0eSIsIlNtYXJ0Rm9yZWdyb3VuZElzQWN0aXZlIjpmYWxzZSwiSG9yaXpvbnRhbEFsaWdubWVudCI6MSwiVmVydGljYWxBbGlnbm1lbnQiOjAsIlNtYXJ0Rm9yZWdyb3VuZCI6bnVsbCwiQmFja2dyb3VuZEZpbGxUeXBlIjowLCJNYXJnaW4iOnsiJGlkIjoiODciLCJUb3AiOjAsIkxlZnQiOjAsIlJpZ2h0IjowLCJCb3R0b20iOjB9LCJQYWRkaW5nIjp7IiRpZCI6Ijg4IiwiVG9wIjowLCJMZWZ0IjowLCJSaWdodCI6MCwiQm90dG9tIjowfSwiQmFja2dyb3VuZCI6eyIkaWQiOiI4OSIsIkNvbG9yIjp7IiRyZWYiOiIyMCJ9fSwiSXNWaXNpYmxlIjp0cnVlLCJXaWR0aCI6MC4wLCJIZWlnaHQiOjAuMCwiQm9yZGVyU3R5bGUiOm51bGwsIlBhcmVudFN0eWxlIjpudWxsfSwiRHVyYXRpb25TdHlsZSI6eyIkaWQiOiI5MCIsIkZvbnRTZXR0aW5ncyI6eyIkaWQiOiI5MSIsIkZvbnRTaXplIjoxMCwiRm9udE5hbWUiOiJDYWxpYnJpIiwiSXNCb2xkIjpmYWxzZSwiSXNJdGFsaWMiOmZhbHNlLCJJc1VuZGVybGluZWQiOmZhbHNlLCJQYXJlbnRTdHlsZSI6bnVsbH0sIkF1dG9TaXplIjowLCJGb3JlZ3JvdW5kIjp7IiRpZCI6IjkyIiwiQ29sb3IiOnsiJGlkIjoiOTMiLCJBIjoyNTUsIlIiOjIzNywiRyI6MTI1LCJCIjo0OX19LCJNYXhXaWR0aCI6MjAwLjAsIk1heEhlaWdodCI6IkluZmluaXR5IiwiU21hcnRGb3JlZ3JvdW5kSXNBY3RpdmUiOmZhbHNlLCJIb3Jpem9udGFsQWxpZ25tZW50IjowLCJWZXJ0aWNhbEFsaWdubWVudCI6MCwiU21hcnRGb3JlZ3JvdW5kIjpudWxsLCJCYWNrZ3JvdW5kRmlsbFR5cGUiOjAsIk1hcmdpbiI6eyIkaWQiOiI5NCIsIlRvcCI6MCwiTGVmdCI6MCwiUmlnaHQiOjAsIkJvdHRvbSI6MH0sIlBhZGRpbmciOnsiJGlkIjoiOTUiLCJUb3AiOjAsIkxlZnQiOjAsIlJpZ2h0IjowLCJCb3R0b20iOjB9LCJCYWNrZ3JvdW5kIjp7IiRpZCI6Ijk2IiwiQ29sb3IiOnsiJHJlZiI6IjIwIn19LCJJc1Zpc2libGUiOnRydWUsIldpZHRoIjowLjAsIkhlaWdodCI6MC4wLCJCb3JkZXJTdHlsZSI6bnVsbCwiUGFyZW50U3R5bGUiOm51bGx9LCJIb3Jpem9udGFsQ29ubmVjdG9yU3R5bGUiOnsiJGlkIjoiOTciLCJMaW5lQ29sb3IiOnsiJGlkIjoiOTgiLCIkdHlwZSI6Ik5MUkUuQ29tbW9uLkRvbS5Tb2xpZENvbG9yQnJ1c2gsIE5MUkUuQ29tbW9uIiwiQ29sb3IiOnsiJGlkIjoiOTkiLCJBIjoyNTUsIlIiOjIwNCwiRyI6MjA0LCJCIjoyMDR9fSwiTGluZVdlaWdodCI6MS4wLCJMaW5lVHlwZSI6MCwiUGFyZW50U3R5bGUiOm51bGx9LCJWZXJ0aWNhbENvbm5lY3RvclN0eWxlIjp7IiRpZCI6IjEwMCIsIkxpbmVDb2xvciI6eyIkaWQiOiIxMDEiLCIkdHlwZSI6Ik5MUkUuQ29tbW9uLkRvbS5Tb2xpZENvbG9yQnJ1c2gsIE5MUkUuQ29tbW9uIiwiQ29sb3IiOnsiJGlkIjoiMTAyIiwiQSI6MjU1LCJSIjoyMDQsIkciOjIwNCwiQiI6MjA0fX0sIkxpbmVXZWlnaHQiOjEuMCwiTGluZVR5cGUiOjAsIlBhcmVudFN0eWxlIjpudWxsfSwiTWFyZ2luIjpudWxsLCJTdGFydERhdGVQb3NpdGlvbiI6NCwiRW5kRGF0ZVBvc2l0aW9uIjo0LCJEYXRlSXNWaXNpYmxlIjp0cnVlLCJUaXRsZVBvc2l0aW9uIjoyLCJEdXJhdGlvblBvc2l0aW9uIjo2LCJQZXJjZW50YWdlQ29tcGxldGVkUG9zaXRpb24iOjIsIlNwYWNpbmciOjUsIklzQmVsb3dUaW1lYmFuZCI6ZmFsc2UsIlBlcmNlbnRhZ2VDb21wbGV0ZVNoYXBlT3BhY2l0eSI6MzUsIlNoYXBlU3R5bGUiOnsiJGlkIjoiMTAzIiwiTWFyZ2luIjp7IiRpZCI6IjEwNCIsIlRvcCI6MCwiTGVmdCI6NCwiUmlnaHQiOjQsIkJvdHRvbSI6MH0sIlBhZGRpbmciOnsiJGlkIjoiMTA1IiwiVG9wIjowLCJMZWZ0IjowLCJSaWdodCI6MCwiQm90dG9tIjowfSwiQmFja2dyb3VuZCI6eyIkaWQiOiIxMDYiLCJDb2xvciI6eyIkaWQiOiIxMDciLCJBIjoyNTUsIlIiOjAsIkciOjExNCwiQiI6MTg4fX0sIklzVmlzaWJsZSI6dHJ1ZSwiV2lkdGgiOjAuMCwiSGVpZ2h0IjoyMi4wLCJCb3JkZXJTdHlsZSI6eyIkaWQiOiIxMDgiLCJMaW5lQ29sb3IiOnsiJGlkIjoiMTA5IiwiJHR5cGUiOiJOTFJFLkNvbW1vbi5Eb20uU29saWRDb2xvckJydXNoLCBOTFJFLkNvbW1vbiIsIkNvbG9yIjp7IiRpZCI6IjExMCIsIkEiOjI1NSwiUiI6MjU1LCJHIjowLCJCIjowfX0sIkxpbmVXZWlnaHQiOjAuMCwiTGluZVR5cGUiOjAsIlBhcmVudFN0eWxlIjpudWxsfSwiUGFyZW50U3R5bGUiOm51bGx9LCJUaXRsZVN0eWxlIjp7IiRpZCI6IjExMSIsIkZvbnRTZXR0aW5ncyI6eyIkaWQiOiIxMTIiLCJGb250U2l6ZSI6MTEsIkZvbnROYW1lIjoiQ2FsaWJyaSIsIklzQm9sZCI6dHJ1ZSwiSXNJdGFsaWMiOmZhbHNlLCJJc1VuZGVybGluZWQiOmZhbHNlLCJQYXJlbnRTdHlsZSI6bnVsbH0sIkF1dG9TaXplIjowLCJGb3JlZ3JvdW5kIjp7IiRpZCI6IjExMyIsIkNvbG9yIjp7IiRpZCI6IjExNCIsIkEiOjI1NSwiUiI6MCwiRyI6MCwiQiI6MH19LCJNYXhXaWR0aCI6OTYwLjAsIk1heEhlaWdodCI6IkluZmluaXR5IiwiU21hcnRGb3JlZ3JvdW5kSXNBY3RpdmUiOmZhbHNlLCJIb3Jpem9udGFsQWxpZ25tZW50IjoxLCJWZXJ0aWNhbEFsaWdubWVudCI6MCwiU21hcnRGb3JlZ3JvdW5kIjpudWxsLCJCYWNrZ3JvdW5kRmlsbFR5cGUiOjAsIk1hcmdpbiI6eyIkaWQiOiIxMTUiLCJUb3AiOjAsIkxlZnQiOjAsIlJpZ2h0IjowLCJCb3R0b20iOjB9LCJQYWRkaW5nIjp7IiRpZCI6IjExNiIsIlRvcCI6MCwiTGVmdCI6MCwiUmlnaHQiOjAsIkJvdHRvbSI6MH0sIkJhY2tncm91bmQiOnsiJGlkIjoiMTE3IiwiQ29sb3IiOnsiJHJlZiI6IjIwIn19LCJJc1Zpc2libGUiOnRydWUsIldpZHRoIjowLjAsIkhlaWdodCI6MC4wLCJCb3JkZXJTdHlsZSI6bnVsbCwiUGFyZW50U3R5bGUiOm51bGx9LCJEYXRlU3R5bGUiOnsiJGlkIjoiMTE4IiwiRm9udFNldHRpbmdzIjp7IiRpZCI6IjExOSIsIkZvbnRTaXplIjoxMCwiRm9udE5hbWUiOiJDYWxpYnJpIiwiSXNCb2xkIjpmYWxzZSwiSXNJdGFsaWMiOmZhbHNlLCJJc1VuZGVybGluZWQiOmZhbHNlLCJQYXJlbnRTdHlsZSI6bnVsbH0sIkF1dG9TaXplIjowLCJGb3JlZ3JvdW5kIjp7IiRpZCI6IjEyMCIsIkNvbG9yIjp7IiRpZCI6IjEyMSIsIkEiOjI1NSwiUiI6NjgsIkciOjg0LCJCIjoxMDZ9fSwiTWF4V2lkdGgiOjIwMC4wLCJNYXhIZWlnaHQiOiJJbmZpbml0eSIsIlNtYXJ0Rm9yZWdyb3VuZElzQWN0aXZlIjpmYWxzZSwiSG9yaXpvbnRhbEFsaWdubWVudCI6MCwiVmVydGljYWxBbGlnbm1lbnQiOjAsIlNtYXJ0Rm9yZWdyb3VuZCI6bnVsbCwiQmFja2dyb3VuZEZpbGxUeXBlIjowLCJNYXJnaW4iOnsiJGlkIjoiMTIyIiwiVG9wIjowLCJMZWZ0IjowLCJSaWdodCI6MCwiQm90dG9tIjowfSwiUGFkZGluZyI6eyIkaWQiOiIxMjMiLCJUb3AiOjAsIkxlZnQiOjAsIlJpZ2h0IjowLCJCb3R0b20iOjB9LCJCYWNrZ3JvdW5kIjp7IiRpZCI6IjEyNCIsIkNvbG9yIjp7IiRyZWYiOiIyMCJ9fSwiSXNWaXNpYmxlIjp0cnVlLCJXaWR0aCI6MC4wLCJIZWlnaHQiOjAuMCwiQm9yZGVyU3R5bGUiOm51bGwsIlBhcmVudFN0eWxlIjpudWxsfSwiRGF0ZUZvcm1hdCI6eyIkaWQiOiIxMjUiLCJGb3JtYXRTdHJpbmciOiJNTU0gZCIsIlNlcGFyYXRvciI6Ii8iLCJVc2VJbnRlcm5hdGlvbmFsRGF0ZUZvcm1hdCI6ZmFsc2UsIkRhdGVJc1Zpc2libGUiOnRydWUsIlRpbWVJc1Zpc2libGUiOmZhbHNlLCJIb3VyRGlnaXRzIjoxLCJBbVBtRGVzaWduYXRvciI6MiwiVHJpbTAwTWludXRlcyI6ZmFsc2UsIkxhc3RLbm93blZpc2liaWxpdHlTdGF0ZSI6bnVsbH0sIklzVmlzaWJsZSI6dHJ1ZSwiUGFyZW50U3R5bGUiOm51bGwsIl9leHBsaWNpdGx5U2V0Ijp7IiRpZCI6IjEyNiIsIlNoYXBlU3R5bGUiOmZhbHNlLCJUaXRsZVN0eWxlIjpmYWxzZSwiRGF0ZVN0eWxlIjpmYWxzZSwiSG9yaXpvbnRhbENvbm5lY3RvclN0eWxlIjpmYWxzZSwiVmVydGljYWxDb25uZWN0b3JTdHlsZSI6ZmFsc2UsIlBlcmNlbnRhZ2VDb21wbGV0ZVNoYXBlT3BhY2l0eSI6ZmFsc2UsIlNoYXBlIjpmYWxzZSwiU2hhcGVUaGlja25lc3MiOmZhbHNlLCJEdXJhdGlvbkZvcm1hdCI6ZmFsc2UsIkluY2x1ZGVOb25Xb3JraW5nRGF5c0luRHVyYXRpb24iOmZhbHNlLCJNYXJnaW4iOmZhbHNlLCJTdGFydERhdGVQb3NpdGlvbiI6ZmFsc2UsIkVuZERhdGVQb3NpdGlvbiI6ZmFsc2UsIlRpdGxlUG9zaXRpb24iOmZhbHNlLCJEdXJhdGlvblBvc2l0aW9uIjpmYWxzZSwiUGVyY2VudGFnZUNvbXBsZXRlZFBvc2l0aW9uIjpmYWxzZSwiU3BhY2luZyI6ZmFsc2UsIklzQmVsb3dUaW1lYmFuZCI6ZmFsc2UsIkRhdGVGb3JtYXQiOmZhbHNlLCJJc1Zpc2libGUiOmZhbHNlfX0sIkdyaWRsaW5lUGFuZWxTdHlsZSI6eyIkaWQiOiIxMjciLCJHcmlkbGluZVN0eWxlIjp7IiRpZCI6IjEyOCIsIkxpbmVDb2xvciI6eyIkaWQiOiIxMjkiLCIkdHlwZSI6Ik5MUkUuQ29tbW9uLkRvbS5Tb2xpZENvbG9yQnJ1c2gsIE5MUkUuQ29tbW9uIiwiQ29sb3IiOnsiJGlkIjoiMTMwIiwiQSI6MzgsIlIiOjkxLCJHIjoxNTUsIkIiOjIxM319LCJMaW5lV2VpZ2h0IjoxLjAsIkxpbmVUeXBlIjowLCJQYXJlbnRTdHlsZSI6bnVsbH0sIk1hcmdpbiI6eyIkaWQiOiIxMzEiLCJUb3AiOjAsIkxlZnQiOjAsIlJpZ2h0IjowLCJCb3R0b20iOjB9LCJQYWRkaW5nIjp7IiRpZCI6IjEzMiIsIlRvcCI6MCwiTGVmdCI6MCwiUmlnaHQiOjAsIkJvdHRvbSI6MH0sIkJhY2tncm91bmQiOm51bGwsIklzVmlzaWJsZSI6dHJ1ZSwiV2lkdGgiOjAuMCwiSGVpZ2h0IjowLjAsIkJvcmRlclN0eWxlIjp7IiRpZCI6IjEzMyIsIkxpbmVDb2xvciI6bnVsbCwiTGluZVdlaWdodCI6MC4wLCJMaW5lVHlwZSI6MCwiUGFyZW50U3R5bGUiOm51bGx9LCJQYXJlbnRTdHlsZSI6bnVsbH0sIlNob3dFbGFwc2VkVGltZUdyYWRpZW50U3R5bGUiOnRydWUsIkRlZmF1bHRTd2ltbGFuZVN0eWxlIjp7IiRpZCI6IjEzNCIsIkhlYWRlclN0eWxlIjp7IiRpZCI6IjEzNSIsIlRleHRTdHlsZSI6eyIkaWQiOiIxMzYiLCJGb250U2V0dGluZ3MiOnsiJGlkIjoiMTM3IiwiRm9udFNpemUiOjEyLCJGb250TmFtZSI6IkNhbGlicmkiLCJJc0JvbGQiOmZhbHNlLCJJc0l0YWxpYyI6ZmFsc2UsIklzVW5kZXJsaW5lZCI6ZmFsc2UsIlBhcmVudFN0eWxlIjpudWxsfSwiQXV0b1NpemUiOjAsIkZvcmVncm91bmQiOnsiJGlkIjoiMTM4IiwiQ29sb3IiOnsiJGlkIjoiMTM5IiwiQSI6MjU1LCJSIjozMiwiRyI6NTYsIkIiOjEwMH19LCJNYXhXaWR0aCI6MC4wLCJNYXhIZWlnaHQiOjAuMCwiU21hcnRGb3JlZ3JvdW5kSXNBY3RpdmUiOmZhbHNlLCJIb3Jpem9udGFsQWxpZ25tZW50IjowLCJWZXJ0aWNhbEFsaWdubWVudCI6MCwiU21hcnRGb3JlZ3JvdW5kIjpudWxsLCJCYWNrZ3JvdW5kRmlsbFR5cGUiOjAsIk1hcmdpbiI6eyIkaWQiOiIxNDAiLCJUb3AiOjAsIkxlZnQiOjAsIlJpZ2h0IjowLCJCb3R0b20iOjB9LCJQYWRkaW5nIjp7IiRpZCI6IjE0MSIsIlRvcCI6MCwiTGVmdCI6MCwiUmlnaHQiOjAsIkJvdHRvbSI6MH0sIkJhY2tncm91bmQiOm51bGwsIklzVmlzaWJsZSI6ZmFsc2UsIldpZHRoIjowLjAsIkhlaWdodCI6MC4wLCJCb3JkZXJTdHlsZSI6bnVsbCwiUGFyZW50U3R5bGUiOm51bGx9LCJSZWN0YW5nbGVTdHlsZSI6eyIkaWQiOiIxNDIiLCJNYXJnaW4iOnsiJGlkIjoiMTQzIiwiVG9wIjowLCJMZWZ0IjowLCJSaWdodCI6MCwiQm90dG9tIjowfSwiUGFkZGluZyI6eyIkaWQiOiIxNDQiLCJUb3AiOjAsIkxlZnQiOjAsIlJpZ2h0IjowLCJCb3R0b20iOjB9LCJCYWNrZ3JvdW5kIjp7IiRpZCI6IjE0NSIsIkNvbG9yIjp7IiRpZCI6IjE0NiIsIkEiOjEyNywiUiI6OTEsIkciOjE1NSwiQiI6MjEzfX0sIklzVmlzaWJsZSI6ZmFsc2UsIldpZHRoIjowLjAsIkhlaWdodCI6MC4wLCJCb3JkZXJTdHlsZSI6eyIkaWQiOiIxNDciLCJMaW5lQ29sb3IiOnsiJGlkIjoiMTQ4IiwiJHR5cGUiOiJOTFJFLkNvbW1vbi5Eb20uU29saWRDb2xvckJydXNoLCBOTFJFLkNvbW1vbiIsIkNvbG9yIjp7IiRpZCI6IjE0OSIsIkEiOjI1NSwiUiI6MjU1LCJHIjowLCJCIjowfX0sIkxpbmVXZWlnaHQiOjAuMCwiTGluZVR5cGUiOjAsIlBhcmVudFN0eWxlIjpudWxsfSwiUGFyZW50U3R5bGUiOm51bGx9LCJNYXJnaW4iOnsiJGlkIjoiMTUwIiwiVG9wIjowLCJMZWZ0IjowLCJSaWdodCI6MCwiQm90dG9tIjowfSwiUGFkZGluZyI6eyIkaWQiOiIxNTEiLCJUb3AiOjAsIkxlZnQiOjAsIlJpZ2h0IjowLCJCb3R0b20iOjB9LCJCYWNrZ3JvdW5kIjpudWxsLCJJc1Zpc2libGUiOnRydWUsIldpZHRoIjowLjAsIkhlaWdodCI6MC4wLCJCb3JkZXJTdHlsZSI6bnVsbCwiUGFyZW50U3R5bGUiOm51bGx9LCJCYWNrZ3JvdW5kU3R5bGUiOnsiJGlkIjoiMTUyIiwiTWFyZ2luIjp7IiRpZCI6IjE1MyIsIlRvcCI6MCwiTGVmdCI6MCwiUmlnaHQiOjAsIkJvdHRvbSI6MH0sIlBhZGRpbmciOnsiJGlkIjoiMTU0IiwiVG9wIjowLCJMZWZ0IjowLCJSaWdodCI6MCwiQm90dG9tIjowfSwiQmFja2dyb3VuZCI6eyIkaWQiOiIxNTUiLCJDb2xvciI6eyIkaWQiOiIxNTYiLCJBIjozOCwiUiI6OTEsIkciOjE1NSwiQiI6MjEzfX0sIklzVmlzaWJsZSI6dHJ1ZSwiV2lkdGgiOjAuMCwiSGVpZ2h0IjowLjAsIkJvcmRlclN0eWxlIjp7IiRpZCI6IjE1NyIsIkxpbmVDb2xvciI6eyIkaWQiOiIxNTgiLCIkdHlwZSI6Ik5MUkUuQ29tbW9uLkRvbS5Tb2xpZENvbG9yQnJ1c2gsIE5MUkUuQ29tbW9uIiwiQ29sb3IiOnsiJGlkIjoiMTU5IiwiQSI6MjU1LCJSIjoyNTUsIkciOjAsIkIiOjB9fSwiTGluZVdlaWdodCI6MC4wLCJMaW5lVHlwZSI6MCwiUGFyZW50U3R5bGUiOm51bGx9LCJQYXJlbnRTdHlsZSI6bnVsbH0sIklzQWJvdmVUaW1lYmFuZCI6ZmFsc2UsIk1hcmdpbiI6eyIkaWQiOiIxNjAiLCJUb3AiOjAsIkxlZnQiOjAsIlJpZ2h0IjowLCJCb3R0b20iOjB9LCJQYWRkaW5nIjp7IiRpZCI6IjE2MSIsIlRvcCI6MCwiTGVmdCI6MCwiUmlnaHQiOjAsIkJvdHRvbSI6MH0sIklzVmlzaWJsZSI6dHJ1ZSwiV2lkdGgiOjAuMCwiSGVpZ2h0IjowLjAsIkJvcmRlclN0eWxlIjpudWxsLCJQYXJlbnRTdHlsZSI6bnVsbH19LCJTY2FsZSI6eyIkaWQiOiIxNjIiLCJTdGFydERhdGUiOiIwMDAxLTAxLTAxVDAwOjAwOjAwIiwiRW5kRGF0ZSI6IjIwMjAtMDMtMjBUMjM6NTk6MDAiLCJGb3JtYXQiOiJNTU0iLCJUeXBlIjoyLCJBdXRvRGF0ZVJhbmdlIjp0cnVlLCJXb3JraW5nRGF5cyI6MzEsIlRvZGF5TWFya2VyVGV4dCI6IlRvZGF5IiwiQXV0b1NjYWxlVHlwZSI6dHJ1ZX0sIk1pbGVzdG9uZXMiOltdLCJUYXNrcyI6W3siJGlkIjoiMTYzIiwiR3JvdXBOYW1lIjpudWxsLCJTdGFydERhdGUiOiIyMDE5LTExLTExVDAwOjAwOjAwIiwiRW5kRGF0ZSI6IjIwMTktMTEtMjJUMjM6NTk6MDAiLCJQZXJjZW50YWdlQ29tcGxldGUiOjEwMC4wLCJTdHlsZSI6eyIkaWQiOiIxNjQiLCJTaGFwZSI6MCwiU2hhcGVUaGlja25lc3MiOjIsIkR1cmF0aW9uRm9ybWF0IjowLCJJbmNsdWRlTm9uV29ya2luZ0RheXNJbkR1cmF0aW9uIjpmYWxzZSwiUGVyY2VudGFnZUNvbXBsZXRlU3R5bGUiOnsiJGlkIjoiMTY1IiwiRm9udFNldHRpbmdzIjp7IiRpZCI6IjE2NiIsIkZvbnRTaXplIjoxMCwiRm9udE5hbWUiOiJDYWxpYnJpIiwiSXNCb2xkIjpmYWxzZSwiSXNJdGFsaWMiOmZhbHNlLCJJc1VuZGVybGluZWQiOmZhbHNlLCJQYXJlbnRTdHlsZSI6bnVsbH0sIkF1dG9TaXplIjowLCJGb3JlZ3JvdW5kIjp7IiRyZWYiOiI4NSJ9LCJNYXhXaWR0aCI6MjAwLjAsIk1heEhlaWdodCI6IkluZmluaXR5IiwiU21hcnRGb3JlZ3JvdW5kSXNBY3RpdmUiOmZhbHNlLCJIb3Jpem9udGFsQWxpZ25tZW50IjowLCJWZXJ0aWNhbEFsaWdubWVudCI6MCwiU21hcnRGb3JlZ3JvdW5kIjpudWxsLCJCYWNrZ3JvdW5kRmlsbFR5cGUiOjAsIk1hcmdpbiI6eyIkaWQiOiIxNjciLCJUb3AiOjAsIkxlZnQiOjAsIlJpZ2h0IjowLCJCb3R0b20iOjB9LCJQYWRkaW5nIjp7IiRpZCI6IjE2OCIsIlRvcCI6MCwiTGVmdCI6MCwiUmlnaHQiOjAsIkJvdHRvbSI6MH0sIkJhY2tncm91bmQiOnsiJHJlZiI6Ijg5In0sIklzVmlzaWJsZSI6dHJ1ZSwiV2lkdGgiOjAuMCwiSGVpZ2h0IjowLjAsIkJvcmRlclN0eWxlIjp7IiRpZCI6IjE2OSIsIkxpbmVDb2xvciI6bnVsbCwiTGluZVdlaWdodCI6MC4wLCJMaW5lVHlwZSI6MCwiUGFyZW50U3R5bGUiOm51bGx9LCJQYXJlbnRTdHlsZSI6bnVsbH0sIkR1cmF0aW9uU3R5bGUiOnsiJGlkIjoiMTcwIiwiRm9udFNldHRpbmdzIjp7IiRpZCI6IjE3MSIsIkZvbnRTaXplIjoxMCwiRm9udE5hbWUiOiJDYWxpYnJpIiwiSXNCb2xkIjpmYWxzZSwiSXNJdGFsaWMiOmZhbHNlLCJJc1VuZGVybGluZWQiOmZhbHNlLCJQYXJlbnRTdHlsZSI6bnVsbH0sIkF1dG9TaXplIjowLCJGb3JlZ3JvdW5kIjp7IiRpZCI6IjE3MiIsIkNvbG9yIjp7IiRyZWYiOiI5MyJ9fSwiTWF4V2lkdGgiOjIwMC4wLCJNYXhIZWlnaHQiOiJJbmZpbml0eSIsIlNtYXJ0Rm9yZWdyb3VuZElzQWN0aXZlIjpmYWxzZSwiSG9yaXpvbnRhbEFsaWdubWVudCI6MCwiVmVydGljYWxBbGlnbm1lbnQiOjAsIlNtYXJ0Rm9yZWdyb3VuZCI6bnVsbCwiQmFja2dyb3VuZEZpbGxUeXBlIjowLCJNYXJnaW4iOnsiJGlkIjoiMTczIiwiVG9wIjowLCJMZWZ0IjowLCJSaWdodCI6MCwiQm90dG9tIjowfSwiUGFkZGluZyI6eyIkaWQiOiIxNzQiLCJUb3AiOjAsIkxlZnQiOjAsIlJpZ2h0IjowLCJCb3R0b20iOjB9LCJCYWNrZ3JvdW5kIjp7IiRyZWYiOiI5NiJ9LCJJc1Zpc2libGUiOnRydWUsIldpZHRoIjowLjAsIkhlaWdodCI6MC4wLCJCb3JkZXJTdHlsZSI6eyIkaWQiOiIxNzUiLCJMaW5lQ29sb3IiOm51bGwsIkxpbmVXZWlnaHQiOjAuMCwiTGluZVR5cGUiOjAsIlBhcmVudFN0eWxlIjpudWxsfSwiUGFyZW50U3R5bGUiOm51bGx9LCJIb3Jpem9udGFsQ29ubmVjdG9yU3R5bGUiOnsiJGlkIjoiMTc2IiwiTGluZUNvbG9yIjp7IiRyZWYiOiI5OCJ9LCJMaW5lV2VpZ2h0IjoxLjAsIkxpbmVUeXBlIjowLCJQYXJlbnRTdHlsZSI6bnVsbH0sIlZlcnRpY2FsQ29ubmVjdG9yU3R5bGUiOnsiJGlkIjoiMTc3IiwiTGluZUNvbG9yIjp7IiRyZWYiOiIxMDEifSwiTGluZVdlaWdodCI6MS4wLCJMaW5lVHlwZSI6MCwiUGFyZW50U3R5bGUiOm51bGx9LCJNYXJnaW4iOm51bGwsIlN0YXJ0RGF0ZVBvc2l0aW9uIjo0LCJFbmREYXRlUG9zaXRpb24iOjQsIkRhdGVJc1Zpc2libGUiOnRydWUsIlRpdGxlUG9zaXRpb24iOjMsIkR1cmF0aW9uUG9zaXRpb24iOjYsIlBlcmNlbnRhZ2VDb21wbGV0ZWRQb3NpdGlvbiI6MiwiU3BhY2luZyI6NSwiSXNCZWxvd1RpbWViYW5kIjpmYWxzZSwiUGVyY2VudGFnZUNvbXBsZXRlU2hhcGVPcGFjaXR5IjozNSwiU2hhcGVTdHlsZSI6eyIkaWQiOiIxNzgiLCJNYXJnaW4iOnsiJGlkIjoiMTc5IiwiVG9wIjowLCJMZWZ0Ijo0LCJSaWdodCI6NCwiQm90dG9tIjowfSwiUGFkZGluZyI6eyIkaWQiOiIxODAiLCJUb3AiOjAsIkxlZnQiOjAsIlJpZ2h0IjowLCJCb3R0b20iOjB9LCJCYWNrZ3JvdW5kIjp7IiRpZCI6IjE4MSIsIkNvbG9yIjp7IiRpZCI6IjE4MiIsIkEiOjI1NSwiUiI6MjM3LCJHIjoxMjUsIkIiOjQ5fX0sIklzVmlzaWJsZSI6dHJ1ZSwiV2lkdGgiOjAuMCwiSGVpZ2h0IjoyMi4wLCJCb3JkZXJTdHlsZSI6eyIkaWQiOiIxODMiLCJMaW5lQ29sb3IiOnsiJHJlZiI6IjEwOSJ9LCJMaW5lV2VpZ2h0IjowLjAsIkxpbmVUeXBlIjowLCJQYXJlbnRTdHlsZSI6bnVsbH0sIlBhcmVudFN0eWxlIjpudWxsfSwiVGl0bGVTdHlsZSI6eyIkaWQiOiIxODQiLCJGb250U2V0dGluZ3MiOnsiJGlkIjoiMTg1IiwiRm9udFNpemUiOjExLCJGb250TmFtZSI6IkNhbGlicmkiLCJJc0JvbGQiOnRydWUsIklzSXRhbGljIjpmYWxzZSwiSXNVbmRlcmxpbmVkIjpmYWxzZSwiUGFyZW50U3R5bGUiOm51bGx9LCJBdXRvU2l6ZSI6MCwiRm9yZWdyb3VuZCI6eyIkaWQiOiIxODYiLCJDb2xvciI6eyIkcmVmIjoiMTE0In19LCJNYXhXaWR0aCI6NzIwLjAsIk1heEhlaWdodCI6IkluZmluaXR5IiwiU21hcnRGb3JlZ3JvdW5kSXNBY3RpdmUiOmZhbHNlLCJIb3Jpem9udGFsQWxpZ25tZW50IjoyLCJWZXJ0aWNhbEFsaWdubWVudCI6MCwiU21hcnRGb3JlZ3JvdW5kIjpudWxsLCJCYWNrZ3JvdW5kRmlsbFR5cGUiOjAsIk1hcmdpbiI6eyIkaWQiOiIxODciLCJUb3AiOjAsIkxlZnQiOjAsIlJpZ2h0IjowLCJCb3R0b20iOjB9LCJQYWRkaW5nIjp7IiRpZCI6IjE4OCIsIlRvcCI6MCwiTGVmdCI6MCwiUmlnaHQiOjAsIkJvdHRvbSI6MH0sIkJhY2tncm91bmQiOnsiJHJlZiI6IjExNyJ9LCJJc1Zpc2libGUiOnRydWUsIldpZHRoIjowLjAsIkhlaWdodCI6MC4wLCJCb3JkZXJTdHlsZSI6eyIkaWQiOiIxODkiLCJMaW5lQ29sb3IiOm51bGwsIkxpbmVXZWlnaHQiOjAuMCwiTGluZVR5cGUiOjAsIlBhcmVudFN0eWxlIjpudWxsfSwiUGFyZW50U3R5bGUiOm51bGx9LCJEYXRlU3R5bGUiOnsiJGlkIjoiMTkwIiwiRm9udFNldHRpbmdzIjp7IiRpZCI6IjE5MSIsIkZvbnRTaXplIjoxMCwiRm9udE5hbWUiOiJDYWxpYnJpIiwiSXNCb2xkIjpmYWxzZSwiSXNJdGFsaWMiOmZhbHNlLCJJc1VuZGVybGluZWQiOmZhbHNlLCJQYXJlbnRTdHlsZSI6bnVsbH0sIkF1dG9TaXplIjowLCJGb3JlZ3JvdW5kIjp7IiRpZCI6IjE5MiIsIkNvbG9yIjp7IiRyZWYiOiIxMjEifX0sIk1heFdpZHRoIjoyMDAuMCwiTWF4SGVpZ2h0IjoiSW5maW5pdHkiLCJTbWFydEZvcmVncm91bmRJc0FjdGl2ZSI6ZmFsc2UsIkhvcml6b250YWxBbGlnbm1lbnQiOjAsIlZlcnRpY2FsQWxpZ25tZW50IjowLCJTbWFydEZvcmVncm91bmQiOm51bGwsIkJhY2tncm91bmRGaWxsVHlwZSI6MCwiTWFyZ2luIjp7IiRpZCI6IjE5MyIsIlRvcCI6MCwiTGVmdCI6MCwiUmlnaHQiOjAsIkJvdHRvbSI6MH0sIlBhZGRpbmciOnsiJGlkIjoiMTk0IiwiVG9wIjowLCJMZWZ0IjowLCJSaWdodCI6MCwiQm90dG9tIjowfSwiQmFja2dyb3VuZCI6eyIkcmVmIjoiMTI0In0sIklzVmlzaWJsZSI6dHJ1ZSwiV2lkdGgiOjAuMCwiSGVpZ2h0IjowLjAsIkJvcmRlclN0eWxlIjp7IiRpZCI6IjE5NSIsIkxpbmVDb2xvciI6bnVsbCwiTGluZVdlaWdodCI6MC4wLCJMaW5lVHlwZSI6MCwiUGFyZW50U3R5bGUiOm51bGx9LCJQYXJlbnRTdHlsZSI6bnVsbH0sIkRhdGVGb3JtYXQiOnsiJGlkIjoiMTk2IiwiRm9ybWF0U3RyaW5nIjoiTU1NIGQiLCJTZXBhcmF0b3IiOiIvIiwiVXNlSW50ZXJuYXRpb25hbERhdGVGb3JtYXQiOmZhbHNlLCJEYXRlSXNWaXNpYmxlIjp0cnVlLCJUaW1lSXNWaXNpYmxlIjpmYWxzZSwiSG91ckRpZ2l0cyI6MSwiQW1QbURlc2lnbmF0b3IiOjIsIlRyaW0wME1pbnV0ZXMiOmZhbHNlLCJMYXN0S25vd25WaXNpYmlsaXR5U3RhdGUiOm51bGx9LCJJc1Zpc2libGUiOnRydWUsIlBhcmVudFN0eWxlIjpudWxsfSwiSW5kZXgiOjAsIlNtYXJ0RHVyYXRpb25BY3RpdmF0ZWQiOmZhbHNlLCJEYXRlRm9ybWF0Ijp7IiRyZWYiOiIxOTYifSwiSWQiOiJjZTAxOTMzNy1mMjM5LTRjM2MtOTU2ZS05NTQzMWY0ZDExN2QiLCJJbXBvcnRJZCI6bnVsbCwiVGl0bGUiOiJDb21wcmVuZHJlIGwnb3V0aWwgUk9udG9Ub29scyIsIk5vdGUiOm51bGwsIkh5cGVybGluayI6eyIkaWQiOiIxOTciLCJBZGRyZXNzIjoiIiwiU3ViQWRkcmVzcyI6IiJ9LCJJc0NoYW5nZWQiOmZhbHNlLCJJc05ldyI6ZmFsc2V9LHsiJGlkIjoiMTk4IiwiR3JvdXBOYW1lIjpudWxsLCJTdGFydERhdGUiOiIyMDE5LTExLTExVDAwOjAwOjAwIiwiRW5kRGF0ZSI6IjIwMTktMTItMjBUMjM6NTk6MDAiLCJQZXJjZW50YWdlQ29tcGxldGUiOjIwLjAsIlN0eWxlIjp7IiRpZCI6IjE5OSIsIlNoYXBlIjowLCJTaGFwZVRoaWNrbmVzcyI6MiwiRHVyYXRpb25Gb3JtYXQiOjAsIkluY2x1ZGVOb25Xb3JraW5nRGF5c0luRHVyYXRpb24iOmZhbHNlLCJQZXJjZW50YWdlQ29tcGxldGVTdHlsZSI6eyIkaWQiOiIyMDAiLCJGb250U2V0dGluZ3MiOnsiJGlkIjoiMjAxIiwiRm9udFNpemUiOjEwLCJGb250TmFtZSI6IkNhbGlicmkiLCJJc0JvbGQiOmZhbHNlLCJJc0l0YWxpYyI6ZmFsc2UsIklzVW5kZXJsaW5lZCI6ZmFsc2UsIlBhcmVudFN0eWxlIjpudWxsfSwiQXV0b1NpemUiOjAsIkZvcmVncm91bmQiOnsiJHJlZiI6Ijg1In0sIk1heFdpZHRoIjoyMDAuMCwiTWF4SGVpZ2h0IjoiSW5maW5pdHkiLCJTbWFydEZvcmVncm91bmRJc0FjdGl2ZSI6ZmFsc2UsIkhvcml6b250YWxBbGlnbm1lbnQiOjAsIlZlcnRpY2FsQWxpZ25tZW50IjowLCJTbWFydEZvcmVncm91bmQiOm51bGwsIkJhY2tncm91bmRGaWxsVHlwZSI6MCwiTWFyZ2luIjp7IiRpZCI6IjIwMiIsIlRvcCI6MCwiTGVmdCI6MCwiUmlnaHQiOjAsIkJvdHRvbSI6MH0sIlBhZGRpbmciOnsiJGlkIjoiMjAzIiwiVG9wIjowLCJMZWZ0IjowLCJSaWdodCI6MCwiQm90dG9tIjowfSwiQmFja2dyb3VuZCI6eyIkcmVmIjoiODkifSwiSXNWaXNpYmxlIjp0cnVlLCJXaWR0aCI6MC4wLCJIZWlnaHQiOjAuMCwiQm9yZGVyU3R5bGUiOnsiJGlkIjoiMjA0IiwiTGluZUNvbG9yIjpudWxsLCJMaW5lV2VpZ2h0IjowLjAsIkxpbmVUeXBlIjowLCJQYXJlbnRTdHlsZSI6bnVsbH0sIlBhcmVudFN0eWxlIjpudWxsfSwiRHVyYXRpb25TdHlsZSI6eyIkaWQiOiIyMDUiLCJGb250U2V0dGluZ3MiOnsiJGlkIjoiMjA2IiwiRm9udFNpemUiOjEwLCJGb250TmFtZSI6IkNhbGlicmkiLCJJc0JvbGQiOmZhbHNlLCJJc0l0YWxpYyI6ZmFsc2UsIklzVW5kZXJsaW5lZCI6ZmFsc2UsIlBhcmVudFN0eWxlIjpudWxsfSwiQXV0b1NpemUiOjAsIkZvcmVncm91bmQiOnsiJGlkIjoiMjA3IiwiQ29sb3IiOnsiJHJlZiI6IjkzIn19LCJNYXhXaWR0aCI6MjAwLjAsIk1heEhlaWdodCI6IkluZmluaXR5IiwiU21hcnRGb3JlZ3JvdW5kSXNBY3RpdmUiOmZhbHNlLCJIb3Jpem9udGFsQWxpZ25tZW50IjowLCJWZXJ0aWNhbEFsaWdubWVudCI6MCwiU21hcnRGb3JlZ3JvdW5kIjpudWxsLCJCYWNrZ3JvdW5kRmlsbFR5cGUiOjAsIk1hcmdpbiI6eyIkaWQiOiIyMDgiLCJUb3AiOjAsIkxlZnQiOjAsIlJpZ2h0IjowLCJCb3R0b20iOjB9LCJQYWRkaW5nIjp7IiRpZCI6IjIwOSIsIlRvcCI6MCwiTGVmdCI6MCwiUmlnaHQiOjAsIkJvdHRvbSI6MH0sIkJhY2tncm91bmQiOnsiJHJlZiI6Ijk2In0sIklzVmlzaWJsZSI6dHJ1ZSwiV2lkdGgiOjAuMCwiSGVpZ2h0IjowLjAsIkJvcmRlclN0eWxlIjp7IiRpZCI6IjIxMCIsIkxpbmVDb2xvciI6bnVsbCwiTGluZVdlaWdodCI6MC4wLCJMaW5lVHlwZSI6MCwiUGFyZW50U3R5bGUiOm51bGx9LCJQYXJlbnRTdHlsZSI6bnVsbH0sIkhvcml6b250YWxDb25uZWN0b3JTdHlsZSI6eyIkaWQiOiIyMTEiLCJMaW5lQ29sb3IiOnsiJHJlZiI6Ijk4In0sIkxpbmVXZWlnaHQiOjEuMCwiTGluZVR5cGUiOjAsIlBhcmVudFN0eWxlIjpudWxsfSwiVmVydGljYWxDb25uZWN0b3JTdHlsZSI6eyIkaWQiOiIyMTIiLCJMaW5lQ29sb3IiOnsiJHJlZiI6IjEwMSJ9LCJMaW5lV2VpZ2h0IjoxLjAsIkxpbmVUeXBlIjowLCJQYXJlbnRTdHlsZSI6bnVsbH0sIk1hcmdpbiI6bnVsbCwiU3RhcnREYXRlUG9zaXRpb24iOjQsIkVuZERhdGVQb3NpdGlvbiI6NCwiRGF0ZUlzVmlzaWJsZSI6dHJ1ZSwiVGl0bGVQb3NpdGlvbiI6MiwiRHVyYXRpb25Qb3NpdGlvbiI6NiwiUGVyY2VudGFnZUNvbXBsZXRlZFBvc2l0aW9uIjoyLCJTcGFjaW5nIjo1LCJJc0JlbG93VGltZWJhbmQiOmZhbHNlLCJQZXJjZW50YWdlQ29tcGxldGVTaGFwZU9wYWNpdHkiOjM1LCJTaGFwZVN0eWxlIjp7IiRpZCI6IjIxMyIsIk1hcmdpbiI6eyIkaWQiOiIyMTQiLCJUb3AiOjAsIkxlZnQiOjQsIlJpZ2h0Ijo0LCJCb3R0b20iOjB9LCJQYWRkaW5nIjp7IiRpZCI6IjIxNSIsIlRvcCI6MCwiTGVmdCI6MCwiUmlnaHQiOjAsIkJvdHRvbSI6MH0sIkJhY2tncm91bmQiOnsiJGlkIjoiMjE2IiwiQ29sb3IiOnsiJGlkIjoiMjE3IiwiQSI6MjU1LCJSIjo5MSwiRyI6MTU1LCJCIjoyMTN9fSwiSXNWaXNpYmxlIjp0cnVlLCJXaWR0aCI6MC4wLCJIZWlnaHQiOjIyLjAsIkJvcmRlclN0eWxlIjp7IiRpZCI6IjIxOCIsIkxpbmVDb2xvciI6eyIkcmVmIjoiMTA5In0sIkxpbmVXZWlnaHQiOjAuMCwiTGluZVR5cGUiOjAsIlBhcmVudFN0eWxlIjpudWxsfSwiUGFyZW50U3R5bGUiOm51bGx9LCJUaXRsZVN0eWxlIjp7IiRpZCI6IjIxOSIsIkZvbnRTZXR0aW5ncyI6eyIkaWQiOiIyMjAiLCJGb250U2l6ZSI6MTEsIkZvbnROYW1lIjoiQ2FsaWJyaSIsIklzQm9sZCI6dHJ1ZSwiSXNJdGFsaWMiOmZhbHNlLCJJc1VuZGVybGluZWQiOmZhbHNlLCJQYXJlbnRTdHlsZSI6bnVsbH0sIkF1dG9TaXplIjowLCJGb3JlZ3JvdW5kIjp7IiRpZCI6IjIyMSIsIkNvbG9yIjp7IiRyZWYiOiIxMTQifX0sIk1heFdpZHRoIjo3MjAuMCwiTWF4SGVpZ2h0IjoiSW5maW5pdHkiLCJTbWFydEZvcmVncm91bmRJc0FjdGl2ZSI6ZmFsc2UsIkhvcml6b250YWxBbGlnbm1lbnQiOjEsIlZlcnRpY2FsQWxpZ25tZW50IjowLCJTbWFydEZvcmVncm91bmQiOm51bGwsIkJhY2tncm91bmRGaWxsVHlwZSI6MCwiTWFyZ2luIjp7IiRpZCI6IjIyMiIsIlRvcCI6MCwiTGVmdCI6MCwiUmlnaHQiOjAsIkJvdHRvbSI6MH0sIlBhZGRpbmciOnsiJGlkIjoiMjIzIiwiVG9wIjowLCJMZWZ0IjowLCJSaWdodCI6MCwiQm90dG9tIjowfSwiQmFja2dyb3VuZCI6eyIkcmVmIjoiMTE3In0sIklzVmlzaWJsZSI6dHJ1ZSwiV2lkdGgiOjAuMCwiSGVpZ2h0IjowLjAsIkJvcmRlclN0eWxlIjp7IiRpZCI6IjIyNCIsIkxpbmVDb2xvciI6bnVsbCwiTGluZVdlaWdodCI6MC4wLCJMaW5lVHlwZSI6MCwiUGFyZW50U3R5bGUiOm51bGx9LCJQYXJlbnRTdHlsZSI6bnVsbH0sIkRhdGVTdHlsZSI6eyIkaWQiOiIyMjUiLCJGb250U2V0dGluZ3MiOnsiJGlkIjoiMjI2IiwiRm9udFNpemUiOjEwLCJGb250TmFtZSI6IkNhbGlicmkiLCJJc0JvbGQiOmZhbHNlLCJJc0l0YWxpYyI6ZmFsc2UsIklzVW5kZXJsaW5lZCI6ZmFsc2UsIlBhcmVudFN0eWxlIjpudWxsfSwiQXV0b1NpemUiOjAsIkZvcmVncm91bmQiOnsiJGlkIjoiMjI3IiwiQ29sb3IiOnsiJHJlZiI6IjEyMSJ9fSwiTWF4V2lkdGgiOjIwMC4wLCJNYXhIZWlnaHQiOiJJbmZpbml0eSIsIlNtYXJ0Rm9yZWdyb3VuZElzQWN0aXZlIjpmYWxzZSwiSG9yaXpvbnRhbEFsaWdubWVudCI6MCwiVmVydGljYWxBbGlnbm1lbnQiOjAsIlNtYXJ0Rm9yZWdyb3VuZCI6bnVsbCwiQmFja2dyb3VuZEZpbGxUeXBlIjowLCJNYXJnaW4iOnsiJGlkIjoiMjI4IiwiVG9wIjowLCJMZWZ0IjowLCJSaWdodCI6MCwiQm90dG9tIjowfSwiUGFkZGluZyI6eyIkaWQiOiIyMjkiLCJUb3AiOjAsIkxlZnQiOjAsIlJpZ2h0IjowLCJCb3R0b20iOjB9LCJCYWNrZ3JvdW5kIjp7IiRyZWYiOiIxMjQifSwiSXNWaXNpYmxlIjp0cnVlLCJXaWR0aCI6MC4wLCJIZWlnaHQiOjAuMCwiQm9yZGVyU3R5bGUiOnsiJGlkIjoiMjMwIiwiTGluZUNvbG9yIjpudWxsLCJMaW5lV2VpZ2h0IjowLjAsIkxpbmVUeXBlIjowLCJQYXJlbnRTdHlsZSI6bnVsbH0sIlBhcmVudFN0eWxlIjpudWxsfSwiRGF0ZUZvcm1hdCI6eyIkaWQiOiIyMzEiLCJGb3JtYXRTdHJpbmciOiJNTU0gZCIsIlNlcGFyYXRvciI6Ii8iLCJVc2VJbnRlcm5hdGlvbmFsRGF0ZUZvcm1hdCI6ZmFsc2UsIkRhdGVJc1Zpc2libGUiOnRydWUsIlRpbWVJc1Zpc2libGUiOmZhbHNlLCJIb3VyRGlnaXRzIjoxLCJBbVBtRGVzaWduYXRvciI6MiwiVHJpbTAwTWludXRlcyI6ZmFsc2UsIkxhc3RLbm93blZpc2liaWxpdHlTdGF0ZSI6bnVsbH0sIklzVmlzaWJsZSI6dHJ1ZSwiUGFyZW50U3R5bGUiOm51bGx9LCJJbmRleCI6MSwiU21hcnREdXJhdGlvbkFjdGl2YXRlZCI6ZmFsc2UsIkRhdGVGb3JtYXQiOnsiJHJlZiI6IjIzMSJ9LCJJZCI6IjE2ODQyZjMyLWViZDMtNDEzZS1hMGJlLTlhMTBiZTNlN2VlOSIsIkltcG9ydElkIjpudWxsLCJUaXRsZSI6IkNyw6llciBsJ2ludGVyZmFjZSB3ZWIiLCJOb3RlIjpudWxsLCJIeXBlcmxpbmsiOnsiJGlkIjoiMjMyIiwiQWRkcmVzcyI6IiIsIlN1YkFkZHJlc3MiOiIifSwiSXNDaGFuZ2VkIjpmYWxzZSwiSXNOZXciOmZhbHNlfSx7IiRpZCI6IjIzMyIsIkdyb3VwTmFtZSI6bnVsbCwiU3RhcnREYXRlIjoiMjAxOS0xMS0xMVQwMDowMDowMCIsIkVuZERhdGUiOiIyMDE5LTExLTIyVDIzOjU5OjAwIiwiUGVyY2VudGFnZUNvbXBsZXRlIjoxMDAuMCwiU3R5bGUiOnsiJGlkIjoiMjM0IiwiU2hhcGUiOjAsIlNoYXBlVGhpY2tuZXNzIjoyLCJEdXJhdGlvbkZvcm1hdCI6MCwiSW5jbHVkZU5vbldvcmtpbmdEYXlzSW5EdXJhdGlvbiI6ZmFsc2UsIlBlcmNlbnRhZ2VDb21wbGV0ZVN0eWxlIjp7IiRpZCI6IjIzNSIsIkZvbnRTZXR0aW5ncyI6eyIkaWQiOiIyMzYiLCJGb250U2l6ZSI6MTAsIkZvbnROYW1lIjoiQ2FsaWJyaSIsIklzQm9sZCI6ZmFsc2UsIklzSXRhbGljIjpmYWxzZSwiSXNVbmRlcmxpbmVkIjpmYWxzZSwiUGFyZW50U3R5bGUiOm51bGx9LCJBdXRvU2l6ZSI6MCwiRm9yZWdyb3VuZCI6eyIkcmVmIjoiODUifSwiTWF4V2lkdGgiOjIwMC4wLCJNYXhIZWlnaHQiOiJJbmZpbml0eSIsIlNtYXJ0Rm9yZWdyb3VuZElzQWN0aXZlIjpmYWxzZSwiSG9yaXpvbnRhbEFsaWdubWVudCI6MCwiVmVydGljYWxBbGlnbm1lbnQiOjAsIlNtYXJ0Rm9yZWdyb3VuZCI6bnVsbCwiQmFja2dyb3VuZEZpbGxUeXBlIjowLCJNYXJnaW4iOnsiJGlkIjoiMjM3IiwiVG9wIjowLCJMZWZ0IjowLCJSaWdodCI6MCwiQm90dG9tIjowfSwiUGFkZGluZyI6eyIkaWQiOiIyMzgiLCJUb3AiOjAsIkxlZnQiOjAsIlJpZ2h0IjowLCJCb3R0b20iOjB9LCJCYWNrZ3JvdW5kIjp7IiRyZWYiOiI4OSJ9LCJJc1Zpc2libGUiOnRydWUsIldpZHRoIjowLjAsIkhlaWdodCI6MC4wLCJCb3JkZXJTdHlsZSI6eyIkaWQiOiIyMzkiLCJMaW5lQ29sb3IiOm51bGwsIkxpbmVXZWlnaHQiOjAuMCwiTGluZVR5cGUiOjAsIlBhcmVudFN0eWxlIjpudWxsfSwiUGFyZW50U3R5bGUiOm51bGx9LCJEdXJhdGlvblN0eWxlIjp7IiRpZCI6IjI0MCIsIkZvbnRTZXR0aW5ncyI6eyIkaWQiOiIyNDEiLCJGb250U2l6ZSI6MTAsIkZvbnROYW1lIjoiQ2FsaWJyaSIsIklzQm9sZCI6ZmFsc2UsIklzSXRhbGljIjpmYWxzZSwiSXNVbmRlcmxpbmVkIjpmYWxzZSwiUGFyZW50U3R5bGUiOm51bGx9LCJBdXRvU2l6ZSI6MCwiRm9yZWdyb3VuZCI6eyIkaWQiOiIyNDIiLCJDb2xvciI6eyIkcmVmIjoiOTMifX0sIk1heFdpZHRoIjoyMDAuMCwiTWF4SGVpZ2h0IjoiSW5maW5pdHkiLCJTbWFydEZvcmVncm91bmRJc0FjdGl2ZSI6ZmFsc2UsIkhvcml6b250YWxBbGlnbm1lbnQiOjAsIlZlcnRpY2FsQWxpZ25tZW50IjowLCJTbWFydEZvcmVncm91bmQiOm51bGwsIkJhY2tncm91bmRGaWxsVHlwZSI6MCwiTWFyZ2luIjp7IiRpZCI6IjI0MyIsIlRvcCI6MCwiTGVmdCI6MCwiUmlnaHQiOjAsIkJvdHRvbSI6MH0sIlBhZGRpbmciOnsiJGlkIjoiMjQ0IiwiVG9wIjowLCJMZWZ0IjowLCJSaWdodCI6MCwiQm90dG9tIjowfSwiQmFja2dyb3VuZCI6eyIkcmVmIjoiOTYifSwiSXNWaXNpYmxlIjp0cnVlLCJXaWR0aCI6MC4wLCJIZWlnaHQiOjAuMCwiQm9yZGVyU3R5bGUiOnsiJGlkIjoiMjQ1IiwiTGluZUNvbG9yIjpudWxsLCJMaW5lV2VpZ2h0IjowLjAsIkxpbmVUeXBlIjowLCJQYXJlbnRTdHlsZSI6bnVsbH0sIlBhcmVudFN0eWxlIjpudWxsfSwiSG9yaXpvbnRhbENvbm5lY3RvclN0eWxlIjp7IiRpZCI6IjI0NiIsIkxpbmVDb2xvciI6eyIkcmVmIjoiOTgifSwiTGluZVdlaWdodCI6MS4wLCJMaW5lVHlwZSI6MCwiUGFyZW50U3R5bGUiOm51bGx9LCJWZXJ0aWNhbENvbm5lY3RvclN0eWxlIjp7IiRpZCI6IjI0NyIsIkxpbmVDb2xvciI6eyIkcmVmIjoiMTAxIn0sIkxpbmVXZWlnaHQiOjEuMCwiTGluZVR5cGUiOjAsIlBhcmVudFN0eWxlIjpudWxsfSwiTWFyZ2luIjpudWxsLCJTdGFydERhdGVQb3NpdGlvbiI6NCwiRW5kRGF0ZVBvc2l0aW9uIjo0LCJEYXRlSXNWaXNpYmxlIjp0cnVlLCJUaXRsZVBvc2l0aW9uIjozLCJEdXJhdGlvblBvc2l0aW9uIjo2LCJQZXJjZW50YWdlQ29tcGxldGVkUG9zaXRpb24iOjIsIlNwYWNpbmciOjUsIklzQmVsb3dUaW1lYmFuZCI6ZmFsc2UsIlBlcmNlbnRhZ2VDb21wbGV0ZVNoYXBlT3BhY2l0eSI6MzUsIlNoYXBlU3R5bGUiOnsiJGlkIjoiMjQ4IiwiTWFyZ2luIjp7IiRpZCI6IjI0OSIsIlRvcCI6MCwiTGVmdCI6NCwiUmlnaHQiOjQsIkJvdHRvbSI6MH0sIlBhZGRpbmciOnsiJGlkIjoiMjUwIiwiVG9wIjowLCJMZWZ0IjowLCJSaWdodCI6MCwiQm90dG9tIjowfSwiQmFja2dyb3VuZCI6eyIkaWQiOiIyNTEiLCJDb2xvciI6eyIkaWQiOiIyNTIiLCJBIjoyNTUsIlIiOjIzNywiRyI6MTI1LCJCIjo0OX19LCJJc1Zpc2libGUiOnRydWUsIldpZHRoIjowLjAsIkhlaWdodCI6MjIuMCwiQm9yZGVyU3R5bGUiOnsiJGlkIjoiMjUzIiwiTGluZUNvbG9yIjp7IiRyZWYiOiIxMDkifSwiTGluZVdlaWdodCI6MC4wLCJMaW5lVHlwZSI6MCwiUGFyZW50U3R5bGUiOm51bGx9LCJQYXJlbnRTdHlsZSI6bnVsbH0sIlRpdGxlU3R5bGUiOnsiJGlkIjoiMjU0IiwiRm9udFNldHRpbmdzIjp7IiRpZCI6IjI1NSIsIkZvbnRTaXplIjoxMSwiRm9udE5hbWUiOiJDYWxpYnJpIiwiSXNCb2xkIjp0cnVlLCJJc0l0YWxpYyI6ZmFsc2UsIklzVW5kZXJsaW5lZCI6ZmFsc2UsIlBhcmVudFN0eWxlIjpudWxsfSwiQXV0b1NpemUiOjAsIkZvcmVncm91bmQiOnsiJGlkIjoiMjU2IiwiQ29sb3IiOnsiJHJlZiI6IjExNCJ9fSwiTWF4V2lkdGgiOjcyMC4wLCJNYXhIZWlnaHQiOiJJbmZpbml0eSIsIlNtYXJ0Rm9yZWdyb3VuZElzQWN0aXZlIjpmYWxzZSwiSG9yaXpvbnRhbEFsaWdubWVudCI6MiwiVmVydGljYWxBbGlnbm1lbnQiOjAsIlNtYXJ0Rm9yZWdyb3VuZCI6bnVsbCwiQmFja2dyb3VuZEZpbGxUeXBlIjowLCJNYXJnaW4iOnsiJGlkIjoiMjU3IiwiVG9wIjowLCJMZWZ0IjowLCJSaWdodCI6MCwiQm90dG9tIjowfSwiUGFkZGluZyI6eyIkaWQiOiIyNTgiLCJUb3AiOjAsIkxlZnQiOjAsIlJpZ2h0IjowLCJCb3R0b20iOjB9LCJCYWNrZ3JvdW5kIjp7IiRyZWYiOiIxMTcifSwiSXNWaXNpYmxlIjp0cnVlLCJXaWR0aCI6MC4wLCJIZWlnaHQiOjAuMCwiQm9yZGVyU3R5bGUiOnsiJGlkIjoiMjU5IiwiTGluZUNvbG9yIjpudWxsLCJMaW5lV2VpZ2h0IjowLjAsIkxpbmVUeXBlIjowLCJQYXJlbnRTdHlsZSI6bnVsbH0sIlBhcmVudFN0eWxlIjpudWxsfSwiRGF0ZVN0eWxlIjp7IiRpZCI6IjI2MCIsIkZvbnRTZXR0aW5ncyI6eyIkaWQiOiIyNjEiLCJGb250U2l6ZSI6MTAsIkZvbnROYW1lIjoiQ2FsaWJyaSIsIklzQm9sZCI6ZmFsc2UsIklzSXRhbGljIjpmYWxzZSwiSXNVbmRlcmxpbmVkIjpmYWxzZSwiUGFyZW50U3R5bGUiOm51bGx9LCJBdXRvU2l6ZSI6MCwiRm9yZWdyb3VuZCI6eyIkaWQiOiIyNjIiLCJDb2xvciI6eyIkcmVmIjoiMTIxIn19LCJNYXhXaWR0aCI6MjAwLjAsIk1heEhlaWdodCI6IkluZmluaXR5IiwiU21hcnRGb3JlZ3JvdW5kSXNBY3RpdmUiOmZhbHNlLCJIb3Jpem9udGFsQWxpZ25tZW50IjowLCJWZXJ0aWNhbEFsaWdubWVudCI6MCwiU21hcnRGb3JlZ3JvdW5kIjpudWxsLCJCYWNrZ3JvdW5kRmlsbFR5cGUiOjAsIk1hcmdpbiI6eyIkaWQiOiIyNjMiLCJUb3AiOjAsIkxlZnQiOjAsIlJpZ2h0IjowLCJCb3R0b20iOjB9LCJQYWRkaW5nIjp7IiRpZCI6IjI2NCIsIlRvcCI6MCwiTGVmdCI6MCwiUmlnaHQiOjAsIkJvdHRvbSI6MH0sIkJhY2tncm91bmQiOnsiJHJlZiI6IjEyNCJ9LCJJc1Zpc2libGUiOnRydWUsIldpZHRoIjowLjAsIkhlaWdodCI6MC4wLCJCb3JkZXJTdHlsZSI6eyIkaWQiOiIyNjUiLCJMaW5lQ29sb3IiOm51bGwsIkxpbmVXZWlnaHQiOjAuMCwiTGluZVR5cGUiOjAsIlBhcmVudFN0eWxlIjpudWxsfSwiUGFyZW50U3R5bGUiOm51bGx9LCJEYXRlRm9ybWF0Ijp7IiRpZCI6IjI2NiIsIkZvcm1hdFN0cmluZyI6Ik1NTSBkIiwiU2VwYXJhdG9yIjoiLyIsIlVzZUludGVybmF0aW9uYWxEYXRlRm9ybWF0IjpmYWxzZSwiRGF0ZUlzVmlzaWJsZSI6dHJ1ZSwiVGltZUlzVmlzaWJsZSI6ZmFsc2UsIkhvdXJEaWdpdHMiOjEsIkFtUG1EZXNpZ25hdG9yIjoyLCJUcmltMDBNaW51dGVzIjpmYWxzZSwiTGFzdEtub3duVmlzaWJpbGl0eVN0YXRlIjpudWxsfSwiSXNWaXNpYmxlIjp0cnVlLCJQYXJlbnRTdHlsZSI6bnVsbH0sIkluZGV4IjoyLCJTbWFydER1cmF0aW9uQWN0aXZhdGVkIjpmYWxzZSwiRGF0ZUZvcm1hdCI6eyIkcmVmIjoiMjY2In0sIklkIjoiNDYzNGVmZmQtMTAzZi00NGIwLTg2MjYtNWU5ZDU2MzU2MzQwIiwiSW1wb3J0SWQiOm51bGwsIlRpdGxlIjoiw4ljcmlyZSBsZXMgZGlmZsOpcmVudHMgc2NyaXB0IGZvbmN0aW9ubmVscyAiLCJOb3RlIjoiZTF4eWRHWXhYR0Z1YzJsY1lXNXphV053WnpFeU5USmNkV014WEdoMGJXRjFkSE53WEdSbFptWXllMXhtYjI1MGRHSnNlMXhtTUZ4bVkyaGhjbk5sZERBZ1ZHbHRaWE1nVG1WM0lGSnZiV0Z1TzMxN1hHWXlYR1pqYUdGeWMyVjBNQ0JUWldkdlpTQlZTVHQ5Zlh0Y1kyOXNiM0owWW14Y2NtVmtNRnhuY21WbGJqQmNZbXgxWlRBN1hISmxaREkxTlZ4bmNtVmxiakkxTlZ4aWJIVmxNalUxTzF4eVpXUTFNVnhuY21WbGJqVXhYR0pzZFdVMU1UdDlYR3h2WTJoY2FHbGphRnhrWW1Ob1hIQmhjbVJjY0d4aGFXNWNiSFJ5Y0dGeVhHbDBZWEF3ZTF4c1lXNW5NVEF6TTF4bWN6RTRYR1l5WEdObU1pQmNZMll5WEhGc2UxeG1NaUI3WEd4aGJtY3hNRE0yWEd4MGNtTm9JRElnYzJWdFlXbHVaWE45WEd4cE1GeHlhVEJjYzJFd1hITmlNRnhtYVRCY2NXeGNjR0Z5ZlEwS2ZRMEtmUT09IiwiSHlwZXJsaW5rIjp7IiRpZCI6IjI2NyIsIkFkZHJlc3MiOiIiLCJTdWJBZGRyZXNzIjoiIn0sIklzQ2hhbmdlZCI6ZmFsc2UsIklzTmV3IjpmYWxzZX0seyIkaWQiOiIyNjgiLCJHcm91cE5hbWUiOm51bGwsIlN0YXJ0RGF0ZSI6IjIwMTktMTItMDlUMDA6MDA6MDBaIiwiRW5kRGF0ZSI6IjIwMTktMTItMjBUMjM6NTk6MDAiLCJQZXJjZW50YWdlQ29tcGxldGUiOm51bGwsIlN0eWxlIjp7IiRpZCI6IjI2OSIsIlNoYXBlIjowLCJTaGFwZVRoaWNrbmVzcyI6MiwiRHVyYXRpb25Gb3JtYXQiOjAsIkluY2x1ZGVOb25Xb3JraW5nRGF5c0luRHVyYXRpb24iOmZhbHNlLCJQZXJjZW50YWdlQ29tcGxldGVTdHlsZSI6eyIkaWQiOiIyNzAiLCJGb250U2V0dGluZ3MiOnsiJGlkIjoiMjcxIiwiRm9udFNpemUiOjEwLCJGb250TmFtZSI6IkNhbGlicmkiLCJJc0JvbGQiOmZhbHNlLCJJc0l0YWxpYyI6ZmFsc2UsIklzVW5kZXJsaW5lZCI6ZmFsc2UsIlBhcmVudFN0eWxlIjpudWxsfSwiQXV0b1NpemUiOjAsIkZvcmVncm91bmQiOnsiJHJlZiI6Ijg1In0sIk1heFdpZHRoIjoyMDAuMCwiTWF4SGVpZ2h0IjoiSW5maW5pdHkiLCJTbWFydEZvcmVncm91bmRJc0FjdGl2ZSI6ZmFsc2UsIkhvcml6b250YWxBbGlnbm1lbnQiOjAsIlZlcnRpY2FsQWxpZ25tZW50IjowLCJTbWFydEZvcmVncm91bmQiOm51bGwsIkJhY2tncm91bmRGaWxsVHlwZSI6MCwiTWFyZ2luIjp7IiRpZCI6IjI3MiIsIlRvcCI6MCwiTGVmdCI6MCwiUmlnaHQiOjAsIkJvdHRvbSI6MH0sIlBhZGRpbmciOnsiJGlkIjoiMjczIiwiVG9wIjowLCJMZWZ0IjowLCJSaWdodCI6MCwiQm90dG9tIjowfSwiQmFja2dyb3VuZCI6eyIkcmVmIjoiODkifSwiSXNWaXNpYmxlIjp0cnVlLCJXaWR0aCI6MC4wLCJIZWlnaHQiOjAuMCwiQm9yZGVyU3R5bGUiOnsiJGlkIjoiMjc0IiwiTGluZUNvbG9yIjpudWxsLCJMaW5lV2VpZ2h0IjowLjAsIkxpbmVUeXBlIjowLCJQYXJlbnRTdHlsZSI6bnVsbH0sIlBhcmVudFN0eWxlIjpudWxsfSwiRHVyYXRpb25TdHlsZSI6eyIkaWQiOiIyNzUiLCJGb250U2V0dGluZ3MiOnsiJGlkIjoiMjc2IiwiRm9udFNpemUiOjEwLCJGb250TmFtZSI6IkNhbGlicmkiLCJJc0JvbGQiOmZhbHNlLCJJc0l0YWxpYyI6ZmFsc2UsIklzVW5kZXJsaW5lZCI6ZmFsc2UsIlBhcmVudFN0eWxlIjpudWxsfSwiQXV0b1NpemUiOjAsIkZvcmVncm91bmQiOnsiJGlkIjoiMjc3IiwiQ29sb3IiOnsiJHJlZiI6IjkzIn19LCJNYXhXaWR0aCI6MjAwLjAsIk1heEhlaWdodCI6IkluZmluaXR5IiwiU21hcnRGb3JlZ3JvdW5kSXNBY3RpdmUiOmZhbHNlLCJIb3Jpem9udGFsQWxpZ25tZW50IjowLCJWZXJ0aWNhbEFsaWdubWVudCI6MCwiU21hcnRGb3JlZ3JvdW5kIjpudWxsLCJCYWNrZ3JvdW5kRmlsbFR5cGUiOjAsIk1hcmdpbiI6eyIkaWQiOiIyNzgiLCJUb3AiOjAsIkxlZnQiOjAsIlJpZ2h0IjowLCJCb3R0b20iOjB9LCJQYWRkaW5nIjp7IiRpZCI6IjI3OSIsIlRvcCI6MCwiTGVmdCI6MCwiUmlnaHQiOjAsIkJvdHRvbSI6MH0sIkJhY2tncm91bmQiOnsiJHJlZiI6Ijk2In0sIklzVmlzaWJsZSI6dHJ1ZSwiV2lkdGgiOjAuMCwiSGVpZ2h0IjowLjAsIkJvcmRlclN0eWxlIjp7IiRpZCI6IjI4MCIsIkxpbmVDb2xvciI6bnVsbCwiTGluZVdlaWdodCI6MC4wLCJMaW5lVHlwZSI6MCwiUGFyZW50U3R5bGUiOm51bGx9LCJQYXJlbnRTdHlsZSI6bnVsbH0sIkhvcml6b250YWxDb25uZWN0b3JTdHlsZSI6eyIkaWQiOiIyODEiLCJMaW5lQ29sb3IiOnsiJHJlZiI6Ijk4In0sIkxpbmVXZWlnaHQiOjEuMCwiTGluZVR5cGUiOjAsIlBhcmVudFN0eWxlIjpudWxsfSwiVmVydGljYWxDb25uZWN0b3JTdHlsZSI6eyIkaWQiOiIyODIiLCJMaW5lQ29sb3IiOnsiJHJlZiI6IjEwMSJ9LCJMaW5lV2VpZ2h0IjoxLjAsIkxpbmVUeXBlIjowLCJQYXJlbnRTdHlsZSI6bnVsbH0sIk1hcmdpbiI6bnVsbCwiU3RhcnREYXRlUG9zaXRpb24iOjQsIkVuZERhdGVQb3NpdGlvbiI6NCwiRGF0ZUlzVmlzaWJsZSI6dHJ1ZSwiVGl0bGVQb3NpdGlvbiI6MywiRHVyYXRpb25Qb3NpdGlvbiI6NiwiUGVyY2VudGFnZUNvbXBsZXRlZFBvc2l0aW9uIjo2LCJTcGFjaW5nIjo1LCJJc0JlbG93VGltZWJhbmQiOmZhbHNlLCJQZXJjZW50YWdlQ29tcGxldGVTaGFwZU9wYWNpdHkiOjM1LCJTaGFwZVN0eWxlIjp7IiRpZCI6IjI4MyIsIk1hcmdpbiI6eyIkaWQiOiIyODQiLCJUb3AiOjAsIkxlZnQiOjQsIlJpZ2h0Ijo0LCJCb3R0b20iOjB9LCJQYWRkaW5nIjp7IiRpZCI6IjI4NSIsIlRvcCI6MCwiTGVmdCI6MCwiUmlnaHQiOjAsIkJvdHRvbSI6MH0sIkJhY2tncm91bmQiOnsiJGlkIjoiMjg2IiwiQ29sb3IiOnsiJGlkIjoiMjg3IiwiQSI6MjU1LCJSIjoyMzcsIkciOjEyNSwiQiI6NDl9fSwiSXNWaXNpYmxlIjp0cnVlLCJXaWR0aCI6MC4wLCJIZWlnaHQiOjIyLjAsIkJvcmRlclN0eWxlIjp7IiRpZCI6IjI4OCIsIkxpbmVDb2xvciI6eyIkcmVmIjoiMTA5In0sIkxpbmVXZWlnaHQiOjAuMCwiTGluZVR5cGUiOjAsIlBhcmVudFN0eWxlIjpudWxsfSwiUGFyZW50U3R5bGUiOm51bGx9LCJUaXRsZVN0eWxlIjp7IiRpZCI6IjI4OSIsIkZvbnRTZXR0aW5ncyI6eyIkaWQiOiIyOTAiLCJGb250U2l6ZSI6MTEsIkZvbnROYW1lIjoiQ2FsaWJyaSIsIklzQm9sZCI6dHJ1ZSwiSXNJdGFsaWMiOmZhbHNlLCJJc1VuZGVybGluZWQiOmZhbHNlLCJQYXJlbnRTdHlsZSI6bnVsbH0sIkF1dG9TaXplIjowLCJGb3JlZ3JvdW5kIjp7IiRpZCI6IjI5MSIsIkNvbG9yIjp7IiRyZWYiOiIxMTQifX0sIk1heFdpZHRoIjo3MjAuMCwiTWF4SGVpZ2h0IjoiSW5maW5pdHkiLCJTbWFydEZvcmVncm91bmRJc0FjdGl2ZSI6ZmFsc2UsIkhvcml6b250YWxBbGlnbm1lbnQiOjIsIlZlcnRpY2FsQWxpZ25tZW50IjowLCJTbWFydEZvcmVncm91bmQiOm51bGwsIkJhY2tncm91bmRGaWxsVHlwZSI6MCwiTWFyZ2luIjp7IiRpZCI6IjI5MiIsIlRvcCI6MCwiTGVmdCI6MCwiUmlnaHQiOjAsIkJvdHRvbSI6MH0sIlBhZGRpbmciOnsiJGlkIjoiMjkzIiwiVG9wIjowLCJMZWZ0IjowLCJSaWdodCI6MCwiQm90dG9tIjowfSwiQmFja2dyb3VuZCI6eyIkcmVmIjoiMTE3In0sIklzVmlzaWJsZSI6dHJ1ZSwiV2lkdGgiOjAuMCwiSGVpZ2h0IjowLjAsIkJvcmRlclN0eWxlIjp7IiRpZCI6IjI5NCIsIkxpbmVDb2xvciI6bnVsbCwiTGluZVdlaWdodCI6MC4wLCJMaW5lVHlwZSI6MCwiUGFyZW50U3R5bGUiOm51bGx9LCJQYXJlbnRTdHlsZSI6bnVsbH0sIkRhdGVTdHlsZSI6eyIkaWQiOiIyOTUiLCJGb250U2V0dGluZ3MiOnsiJGlkIjoiMjk2IiwiRm9udFNpemUiOjEwLCJGb250TmFtZSI6IkNhbGlicmkiLCJJc0JvbGQiOmZhbHNlLCJJc0l0YWxpYyI6ZmFsc2UsIklzVW5kZXJsaW5lZCI6ZmFsc2UsIlBhcmVudFN0eWxlIjpudWxsfSwiQXV0b1NpemUiOjAsIkZvcmVncm91bmQiOnsiJGlkIjoiMjk3IiwiQ29sb3IiOnsiJHJlZiI6IjEyMSJ9fSwiTWF4V2lkdGgiOjIwMC4wLCJNYXhIZWlnaHQiOiJJbmZpbml0eSIsIlNtYXJ0Rm9yZWdyb3VuZElzQWN0aXZlIjpmYWxzZSwiSG9yaXpvbnRhbEFsaWdubWVudCI6MCwiVmVydGljYWxBbGlnbm1lbnQiOjAsIlNtYXJ0Rm9yZWdyb3VuZCI6bnVsbCwiQmFja2dyb3VuZEZpbGxUeXBlIjowLCJNYXJnaW4iOnsiJGlkIjoiMjk4IiwiVG9wIjowLCJMZWZ0IjowLCJSaWdodCI6MCwiQm90dG9tIjowfSwiUGFkZGluZyI6eyIkaWQiOiIyOTkiLCJUb3AiOjAsIkxlZnQiOjAsIlJpZ2h0IjowLCJCb3R0b20iOjB9LCJCYWNrZ3JvdW5kIjp7IiRyZWYiOiIxMjQifSwiSXNWaXNpYmxlIjp0cnVlLCJXaWR0aCI6MC4wLCJIZWlnaHQiOjAuMCwiQm9yZGVyU3R5bGUiOnsiJGlkIjoiMzAwIiwiTGluZUNvbG9yIjpudWxsLCJMaW5lV2VpZ2h0IjowLjAsIkxpbmVUeXBlIjowLCJQYXJlbnRTdHlsZSI6bnVsbH0sIlBhcmVudFN0eWxlIjpudWxsfSwiRGF0ZUZvcm1hdCI6eyIkaWQiOiIzMDEiLCJGb3JtYXRTdHJpbmciOiJNTU0gZCIsIlNlcGFyYXRvciI6Ii8iLCJVc2VJbnRlcm5hdGlvbmFsRGF0ZUZvcm1hdCI6ZmFsc2UsIkRhdGVJc1Zpc2libGUiOnRydWUsIlRpbWVJc1Zpc2libGUiOmZhbHNlLCJIb3VyRGlnaXRzIjoxLCJBbVBtRGVzaWduYXRvciI6MiwiVHJpbTAwTWludXRlcyI6ZmFsc2UsIkxhc3RLbm93blZpc2liaWxpdHlTdGF0ZSI6bnVsbH0sIklzVmlzaWJsZSI6dHJ1ZSwiUGFyZW50U3R5bGUiOm51bGx9LCJJbmRleCI6MywiU21hcnREdXJhdGlvbkFjdGl2YXRlZCI6ZmFsc2UsIkRhdGVGb3JtYXQiOnsiJHJlZiI6IjMwMSJ9LCJJZCI6ImVhZWE4YWIzLWQ3YjgtNGVjMC05MzNiLTQ3ODllMGM1ZGNlMyIsIkltcG9ydElkIjpudWxsLCJUaXRsZSI6IlLDqXVuaXIgbGVzIHNjcmlwdHMgZW4gdW4gc2V1bCAiLCJOb3RlIjpudWxsLCJIeXBlcmxpbmsiOnsiJGlkIjoiMzAyIiwiQWRkcmVzcyI6IiIsIlN1YkFkZHJlc3MiOiIifSwiSXNDaGFuZ2VkIjpmYWxzZSwiSXNOZXciOmZhbHNlfSx7IiRpZCI6IjMwMyIsIkdyb3VwTmFtZSI6bnVsbCwiU3RhcnREYXRlIjoiMjAyMC0wMS0xM1QwMDowMDowMFoiLCJFbmREYXRlIjoiMjAyMC0wMi0yMVQyMzo1OTowMCIsIlBlcmNlbnRhZ2VDb21wbGV0ZSI6bnVsbCwiU3R5bGUiOnsiJGlkIjoiMzA0IiwiU2hhcGUiOjAsIlNoYXBlVGhpY2tuZXNzIjoyLCJEdXJhdGlvbkZvcm1hdCI6MCwiSW5jbHVkZU5vbldvcmtpbmdEYXlzSW5EdXJhdGlvbiI6ZmFsc2UsIlBlcmNlbnRhZ2VDb21wbGV0ZVN0eWxlIjp7IiRpZCI6IjMwNSIsIkZvbnRTZXR0aW5ncyI6eyIkaWQiOiIzMDYiLCJGb250U2l6ZSI6MTAsIkZvbnROYW1lIjoiQ2FsaWJyaSIsIklzQm9sZCI6ZmFsc2UsIklzSXRhbGljIjpmYWxzZSwiSXNVbmRlcmxpbmVkIjpmYWxzZSwiUGFyZW50U3R5bGUiOm51bGx9LCJBdXRvU2l6ZSI6MCwiRm9yZWdyb3VuZCI6eyIkcmVmIjoiODUifSwiTWF4V2lkdGgiOjIwMC4wLCJNYXhIZWlnaHQiOiJJbmZpbml0eSIsIlNtYXJ0Rm9yZWdyb3VuZElzQWN0aXZlIjpmYWxzZSwiSG9yaXpvbnRhbEFsaWdubWVudCI6MCwiVmVydGljYWxBbGlnbm1lbnQiOjAsIlNtYXJ0Rm9yZWdyb3VuZCI6bnVsbCwiQmFja2dyb3VuZEZpbGxUeXBlIjowLCJNYXJnaW4iOnsiJGlkIjoiMzA3IiwiVG9wIjowLCJMZWZ0IjowLCJSaWdodCI6MCwiQm90dG9tIjowfSwiUGFkZGluZyI6eyIkaWQiOiIzMDgiLCJUb3AiOjAsIkxlZnQiOjAsIlJpZ2h0IjowLCJCb3R0b20iOjB9LCJCYWNrZ3JvdW5kIjp7IiRyZWYiOiI4OSJ9LCJJc1Zpc2libGUiOnRydWUsIldpZHRoIjowLjAsIkhlaWdodCI6MC4wLCJCb3JkZXJTdHlsZSI6eyIkaWQiOiIzMDkiLCJMaW5lQ29sb3IiOm51bGwsIkxpbmVXZWlnaHQiOjAuMCwiTGluZVR5cGUiOjAsIlBhcmVudFN0eWxlIjpudWxsfSwiUGFyZW50U3R5bGUiOm51bGx9LCJEdXJhdGlvblN0eWxlIjp7IiRpZCI6IjMxMCIsIkZvbnRTZXR0aW5ncyI6eyIkaWQiOiIzMTEiLCJGb250U2l6ZSI6MTAsIkZvbnROYW1lIjoiQ2FsaWJyaSIsIklzQm9sZCI6ZmFsc2UsIklzSXRhbGljIjpmYWxzZSwiSXNVbmRlcmxpbmVkIjpmYWxzZSwiUGFyZW50U3R5bGUiOm51bGx9LCJBdXRvU2l6ZSI6MCwiRm9yZWdyb3VuZCI6eyIkaWQiOiIzMTIiLCJDb2xvciI6eyIkcmVmIjoiOTMifX0sIk1heFdpZHRoIjoyMDAuMCwiTWF4SGVpZ2h0IjoiSW5maW5pdHkiLCJTbWFydEZvcmVncm91bmRJc0FjdGl2ZSI6ZmFsc2UsIkhvcml6b250YWxBbGlnbm1lbnQiOjAsIlZlcnRpY2FsQWxpZ25tZW50IjowLCJTbWFydEZvcmVncm91bmQiOm51bGwsIkJhY2tncm91bmRGaWxsVHlwZSI6MCwiTWFyZ2luIjp7IiRpZCI6IjMxMyIsIlRvcCI6MCwiTGVmdCI6MCwiUmlnaHQiOjAsIkJvdHRvbSI6MH0sIlBhZGRpbmciOnsiJGlkIjoiMzE0IiwiVG9wIjowLCJMZWZ0IjowLCJSaWdodCI6MCwiQm90dG9tIjowfSwiQmFja2dyb3VuZCI6eyIkcmVmIjoiOTYifSwiSXNWaXNpYmxlIjp0cnVlLCJXaWR0aCI6MC4wLCJIZWlnaHQiOjAuMCwiQm9yZGVyU3R5bGUiOnsiJGlkIjoiMzE1IiwiTGluZUNvbG9yIjpudWxsLCJMaW5lV2VpZ2h0IjowLjAsIkxpbmVUeXBlIjowLCJQYXJlbnRTdHlsZSI6bnVsbH0sIlBhcmVudFN0eWxlIjpudWxsfSwiSG9yaXpvbnRhbENvbm5lY3RvclN0eWxlIjp7IiRpZCI6IjMxNiIsIkxpbmVDb2xvciI6eyIkcmVmIjoiOTgifSwiTGluZVdlaWdodCI6MS4wLCJMaW5lVHlwZSI6MCwiUGFyZW50U3R5bGUiOm51bGx9LCJWZXJ0aWNhbENvbm5lY3RvclN0eWxlIjp7IiRpZCI6IjMxNyIsIkxpbmVDb2xvciI6eyIkcmVmIjoiMTAxIn0sIkxpbmVXZWlnaHQiOjEuMCwiTGluZVR5cGUiOjAsIlBhcmVudFN0eWxlIjpudWxsfSwiTWFyZ2luIjpudWxsLCJTdGFydERhdGVQb3NpdGlvbiI6NCwiRW5kRGF0ZVBvc2l0aW9uIjo0LCJEYXRlSXNWaXNpYmxlIjp0cnVlLCJUaXRsZVBvc2l0aW9uIjozLCJEdXJhdGlvblBvc2l0aW9uIjo2LCJQZXJjZW50YWdlQ29tcGxldGVkUG9zaXRpb24iOjYsIlNwYWNpbmciOjUsIklzQmVsb3dUaW1lYmFuZCI6ZmFsc2UsIlBlcmNlbnRhZ2VDb21wbGV0ZVNoYXBlT3BhY2l0eSI6MzUsIlNoYXBlU3R5bGUiOnsiJGlkIjoiMzE4IiwiTWFyZ2luIjp7IiRpZCI6IjMxOSIsIlRvcCI6MCwiTGVmdCI6NCwiUmlnaHQiOjQsIkJvdHRvbSI6MH0sIlBhZGRpbmciOnsiJGlkIjoiMzIwIiwiVG9wIjowLCJMZWZ0IjowLCJSaWdodCI6MCwiQm90dG9tIjowfSwiQmFja2dyb3VuZCI6eyIkaWQiOiIzMjEiLCJDb2xvciI6eyIkaWQiOiIzMjIiLCJBIjoyNTUsIlIiOjExMiwiRyI6MTczLCJCIjo3MX19LCJJc1Zpc2libGUiOnRydWUsIldpZHRoIjowLjAsIkhlaWdodCI6MjIuMCwiQm9yZGVyU3R5bGUiOnsiJGlkIjoiMzIzIiwiTGluZUNvbG9yIjp7IiRyZWYiOiIxMDkifSwiTGluZVdlaWdodCI6MC4wLCJMaW5lVHlwZSI6MCwiUGFyZW50U3R5bGUiOm51bGx9LCJQYXJlbnRTdHlsZSI6bnVsbH0sIlRpdGxlU3R5bGUiOnsiJGlkIjoiMzI0IiwiRm9udFNldHRpbmdzIjp7IiRpZCI6IjMyNSIsIkZvbnRTaXplIjoxMSwiRm9udE5hbWUiOiJDYWxpYnJpIiwiSXNCb2xkIjp0cnVlLCJJc0l0YWxpYyI6ZmFsc2UsIklzVW5kZXJsaW5lZCI6ZmFsc2UsIlBhcmVudFN0eWxlIjpudWxsfSwiQXV0b1NpemUiOjAsIkZvcmVncm91bmQiOnsiJGlkIjoiMzI2IiwiQ29sb3IiOnsiJHJlZiI6IjExNCJ9fSwiTWF4V2lkdGgiOjcyMC4wLCJNYXhIZWlnaHQiOiJJbmZpbml0eSIsIlNtYXJ0Rm9yZWdyb3VuZElzQWN0aXZlIjpmYWxzZSwiSG9yaXpvbnRhbEFsaWdubWVudCI6MiwiVmVydGljYWxBbGlnbm1lbnQiOjAsIlNtYXJ0Rm9yZWdyb3VuZCI6bnVsbCwiQmFja2dyb3VuZEZpbGxUeXBlIjowLCJNYXJnaW4iOnsiJGlkIjoiMzI3IiwiVG9wIjowLCJMZWZ0IjowLCJSaWdodCI6MCwiQm90dG9tIjowfSwiUGFkZGluZyI6eyIkaWQiOiIzMjgiLCJUb3AiOjAsIkxlZnQiOjAsIlJpZ2h0IjowLCJCb3R0b20iOjB9LCJCYWNrZ3JvdW5kIjp7IiRyZWYiOiIxMTcifSwiSXNWaXNpYmxlIjp0cnVlLCJXaWR0aCI6MC4wLCJIZWlnaHQiOjAuMCwiQm9yZGVyU3R5bGUiOnsiJGlkIjoiMzI5IiwiTGluZUNvbG9yIjpudWxsLCJMaW5lV2VpZ2h0IjowLjAsIkxpbmVUeXBlIjowLCJQYXJlbnRTdHlsZSI6bnVsbH0sIlBhcmVudFN0eWxlIjpudWxsfSwiRGF0ZVN0eWxlIjp7IiRpZCI6IjMzMCIsIkZvbnRTZXR0aW5ncyI6eyIkaWQiOiIzMzEiLCJGb250U2l6ZSI6MTAsIkZvbnROYW1lIjoiQ2FsaWJyaSIsIklzQm9sZCI6ZmFsc2UsIklzSXRhbGljIjpmYWxzZSwiSXNVbmRlcmxpbmVkIjpmYWxzZSwiUGFyZW50U3R5bGUiOm51bGx9LCJBdXRvU2l6ZSI6MCwiRm9yZWdyb3VuZCI6eyIkaWQiOiIzMzIiLCJDb2xvciI6eyIkcmVmIjoiMTIxIn19LCJNYXhXaWR0aCI6MjAwLjAsIk1heEhlaWdodCI6IkluZmluaXR5IiwiU21hcnRGb3JlZ3JvdW5kSXNBY3RpdmUiOmZhbHNlLCJIb3Jpem9udGFsQWxpZ25tZW50IjowLCJWZXJ0aWNhbEFsaWdubWVudCI6MCwiU21hcnRGb3JlZ3JvdW5kIjpudWxsLCJCYWNrZ3JvdW5kRmlsbFR5cGUiOjAsIk1hcmdpbiI6eyIkaWQiOiIzMzMiLCJUb3AiOjAsIkxlZnQiOjAsIlJpZ2h0IjowLCJCb3R0b20iOjB9LCJQYWRkaW5nIjp7IiRpZCI6IjMzNCIsIlRvcCI6MCwiTGVmdCI6MCwiUmlnaHQiOjAsIkJvdHRvbSI6MH0sIkJhY2tncm91bmQiOnsiJHJlZiI6IjEyNCJ9LCJJc1Zpc2libGUiOnRydWUsIldpZHRoIjowLjAsIkhlaWdodCI6MC4wLCJCb3JkZXJTdHlsZSI6eyIkaWQiOiIzMzUiLCJMaW5lQ29sb3IiOm51bGwsIkxpbmVXZWlnaHQiOjAuMCwiTGluZVR5cGUiOjAsIlBhcmVudFN0eWxlIjpudWxsfSwiUGFyZW50U3R5bGUiOm51bGx9LCJEYXRlRm9ybWF0Ijp7IiRpZCI6IjMzNiIsIkZvcm1hdFN0cmluZyI6Ik1NTSBkIiwiU2VwYXJhdG9yIjoiLyIsIlVzZUludGVybmF0aW9uYWxEYXRlRm9ybWF0IjpmYWxzZSwiRGF0ZUlzVmlzaWJsZSI6dHJ1ZSwiVGltZUlzVmlzaWJsZSI6ZmFsc2UsIkhvdXJEaWdpdHMiOjEsIkFtUG1EZXNpZ25hdG9yIjoyLCJUcmltMDBNaW51dGVzIjpmYWxzZSwiTGFzdEtub3duVmlzaWJpbGl0eVN0YXRlIjpudWxsfSwiSXNWaXNpYmxlIjp0cnVlLCJQYXJlbnRTdHlsZSI6bnVsbH0sIkluZGV4Ijo0LCJTbWFydER1cmF0aW9uQWN0aXZhdGVkIjpmYWxzZSwiRGF0ZUZvcm1hdCI6eyIkcmVmIjoiMzM2In0sIklkIjoiNjQ0YTVjNzgtYTE4Mi00Y2E1LWJhNzktM2NlNGNmYjdiMzIwIiwiSW1wb3J0SWQiOm51bGwsIlRpdGxlIjoiRmFpcmUgbGUgbGllbiBlbnRyZSBsJ2ludGVyZmFjZSB3ZWIgZXQgbGVzIHNjcmlwdHMgUiAiLCJOb3RlIjpudWxsLCJIeXBlcmxpbmsiOnsiJGlkIjoiMzM3IiwiQWRkcmVzcyI6IiIsIlN1YkFkZHJlc3MiOiIifSwiSXNDaGFuZ2VkIjpmYWxzZSwiSXNOZXciOmZhbHNlfSx7IiRpZCI6IjMzOCIsIkdyb3VwTmFtZSI6bnVsbCwiU3RhcnREYXRlIjoiMjAyMC0wMS0xM1QwMDowMDowMFoiLCJFbmREYXRlIjoiMjAyMC0wMi0yMVQyMzo1OTowMCIsIlBlcmNlbnRhZ2VDb21wbGV0ZSI6bnVsbCwiU3R5bGUiOnsiJGlkIjoiMzM5IiwiU2hhcGUiOjAsIlNoYXBlVGhpY2tuZXNzIjoyLCJEdXJhdGlvbkZvcm1hdCI6MCwiSW5jbHVkZU5vbldvcmtpbmdEYXlzSW5EdXJhdGlvbiI6ZmFsc2UsIlBlcmNlbnRhZ2VDb21wbGV0ZVN0eWxlIjp7IiRpZCI6IjM0MCIsIkZvbnRTZXR0aW5ncyI6eyIkaWQiOiIzNDEiLCJGb250U2l6ZSI6MTAsIkZvbnROYW1lIjoiQ2FsaWJyaSIsIklzQm9sZCI6ZmFsc2UsIklzSXRhbGljIjpmYWxzZSwiSXNVbmRlcmxpbmVkIjpmYWxzZSwiUGFyZW50U3R5bGUiOm51bGx9LCJBdXRvU2l6ZSI6MCwiRm9yZWdyb3VuZCI6eyIkcmVmIjoiODUifSwiTWF4V2lkdGgiOjIwMC4wLCJNYXhIZWlnaHQiOiJJbmZpbml0eSIsIlNtYXJ0Rm9yZWdyb3VuZElzQWN0aXZlIjpmYWxzZSwiSG9yaXpvbnRhbEFsaWdubWVudCI6MCwiVmVydGljYWxBbGlnbm1lbnQiOjAsIlNtYXJ0Rm9yZWdyb3VuZCI6bnVsbCwiQmFja2dyb3VuZEZpbGxUeXBlIjowLCJNYXJnaW4iOnsiJGlkIjoiMzQyIiwiVG9wIjowLCJMZWZ0IjowLCJSaWdodCI6MCwiQm90dG9tIjowfSwiUGFkZGluZyI6eyIkaWQiOiIzNDMiLCJUb3AiOjAsIkxlZnQiOjAsIlJpZ2h0IjowLCJCb3R0b20iOjB9LCJCYWNrZ3JvdW5kIjp7IiRyZWYiOiI4OSJ9LCJJc1Zpc2libGUiOnRydWUsIldpZHRoIjowLjAsIkhlaWdodCI6MC4wLCJCb3JkZXJTdHlsZSI6eyIkaWQiOiIzNDQiLCJMaW5lQ29sb3IiOm51bGwsIkxpbmVXZWlnaHQiOjAuMCwiTGluZVR5cGUiOjAsIlBhcmVudFN0eWxlIjpudWxsfSwiUGFyZW50U3R5bGUiOm51bGx9LCJEdXJhdGlvblN0eWxlIjp7IiRpZCI6IjM0NSIsIkZvbnRTZXR0aW5ncyI6eyIkaWQiOiIzNDYiLCJGb250U2l6ZSI6MTAsIkZvbnROYW1lIjoiQ2FsaWJyaSIsIklzQm9sZCI6ZmFsc2UsIklzSXRhbGljIjpmYWxzZSwiSXNVbmRlcmxpbmVkIjpmYWxzZSwiUGFyZW50U3R5bGUiOm51bGx9LCJBdXRvU2l6ZSI6MCwiRm9yZWdyb3VuZCI6eyIkaWQiOiIzNDciLCJDb2xvciI6eyIkcmVmIjoiOTMifX0sIk1heFdpZHRoIjoyMDAuMCwiTWF4SGVpZ2h0IjoiSW5maW5pdHkiLCJTbWFydEZvcmVncm91bmRJc0FjdGl2ZSI6ZmFsc2UsIkhvcml6b250YWxBbGlnbm1lbnQiOjAsIlZlcnRpY2FsQWxpZ25tZW50IjowLCJTbWFydEZvcmVncm91bmQiOm51bGwsIkJhY2tncm91bmRGaWxsVHlwZSI6MCwiTWFyZ2luIjp7IiRpZCI6IjM0OCIsIlRvcCI6MCwiTGVmdCI6MCwiUmlnaHQiOjAsIkJvdHRvbSI6MH0sIlBhZGRpbmciOnsiJGlkIjoiMzQ5IiwiVG9wIjowLCJMZWZ0IjowLCJSaWdodCI6MCwiQm90dG9tIjowfSwiQmFja2dyb3VuZCI6eyIkcmVmIjoiOTYifSwiSXNWaXNpYmxlIjp0cnVlLCJXaWR0aCI6MC4wLCJIZWlnaHQiOjAuMCwiQm9yZGVyU3R5bGUiOnsiJGlkIjoiMzUwIiwiTGluZUNvbG9yIjpudWxsLCJMaW5lV2VpZ2h0IjowLjAsIkxpbmVUeXBlIjowLCJQYXJlbnRTdHlsZSI6bnVsbH0sIlBhcmVudFN0eWxlIjpudWxsfSwiSG9yaXpvbnRhbENvbm5lY3RvclN0eWxlIjp7IiRpZCI6IjM1MSIsIkxpbmVDb2xvciI6eyIkcmVmIjoiOTgifSwiTGluZVdlaWdodCI6MS4wLCJMaW5lVHlwZSI6MCwiUGFyZW50U3R5bGUiOm51bGx9LCJWZXJ0aWNhbENvbm5lY3RvclN0eWxlIjp7IiRpZCI6IjM1MiIsIkxpbmVDb2xvciI6eyIkcmVmIjoiMTAxIn0sIkxpbmVXZWlnaHQiOjEuMCwiTGluZVR5cGUiOjAsIlBhcmVudFN0eWxlIjpudWxsfSwiTWFyZ2luIjpudWxsLCJTdGFydERhdGVQb3NpdGlvbiI6NCwiRW5kRGF0ZVBvc2l0aW9uIjo0LCJEYXRlSXNWaXNpYmxlIjp0cnVlLCJUaXRsZVBvc2l0aW9uIjoyLCJEdXJhdGlvblBvc2l0aW9uIjo2LCJQZXJjZW50YWdlQ29tcGxldGVkUG9zaXRpb24iOjYsIlNwYWNpbmciOjUsIklzQmVsb3dUaW1lYmFuZCI6ZmFsc2UsIlBlcmNlbnRhZ2VDb21wbGV0ZVNoYXBlT3BhY2l0eSI6MzUsIlNoYXBlU3R5bGUiOnsiJGlkIjoiMzUzIiwiTWFyZ2luIjp7IiRpZCI6IjM1NCIsIlRvcCI6MCwiTGVmdCI6NCwiUmlnaHQiOjQsIkJvdHRvbSI6MH0sIlBhZGRpbmciOnsiJGlkIjoiMzU1IiwiVG9wIjowLCJMZWZ0IjowLCJSaWdodCI6MCwiQm90dG9tIjowfSwiQmFja2dyb3VuZCI6eyIkaWQiOiIzNTYiLCJDb2xvciI6eyIkaWQiOiIzNTciLCJBIjoyNTUsIlIiOjkxLCJHIjoxNTUsIkIiOjIxM319LCJJc1Zpc2libGUiOnRydWUsIldpZHRoIjowLjAsIkhlaWdodCI6MjIuMCwiQm9yZGVyU3R5bGUiOnsiJGlkIjoiMzU4IiwiTGluZUNvbG9yIjp7IiRyZWYiOiIxMDkifSwiTGluZVdlaWdodCI6MC4wLCJMaW5lVHlwZSI6MCwiUGFyZW50U3R5bGUiOm51bGx9LCJQYXJlbnRTdHlsZSI6bnVsbH0sIlRpdGxlU3R5bGUiOnsiJGlkIjoiMzU5IiwiRm9udFNldHRpbmdzIjp7IiRpZCI6IjM2MCIsIkZvbnRTaXplIjoxMSwiRm9udE5hbWUiOiJDYWxpYnJpIiwiSXNCb2xkIjp0cnVlLCJJc0l0YWxpYyI6ZmFsc2UsIklzVW5kZXJsaW5lZCI6ZmFsc2UsIlBhcmVudFN0eWxlIjpudWxsfSwiQXV0b1NpemUiOjAsIkZvcmVncm91bmQiOnsiJGlkIjoiMzYxIiwiQ29sb3IiOnsiJHJlZiI6IjExNCJ9fSwiTWF4V2lkdGgiOjcyMC4wLCJNYXhIZWlnaHQiOiJJbmZpbml0eSIsIlNtYXJ0Rm9yZWdyb3VuZElzQWN0aXZlIjpmYWxzZSwiSG9yaXpvbnRhbEFsaWdubWVudCI6MSwiVmVydGljYWxBbGlnbm1lbnQiOjAsIlNtYXJ0Rm9yZWdyb3VuZCI6bnVsbCwiQmFja2dyb3VuZEZpbGxUeXBlIjowLCJNYXJnaW4iOnsiJGlkIjoiMzYyIiwiVG9wIjowLCJMZWZ0IjowLCJSaWdodCI6MCwiQm90dG9tIjowfSwiUGFkZGluZyI6eyIkaWQiOiIzNjMiLCJUb3AiOjAsIkxlZnQiOjAsIlJpZ2h0IjowLCJCb3R0b20iOjB9LCJCYWNrZ3JvdW5kIjp7IiRyZWYiOiIxMTcifSwiSXNWaXNpYmxlIjp0cnVlLCJXaWR0aCI6MC4wLCJIZWlnaHQiOjAuMCwiQm9yZGVyU3R5bGUiOnsiJGlkIjoiMzY0IiwiTGluZUNvbG9yIjpudWxsLCJMaW5lV2VpZ2h0IjowLjAsIkxpbmVUeXBlIjowLCJQYXJlbnRTdHlsZSI6bnVsbH0sIlBhcmVudFN0eWxlIjpudWxsfSwiRGF0ZVN0eWxlIjp7IiRpZCI6IjM2NSIsIkZvbnRTZXR0aW5ncyI6eyIkaWQiOiIzNjYiLCJGb250U2l6ZSI6MTAsIkZvbnROYW1lIjoiQ2FsaWJyaSIsIklzQm9sZCI6ZmFsc2UsIklzSXRhbGljIjpmYWxzZSwiSXNVbmRlcmxpbmVkIjpmYWxzZSwiUGFyZW50U3R5bGUiOm51bGx9LCJBdXRvU2l6ZSI6MCwiRm9yZWdyb3VuZCI6eyIkaWQiOiIzNjciLCJDb2xvciI6eyIkcmVmIjoiMTIxIn19LCJNYXhXaWR0aCI6MjAwLjAsIk1heEhlaWdodCI6IkluZmluaXR5IiwiU21hcnRGb3JlZ3JvdW5kSXNBY3RpdmUiOmZhbHNlLCJIb3Jpem9udGFsQWxpZ25tZW50IjowLCJWZXJ0aWNhbEFsaWdubWVudCI6MCwiU21hcnRGb3JlZ3JvdW5kIjpudWxsLCJCYWNrZ3JvdW5kRmlsbFR5cGUiOjAsIk1hcmdpbiI6eyIkaWQiOiIzNjgiLCJUb3AiOjAsIkxlZnQiOjAsIlJpZ2h0IjowLCJCb3R0b20iOjB9LCJQYWRkaW5nIjp7IiRpZCI6IjM2OSIsIlRvcCI6MCwiTGVmdCI6MCwiUmlnaHQiOjAsIkJvdHRvbSI6MH0sIkJhY2tncm91bmQiOnsiJHJlZiI6IjEyNCJ9LCJJc1Zpc2libGUiOnRydWUsIldpZHRoIjowLjAsIkhlaWdodCI6MC4wLCJCb3JkZXJTdHlsZSI6eyIkaWQiOiIzNzAiLCJMaW5lQ29sb3IiOm51bGwsIkxpbmVXZWlnaHQiOjAuMCwiTGluZVR5cGUiOjAsIlBhcmVudFN0eWxlIjpudWxsfSwiUGFyZW50U3R5bGUiOm51bGx9LCJEYXRlRm9ybWF0Ijp7IiRpZCI6IjM3MSIsIkZvcm1hdFN0cmluZyI6Ik1NTSBkIiwiU2VwYXJhdG9yIjoiLyIsIlVzZUludGVybmF0aW9uYWxEYXRlRm9ybWF0IjpmYWxzZSwiRGF0ZUlzVmlzaWJsZSI6dHJ1ZSwiVGltZUlzVmlzaWJsZSI6ZmFsc2UsIkhvdXJEaWdpdHMiOjEsIkFtUG1EZXNpZ25hdG9yIjoyLCJUcmltMDBNaW51dGVzIjpmYWxzZSwiTGFzdEtub3duVmlzaWJpbGl0eVN0YXRlIjpudWxsfSwiSXNWaXNpYmxlIjp0cnVlLCJQYXJlbnRTdHlsZSI6bnVsbH0sIkluZGV4Ijo1LCJTbWFydER1cmF0aW9uQWN0aXZhdGVkIjpmYWxzZSwiRGF0ZUZvcm1hdCI6eyIkcmVmIjoiMzcxIn0sIklkIjoiZjVjZTJlMmMtNmFhNS00MjUzLTg1MDAtZTMzOWM4Zjg0Y2Y1IiwiSW1wb3J0SWQiOm51bGwsIlRpdGxlIjoiQWpvdXRlciBkZXMgdm9pZXMgbm9uLWNhbm9uaXF1ZXMgIiwiTm90ZSI6bnVsbCwiSHlwZXJsaW5rIjp7IiRpZCI6IjM3MiIsIkFkZHJlc3MiOiIiLCJTdWJBZGRyZXNzIjoiIn0sIklzQ2hhbmdlZCI6ZmFsc2UsIklzTmV3IjpmYWxzZX0seyIkaWQiOiIzNzMiLCJHcm91cE5hbWUiOm51bGwsIlN0YXJ0RGF0ZSI6IjIwMjAtMDMtMDlUMDA6MDA6MDBaIiwiRW5kRGF0ZSI6IjIwMjAtMDMtMjBUMjM6NTk6MDAiLCJQZXJjZW50YWdlQ29tcGxldGUiOm51bGwsIlN0eWxlIjp7IiRpZCI6IjM3NCIsIlNoYXBlIjowLCJTaGFwZVRoaWNrbmVzcyI6MiwiRHVyYXRpb25Gb3JtYXQiOjAsIkluY2x1ZGVOb25Xb3JraW5nRGF5c0luRHVyYXRpb24iOmZhbHNlLCJQZXJjZW50YWdlQ29tcGxldGVTdHlsZSI6eyIkaWQiOiIzNzUiLCJGb250U2V0dGluZ3MiOnsiJGlkIjoiMzc2IiwiRm9udFNpemUiOjEwLCJGb250TmFtZSI6IkNhbGlicmkiLCJJc0JvbGQiOmZhbHNlLCJJc0l0YWxpYyI6ZmFsc2UsIklzVW5kZXJsaW5lZCI6ZmFsc2UsIlBhcmVudFN0eWxlIjpudWxsfSwiQXV0b1NpemUiOjAsIkZvcmVncm91bmQiOnsiJHJlZiI6Ijg1In0sIk1heFdpZHRoIjoyMDAuMCwiTWF4SGVpZ2h0IjoiSW5maW5pdHkiLCJTbWFydEZvcmVncm91bmRJc0FjdGl2ZSI6ZmFsc2UsIkhvcml6b250YWxBbGlnbm1lbnQiOjAsIlZlcnRpY2FsQWxpZ25tZW50IjowLCJTbWFydEZvcmVncm91bmQiOm51bGwsIkJhY2tncm91bmRGaWxsVHlwZSI6MCwiTWFyZ2luIjp7IiRpZCI6IjM3NyIsIlRvcCI6MCwiTGVmdCI6MCwiUmlnaHQiOjAsIkJvdHRvbSI6MH0sIlBhZGRpbmciOnsiJGlkIjoiMzc4IiwiVG9wIjowLCJMZWZ0IjowLCJSaWdodCI6MCwiQm90dG9tIjowfSwiQmFja2dyb3VuZCI6eyIkcmVmIjoiODkifSwiSXNWaXNpYmxlIjp0cnVlLCJXaWR0aCI6MC4wLCJIZWlnaHQiOjAuMCwiQm9yZGVyU3R5bGUiOnsiJGlkIjoiMzc5IiwiTGluZUNvbG9yIjpudWxsLCJMaW5lV2VpZ2h0IjowLjAsIkxpbmVUeXBlIjowLCJQYXJlbnRTdHlsZSI6bnVsbH0sIlBhcmVudFN0eWxlIjpudWxsfSwiRHVyYXRpb25TdHlsZSI6eyIkaWQiOiIzODAiLCJGb250U2V0dGluZ3MiOnsiJGlkIjoiMzgxIiwiRm9udFNpemUiOjEwLCJGb250TmFtZSI6IkNhbGlicmkiLCJJc0JvbGQiOmZhbHNlLCJJc0l0YWxpYyI6ZmFsc2UsIklzVW5kZXJsaW5lZCI6ZmFsc2UsIlBhcmVudFN0eWxlIjpudWxsfSwiQXV0b1NpemUiOjAsIkZvcmVncm91bmQiOnsiJGlkIjoiMzgyIiwiQ29sb3IiOnsiJHJlZiI6IjkzIn19LCJNYXhXaWR0aCI6MjAwLjAsIk1heEhlaWdodCI6IkluZmluaXR5IiwiU21hcnRGb3JlZ3JvdW5kSXNBY3RpdmUiOmZhbHNlLCJIb3Jpem9udGFsQWxpZ25tZW50IjowLCJWZXJ0aWNhbEFsaWdubWVudCI6MCwiU21hcnRGb3JlZ3JvdW5kIjpudWxsLCJCYWNrZ3JvdW5kRmlsbFR5cGUiOjAsIk1hcmdpbiI6eyIkaWQiOiIzODMiLCJUb3AiOjAsIkxlZnQiOjAsIlJpZ2h0IjowLCJCb3R0b20iOjB9LCJQYWRkaW5nIjp7IiRpZCI6IjM4NCIsIlRvcCI6MCwiTGVmdCI6MCwiUmlnaHQiOjAsIkJvdHRvbSI6MH0sIkJhY2tncm91bmQiOnsiJHJlZiI6Ijk2In0sIklzVmlzaWJsZSI6dHJ1ZSwiV2lkdGgiOjAuMCwiSGVpZ2h0IjowLjAsIkJvcmRlclN0eWxlIjp7IiRpZCI6IjM4NSIsIkxpbmVDb2xvciI6bnVsbCwiTGluZVdlaWdodCI6MC4wLCJMaW5lVHlwZSI6MCwiUGFyZW50U3R5bGUiOm51bGx9LCJQYXJlbnRTdHlsZSI6bnVsbH0sIkhvcml6b250YWxDb25uZWN0b3JTdHlsZSI6eyIkaWQiOiIzODYiLCJMaW5lQ29sb3IiOnsiJHJlZiI6Ijk4In0sIkxpbmVXZWlnaHQiOjEuMCwiTGluZVR5cGUiOjAsIlBhcmVudFN0eWxlIjpudWxsfSwiVmVydGljYWxDb25uZWN0b3JTdHlsZSI6eyIkaWQiOiIzODciLCJMaW5lQ29sb3IiOnsiJHJlZiI6IjEwMSJ9LCJMaW5lV2VpZ2h0IjoxLjAsIkxpbmVUeXBlIjowLCJQYXJlbnRTdHlsZSI6bnVsbH0sIk1hcmdpbiI6bnVsbCwiU3RhcnREYXRlUG9zaXRpb24iOjQsIkVuZERhdGVQb3NpdGlvbiI6NCwiRGF0ZUlzVmlzaWJsZSI6dHJ1ZSwiVGl0bGVQb3NpdGlvbiI6MywiRHVyYXRpb25Qb3NpdGlvbiI6NiwiUGVyY2VudGFnZUNvbXBsZXRlZFBvc2l0aW9uIjo2LCJTcGFjaW5nIjo1LCJJc0JlbG93VGltZWJhbmQiOmZhbHNlLCJQZXJjZW50YWdlQ29tcGxldGVTaGFwZU9wYWNpdHkiOjM1LCJTaGFwZVN0eWxlIjp7IiRpZCI6IjM4OCIsIk1hcmdpbiI6eyIkaWQiOiIzODkiLCJUb3AiOjAsIkxlZnQiOjQsIlJpZ2h0Ijo0LCJCb3R0b20iOjB9LCJQYWRkaW5nIjp7IiRpZCI6IjM5MCIsIlRvcCI6MCwiTGVmdCI6MCwiUmlnaHQiOjAsIkJvdHRvbSI6MH0sIkJhY2tncm91bmQiOnsiJGlkIjoiMzkxIiwiQ29sb3IiOnsiJGlkIjoiMzkyIiwiQSI6MjU1LCJSIjo5MSwiRyI6MTU1LCJCIjoyMTN9fSwiSXNWaXNpYmxlIjp0cnVlLCJXaWR0aCI6MC4wLCJIZWlnaHQiOjIyLjAsIkJvcmRlclN0eWxlIjp7IiRpZCI6IjM5MyIsIkxpbmVDb2xvciI6eyIkcmVmIjoiMTA5In0sIkxpbmVXZWlnaHQiOjAuMCwiTGluZVR5cGUiOjAsIlBhcmVudFN0eWxlIjpudWxsfSwiUGFyZW50U3R5bGUiOm51bGx9LCJUaXRsZVN0eWxlIjp7IiRpZCI6IjM5NCIsIkZvbnRTZXR0aW5ncyI6eyIkaWQiOiIzOTUiLCJGb250U2l6ZSI6MTEsIkZvbnROYW1lIjoiQ2FsaWJyaSIsIklzQm9sZCI6dHJ1ZSwiSXNJdGFsaWMiOmZhbHNlLCJJc1VuZGVybGluZWQiOmZhbHNlLCJQYXJlbnRTdHlsZSI6bnVsbH0sIkF1dG9TaXplIjowLCJGb3JlZ3JvdW5kIjp7IiRpZCI6IjM5NiIsIkNvbG9yIjp7IiRyZWYiOiIxMTQifX0sIk1heFdpZHRoIjo3MjAuMCwiTWF4SGVpZ2h0IjoiSW5maW5pdHkiLCJTbWFydEZvcmVncm91bmRJc0FjdGl2ZSI6ZmFsc2UsIkhvcml6b250YWxBbGlnbm1lbnQiOjIsIlZlcnRpY2FsQWxpZ25tZW50IjowLCJTbWFydEZvcmVncm91bmQiOm51bGwsIkJhY2tncm91bmRGaWxsVHlwZSI6MCwiTWFyZ2luIjp7IiRpZCI6IjM5NyIsIlRvcCI6MCwiTGVmdCI6MCwiUmlnaHQiOjAsIkJvdHRvbSI6MH0sIlBhZGRpbmciOnsiJGlkIjoiMzk4IiwiVG9wIjowLCJMZWZ0IjowLCJSaWdodCI6MCwiQm90dG9tIjowfSwiQmFja2dyb3VuZCI6eyIkcmVmIjoiMTE3In0sIklzVmlzaWJsZSI6dHJ1ZSwiV2lkdGgiOjAuMCwiSGVpZ2h0IjowLjAsIkJvcmRlclN0eWxlIjp7IiRpZCI6IjM5OSIsIkxpbmVDb2xvciI6bnVsbCwiTGluZVdlaWdodCI6MC4wLCJMaW5lVHlwZSI6MCwiUGFyZW50U3R5bGUiOm51bGx9LCJQYXJlbnRTdHlsZSI6bnVsbH0sIkRhdGVTdHlsZSI6eyIkaWQiOiI0MDAiLCJGb250U2V0dGluZ3MiOnsiJGlkIjoiNDAxIiwiRm9udFNpemUiOjEwLCJGb250TmFtZSI6IkNhbGlicmkiLCJJc0JvbGQiOmZhbHNlLCJJc0l0YWxpYyI6ZmFsc2UsIklzVW5kZXJsaW5lZCI6ZmFsc2UsIlBhcmVudFN0eWxlIjpudWxsfSwiQXV0b1NpemUiOjAsIkZvcmVncm91bmQiOnsiJGlkIjoiNDAyIiwiQ29sb3IiOnsiJHJlZiI6IjEyMSJ9fSwiTWF4V2lkdGgiOjIwMC4wLCJNYXhIZWlnaHQiOiJJbmZpbml0eSIsIlNtYXJ0Rm9yZWdyb3VuZElzQWN0aXZlIjpmYWxzZSwiSG9yaXpvbnRhbEFsaWdubWVudCI6MCwiVmVydGljYWxBbGlnbm1lbnQiOjAsIlNtYXJ0Rm9yZWdyb3VuZCI6bnVsbCwiQmFja2dyb3VuZEZpbGxUeXBlIjowLCJNYXJnaW4iOnsiJGlkIjoiNDAzIiwiVG9wIjowLCJMZWZ0IjowLCJSaWdodCI6MCwiQm90dG9tIjowfSwiUGFkZGluZyI6eyIkaWQiOiI0MDQiLCJUb3AiOjAsIkxlZnQiOjAsIlJpZ2h0IjowLCJCb3R0b20iOjB9LCJCYWNrZ3JvdW5kIjp7IiRyZWYiOiIxMjQifSwiSXNWaXNpYmxlIjp0cnVlLCJXaWR0aCI6MC4wLCJIZWlnaHQiOjAuMCwiQm9yZGVyU3R5bGUiOnsiJGlkIjoiNDA1IiwiTGluZUNvbG9yIjpudWxsLCJMaW5lV2VpZ2h0IjowLjAsIkxpbmVUeXBlIjowLCJQYXJlbnRTdHlsZSI6bnVsbH0sIlBhcmVudFN0eWxlIjpudWxsfSwiRGF0ZUZvcm1hdCI6eyIkaWQiOiI0MDYiLCJGb3JtYXRTdHJpbmciOiJNTU0gZCIsIlNlcGFyYXRvciI6Ii8iLCJVc2VJbnRlcm5hdGlvbmFsRGF0ZUZvcm1hdCI6ZmFsc2UsIkRhdGVJc1Zpc2libGUiOnRydWUsIlRpbWVJc1Zpc2libGUiOmZhbHNlLCJIb3VyRGlnaXRzIjoxLCJBbVBtRGVzaWduYXRvciI6MiwiVHJpbTAwTWludXRlcyI6ZmFsc2UsIkxhc3RLbm93blZpc2liaWxpdHlTdGF0ZSI6bnVsbH0sIklzVmlzaWJsZSI6dHJ1ZSwiUGFyZW50U3R5bGUiOm51bGx9LCJJbmRleCI6NiwiU21hcnREdXJhdGlvbkFjdGl2YXRlZCI6ZmFsc2UsIkRhdGVGb3JtYXQiOnsiJHJlZiI6IjQwNiJ9LCJJZCI6ImU5ZmVkMGY5LTJhMzAtNDcxOC04M2Q3LWViMWY3Yjk0ZjJjOCIsIkltcG9ydElkIjpudWxsLCJUaXRsZSI6IkltcGzDqW1lbnRlciBsJ291dGlscyBzdXIgbGUgc2VydmV1ciBjbGllbnQiLCJOb3RlIjpudWxsLCJIeXBlcmxpbmsiOnsiJGlkIjoiNDA3IiwiQWRkcmVzcyI6IiIsIlN1YkFkZHJlc3MiOiIifSwiSXNDaGFuZ2VkIjpmYWxzZSwiSXNOZXciOmZhbHNlfV0sIlN3aW1sYW5lcyI6W10sIk1zUHJvamVjdEl0ZW1zVHJlZSI6eyIkaWQiOiI0MDgiLCJSb290Ijp7IkltcG9ydElkIjpudWxsLCJJc0ltcG9ydGVkIjpmYWxzZSwiQ2hpbGRyZW4iOltdfX0sIk1ldGFkYXRhIjp7IiRpZCI6IjQwOSIsIlJlY2VudENvbG9yc0NvbGxlY3Rpb24iOiJbXCIjRkZFRDdEMzFcIixcIiNGRjcwQUQ0N1wiLFwiI0ZGRUExNjFFXCJdIn0sIlNldHRpbmdzIjp7IiRpZCI6IjQxMCIsIkltcGFPcHRpb25zIjp7IiRpZCI6IjQxMSIsIkxlZnRUb1JpZ2h0IjpmYWxzZSwiUGF5bG9hZE9wdGlvbnMiOjJ9LCJVc2VDb21wcmVzc2lvbiI6ZmFsc2UsIkNvbXByZXNpb25QZXJjZW50YWdlIjo1MC4wLCJJbmFjdGl2ZUludGVydmFsV2lkdGhUaHJlc2hvbGQiOjMwLjAsIkluYWN0aXZlSW50ZXJ2YWxXaWR0aCI6MS4wLCJTcGxpdFRhc2tzIjpmYWxzZSwiVXNlQ2x1c3RlciI6ZmFsc2UsIkVwc2lsb24iOjUuMCwiTWluUG9pbnRzVG9Gb3JtQUNsdXN0ZXIiOjIsIkdlbmVyYXRlSW52aXNpYmxlU2hhcGVzIjpmYWxzZSwiU21hcnRUaW1lbGluZVRhc2tQZXJjZW50YWdlRml0IjpmYWxzZX0sIklzTmV3IjpmYWxzZSwiSW1wb3J0VHlwZSI6MCwiRmlsZVBhdGgiOm51bGwsIlRpbWVDb25maWd1cmF0aW9uIjp7IiRpZCI6IjQxMiIsIlVzZVRpbWUiOmZhbHNlLCJXb3JrRGF5U3RhcnQiOiIwMDowMDowMCIsIldvcmtEYXlFbmQiOiIyMzo1OTowMCJ9LCJMYXN0VXNlZFRlbXBsYXRlSWQiOiI5NWZiZjBmNy1jYTZjLTRiYjktYWU3OC0xYWFmMmNhOTYwZWIifQ=="/>
   <p:tag name="__MASTER" val="__part_0"/>
 </p:tagLst>
 </file>
@@ -26536,7 +26510,7 @@
 
 <file path=ppt/tags/tag98.xml><?xml version="1.0" encoding="utf-8"?>
 <p:tagLst xmlns:a="http://schemas.openxmlformats.org/drawingml/2006/main" xmlns:r="http://schemas.openxmlformats.org/officeDocument/2006/relationships" xmlns:p="http://schemas.openxmlformats.org/presentationml/2006/main">
-  <p:tag name="__PART_0" val="eyIkaWQiOiIxIiwiQ3VsdHVyZUluZm9OYW1lIjoiZW4tVVMiLCJTdHlsZU5hbWUiOm51bGwsIlZlcnNpb24iOnsiJGlkIjoiMiIsIlZlcnNpb24iOiIzLjIuMCIsIk9yaWdpbmFsQXNzZW1ibHlWZXJzaW9uIjoiNC4wMS4wMC4wMCIsIkVkaXRpb24iOiJGcmVlIiwiSXNQbHVzRWRpdGlvbiI6ZmFsc2UsIklzUHJvRWRpdGlvbiI6ZmFsc2V9LCJFZmZlY3QiOjEsIlN0eWxlIjp7IiRpZCI6IjMiLCJUaW1lYmFuZFN0eWxlIjp7IiRpZCI6IjQiLCJTY2FsZU1hcmtpbmciOjAsIlNoYXBlIjozLCJTaGFwZVN0eWxlIjp7IiRpZCI6IjUiLCJNYXJnaW4iOnsiJGlkIjoiNiIsIlRvcCI6MCwiTGVmdCI6MTAsIlJpZ2h0IjoxMCwiQm90dG9tIjowfSwiUGFkZGluZyI6eyIkaWQiOiI3IiwiVG9wIjozLCJMZWZ0IjowLCJSaWdodCI6MCwiQm90dG9tIjozfSwiQmFja2dyb3VuZCI6eyIkaWQiOiI4IiwiQ29sb3IiOnsiJGlkIjoiOSIsIkEiOjI1NSwiUiI6MTc4LCJHIjoxNzgsIkIiOjE3OH19LCJJc1Zpc2libGUiOnRydWUsIldpZHRoIjowLjAsIkhlaWdodCI6MzAuMCwiQm9yZGVyU3R5bGUiOnsiJGlkIjoiMTAiLCJMaW5lQ29sb3IiOnsiJGlkIjoiMTEiLCIkdHlwZSI6Ik5MUkUuQ29tbW9uLkRvbS5Tb2xpZENvbG9yQnJ1c2gsIE5MUkUuQ29tbW9uIiwiQ29sb3IiOnsiJGlkIjoiMTIiLCJBIjoyNTUsIlIiOjI1NSwiRyI6MCwiQiI6MH19LCJMaW5lV2VpZ2h0IjowLjAsIkxpbmVUeXBlIjowLCJQYXJlbnRTdHlsZSI6bnVsbH0sIlBhcmVudFN0eWxlIjpudWxsfSwiUmlnaHRFbmRDYXBzU3R5bGUiOnsiJGlkIjoiMTMiLCJGb250U2V0dGluZ3MiOnsiJGlkIjoiMTQiLCJGb250U2l6ZSI6MTgsIkZvbnROYW1lIjoiQ2FsaWJyaSIsIklzQm9sZCI6dHJ1ZSwiSXNJdGFsaWMiOmZhbHNlLCJJc1VuZGVybGluZWQiOmZhbHNlLCJQYXJlbnRTdHlsZSI6bnVsbH0sIkF1dG9TaXplIjowLCJGb3JlZ3JvdW5kIjp7IiRpZCI6IjE1IiwiQ29sb3IiOnsiJGlkIjoiMTYiLCJBIjoyNTUsIlIiOjIzNywiRyI6MTI1LCJCIjo0OX19LCJNYXhXaWR0aCI6IkluZmluaXR5IiwiTWF4SGVpZ2h0IjoiSW5maW5pdHkiLCJTbWFydEZvcmVncm91bmRJc0FjdGl2ZSI6ZmFsc2UsIkhvcml6b250YWxBbGlnbm1lbnQiOjAsIlZlcnRpY2FsQWxpZ25tZW50IjowLCJTbWFydEZvcmVncm91bmQiOm51bGwsIkJhY2tncm91bmRGaWxsVHlwZSI6MCwiTWFyZ2luIjp7IiRpZCI6IjE3IiwiVG9wIjowLCJMZWZ0IjowLCJSaWdodCI6MjAsIkJvdHRvbSI6MH0sIlBhZGRpbmciOnsiJGlkIjoiMTgiLCJUb3AiOjAsIkxlZnQiOjAsIlJpZ2h0IjowLCJCb3R0b20iOjB9LCJCYWNrZ3JvdW5kIjp7IiRpZCI6IjE5IiwiQ29sb3IiOnsiJGlkIjoiMjAiLCJBIjowLCJSIjowLCJHIjowLCJCIjowfX0sIklzVmlzaWJsZSI6dHJ1ZSwiV2lkdGgiOjAuMCwiSGVpZ2h0IjowLjAsIkJvcmRlclN0eWxlIjpudWxsLCJQYXJlbnRTdHlsZSI6bnVsbH0sIkxlZnRFbmRDYXBzU3R5bGUiOnsiJGlkIjoiMjEiLCJGb250U2V0dGluZ3MiOnsiJGlkIjoiMjIiLCJGb250U2l6ZSI6MTgsIkZvbnROYW1lIjoiQ2FsaWJyaSIsIklzQm9sZCI6dHJ1ZSwiSXNJdGFsaWMiOmZhbHNlLCJJc1VuZGVybGluZWQiOmZhbHNlLCJQYXJlbnRTdHlsZSI6bnVsbH0sIkF1dG9TaXplIjowLCJGb3JlZ3JvdW5kIjp7IiRpZCI6IjIzIiwiQ29sb3IiOnsiJGlkIjoiMjQiLCJBIjoyNTUsIlIiOjIzNywiRyI6MTI1LCJCIjo0OX19LCJNYXhXaWR0aCI6IkluZmluaXR5IiwiTWF4SGVpZ2h0IjoiSW5maW5pdHkiLCJTbWFydEZvcmVncm91bmRJc0FjdGl2ZSI6ZmFsc2UsIkhvcml6b250YWxBbGlnbm1lbnQiOjAsIlZlcnRpY2FsQWxpZ25tZW50IjowLCJTbWFydEZvcmVncm91bmQiOm51bGwsIkJhY2tncm91bmRGaWxsVHlwZSI6MCwiTWFyZ2luIjp7IiRpZCI6IjI1IiwiVG9wIjowLCJMZWZ0IjoyMCwiUmlnaHQiOjAsIkJvdHRvbSI6MH0sIlBhZGRpbmciOnsiJGlkIjoiMjYiLCJUb3AiOjAsIkxlZnQiOjAsIlJpZ2h0IjowLCJCb3R0b20iOjB9LCJCYWNrZ3JvdW5kIjp7IiRpZCI6IjI3IiwiQ29sb3IiOnsiJHJlZiI6IjIwIn19LCJJc1Zpc2libGUiOmZhbHNlLCJXaWR0aCI6MC4wLCJIZWlnaHQiOjAuMCwiQm9yZGVyU3R5bGUiOm51bGwsIlBhcmVudFN0eWxlIjpudWxsfSwiVG9kYXlUZXh0U3R5bGUiOnsiJGlkIjoiMjgiLCJGb250U2V0dGluZ3MiOnsiJGlkIjoiMjkiLCJGb250U2l6ZSI6MTIsIkZvbnROYW1lIjoiQ2FsaWJyaSIsIklzQm9sZCI6ZmFsc2UsIklzSXRhbGljIjpmYWxzZSwiSXNVbmRlcmxpbmVkIjpmYWxzZSwiUGFyZW50U3R5bGUiOm51bGx9LCJBdXRvU2l6ZSI6MCwiRm9yZWdyb3VuZCI6eyIkaWQiOiIzMCIsIkNvbG9yIjp7IiRpZCI6IjMxIiwiQSI6MjU1LCJSIjowLCJHIjowLCJCIjowfX0sIk1heFdpZHRoIjoyMDAuMCwiTWF4SGVpZ2h0IjoiSW5maW5pdHkiLCJTbWFydEZvcmVncm91bmRJc0FjdGl2ZSI6ZmFsc2UsIkhvcml6b250YWxBbGlnbm1lbnQiOjAsIlZlcnRpY2FsQWxpZ25tZW50IjowLCJTbWFydEZvcmVncm91bmQiOm51bGwsIkJhY2tncm91bmRGaWxsVHlwZSI6MCwiTWFyZ2luIjp7IiRpZCI6IjMyIiwiVG9wIjowLCJMZWZ0IjowLCJSaWdodCI6MCwiQm90dG9tIjowfSwiUGFkZGluZyI6eyIkaWQiOiIzMyIsIlRvcCI6MCwiTGVmdCI6MCwiUmlnaHQiOjAsIkJvdHRvbSI6MH0sIkJhY2tncm91bmQiOnsiJGlkIjoiMzQiLCJDb2xvciI6eyIkcmVmIjoiMjAifX0sIklzVmlzaWJsZSI6dHJ1ZSwiV2lkdGgiOjAuMCwiSGVpZ2h0IjowLjAsIkJvcmRlclN0eWxlIjpudWxsLCJQYXJlbnRTdHlsZSI6bnVsbH0sIlRvZGF5TWFya2VyU3R5bGUiOnsiJGlkIjoiMzUiLCJNYXJnaW4iOnsiJGlkIjoiMzYiLCJUb3AiOjAsIkxlZnQiOjAsIlJpZ2h0IjowLCJCb3R0b20iOjB9LCJQYWRkaW5nIjp7IiRpZCI6IjM3IiwiVG9wIjowLCJMZWZ0IjowLCJSaWdodCI6MCwiQm90dG9tIjowfSwiQmFja2dyb3VuZCI6eyIkaWQiOiIzOCIsIkNvbG9yIjp7IiRpZCI6IjM5IiwiQSI6MjU1LCJSIjoyNTUsIkciOjAsIkIiOjB9fSwiSXNWaXNpYmxlIjp0cnVlLCJXaWR0aCI6MC4wLCJIZWlnaHQiOjAuMCwiQm9yZGVyU3R5bGUiOm51bGwsIlBhcmVudFN0eWxlIjpudWxsfSwiU2NhbGVTdHlsZSI6eyIkaWQiOiI0MCIsIlNob3dTZWdtZW50U2VwYXJhdG9ycyI6ZmFsc2UsIlNlZ21lbnRTZXBhcmF0b3JPcGFjaXR5IjozMCwiRm9udFNldHRpbmdzIjp7IiRpZCI6IjQxIiwiRm9udFNpemUiOjEyLCJGb250TmFtZSI6IkNhbGlicmkiLCJJc0JvbGQiOmZhbHNlLCJJc0l0YWxpYyI6ZmFsc2UsIklzVW5kZXJsaW5lZCI6ZmFsc2UsIlBhcmVudFN0eWxlIjpudWxsfSwiQXV0b1NpemUiOjAsIkZvcmVncm91bmQiOnsiJGlkIjoiNDIiLCJDb2xvciI6eyIkaWQiOiI0MyIsIkEiOjI1NSwiUiI6MCwiRyI6MCwiQiI6MH19LCJNYXhXaWR0aCI6MjAwLjAsIk1heEhlaWdodCI6IkluZmluaXR5IiwiU21hcnRGb3JlZ3JvdW5kSXNBY3RpdmUiOmZhbHNlLCJIb3Jpem9udGFsQWxpZ25tZW50IjowLCJWZXJ0aWNhbEFsaWdubWVudCI6MSwiU21hcnRGb3JlZ3JvdW5kIjpudWxsLCJCYWNrZ3JvdW5kRmlsbFR5cGUiOjAsIk1hcmdpbiI6eyIkaWQiOiI0NCIsIlRvcCI6MCwiTGVmdCI6NSwiUmlnaHQiOjAsIkJvdHRvbSI6MH0sIlBhZGRpbmciOnsiJGlkIjoiNDUiLCJUb3AiOjAsIkxlZnQiOjAsIlJpZ2h0IjowLCJCb3R0b20iOjB9LCJCYWNrZ3JvdW5kIjp7IiRpZCI6IjQ2IiwiQ29sb3IiOnsiJHJlZiI6IjIwIn19LCJJc1Zpc2libGUiOnRydWUsIldpZHRoIjowLjAsIkhlaWdodCI6MC4wLCJCb3JkZXJTdHlsZSI6bnVsbCwiUGFyZW50U3R5bGUiOm51bGx9LCJFbGFwc2VkVGltZUJhY2tncm91bmQiOnsiJGlkIjoiNDciLCJDb2xvciI6eyIkaWQiOiI0OCIsIkEiOjc3LCJSIjoyNTUsIkciOjE5MiwiQiI6MH19LCJBcHBlbmRZZWFyT25ZZWFyQ2hhbmdlIjp0cnVlLCJFbGFwc2VkVGltZUZvcm1hdCI6MSwiVG9kYXlNYXJrZXJQb3NpdGlvbiI6MywiUXVpY2tQb3NpdGlvbiI6MiwiQWJzb2x1dGVQb3NpdGlvbiI6NDA1LjAsIk1hcmdpbiI6eyIkaWQiOiI0OSIsIlRvcCI6MCwiTGVmdCI6MTAsIlJpZ2h0IjoxMCwiQm90dG9tIjowfSwiUGFkZGluZyI6eyIkaWQiOiI1MCIsIlRvcCI6MCwiTGVmdCI6MCwiUmlnaHQiOjAsIkJvdHRvbSI6MH0sIkJhY2tncm91bmQiOnsiJGlkIjoiNTEiLCJDb2xvciI6eyIkaWQiOiI1MiIsIkEiOjI1NSwiUiI6MTc4LCJHIjoxNzgsIkIiOjE3OH19LCJJc1Zpc2libGUiOnRydWUsIldpZHRoIjowLjAsIkhlaWdodCI6MC4wLCJCb3JkZXJTdHlsZSI6bnVsbCwiUGFyZW50U3R5bGUiOm51bGx9LCJEZWZhdWx0TWlsZXN0b25lU3R5bGUiOnsiJGlkIjoiNTMiLCJTaGFwZSI6NywiQ29ubmVjdG9yTWFyZ2luIjp7IiRpZCI6IjU0IiwiVG9wIjowLCJMZWZ0IjoyLCJSaWdodCI6MiwiQm90dG9tIjowfSwiQ29ubmVjdG9yU3R5bGUiOnsiJGlkIjoiNTUiLCJMaW5lQ29sb3IiOnsiJGlkIjoiNTYiLCIkdHlwZSI6Ik5MUkUuQ29tbW9uLkRvbS5Tb2xpZENvbG9yQnJ1c2gsIE5MUkUuQ29tbW9uIiwiQ29sb3IiOnsiJGlkIjoiNTciLCJBIjoxMjcsIlIiOjMxLCJHIjo3MywiQiI6MTI2fX0sIkxpbmVXZWlnaHQiOjEuMCwiTGluZVR5cGUiOjAsIlBhcmVudFN0eWxlIjpudWxsfSwiSXNCZWxvd1RpbWViYW5kIjpmYWxzZSwiUG9zaXRpb25PblRhc2siOjAsIkhpZGVEYXRlIjpmYWxzZSwiU2hhcGVTaXplIjoxLCJTcGFjaW5nIjoyLjAsIlBhZGRpbmciOnsiJGlkIjoiNTgiLCJUb3AiOjcsIkxlZnQiOjMsIlJpZ2h0IjowLCJCb3R0b20iOjJ9LCJTaGFwZVN0eWxlIjp7IiRpZCI6IjU5IiwiTWFyZ2luIjp7IiRpZCI6IjYwIiwiVG9wIjowLCJMZWZ0IjowLCJSaWdodCI6MCwiQm90dG9tIjowfSwiUGFkZGluZyI6eyIkaWQiOiI2MSIsIlRvcCI6MCwiTGVmdCI6MCwiUmlnaHQiOjAsIkJvdHRvbSI6MH0sIkJhY2tncm91bmQiOnsiJGlkIjoiNjIiLCJDb2xvciI6eyIkaWQiOiI2MyIsIkEiOjI1NSwiUiI6MCwiRyI6MTE0LCJCIjoxODh9fSwiSXNWaXNpYmxlIjp0cnVlLCJXaWR0aCI6MTguMCwiSGVpZ2h0IjoyMC4wLCJCb3JkZXJTdHlsZSI6eyIkaWQiOiI2NCIsIkxpbmVDb2xvciI6eyIkaWQiOiI2NSIsIiR0eXBlIjoiTkxSRS5Db21tb24uRG9tLlNvbGlkQ29sb3JCcnVzaCwgTkxSRS5Db21tb24iLCJDb2xvciI6eyIkaWQiOiI2NiIsIkEiOjI1NSwiUiI6MjU1LCJHIjowLCJCIjowfX0sIkxpbmVXZWlnaHQiOjAuMCwiTGluZVR5cGUiOjAsIlBhcmVudFN0eWxlIjpudWxsfSwiUGFyZW50U3R5bGUiOm51bGx9LCJUaXRsZVN0eWxlIjp7IiRpZCI6IjY3IiwiRm9udFNldHRpbmdzIjp7IiRpZCI6IjY4IiwiRm9udFNpemUiOjExLCJGb250TmFtZSI6IkNhbGlicmkiLCJJc0JvbGQiOnRydWUsIklzSXRhbGljIjpmYWxzZSwiSXNVbmRlcmxpbmVkIjpmYWxzZSwiUGFyZW50U3R5bGUiOm51bGx9LCJBdXRvU2l6ZSI6MCwiRm9yZWdyb3VuZCI6eyIkaWQiOiI2OSIsIkNvbG9yIjp7IiRpZCI6IjcwIiwiQSI6MjU1LCJSIjowLCJHIjowLCJCIjowfX0sIk1heFdpZHRoIjoyMDAuMCwiTWF4SGVpZ2h0IjoiSW5maW5pdHkiLCJTbWFydEZvcmVncm91bmRJc0FjdGl2ZSI6ZmFsc2UsIkhvcml6b250YWxBbGlnbm1lbnQiOjEsIlZlcnRpY2FsQWxpZ25tZW50IjowLCJTbWFydEZvcmVncm91bmQiOm51bGwsIkJhY2tncm91bmRGaWxsVHlwZSI6MCwiTWFyZ2luIjp7IiRpZCI6IjcxIiwiVG9wIjowLCJMZWZ0IjowLCJSaWdodCI6MCwiQm90dG9tIjowfSwiUGFkZGluZyI6eyIkaWQiOiI3MiIsIlRvcCI6MCwiTGVmdCI6MCwiUmlnaHQiOjAsIkJvdHRvbSI6MH0sIkJhY2tncm91bmQiOnsiJGlkIjoiNzMiLCJDb2xvciI6eyIkcmVmIjoiMjAifX0sIklzVmlzaWJsZSI6dHJ1ZSwiV2lkdGgiOjAuMCwiSGVpZ2h0IjowLjAsIkJvcmRlclN0eWxlIjpudWxsLCJQYXJlbnRTdHlsZSI6bnVsbH0sIkRhdGVTdHlsZSI6eyIkaWQiOiI3NCIsIkZvbnRTZXR0aW5ncyI6eyIkaWQiOiI3NSIsIkZvbnRTaXplIjoxMCwiRm9udE5hbWUiOiJDYWxpYnJpIiwiSXNCb2xkIjpmYWxzZSwiSXNJdGFsaWMiOmZhbHNlLCJJc1VuZGVybGluZWQiOmZhbHNlLCJQYXJlbnRTdHlsZSI6bnVsbH0sIkF1dG9TaXplIjowLCJGb3JlZ3JvdW5kIjp7IiRpZCI6Ijc2IiwiQ29sb3IiOnsiJGlkIjoiNzciLCJBIjoyNTUsIlIiOjY4LCJHIjo4NCwiQiI6MTA2fX0sIk1heFdpZHRoIjoyMDAuMCwiTWF4SGVpZ2h0IjoiSW5maW5pdHkiLCJTbWFydEZvcmVncm91bmRJc0FjdGl2ZSI6ZmFsc2UsIkhvcml6b250YWxBbGlnbm1lbnQiOjAsIlZlcnRpY2FsQWxpZ25tZW50IjowLCJTbWFydEZvcmVncm91bmQiOm51bGwsIkJhY2tncm91bmRGaWxsVHlwZSI6MCwiTWFyZ2luIjp7IiRpZCI6Ijc4IiwiVG9wIjowLCJMZWZ0IjowLCJSaWdodCI6MCwiQm90dG9tIjowfSwiUGFkZGluZyI6eyIkaWQiOiI3OSIsIlRvcCI6MCwiTGVmdCI6MCwiUmlnaHQiOjAsIkJvdHRvbSI6MH0sIkJhY2tncm91bmQiOnsiJGlkIjoiODAiLCJDb2xvciI6eyIkcmVmIjoiMjAifX0sIklzVmlzaWJsZSI6dHJ1ZSwiV2lkdGgiOjAuMCwiSGVpZ2h0IjowLjAsIkJvcmRlclN0eWxlIjpudWxsLCJQYXJlbnRTdHlsZSI6bnVsbH0sIkRhdGVGb3JtYXQiOnsiJGlkIjoiODEiLCJGb3JtYXRTdHJpbmciOiJNTU0gZCIsIlNlcGFyYXRvciI6Ii8iLCJVc2VJbnRlcm5hdGlvbmFsRGF0ZUZvcm1hdCI6ZmFsc2UsIkRhdGVJc1Zpc2libGUiOnRydWUsIlRpbWVJc1Zpc2libGUiOmZhbHNlLCJIb3VyRGlnaXRzIjoxLCJBbVBtRGVzaWduYXRvciI6MiwiVHJpbTAwTWludXRlcyI6ZmFsc2UsIkxhc3RLbm93blZpc2liaWxpdHlTdGF0ZSI6bnVsbH0sIklzVmlzaWJsZSI6dHJ1ZSwiUGFyZW50U3R5bGUiOm51bGx9LCJEZWZhdWx0VGFza1N0eWxlIjp7IiRpZCI6IjgyIiwiU2hhcGUiOjAsIlNoYXBlVGhpY2tuZXNzIjoyLCJEdXJhdGlvbkZvcm1hdCI6MCwiSW5jbHVkZU5vbldvcmtpbmdEYXlzSW5EdXJhdGlvbiI6ZmFsc2UsIlBlcmNlbnRhZ2VDb21wbGV0ZVN0eWxlIjp7IiRpZCI6IjgzIiwiRm9udFNldHRpbmdzIjp7IiRpZCI6Ijg0IiwiRm9udFNpemUiOjEwLCJGb250TmFtZSI6IkNhbGlicmkiLCJJc0JvbGQiOmZhbHNlLCJJc0l0YWxpYyI6ZmFsc2UsIklzVW5kZXJsaW5lZCI6ZmFsc2UsIlBhcmVudFN0eWxlIjpudWxsfSwiQXV0b1NpemUiOjAsIkZvcmVncm91bmQiOnsiJGlkIjoiODUiLCJDb2xvciI6eyIkaWQiOiI4NiIsIkEiOjI1NSwiUiI6MjM4LCJHIjoyMzYsIkIiOjIyNX19LCJNYXhXaWR0aCI6MjAwLjAsIk1heEhlaWdodCI6IkluZmluaXR5IiwiU21hcnRGb3JlZ3JvdW5kSXNBY3RpdmUiOmZhbHNlLCJIb3Jpem9udGFsQWxpZ25tZW50IjoxLCJWZXJ0aWNhbEFsaWdubWVudCI6MCwiU21hcnRGb3JlZ3JvdW5kIjpudWxsLCJCYWNrZ3JvdW5kRmlsbFR5cGUiOjAsIk1hcmdpbiI6eyIkaWQiOiI4NyIsIlRvcCI6MCwiTGVmdCI6MCwiUmlnaHQiOjAsIkJvdHRvbSI6MH0sIlBhZGRpbmciOnsiJGlkIjoiODgiLCJUb3AiOjAsIkxlZnQiOjAsIlJpZ2h0IjowLCJCb3R0b20iOjB9LCJCYWNrZ3JvdW5kIjp7IiRpZCI6Ijg5IiwiQ29sb3IiOnsiJHJlZiI6IjIwIn19LCJJc1Zpc2libGUiOnRydWUsIldpZHRoIjowLjAsIkhlaWdodCI6MC4wLCJCb3JkZXJTdHlsZSI6bnVsbCwiUGFyZW50U3R5bGUiOm51bGx9LCJEdXJhdGlvblN0eWxlIjp7IiRpZCI6IjkwIiwiRm9udFNldHRpbmdzIjp7IiRpZCI6IjkxIiwiRm9udFNpemUiOjEwLCJGb250TmFtZSI6IkNhbGlicmkiLCJJc0JvbGQiOmZhbHNlLCJJc0l0YWxpYyI6ZmFsc2UsIklzVW5kZXJsaW5lZCI6ZmFsc2UsIlBhcmVudFN0eWxlIjpudWxsfSwiQXV0b1NpemUiOjAsIkZvcmVncm91bmQiOnsiJGlkIjoiOTIiLCJDb2xvciI6eyIkaWQiOiI5MyIsIkEiOjI1NSwiUiI6MjM3LCJHIjoxMjUsIkIiOjQ5fX0sIk1heFdpZHRoIjoyMDAuMCwiTWF4SGVpZ2h0IjoiSW5maW5pdHkiLCJTbWFydEZvcmVncm91bmRJc0FjdGl2ZSI6ZmFsc2UsIkhvcml6b250YWxBbGlnbm1lbnQiOjAsIlZlcnRpY2FsQWxpZ25tZW50IjowLCJTbWFydEZvcmVncm91bmQiOm51bGwsIkJhY2tncm91bmRGaWxsVHlwZSI6MCwiTWFyZ2luIjp7IiRpZCI6Ijk0IiwiVG9wIjowLCJMZWZ0IjowLCJSaWdodCI6MCwiQm90dG9tIjowfSwiUGFkZGluZyI6eyIkaWQiOiI5NSIsIlRvcCI6MCwiTGVmdCI6MCwiUmlnaHQiOjAsIkJvdHRvbSI6MH0sIkJhY2tncm91bmQiOnsiJGlkIjoiOTYiLCJDb2xvciI6eyIkcmVmIjoiMjAifX0sIklzVmlzaWJsZSI6dHJ1ZSwiV2lkdGgiOjAuMCwiSGVpZ2h0IjowLjAsIkJvcmRlclN0eWxlIjpudWxsLCJQYXJlbnRTdHlsZSI6bnVsbH0sIkhvcml6b250YWxDb25uZWN0b3JTdHlsZSI6eyIkaWQiOiI5NyIsIkxpbmVDb2xvciI6eyIkaWQiOiI5OCIsIiR0eXBlIjoiTkxSRS5Db21tb24uRG9tLlNvbGlkQ29sb3JCcnVzaCwgTkxSRS5Db21tb24iLCJDb2xvciI6eyIkaWQiOiI5OSIsIkEiOjI1NSwiUiI6MjA0LCJHIjoyMDQsIkIiOjIwNH19LCJMaW5lV2VpZ2h0IjoxLjAsIkxpbmVUeXBlIjowLCJQYXJlbnRTdHlsZSI6bnVsbH0sIlZlcnRpY2FsQ29ubmVjdG9yU3R5bGUiOnsiJGlkIjoiMTAwIiwiTGluZUNvbG9yIjp7IiRpZCI6IjEwMSIsIiR0eXBlIjoiTkxSRS5Db21tb24uRG9tLlNvbGlkQ29sb3JCcnVzaCwgTkxSRS5Db21tb24iLCJDb2xvciI6eyIkaWQiOiIxMDIiLCJBIjoyNTUsIlIiOjIwNCwiRyI6MjA0LCJCIjoyMDR9fSwiTGluZVdlaWdodCI6MS4wLCJMaW5lVHlwZSI6MCwiUGFyZW50U3R5bGUiOm51bGx9LCJNYXJnaW4iOm51bGwsIlN0YXJ0RGF0ZVBvc2l0aW9uIjo0LCJFbmREYXRlUG9zaXRpb24iOjQsIkRhdGVJc1Zpc2libGUiOnRydWUsIlRpdGxlUG9zaXRpb24iOjIsIkR1cmF0aW9uUG9zaXRpb24iOjYsIlBlcmNlbnRhZ2VDb21wbGV0ZWRQb3NpdGlvbiI6MiwiU3BhY2luZyI6NSwiSXNCZWxvd1RpbWViYW5kIjpmYWxzZSwiUGVyY2VudGFnZUNvbXBsZXRlU2hhcGVPcGFjaXR5IjozNSwiU2hhcGVTdHlsZSI6eyIkaWQiOiIxMDMiLCJNYXJnaW4iOnsiJGlkIjoiMTA0IiwiVG9wIjowLCJMZWZ0Ijo0LCJSaWdodCI6NCwiQm90dG9tIjowfSwiUGFkZGluZyI6eyIkaWQiOiIxMDUiLCJUb3AiOjAsIkxlZnQiOjAsIlJpZ2h0IjowLCJCb3R0b20iOjB9LCJCYWNrZ3JvdW5kIjp7IiRpZCI6IjEwNiIsIkNvbG9yIjp7IiRpZCI6IjEwNyIsIkEiOjI1NSwiUiI6MCwiRyI6MTE0LCJCIjoxODh9fSwiSXNWaXNpYmxlIjp0cnVlLCJXaWR0aCI6MC4wLCJIZWlnaHQiOjIyLjAsIkJvcmRlclN0eWxlIjp7IiRpZCI6IjEwOCIsIkxpbmVDb2xvciI6eyIkaWQiOiIxMDkiLCIkdHlwZSI6Ik5MUkUuQ29tbW9uLkRvbS5Tb2xpZENvbG9yQnJ1c2gsIE5MUkUuQ29tbW9uIiwiQ29sb3IiOnsiJGlkIjoiMTEwIiwiQSI6MjU1LCJSIjoyNTUsIkciOjAsIkIiOjB9fSwiTGluZVdlaWdodCI6MC4wLCJMaW5lVHlwZSI6MCwiUGFyZW50U3R5bGUiOm51bGx9LCJQYXJlbnRTdHlsZSI6bnVsbH0sIlRpdGxlU3R5bGUiOnsiJGlkIjoiMTExIiwiRm9udFNldHRpbmdzIjp7IiRpZCI6IjExMiIsIkZvbnRTaXplIjoxMSwiRm9udE5hbWUiOiJDYWxpYnJpIiwiSXNCb2xkIjp0cnVlLCJJc0l0YWxpYyI6ZmFsc2UsIklzVW5kZXJsaW5lZCI6ZmFsc2UsIlBhcmVudFN0eWxlIjpudWxsfSwiQXV0b1NpemUiOjAsIkZvcmVncm91bmQiOnsiJGlkIjoiMTEzIiwiQ29sb3IiOnsiJGlkIjoiMTE0IiwiQSI6MjU1LCJSIjowLCJHIjowLCJCIjowfX0sIk1heFdpZHRoIjo5NjAuMCwiTWF4SGVpZ2h0IjoiSW5maW5pdHkiLCJTbWFydEZvcmVncm91bmRJc0FjdGl2ZSI6ZmFsc2UsIkhvcml6b250YWxBbGlnbm1lbnQiOjEsIlZlcnRpY2FsQWxpZ25tZW50IjowLCJTbWFydEZvcmVncm91bmQiOm51bGwsIkJhY2tncm91bmRGaWxsVHlwZSI6MCwiTWFyZ2luIjp7IiRpZCI6IjExNSIsIlRvcCI6MCwiTGVmdCI6MCwiUmlnaHQiOjAsIkJvdHRvbSI6MH0sIlBhZGRpbmciOnsiJGlkIjoiMTE2IiwiVG9wIjowLCJMZWZ0IjowLCJSaWdodCI6MCwiQm90dG9tIjowfSwiQmFja2dyb3VuZCI6eyIkaWQiOiIxMTciLCJDb2xvciI6eyIkcmVmIjoiMjAifX0sIklzVmlzaWJsZSI6dHJ1ZSwiV2lkdGgiOjAuMCwiSGVpZ2h0IjowLjAsIkJvcmRlclN0eWxlIjpudWxsLCJQYXJlbnRTdHlsZSI6bnVsbH0sIkRhdGVTdHlsZSI6eyIkaWQiOiIxMTgiLCJGb250U2V0dGluZ3MiOnsiJGlkIjoiMTE5IiwiRm9udFNpemUiOjEwLCJGb250TmFtZSI6IkNhbGlicmkiLCJJc0JvbGQiOmZhbHNlLCJJc0l0YWxpYyI6ZmFsc2UsIklzVW5kZXJsaW5lZCI6ZmFsc2UsIlBhcmVudFN0eWxlIjpudWxsfSwiQXV0b1NpemUiOjAsIkZvcmVncm91bmQiOnsiJGlkIjoiMTIwIiwiQ29sb3IiOnsiJGlkIjoiMTIxIiwiQSI6MjU1LCJSIjo2OCwiRyI6ODQsIkIiOjEwNn19LCJNYXhXaWR0aCI6MjAwLjAsIk1heEhlaWdodCI6IkluZmluaXR5IiwiU21hcnRGb3JlZ3JvdW5kSXNBY3RpdmUiOmZhbHNlLCJIb3Jpem9udGFsQWxpZ25tZW50IjowLCJWZXJ0aWNhbEFsaWdubWVudCI6MCwiU21hcnRGb3JlZ3JvdW5kIjpudWxsLCJCYWNrZ3JvdW5kRmlsbFR5cGUiOjAsIk1hcmdpbiI6eyIkaWQiOiIxMjIiLCJUb3AiOjAsIkxlZnQiOjAsIlJpZ2h0IjowLCJCb3R0b20iOjB9LCJQYWRkaW5nIjp7IiRpZCI6IjEyMyIsIlRvcCI6MCwiTGVmdCI6MCwiUmlnaHQiOjAsIkJvdHRvbSI6MH0sIkJhY2tncm91bmQiOnsiJGlkIjoiMTI0IiwiQ29sb3IiOnsiJHJlZiI6IjIwIn19LCJJc1Zpc2libGUiOnRydWUsIldpZHRoIjowLjAsIkhlaWdodCI6MC4wLCJCb3JkZXJTdHlsZSI6bnVsbCwiUGFyZW50U3R5bGUiOm51bGx9LCJEYXRlRm9ybWF0Ijp7IiRpZCI6IjEyNSIsIkZvcm1hdFN0cmluZyI6Ik1NTSBkIiwiU2VwYXJhdG9yIjoiLyIsIlVzZUludGVybmF0aW9uYWxEYXRlRm9ybWF0IjpmYWxzZSwiRGF0ZUlzVmlzaWJsZSI6dHJ1ZSwiVGltZUlzVmlzaWJsZSI6ZmFsc2UsIkhvdXJEaWdpdHMiOjEsIkFtUG1EZXNpZ25hdG9yIjoyLCJUcmltMDBNaW51dGVzIjpmYWxzZSwiTGFzdEtub3duVmlzaWJpbGl0eVN0YXRlIjpudWxsfSwiSXNWaXNpYmxlIjp0cnVlLCJQYXJlbnRTdHlsZSI6bnVsbCwiX2V4cGxpY2l0bHlTZXQiOnsiJGlkIjoiMTI2IiwiU2hhcGVTdHlsZSI6ZmFsc2UsIlRpdGxlU3R5bGUiOmZhbHNlLCJEYXRlU3R5bGUiOmZhbHNlLCJIb3Jpem9udGFsQ29ubmVjdG9yU3R5bGUiOmZhbHNlLCJWZXJ0aWNhbENvbm5lY3RvclN0eWxlIjpmYWxzZSwiUGVyY2VudGFnZUNvbXBsZXRlU2hhcGVPcGFjaXR5IjpmYWxzZSwiRHVyYXRpb25Gb3JtYXQiOmZhbHNlLCJEdXJhdGlvblBvc2l0aW9uIjpmYWxzZSwiRW5kRGF0ZVBvc2l0aW9uIjpmYWxzZSwiSXNCZWxvd1RpbWViYW5kIjpmYWxzZSwiUGVyY2VudGFnZUNvbXBsZXRlZFBvc2l0aW9uIjpmYWxzZSwiU2hhcGUiOmZhbHNlLCJTaGFwZVRoaWNrbmVzcyI6ZmFsc2UsIlNwYWNpbmciOmZhbHNlLCJTdGFydERhdGVQb3NpdGlvbiI6ZmFsc2UsIlRpdGxlUG9zaXRpb24iOmZhbHNlLCJEYXRlRm9ybWF0IjpmYWxzZSwiSXNWaXNpYmxlIjpmYWxzZSwiTWFyZ2luIjpmYWxzZX19LCJHcmlkbGluZVBhbmVsU3R5bGUiOnsiJGlkIjoiMTI3IiwiR3JpZGxpbmVTdHlsZSI6eyIkaWQiOiIxMjgiLCJMaW5lQ29sb3IiOnsiJGlkIjoiMTI5IiwiJHR5cGUiOiJOTFJFLkNvbW1vbi5Eb20uU29saWRDb2xvckJydXNoLCBOTFJFLkNvbW1vbiIsIkNvbG9yIjp7IiRpZCI6IjEzMCIsIkEiOjM4LCJSIjo5MSwiRyI6MTU1LCJCIjoyMTN9fSwiTGluZVdlaWdodCI6MS4wLCJMaW5lVHlwZSI6MCwiUGFyZW50U3R5bGUiOm51bGx9LCJNYXJnaW4iOnsiJGlkIjoiMTMxIiwiVG9wIjowLCJMZWZ0IjowLCJSaWdodCI6MCwiQm90dG9tIjowfSwiUGFkZGluZyI6eyIkaWQiOiIxMzIiLCJUb3AiOjAsIkxlZnQiOjAsIlJpZ2h0IjowLCJCb3R0b20iOjB9LCJCYWNrZ3JvdW5kIjpudWxsLCJJc1Zpc2libGUiOnRydWUsIldpZHRoIjowLjAsIkhlaWdodCI6MC4wLCJCb3JkZXJTdHlsZSI6eyIkaWQiOiIxMzMiLCJMaW5lQ29sb3IiOm51bGwsIkxpbmVXZWlnaHQiOjAuMCwiTGluZVR5cGUiOjAsIlBhcmVudFN0eWxlIjpudWxsfSwiUGFyZW50U3R5bGUiOm51bGx9LCJTaG93RWxhcHNlZFRpbWVHcmFkaWVudFN0eWxlIjp0cnVlLCJEZWZhdWx0U3dpbWxhbmVTdHlsZSI6eyIkaWQiOiIxMzQiLCJIZWFkZXJTdHlsZSI6eyIkaWQiOiIxMzUiLCJUZXh0U3R5bGUiOnsiJGlkIjoiMTM2IiwiRm9udFNldHRpbmdzIjp7IiRpZCI6IjEzNyIsIkZvbnRTaXplIjoxMiwiRm9udE5hbWUiOiJDYWxpYnJpIiwiSXNCb2xkIjpmYWxzZSwiSXNJdGFsaWMiOmZhbHNlLCJJc1VuZGVybGluZWQiOmZhbHNlLCJQYXJlbnRTdHlsZSI6bnVsbH0sIkF1dG9TaXplIjowLCJGb3JlZ3JvdW5kIjp7IiRpZCI6IjEzOCIsIkNvbG9yIjp7IiRpZCI6IjEzOSIsIkEiOjI1NSwiUiI6MzIsIkciOjU2LCJCIjoxMDB9fSwiTWF4V2lkdGgiOjAuMCwiTWF4SGVpZ2h0IjowLjAsIlNtYXJ0Rm9yZWdyb3VuZElzQWN0aXZlIjpmYWxzZSwiSG9yaXpvbnRhbEFsaWdubWVudCI6MCwiVmVydGljYWxBbGlnbm1lbnQiOjAsIlNtYXJ0Rm9yZWdyb3VuZCI6bnVsbCwiQmFja2dyb3VuZEZpbGxUeXBlIjowLCJNYXJnaW4iOnsiJGlkIjoiMTQwIiwiVG9wIjowLCJMZWZ0IjowLCJSaWdodCI6MCwiQm90dG9tIjowfSwiUGFkZGluZyI6eyIkaWQiOiIxNDEiLCJUb3AiOjAsIkxlZnQiOjAsIlJpZ2h0IjowLCJCb3R0b20iOjB9LCJCYWNrZ3JvdW5kIjpudWxsLCJJc1Zpc2libGUiOmZhbHNlLCJXaWR0aCI6MC4wLCJIZWlnaHQiOjAuMCwiQm9yZGVyU3R5bGUiOm51bGwsIlBhcmVudFN0eWxlIjpudWxsfSwiUmVjdGFuZ2xlU3R5bGUiOnsiJGlkIjoiMTQyIiwiTWFyZ2luIjp7IiRpZCI6IjE0MyIsIlRvcCI6MCwiTGVmdCI6MCwiUmlnaHQiOjAsIkJvdHRvbSI6MH0sIlBhZGRpbmciOnsiJGlkIjoiMTQ0IiwiVG9wIjowLCJMZWZ0IjowLCJSaWdodCI6MCwiQm90dG9tIjowfSwiQmFja2dyb3VuZCI6eyIkaWQiOiIxNDUiLCJDb2xvciI6eyIkaWQiOiIxNDYiLCJBIjoxMjcsIlIiOjkxLCJHIjoxNTUsIkIiOjIxM319LCJJc1Zpc2libGUiOmZhbHNlLCJXaWR0aCI6MC4wLCJIZWlnaHQiOjAuMCwiQm9yZGVyU3R5bGUiOnsiJGlkIjoiMTQ3IiwiTGluZUNvbG9yIjp7IiRpZCI6IjE0OCIsIiR0eXBlIjoiTkxSRS5Db21tb24uRG9tLlNvbGlkQ29sb3JCcnVzaCwgTkxSRS5Db21tb24iLCJDb2xvciI6eyIkaWQiOiIxNDkiLCJBIjoyNTUsIlIiOjI1NSwiRyI6MCwiQiI6MH19LCJMaW5lV2VpZ2h0IjowLjAsIkxpbmVUeXBlIjowLCJQYXJlbnRTdHlsZSI6bnVsbH0sIlBhcmVudFN0eWxlIjpudWxsfSwiTWFyZ2luIjp7IiRpZCI6IjE1MCIsIlRvcCI6MCwiTGVmdCI6MCwiUmlnaHQiOjAsIkJvdHRvbSI6MH0sIlBhZGRpbmciOnsiJGlkIjoiMTUxIiwiVG9wIjowLCJMZWZ0IjowLCJSaWdodCI6MCwiQm90dG9tIjowfSwiQmFja2dyb3VuZCI6bnVsbCwiSXNWaXNpYmxlIjp0cnVlLCJXaWR0aCI6MC4wLCJIZWlnaHQiOjAuMCwiQm9yZGVyU3R5bGUiOm51bGwsIlBhcmVudFN0eWxlIjpudWxsfSwiQmFja2dyb3VuZFN0eWxlIjp7IiRpZCI6IjE1MiIsIk1hcmdpbiI6eyIkaWQiOiIxNTMiLCJUb3AiOjAsIkxlZnQiOjAsIlJpZ2h0IjowLCJCb3R0b20iOjB9LCJQYWRkaW5nIjp7IiRpZCI6IjE1NCIsIlRvcCI6MCwiTGVmdCI6MCwiUmlnaHQiOjAsIkJvdHRvbSI6MH0sIkJhY2tncm91bmQiOnsiJGlkIjoiMTU1IiwiQ29sb3IiOnsiJGlkIjoiMTU2IiwiQSI6MzgsIlIiOjkxLCJHIjoxNTUsIkIiOjIxM319LCJJc1Zpc2libGUiOnRydWUsIldpZHRoIjowLjAsIkhlaWdodCI6MC4wLCJCb3JkZXJTdHlsZSI6eyIkaWQiOiIxNTciLCJMaW5lQ29sb3IiOnsiJGlkIjoiMTU4IiwiJHR5cGUiOiJOTFJFLkNvbW1vbi5Eb20uU29saWRDb2xvckJydXNoLCBOTFJFLkNvbW1vbiIsIkNvbG9yIjp7IiRpZCI6IjE1OSIsIkEiOjI1NSwiUiI6MjU1LCJHIjowLCJCIjowfX0sIkxpbmVXZWlnaHQiOjAuMCwiTGluZVR5cGUiOjAsIlBhcmVudFN0eWxlIjpudWxsfSwiUGFyZW50U3R5bGUiOm51bGx9LCJJc0Fib3ZlVGltZWJhbmQiOmZhbHNlLCJNYXJnaW4iOnsiJGlkIjoiMTYwIiwiVG9wIjowLCJMZWZ0IjowLCJSaWdodCI6MCwiQm90dG9tIjowfSwiUGFkZGluZyI6eyIkaWQiOiIxNjEiLCJUb3AiOjAsIkxlZnQiOjAsIlJpZ2h0IjowLCJCb3R0b20iOjB9LCJJc1Zpc2libGUiOnRydWUsIldpZHRoIjowLjAsIkhlaWdodCI6MC4wLCJCb3JkZXJTdHlsZSI6bnVsbCwiUGFyZW50U3R5bGUiOm51bGx9fSwiU2NhbGUiOnsiJGlkIjoiMTYyIiwiU3RhcnREYXRlIjoiMDAwMS0wMS0wMVQwMDowMDowMCIsIkVuZERhdGUiOiIyMDIwLTAzLTIwVDIzOjU5OjAwIiwiRm9ybWF0IjoiTU1NIiwiVHlwZSI6MiwiQXV0b0RhdGVSYW5nZSI6dHJ1ZSwiV29ya2luZ0RheXMiOjMxLCJUb2RheU1hcmtlclRleHQiOiJUb2RheSIsIkF1dG9TY2FsZVR5cGUiOnRydWV9LCJNaWxlc3RvbmVzIjpbXSwiVGFza3MiOlt7IiRpZCI6IjE2MyIsIkdyb3VwTmFtZSI6bnVsbCwiU3RhcnREYXRlIjoiMjAxOS0xMS0xMVQwMDowMDowMCIsIkVuZERhdGUiOiIyMDE5LTExLTIyVDIzOjU5OjAwIiwiUGVyY2VudGFnZUNvbXBsZXRlIjoxMDAuMCwiU3R5bGUiOnsiJGlkIjoiMTY0IiwiU2hhcGUiOjAsIlNoYXBlVGhpY2tuZXNzIjoyLCJEdXJhdGlvbkZvcm1hdCI6MCwiSW5jbHVkZU5vbldvcmtpbmdEYXlzSW5EdXJhdGlvbiI6ZmFsc2UsIlBlcmNlbnRhZ2VDb21wbGV0ZVN0eWxlIjp7IiRpZCI6IjE2NSIsIkZvbnRTZXR0aW5ncyI6eyIkaWQiOiIxNjYiLCJGb250U2l6ZSI6MTAsIkZvbnROYW1lIjoiQ2FsaWJyaSIsIklzQm9sZCI6ZmFsc2UsIklzSXRhbGljIjpmYWxzZSwiSXNVbmRlcmxpbmVkIjpmYWxzZSwiUGFyZW50U3R5bGUiOm51bGx9LCJBdXRvU2l6ZSI6MCwiRm9yZWdyb3VuZCI6eyIkcmVmIjoiODUifSwiTWF4V2lkdGgiOjIwMC4wLCJNYXhIZWlnaHQiOiJJbmZpbml0eSIsIlNtYXJ0Rm9yZWdyb3VuZElzQWN0aXZlIjpmYWxzZSwiSG9yaXpvbnRhbEFsaWdubWVudCI6MCwiVmVydGljYWxBbGlnbm1lbnQiOjAsIlNtYXJ0Rm9yZWdyb3VuZCI6bnVsbCwiQmFja2dyb3VuZEZpbGxUeXBlIjowLCJNYXJnaW4iOnsiJGlkIjoiMTY3IiwiVG9wIjowLCJMZWZ0IjowLCJSaWdodCI6MCwiQm90dG9tIjowfSwiUGFkZGluZyI6eyIkaWQiOiIxNjgiLCJUb3AiOjAsIkxlZnQiOjAsIlJpZ2h0IjowLCJCb3R0b20iOjB9LCJCYWNrZ3JvdW5kIjp7IiRyZWYiOiI4OSJ9LCJJc1Zpc2libGUiOnRydWUsIldpZHRoIjowLjAsIkhlaWdodCI6MC4wLCJCb3JkZXJTdHlsZSI6eyIkaWQiOiIxNjkiLCJMaW5lQ29sb3IiOm51bGwsIkxpbmVXZWlnaHQiOjAuMCwiTGluZVR5cGUiOjAsIlBhcmVudFN0eWxlIjpudWxsfSwiUGFyZW50U3R5bGUiOm51bGx9LCJEdXJhdGlvblN0eWxlIjp7IiRpZCI6IjE3MCIsIkZvbnRTZXR0aW5ncyI6eyIkaWQiOiIxNzEiLCJGb250U2l6ZSI6MTAsIkZvbnROYW1lIjoiQ2FsaWJyaSIsIklzQm9sZCI6ZmFsc2UsIklzSXRhbGljIjpmYWxzZSwiSXNVbmRlcmxpbmVkIjpmYWxzZSwiUGFyZW50U3R5bGUiOm51bGx9LCJBdXRvU2l6ZSI6MCwiRm9yZWdyb3VuZCI6eyIkaWQiOiIxNzIiLCJDb2xvciI6eyIkcmVmIjoiOTMifX0sIk1heFdpZHRoIjoyMDAuMCwiTWF4SGVpZ2h0IjoiSW5maW5pdHkiLCJTbWFydEZvcmVncm91bmRJc0FjdGl2ZSI6ZmFsc2UsIkhvcml6b250YWxBbGlnbm1lbnQiOjAsIlZlcnRpY2FsQWxpZ25tZW50IjowLCJTbWFydEZvcmVncm91bmQiOm51bGwsIkJhY2tncm91bmRGaWxsVHlwZSI6MCwiTWFyZ2luIjp7IiRpZCI6IjE3MyIsIlRvcCI6MCwiTGVmdCI6MCwiUmlnaHQiOjAsIkJvdHRvbSI6MH0sIlBhZGRpbmciOnsiJGlkIjoiMTc0IiwiVG9wIjowLCJMZWZ0IjowLCJSaWdodCI6MCwiQm90dG9tIjowfSwiQmFja2dyb3VuZCI6eyIkcmVmIjoiOTYifSwiSXNWaXNpYmxlIjp0cnVlLCJXaWR0aCI6MC4wLCJIZWlnaHQiOjAuMCwiQm9yZGVyU3R5bGUiOnsiJGlkIjoiMTc1IiwiTGluZUNvbG9yIjpudWxsLCJMaW5lV2VpZ2h0IjowLjAsIkxpbmVUeXBlIjowLCJQYXJlbnRTdHlsZSI6bnVsbH0sIlBhcmVudFN0eWxlIjpudWxsfSwiSG9yaXpvbnRhbENvbm5lY3RvclN0eWxlIjp7IiRpZCI6IjE3NiIsIkxpbmVDb2xvciI6eyIkcmVmIjoiOTgifSwiTGluZVdlaWdodCI6MS4wLCJMaW5lVHlwZSI6MCwiUGFyZW50U3R5bGUiOm51bGx9LCJWZXJ0aWNhbENvbm5lY3RvclN0eWxlIjp7IiRpZCI6IjE3NyIsIkxpbmVDb2xvciI6eyIkcmVmIjoiMTAxIn0sIkxpbmVXZWlnaHQiOjEuMCwiTGluZVR5cGUiOjAsIlBhcmVudFN0eWxlIjpudWxsfSwiTWFyZ2luIjpudWxsLCJTdGFydERhdGVQb3NpdGlvbiI6NCwiRW5kRGF0ZVBvc2l0aW9uIjo0LCJEYXRlSXNWaXNpYmxlIjp0cnVlLCJUaXRsZVBvc2l0aW9uIjozLCJEdXJhdGlvblBvc2l0aW9uIjo2LCJQZXJjZW50YWdlQ29tcGxldGVkUG9zaXRpb24iOjIsIlNwYWNpbmciOjUsIklzQmVsb3dUaW1lYmFuZCI6ZmFsc2UsIlBlcmNlbnRhZ2VDb21wbGV0ZVNoYXBlT3BhY2l0eSI6MzUsIlNoYXBlU3R5bGUiOnsiJGlkIjoiMTc4IiwiTWFyZ2luIjp7IiRpZCI6IjE3OSIsIlRvcCI6MCwiTGVmdCI6NCwiUmlnaHQiOjQsIkJvdHRvbSI6MH0sIlBhZGRpbmciOnsiJGlkIjoiMTgwIiwiVG9wIjowLCJMZWZ0IjowLCJSaWdodCI6MCwiQm90dG9tIjowfSwiQmFja2dyb3VuZCI6eyIkaWQiOiIxODEiLCJDb2xvciI6eyIkaWQiOiIxODIiLCJBIjoyNTUsIlIiOjIzNywiRyI6MTI1LCJCIjo0OX19LCJJc1Zpc2libGUiOnRydWUsIldpZHRoIjowLjAsIkhlaWdodCI6MjIuMCwiQm9yZGVyU3R5bGUiOnsiJGlkIjoiMTgzIiwiTGluZUNvbG9yIjp7IiRyZWYiOiIxMDkifSwiTGluZVdlaWdodCI6MC4wLCJMaW5lVHlwZSI6MCwiUGFyZW50U3R5bGUiOm51bGx9LCJQYXJlbnRTdHlsZSI6bnVsbH0sIlRpdGxlU3R5bGUiOnsiJGlkIjoiMTg0IiwiRm9udFNldHRpbmdzIjp7IiRpZCI6IjE4NSIsIkZvbnRTaXplIjoxMSwiRm9udE5hbWUiOiJDYWxpYnJpIiwiSXNCb2xkIjp0cnVlLCJJc0l0YWxpYyI6ZmFsc2UsIklzVW5kZXJsaW5lZCI6ZmFsc2UsIlBhcmVudFN0eWxlIjpudWxsfSwiQXV0b1NpemUiOjAsIkZvcmVncm91bmQiOnsiJGlkIjoiMTg2IiwiQ29sb3IiOnsiJHJlZiI6IjExNCJ9fSwiTWF4V2lkdGgiOjcyMC4wLCJNYXhIZWlnaHQiOiJJbmZpbml0eSIsIlNtYXJ0Rm9yZWdyb3VuZElzQWN0aXZlIjpmYWxzZSwiSG9yaXpvbnRhbEFsaWdubWVudCI6MiwiVmVydGljYWxBbGlnbm1lbnQiOjAsIlNtYXJ0Rm9yZWdyb3VuZCI6bnVsbCwiQmFja2dyb3VuZEZpbGxUeXBlIjowLCJNYXJnaW4iOnsiJGlkIjoiMTg3IiwiVG9wIjowLCJMZWZ0IjowLCJSaWdodCI6MCwiQm90dG9tIjowfSwiUGFkZGluZyI6eyIkaWQiOiIxODgiLCJUb3AiOjAsIkxlZnQiOjAsIlJpZ2h0IjowLCJCb3R0b20iOjB9LCJCYWNrZ3JvdW5kIjp7IiRyZWYiOiIxMTcifSwiSXNWaXNpYmxlIjp0cnVlLCJXaWR0aCI6MC4wLCJIZWlnaHQiOjAuMCwiQm9yZGVyU3R5bGUiOnsiJGlkIjoiMTg5IiwiTGluZUNvbG9yIjpudWxsLCJMaW5lV2VpZ2h0IjowLjAsIkxpbmVUeXBlIjowLCJQYXJlbnRTdHlsZSI6bnVsbH0sIlBhcmVudFN0eWxlIjpudWxsfSwiRGF0ZVN0eWxlIjp7IiRpZCI6IjE5MCIsIkZvbnRTZXR0aW5ncyI6eyIkaWQiOiIxOTEiLCJGb250U2l6ZSI6MTAsIkZvbnROYW1lIjoiQ2FsaWJyaSIsIklzQm9sZCI6ZmFsc2UsIklzSXRhbGljIjpmYWxzZSwiSXNVbmRlcmxpbmVkIjpmYWxzZSwiUGFyZW50U3R5bGUiOm51bGx9LCJBdXRvU2l6ZSI6MCwiRm9yZWdyb3VuZCI6eyIkaWQiOiIxOTIiLCJDb2xvciI6eyIkcmVmIjoiMTIxIn19LCJNYXhXaWR0aCI6MjAwLjAsIk1heEhlaWdodCI6IkluZmluaXR5IiwiU21hcnRGb3JlZ3JvdW5kSXNBY3RpdmUiOmZhbHNlLCJIb3Jpem9udGFsQWxpZ25tZW50IjowLCJWZXJ0aWNhbEFsaWdubWVudCI6MCwiU21hcnRGb3JlZ3JvdW5kIjpudWxsLCJCYWNrZ3JvdW5kRmlsbFR5cGUiOjAsIk1hcmdpbiI6eyIkaWQiOiIxOTMiLCJUb3AiOjAsIkxlZnQiOjAsIlJpZ2h0IjowLCJCb3R0b20iOjB9LCJQYWRkaW5nIjp7IiRpZCI6IjE5NCIsIlRvcCI6MCwiTGVmdCI6MCwiUmlnaHQiOjAsIkJvdHRvbSI6MH0sIkJhY2tncm91bmQiOnsiJHJlZiI6IjEyNCJ9LCJJc1Zpc2libGUiOnRydWUsIldpZHRoIjowLjAsIkhlaWdodCI6MC4wLCJCb3JkZXJTdHlsZSI6eyIkaWQiOiIxOTUiLCJMaW5lQ29sb3IiOm51bGwsIkxpbmVXZWlnaHQiOjAuMCwiTGluZVR5cGUiOjAsIlBhcmVudFN0eWxlIjpudWxsfSwiUGFyZW50U3R5bGUiOm51bGx9LCJEYXRlRm9ybWF0Ijp7IiRpZCI6IjE5NiIsIkZvcm1hdFN0cmluZyI6Ik1NTSBkIiwiU2VwYXJhdG9yIjoiLyIsIlVzZUludGVybmF0aW9uYWxEYXRlRm9ybWF0IjpmYWxzZSwiRGF0ZUlzVmlzaWJsZSI6dHJ1ZSwiVGltZUlzVmlzaWJsZSI6ZmFsc2UsIkhvdXJEaWdpdHMiOjEsIkFtUG1EZXNpZ25hdG9yIjoyLCJUcmltMDBNaW51dGVzIjpmYWxzZSwiTGFzdEtub3duVmlzaWJpbGl0eVN0YXRlIjpudWxsfSwiSXNWaXNpYmxlIjp0cnVlLCJQYXJlbnRTdHlsZSI6bnVsbH0sIkluZGV4IjowLCJTbWFydER1cmF0aW9uQWN0aXZhdGVkIjpmYWxzZSwiRGF0ZUZvcm1hdCI6eyIkcmVmIjoiMTk2In0sIklkIjoiY2UwMTkzMzctZjIzOS00YzNjLTk1NmUtOTU0MzFmNGQxMTdkIiwiSW1wb3J0SWQiOm51bGwsIlRpdGxlIjoiQ29tcHJlbmRyZSBsJ291dGlsIFJPbnRvVG9vbHMiLCJOb3RlIjpudWxsLCJIeXBlcmxpbmsiOnsiJGlkIjoiMTk3IiwiQWRkcmVzcyI6IiIsIlN1YkFkZHJlc3MiOiIifSwiSXNDaGFuZ2VkIjpmYWxzZSwiSXNOZXciOmZhbHNlfSx7IiRpZCI6IjE5OCIsIkdyb3VwTmFtZSI6bnVsbCwiU3RhcnREYXRlIjoiMjAxOS0xMS0xMVQwMDowMDowMCIsIkVuZERhdGUiOiIyMDE5LTEyLTIwVDIzOjU5OjAwIiwiUGVyY2VudGFnZUNvbXBsZXRlIjoyMC4wLCJTdHlsZSI6eyIkaWQiOiIxOTkiLCJTaGFwZSI6MCwiU2hhcGVUaGlja25lc3MiOjIsIkR1cmF0aW9uRm9ybWF0IjowLCJJbmNsdWRlTm9uV29ya2luZ0RheXNJbkR1cmF0aW9uIjpmYWxzZSwiUGVyY2VudGFnZUNvbXBsZXRlU3R5bGUiOnsiJGlkIjoiMjAwIiwiRm9udFNldHRpbmdzIjp7IiRpZCI6IjIwMSIsIkZvbnRTaXplIjoxMCwiRm9udE5hbWUiOiJDYWxpYnJpIiwiSXNCb2xkIjpmYWxzZSwiSXNJdGFsaWMiOmZhbHNlLCJJc1VuZGVybGluZWQiOmZhbHNlLCJQYXJlbnRTdHlsZSI6bnVsbH0sIkF1dG9TaXplIjowLCJGb3JlZ3JvdW5kIjp7IiRyZWYiOiI4NSJ9LCJNYXhXaWR0aCI6MjAwLjAsIk1heEhlaWdodCI6IkluZmluaXR5IiwiU21hcnRGb3JlZ3JvdW5kSXNBY3RpdmUiOmZhbHNlLCJIb3Jpem9udGFsQWxpZ25tZW50IjowLCJWZXJ0aWNhbEFsaWdubWVudCI6MCwiU21hcnRGb3JlZ3JvdW5kIjpudWxsLCJCYWNrZ3JvdW5kRmlsbFR5cGUiOjAsIk1hcmdpbiI6eyIkaWQiOiIyMDIiLCJUb3AiOjAsIkxlZnQiOjAsIlJpZ2h0IjowLCJCb3R0b20iOjB9LCJQYWRkaW5nIjp7IiRpZCI6IjIwMyIsIlRvcCI6MCwiTGVmdCI6MCwiUmlnaHQiOjAsIkJvdHRvbSI6MH0sIkJhY2tncm91bmQiOnsiJHJlZiI6Ijg5In0sIklzVmlzaWJsZSI6dHJ1ZSwiV2lkdGgiOjAuMCwiSGVpZ2h0IjowLjAsIkJvcmRlclN0eWxlIjp7IiRpZCI6IjIwNCIsIkxpbmVDb2xvciI6bnVsbCwiTGluZVdlaWdodCI6MC4wLCJMaW5lVHlwZSI6MCwiUGFyZW50U3R5bGUiOm51bGx9LCJQYXJlbnRTdHlsZSI6bnVsbH0sIkR1cmF0aW9uU3R5bGUiOnsiJGlkIjoiMjA1IiwiRm9udFNldHRpbmdzIjp7IiRpZCI6IjIwNiIsIkZvbnRTaXplIjoxMCwiRm9udE5hbWUiOiJDYWxpYnJpIiwiSXNCb2xkIjpmYWxzZSwiSXNJdGFsaWMiOmZhbHNlLCJJc1VuZGVybGluZWQiOmZhbHNlLCJQYXJlbnRTdHlsZSI6bnVsbH0sIkF1dG9TaXplIjowLCJGb3JlZ3JvdW5kIjp7IiRpZCI6IjIwNyIsIkNvbG9yIjp7IiRyZWYiOiI5MyJ9fSwiTWF4V2lkdGgiOjIwMC4wLCJNYXhIZWlnaHQiOiJJbmZpbml0eSIsIlNtYXJ0Rm9yZWdyb3VuZElzQWN0aXZlIjpmYWxzZSwiSG9yaXpvbnRhbEFsaWdubWVudCI6MCwiVmVydGljYWxBbGlnbm1lbnQiOjAsIlNtYXJ0Rm9yZWdyb3VuZCI6bnVsbCwiQmFja2dyb3VuZEZpbGxUeXBlIjowLCJNYXJnaW4iOnsiJGlkIjoiMjA4IiwiVG9wIjowLCJMZWZ0IjowLCJSaWdodCI6MCwiQm90dG9tIjowfSwiUGFkZGluZyI6eyIkaWQiOiIyMDkiLCJUb3AiOjAsIkxlZnQiOjAsIlJpZ2h0IjowLCJCb3R0b20iOjB9LCJCYWNrZ3JvdW5kIjp7IiRyZWYiOiI5NiJ9LCJJc1Zpc2libGUiOnRydWUsIldpZHRoIjowLjAsIkhlaWdodCI6MC4wLCJCb3JkZXJTdHlsZSI6eyIkaWQiOiIyMTAiLCJMaW5lQ29sb3IiOm51bGwsIkxpbmVXZWlnaHQiOjAuMCwiTGluZVR5cGUiOjAsIlBhcmVudFN0eWxlIjpudWxsfSwiUGFyZW50U3R5bGUiOm51bGx9LCJIb3Jpem9udGFsQ29ubmVjdG9yU3R5bGUiOnsiJGlkIjoiMjExIiwiTGluZUNvbG9yIjp7IiRyZWYiOiI5OCJ9LCJMaW5lV2VpZ2h0IjoxLjAsIkxpbmVUeXBlIjowLCJQYXJlbnRTdHlsZSI6bnVsbH0sIlZlcnRpY2FsQ29ubmVjdG9yU3R5bGUiOnsiJGlkIjoiMjEyIiwiTGluZUNvbG9yIjp7IiRyZWYiOiIxMDEifSwiTGluZVdlaWdodCI6MS4wLCJMaW5lVHlwZSI6MCwiUGFyZW50U3R5bGUiOm51bGx9LCJNYXJnaW4iOm51bGwsIlN0YXJ0RGF0ZVBvc2l0aW9uIjo0LCJFbmREYXRlUG9zaXRpb24iOjQsIkRhdGVJc1Zpc2libGUiOnRydWUsIlRpdGxlUG9zaXRpb24iOjIsIkR1cmF0aW9uUG9zaXRpb24iOjYsIlBlcmNlbnRhZ2VDb21wbGV0ZWRQb3NpdGlvbiI6MiwiU3BhY2luZyI6NSwiSXNCZWxvd1RpbWViYW5kIjpmYWxzZSwiUGVyY2VudGFnZUNvbXBsZXRlU2hhcGVPcGFjaXR5IjozNSwiU2hhcGVTdHlsZSI6eyIkaWQiOiIyMTMiLCJNYXJnaW4iOnsiJGlkIjoiMjE0IiwiVG9wIjowLCJMZWZ0Ijo0LCJSaWdodCI6NCwiQm90dG9tIjowfSwiUGFkZGluZyI6eyIkaWQiOiIyMTUiLCJUb3AiOjAsIkxlZnQiOjAsIlJpZ2h0IjowLCJCb3R0b20iOjB9LCJCYWNrZ3JvdW5kIjp7IiRpZCI6IjIxNiIsIkNvbG9yIjp7IiRpZCI6IjIxNyIsIkEiOjI1NSwiUiI6OTEsIkciOjE1NSwiQiI6MjEzfX0sIklzVmlzaWJsZSI6dHJ1ZSwiV2lkdGgiOjAuMCwiSGVpZ2h0IjoyMi4wLCJCb3JkZXJTdHlsZSI6eyIkaWQiOiIyMTgiLCJMaW5lQ29sb3IiOnsiJHJlZiI6IjEwOSJ9LCJMaW5lV2VpZ2h0IjowLjAsIkxpbmVUeXBlIjowLCJQYXJlbnRTdHlsZSI6bnVsbH0sIlBhcmVudFN0eWxlIjpudWxsfSwiVGl0bGVTdHlsZSI6eyIkaWQiOiIyMTkiLCJGb250U2V0dGluZ3MiOnsiJGlkIjoiMjIwIiwiRm9udFNpemUiOjExLCJGb250TmFtZSI6IkNhbGlicmkiLCJJc0JvbGQiOnRydWUsIklzSXRhbGljIjpmYWxzZSwiSXNVbmRlcmxpbmVkIjpmYWxzZSwiUGFyZW50U3R5bGUiOm51bGx9LCJBdXRvU2l6ZSI6MCwiRm9yZWdyb3VuZCI6eyIkaWQiOiIyMjEiLCJDb2xvciI6eyIkcmVmIjoiMTE0In19LCJNYXhXaWR0aCI6NzIwLjAsIk1heEhlaWdodCI6IkluZmluaXR5IiwiU21hcnRGb3JlZ3JvdW5kSXNBY3RpdmUiOmZhbHNlLCJIb3Jpem9udGFsQWxpZ25tZW50IjoxLCJWZXJ0aWNhbEFsaWdubWVudCI6MCwiU21hcnRGb3JlZ3JvdW5kIjpudWxsLCJCYWNrZ3JvdW5kRmlsbFR5cGUiOjAsIk1hcmdpbiI6eyIkaWQiOiIyMjIiLCJUb3AiOjAsIkxlZnQiOjAsIlJpZ2h0IjowLCJCb3R0b20iOjB9LCJQYWRkaW5nIjp7IiRpZCI6IjIyMyIsIlRvcCI6MCwiTGVmdCI6MCwiUmlnaHQiOjAsIkJvdHRvbSI6MH0sIkJhY2tncm91bmQiOnsiJHJlZiI6IjExNyJ9LCJJc1Zpc2libGUiOnRydWUsIldpZHRoIjowLjAsIkhlaWdodCI6MC4wLCJCb3JkZXJTdHlsZSI6eyIkaWQiOiIyMjQiLCJMaW5lQ29sb3IiOm51bGwsIkxpbmVXZWlnaHQiOjAuMCwiTGluZVR5cGUiOjAsIlBhcmVudFN0eWxlIjpudWxsfSwiUGFyZW50U3R5bGUiOm51bGx9LCJEYXRlU3R5bGUiOnsiJGlkIjoiMjI1IiwiRm9udFNldHRpbmdzIjp7IiRpZCI6IjIyNiIsIkZvbnRTaXplIjoxMCwiRm9udE5hbWUiOiJDYWxpYnJpIiwiSXNCb2xkIjpmYWxzZSwiSXNJdGFsaWMiOmZhbHNlLCJJc1VuZGVybGluZWQiOmZhbHNlLCJQYXJlbnRTdHlsZSI6bnVsbH0sIkF1dG9TaXplIjowLCJGb3JlZ3JvdW5kIjp7IiRpZCI6IjIyNyIsIkNvbG9yIjp7IiRyZWYiOiIxMjEifX0sIk1heFdpZHRoIjoyMDAuMCwiTWF4SGVpZ2h0IjoiSW5maW5pdHkiLCJTbWFydEZvcmVncm91bmRJc0FjdGl2ZSI6ZmFsc2UsIkhvcml6b250YWxBbGlnbm1lbnQiOjAsIlZlcnRpY2FsQWxpZ25tZW50IjowLCJTbWFydEZvcmVncm91bmQiOm51bGwsIkJhY2tncm91bmRGaWxsVHlwZSI6MCwiTWFyZ2luIjp7IiRpZCI6IjIyOCIsIlRvcCI6MCwiTGVmdCI6MCwiUmlnaHQiOjAsIkJvdHRvbSI6MH0sIlBhZGRpbmciOnsiJGlkIjoiMjI5IiwiVG9wIjowLCJMZWZ0IjowLCJSaWdodCI6MCwiQm90dG9tIjowfSwiQmFja2dyb3VuZCI6eyIkcmVmIjoiMTI0In0sIklzVmlzaWJsZSI6dHJ1ZSwiV2lkdGgiOjAuMCwiSGVpZ2h0IjowLjAsIkJvcmRlclN0eWxlIjp7IiRpZCI6IjIzMCIsIkxpbmVDb2xvciI6bnVsbCwiTGluZVdlaWdodCI6MC4wLCJMaW5lVHlwZSI6MCwiUGFyZW50U3R5bGUiOm51bGx9LCJQYXJlbnRTdHlsZSI6bnVsbH0sIkRhdGVGb3JtYXQiOnsiJGlkIjoiMjMxIiwiRm9ybWF0U3RyaW5nIjoiTU1NIGQiLCJTZXBhcmF0b3IiOiIvIiwiVXNlSW50ZXJuYXRpb25hbERhdGVGb3JtYXQiOmZhbHNlLCJEYXRlSXNWaXNpYmxlIjp0cnVlLCJUaW1lSXNWaXNpYmxlIjpmYWxzZSwiSG91ckRpZ2l0cyI6MSwiQW1QbURlc2lnbmF0b3IiOjIsIlRyaW0wME1pbnV0ZXMiOmZhbHNlLCJMYXN0S25vd25WaXNpYmlsaXR5U3RhdGUiOm51bGx9LCJJc1Zpc2libGUiOnRydWUsIlBhcmVudFN0eWxlIjpudWxsfSwiSW5kZXgiOjEsIlNtYXJ0RHVyYXRpb25BY3RpdmF0ZWQiOmZhbHNlLCJEYXRlRm9ybWF0Ijp7IiRyZWYiOiIyMzEifSwiSWQiOiIxNjg0MmYzMi1lYmQzLTQxM2UtYTBiZS05YTEwYmUzZTdlZTkiLCJJbXBvcnRJZCI6bnVsbCwiVGl0bGUiOiJDcsOpZXIgbCdpbnRlcmZhY2Ugd2ViIiwiTm90ZSI6bnVsbCwiSHlwZXJsaW5rIjp7IiRpZCI6IjIzMiIsIkFkZHJlc3MiOiIiLCJTdWJBZGRyZXNzIjoiIn0sIklzQ2hhbmdlZCI6ZmFsc2UsIklzTmV3IjpmYWxzZX0seyIkaWQiOiIyMzMiLCJHcm91cE5hbWUiOm51bGwsIlN0YXJ0RGF0ZSI6IjIwMTktMTEtMTFUMDA6MDA6MDAiLCJFbmREYXRlIjoiMjAxOS0xMS0yMlQyMzo1OTowMCIsIlBlcmNlbnRhZ2VDb21wbGV0ZSI6MTAwLjAsIlN0eWxlIjp7IiRpZCI6IjIzNCIsIlNoYXBlIjowLCJTaGFwZVRoaWNrbmVzcyI6MiwiRHVyYXRpb25Gb3JtYXQiOjAsIkluY2x1ZGVOb25Xb3JraW5nRGF5c0luRHVyYXRpb24iOmZhbHNlLCJQZXJjZW50YWdlQ29tcGxldGVTdHlsZSI6eyIkaWQiOiIyMzUiLCJGb250U2V0dGluZ3MiOnsiJGlkIjoiMjM2IiwiRm9udFNpemUiOjEwLCJGb250TmFtZSI6IkNhbGlicmkiLCJJc0JvbGQiOmZhbHNlLCJJc0l0YWxpYyI6ZmFsc2UsIklzVW5kZXJsaW5lZCI6ZmFsc2UsIlBhcmVudFN0eWxlIjpudWxsfSwiQXV0b1NpemUiOjAsIkZvcmVncm91bmQiOnsiJHJlZiI6Ijg1In0sIk1heFdpZHRoIjoyMDAuMCwiTWF4SGVpZ2h0IjoiSW5maW5pdHkiLCJTbWFydEZvcmVncm91bmRJc0FjdGl2ZSI6ZmFsc2UsIkhvcml6b250YWxBbGlnbm1lbnQiOjAsIlZlcnRpY2FsQWxpZ25tZW50IjowLCJTbWFydEZvcmVncm91bmQiOm51bGwsIkJhY2tncm91bmRGaWxsVHlwZSI6MCwiTWFyZ2luIjp7IiRpZCI6IjIzNyIsIlRvcCI6MCwiTGVmdCI6MCwiUmlnaHQiOjAsIkJvdHRvbSI6MH0sIlBhZGRpbmciOnsiJGlkIjoiMjM4IiwiVG9wIjowLCJMZWZ0IjowLCJSaWdodCI6MCwiQm90dG9tIjowfSwiQmFja2dyb3VuZCI6eyIkcmVmIjoiODkifSwiSXNWaXNpYmxlIjp0cnVlLCJXaWR0aCI6MC4wLCJIZWlnaHQiOjAuMCwiQm9yZGVyU3R5bGUiOnsiJGlkIjoiMjM5IiwiTGluZUNvbG9yIjpudWxsLCJMaW5lV2VpZ2h0IjowLjAsIkxpbmVUeXBlIjowLCJQYXJlbnRTdHlsZSI6bnVsbH0sIlBhcmVudFN0eWxlIjpudWxsfSwiRHVyYXRpb25TdHlsZSI6eyIkaWQiOiIyNDAiLCJGb250U2V0dGluZ3MiOnsiJGlkIjoiMjQxIiwiRm9udFNpemUiOjEwLCJGb250TmFtZSI6IkNhbGlicmkiLCJJc0JvbGQiOmZhbHNlLCJJc0l0YWxpYyI6ZmFsc2UsIklzVW5kZXJsaW5lZCI6ZmFsc2UsIlBhcmVudFN0eWxlIjpudWxsfSwiQXV0b1NpemUiOjAsIkZvcmVncm91bmQiOnsiJGlkIjoiMjQyIiwiQ29sb3IiOnsiJHJlZiI6IjkzIn19LCJNYXhXaWR0aCI6MjAwLjAsIk1heEhlaWdodCI6IkluZmluaXR5IiwiU21hcnRGb3JlZ3JvdW5kSXNBY3RpdmUiOmZhbHNlLCJIb3Jpem9udGFsQWxpZ25tZW50IjowLCJWZXJ0aWNhbEFsaWdubWVudCI6MCwiU21hcnRGb3JlZ3JvdW5kIjpudWxsLCJCYWNrZ3JvdW5kRmlsbFR5cGUiOjAsIk1hcmdpbiI6eyIkaWQiOiIyNDMiLCJUb3AiOjAsIkxlZnQiOjAsIlJpZ2h0IjowLCJCb3R0b20iOjB9LCJQYWRkaW5nIjp7IiRpZCI6IjI0NCIsIlRvcCI6MCwiTGVmdCI6MCwiUmlnaHQiOjAsIkJvdHRvbSI6MH0sIkJhY2tncm91bmQiOnsiJHJlZiI6Ijk2In0sIklzVmlzaWJsZSI6dHJ1ZSwiV2lkdGgiOjAuMCwiSGVpZ2h0IjowLjAsIkJvcmRlclN0eWxlIjp7IiRpZCI6IjI0NSIsIkxpbmVDb2xvciI6bnVsbCwiTGluZVdlaWdodCI6MC4wLCJMaW5lVHlwZSI6MCwiUGFyZW50U3R5bGUiOm51bGx9LCJQYXJlbnRTdHlsZSI6bnVsbH0sIkhvcml6b250YWxDb25uZWN0b3JTdHlsZSI6eyIkaWQiOiIyNDYiLCJMaW5lQ29sb3IiOnsiJHJlZiI6Ijk4In0sIkxpbmVXZWlnaHQiOjEuMCwiTGluZVR5cGUiOjAsIlBhcmVudFN0eWxlIjpudWxsfSwiVmVydGljYWxDb25uZWN0b3JTdHlsZSI6eyIkaWQiOiIyNDciLCJMaW5lQ29sb3IiOnsiJHJlZiI6IjEwMSJ9LCJMaW5lV2VpZ2h0IjoxLjAsIkxpbmVUeXBlIjowLCJQYXJlbnRTdHlsZSI6bnVsbH0sIk1hcmdpbiI6bnVsbCwiU3RhcnREYXRlUG9zaXRpb24iOjQsIkVuZERhdGVQb3NpdGlvbiI6NCwiRGF0ZUlzVmlzaWJsZSI6dHJ1ZSwiVGl0bGVQb3NpdGlvbiI6MywiRHVyYXRpb25Qb3NpdGlvbiI6NiwiUGVyY2VudGFnZUNvbXBsZXRlZFBvc2l0aW9uIjoyLCJTcGFjaW5nIjo1LCJJc0JlbG93VGltZWJhbmQiOmZhbHNlLCJQZXJjZW50YWdlQ29tcGxldGVTaGFwZU9wYWNpdHkiOjM1LCJTaGFwZVN0eWxlIjp7IiRpZCI6IjI0OCIsIk1hcmdpbiI6eyIkaWQiOiIyNDkiLCJUb3AiOjAsIkxlZnQiOjQsIlJpZ2h0Ijo0LCJCb3R0b20iOjB9LCJQYWRkaW5nIjp7IiRpZCI6IjI1MCIsIlRvcCI6MCwiTGVmdCI6MCwiUmlnaHQiOjAsIkJvdHRvbSI6MH0sIkJhY2tncm91bmQiOnsiJGlkIjoiMjUxIiwiQ29sb3IiOnsiJGlkIjoiMjUyIiwiQSI6MjU1LCJSIjoyMzcsIkciOjEyNSwiQiI6NDl9fSwiSXNWaXNpYmxlIjp0cnVlLCJXaWR0aCI6MC4wLCJIZWlnaHQiOjIyLjAsIkJvcmRlclN0eWxlIjp7IiRpZCI6IjI1MyIsIkxpbmVDb2xvciI6eyIkcmVmIjoiMTA5In0sIkxpbmVXZWlnaHQiOjAuMCwiTGluZVR5cGUiOjAsIlBhcmVudFN0eWxlIjpudWxsfSwiUGFyZW50U3R5bGUiOm51bGx9LCJUaXRsZVN0eWxlIjp7IiRpZCI6IjI1NCIsIkZvbnRTZXR0aW5ncyI6eyIkaWQiOiIyNTUiLCJGb250U2l6ZSI6MTEsIkZvbnROYW1lIjoiQ2FsaWJyaSIsIklzQm9sZCI6dHJ1ZSwiSXNJdGFsaWMiOmZhbHNlLCJJc1VuZGVybGluZWQiOmZhbHNlLCJQYXJlbnRTdHlsZSI6bnVsbH0sIkF1dG9TaXplIjowLCJGb3JlZ3JvdW5kIjp7IiRpZCI6IjI1NiIsIkNvbG9yIjp7IiRyZWYiOiIxMTQifX0sIk1heFdpZHRoIjo3MjAuMCwiTWF4SGVpZ2h0IjoiSW5maW5pdHkiLCJTbWFydEZvcmVncm91bmRJc0FjdGl2ZSI6ZmFsc2UsIkhvcml6b250YWxBbGlnbm1lbnQiOjIsIlZlcnRpY2FsQWxpZ25tZW50IjowLCJTbWFydEZvcmVncm91bmQiOm51bGwsIkJhY2tncm91bmRGaWxsVHlwZSI6MCwiTWFyZ2luIjp7IiRpZCI6IjI1NyIsIlRvcCI6MCwiTGVmdCI6MCwiUmlnaHQiOjAsIkJvdHRvbSI6MH0sIlBhZGRpbmciOnsiJGlkIjoiMjU4IiwiVG9wIjowLCJMZWZ0IjowLCJSaWdodCI6MCwiQm90dG9tIjowfSwiQmFja2dyb3VuZCI6eyIkcmVmIjoiMTE3In0sIklzVmlzaWJsZSI6dHJ1ZSwiV2lkdGgiOjAuMCwiSGVpZ2h0IjowLjAsIkJvcmRlclN0eWxlIjp7IiRpZCI6IjI1OSIsIkxpbmVDb2xvciI6bnVsbCwiTGluZVdlaWdodCI6MC4wLCJMaW5lVHlwZSI6MCwiUGFyZW50U3R5bGUiOm51bGx9LCJQYXJlbnRTdHlsZSI6bnVsbH0sIkRhdGVTdHlsZSI6eyIkaWQiOiIyNjAiLCJGb250U2V0dGluZ3MiOnsiJGlkIjoiMjYxIiwiRm9udFNpemUiOjEwLCJGb250TmFtZSI6IkNhbGlicmkiLCJJc0JvbGQiOmZhbHNlLCJJc0l0YWxpYyI6ZmFsc2UsIklzVW5kZXJsaW5lZCI6ZmFsc2UsIlBhcmVudFN0eWxlIjpudWxsfSwiQXV0b1NpemUiOjAsIkZvcmVncm91bmQiOnsiJGlkIjoiMjYyIiwiQ29sb3IiOnsiJHJlZiI6IjEyMSJ9fSwiTWF4V2lkdGgiOjIwMC4wLCJNYXhIZWlnaHQiOiJJbmZpbml0eSIsIlNtYXJ0Rm9yZWdyb3VuZElzQWN0aXZlIjpmYWxzZSwiSG9yaXpvbnRhbEFsaWdubWVudCI6MCwiVmVydGljYWxBbGlnbm1lbnQiOjAsIlNtYXJ0Rm9yZWdyb3VuZCI6bnVsbCwiQmFja2dyb3VuZEZpbGxUeXBlIjowLCJNYXJnaW4iOnsiJGlkIjoiMjYzIiwiVG9wIjowLCJMZWZ0IjowLCJSaWdodCI6MCwiQm90dG9tIjowfSwiUGFkZGluZyI6eyIkaWQiOiIyNjQiLCJUb3AiOjAsIkxlZnQiOjAsIlJpZ2h0IjowLCJCb3R0b20iOjB9LCJCYWNrZ3JvdW5kIjp7IiRyZWYiOiIxMjQifSwiSXNWaXNpYmxlIjp0cnVlLCJXaWR0aCI6MC4wLCJIZWlnaHQiOjAuMCwiQm9yZGVyU3R5bGUiOnsiJGlkIjoiMjY1IiwiTGluZUNvbG9yIjpudWxsLCJMaW5lV2VpZ2h0IjowLjAsIkxpbmVUeXBlIjowLCJQYXJlbnRTdHlsZSI6bnVsbH0sIlBhcmVudFN0eWxlIjpudWxsfSwiRGF0ZUZvcm1hdCI6eyIkaWQiOiIyNjYiLCJGb3JtYXRTdHJpbmciOiJNTU0gZCIsIlNlcGFyYXRvciI6Ii8iLCJVc2VJbnRlcm5hdGlvbmFsRGF0ZUZvcm1hdCI6ZmFsc2UsIkRhdGVJc1Zpc2libGUiOnRydWUsIlRpbWVJc1Zpc2libGUiOmZhbHNlLCJIb3VyRGlnaXRzIjoxLCJBbVBtRGVzaWduYXRvciI6MiwiVHJpbTAwTWludXRlcyI6ZmFsc2UsIkxhc3RLbm93blZpc2liaWxpdHlTdGF0ZSI6bnVsbH0sIklzVmlzaWJsZSI6dHJ1ZSwiUGFyZW50U3R5bGUiOm51bGx9LCJJbmRleCI6MiwiU21hcnREdXJhdGlvbkFjdGl2YXRlZCI6ZmFsc2UsIkRhdGVGb3JtYXQiOnsiJHJlZiI6IjI2NiJ9LCJJZCI6IjQ2MzRlZmZkLTEwM2YtNDRiMC04NjI2LTVlOWQ1NjM1NjM0MCIsIkltcG9ydElkIjpudWxsLCJUaXRsZSI6IsOJY3JpcmUgbGVzIGRpZmbDqXJlbnRzIHNjcmlwdCBmb25jdGlvbm5lbHMgIiwiTm90ZSI6ImUxeHlkR1l4WEdGdWMybGNZVzV6YVdOd1p6RXlOVEpjZFdNeFhHaDBiV0YxZEhOd1hHUmxabVl5ZTF4bWIyNTBkR0pzZTF4bU1GeG1ZMmhoY25ObGREQWdWR2x0WlhNZ1RtVjNJRkp2YldGdU8zMTdYR1l5WEdaamFHRnljMlYwTUNCVFpXZHZaU0JWU1R0OWZYdGNZMjlzYjNKMFlteGNjbVZrTUZ4bmNtVmxiakJjWW14MVpUQTdYSEpsWkRJMU5WeG5jbVZsYmpJMU5WeGliSFZsTWpVMU8xeHlaV1ExTVZ4bmNtVmxialV4WEdKc2RXVTFNVHQ5WEd4dlkyaGNhR2xqYUZ4a1ltTm9YSEJoY21SY2NHeGhhVzVjYkhSeWNHRnlYR2wwWVhBd2UxeHNZVzVuTVRBek0xeG1jekU0WEdZeVhHTm1NaUJjWTJZeVhIRnNlMXhtTWlCN1hHeGhibWN4TURNMlhHeDBjbU5vSURJZ2MyVnRZV2x1WlhOOVhHeHBNRnh5YVRCY2MyRXdYSE5pTUZ4bWFUQmNjV3hjY0dGeWZRMEtmUTBLZlE9PSIsIkh5cGVybGluayI6eyIkaWQiOiIyNjciLCJBZGRyZXNzIjoiIiwiU3ViQWRkcmVzcyI6IiJ9LCJJc0NoYW5nZWQiOmZhbHNlLCJJc05ldyI6ZmFsc2V9LHsiJGlkIjoiMjY4IiwiR3JvdXBOYW1lIjpudWxsLCJTdGFydERhdGUiOiIyMDE5LTEyLTA5VDAwOjAwOjAwWiIsIkVuZERhdGUiOiIyMDE5LTEyLTIwVDIzOjU5OjAwIiwiUGVyY2VudGFnZUNvbXBsZXRlIjpudWxsLCJTdHlsZSI6eyIkaWQiOiIyNjkiLCJTaGFwZSI6MCwiU2hhcGVUaGlja25lc3MiOjIsIkR1cmF0aW9uRm9ybWF0IjowLCJJbmNsdWRlTm9uV29ya2luZ0RheXNJbkR1cmF0aW9uIjpmYWxzZSwiUGVyY2VudGFnZUNvbXBsZXRlU3R5bGUiOnsiJGlkIjoiMjcwIiwiRm9udFNldHRpbmdzIjp7IiRpZCI6IjI3MSIsIkZvbnRTaXplIjoxMCwiRm9udE5hbWUiOiJDYWxpYnJpIiwiSXNCb2xkIjpmYWxzZSwiSXNJdGFsaWMiOmZhbHNlLCJJc1VuZGVybGluZWQiOmZhbHNlLCJQYXJlbnRTdHlsZSI6bnVsbH0sIkF1dG9TaXplIjowLCJGb3JlZ3JvdW5kIjp7IiRyZWYiOiI4NSJ9LCJNYXhXaWR0aCI6MjAwLjAsIk1heEhlaWdodCI6IkluZmluaXR5IiwiU21hcnRGb3JlZ3JvdW5kSXNBY3RpdmUiOmZhbHNlLCJIb3Jpem9udGFsQWxpZ25tZW50IjowLCJWZXJ0aWNhbEFsaWdubWVudCI6MCwiU21hcnRGb3JlZ3JvdW5kIjpudWxsLCJCYWNrZ3JvdW5kRmlsbFR5cGUiOjAsIk1hcmdpbiI6eyIkaWQiOiIyNzIiLCJUb3AiOjAsIkxlZnQiOjAsIlJpZ2h0IjowLCJCb3R0b20iOjB9LCJQYWRkaW5nIjp7IiRpZCI6IjI3MyIsIlRvcCI6MCwiTGVmdCI6MCwiUmlnaHQiOjAsIkJvdHRvbSI6MH0sIkJhY2tncm91bmQiOnsiJHJlZiI6Ijg5In0sIklzVmlzaWJsZSI6dHJ1ZSwiV2lkdGgiOjAuMCwiSGVpZ2h0IjowLjAsIkJvcmRlclN0eWxlIjp7IiRpZCI6IjI3NCIsIkxpbmVDb2xvciI6bnVsbCwiTGluZVdlaWdodCI6MC4wLCJMaW5lVHlwZSI6MCwiUGFyZW50U3R5bGUiOm51bGx9LCJQYXJlbnRTdHlsZSI6bnVsbH0sIkR1cmF0aW9uU3R5bGUiOnsiJGlkIjoiMjc1IiwiRm9udFNldHRpbmdzIjp7IiRpZCI6IjI3NiIsIkZvbnRTaXplIjoxMCwiRm9udE5hbWUiOiJDYWxpYnJpIiwiSXNCb2xkIjpmYWxzZSwiSXNJdGFsaWMiOmZhbHNlLCJJc1VuZGVybGluZWQiOmZhbHNlLCJQYXJlbnRTdHlsZSI6bnVsbH0sIkF1dG9TaXplIjowLCJGb3JlZ3JvdW5kIjp7IiRpZCI6IjI3NyIsIkNvbG9yIjp7IiRyZWYiOiI5MyJ9fSwiTWF4V2lkdGgiOjIwMC4wLCJNYXhIZWlnaHQiOiJJbmZpbml0eSIsIlNtYXJ0Rm9yZWdyb3VuZElzQWN0aXZlIjpmYWxzZSwiSG9yaXpvbnRhbEFsaWdubWVudCI6MCwiVmVydGljYWxBbGlnbm1lbnQiOjAsIlNtYXJ0Rm9yZWdyb3VuZCI6bnVsbCwiQmFja2dyb3VuZEZpbGxUeXBlIjowLCJNYXJnaW4iOnsiJGlkIjoiMjc4IiwiVG9wIjowLCJMZWZ0IjowLCJSaWdodCI6MCwiQm90dG9tIjowfSwiUGFkZGluZyI6eyIkaWQiOiIyNzkiLCJUb3AiOjAsIkxlZnQiOjAsIlJpZ2h0IjowLCJCb3R0b20iOjB9LCJCYWNrZ3JvdW5kIjp7IiRyZWYiOiI5NiJ9LCJJc1Zpc2libGUiOnRydWUsIldpZHRoIjowLjAsIkhlaWdodCI6MC4wLCJCb3JkZXJTdHlsZSI6eyIkaWQiOiIyODAiLCJMaW5lQ29sb3IiOm51bGwsIkxpbmVXZWlnaHQiOjAuMCwiTGluZVR5cGUiOjAsIlBhcmVudFN0eWxlIjpudWxsfSwiUGFyZW50U3R5bGUiOm51bGx9LCJIb3Jpem9udGFsQ29ubmVjdG9yU3R5bGUiOnsiJGlkIjoiMjgxIiwiTGluZUNvbG9yIjp7IiRyZWYiOiI5OCJ9LCJMaW5lV2VpZ2h0IjoxLjAsIkxpbmVUeXBlIjowLCJQYXJlbnRTdHlsZSI6bnVsbH0sIlZlcnRpY2FsQ29ubmVjdG9yU3R5bGUiOnsiJGlkIjoiMjgyIiwiTGluZUNvbG9yIjp7IiRyZWYiOiIxMDEifSwiTGluZVdlaWdodCI6MS4wLCJMaW5lVHlwZSI6MCwiUGFyZW50U3R5bGUiOm51bGx9LCJNYXJnaW4iOm51bGwsIlN0YXJ0RGF0ZVBvc2l0aW9uIjo0LCJFbmREYXRlUG9zaXRpb24iOjQsIkRhdGVJc1Zpc2libGUiOnRydWUsIlRpdGxlUG9zaXRpb24iOjMsIkR1cmF0aW9uUG9zaXRpb24iOjYsIlBlcmNlbnRhZ2VDb21wbGV0ZWRQb3NpdGlvbiI6NiwiU3BhY2luZyI6NSwiSXNCZWxvd1RpbWViYW5kIjpmYWxzZSwiUGVyY2VudGFnZUNvbXBsZXRlU2hhcGVPcGFjaXR5IjozNSwiU2hhcGVTdHlsZSI6eyIkaWQiOiIyODMiLCJNYXJnaW4iOnsiJGlkIjoiMjg0IiwiVG9wIjowLCJMZWZ0Ijo0LCJSaWdodCI6NCwiQm90dG9tIjowfSwiUGFkZGluZyI6eyIkaWQiOiIyODUiLCJUb3AiOjAsIkxlZnQiOjAsIlJpZ2h0IjowLCJCb3R0b20iOjB9LCJCYWNrZ3JvdW5kIjp7IiRpZCI6IjI4NiIsIkNvbG9yIjp7IiRpZCI6IjI4NyIsIkEiOjI1NSwiUiI6MjM3LCJHIjoxMjUsIkIiOjQ5fX0sIklzVmlzaWJsZSI6dHJ1ZSwiV2lkdGgiOjAuMCwiSGVpZ2h0IjoyMi4wLCJCb3JkZXJTdHlsZSI6eyIkaWQiOiIyODgiLCJMaW5lQ29sb3IiOnsiJHJlZiI6IjEwOSJ9LCJMaW5lV2VpZ2h0IjowLjAsIkxpbmVUeXBlIjowLCJQYXJlbnRTdHlsZSI6bnVsbH0sIlBhcmVudFN0eWxlIjpudWxsfSwiVGl0bGVTdHlsZSI6eyIkaWQiOiIyODkiLCJGb250U2V0dGluZ3MiOnsiJGlkIjoiMjkwIiwiRm9udFNpemUiOjExLCJGb250TmFtZSI6IkNhbGlicmkiLCJJc0JvbGQiOnRydWUsIklzSXRhbGljIjpmYWxzZSwiSXNVbmRlcmxpbmVkIjpmYWxzZSwiUGFyZW50U3R5bGUiOm51bGx9LCJBdXRvU2l6ZSI6MCwiRm9yZWdyb3VuZCI6eyIkaWQiOiIyOTEiLCJDb2xvciI6eyIkcmVmIjoiMTE0In19LCJNYXhXaWR0aCI6NzIwLjAsIk1heEhlaWdodCI6IkluZmluaXR5IiwiU21hcnRGb3JlZ3JvdW5kSXNBY3RpdmUiOmZhbHNlLCJIb3Jpem9udGFsQWxpZ25tZW50IjoyLCJWZXJ0aWNhbEFsaWdubWVudCI6MCwiU21hcnRGb3JlZ3JvdW5kIjpudWxsLCJCYWNrZ3JvdW5kRmlsbFR5cGUiOjAsIk1hcmdpbiI6eyIkaWQiOiIyOTIiLCJUb3AiOjAsIkxlZnQiOjAsIlJpZ2h0IjowLCJCb3R0b20iOjB9LCJQYWRkaW5nIjp7IiRpZCI6IjI5MyIsIlRvcCI6MCwiTGVmdCI6MCwiUmlnaHQiOjAsIkJvdHRvbSI6MH0sIkJhY2tncm91bmQiOnsiJHJlZiI6IjExNyJ9LCJJc1Zpc2libGUiOnRydWUsIldpZHRoIjowLjAsIkhlaWdodCI6MC4wLCJCb3JkZXJTdHlsZSI6eyIkaWQiOiIyOTQiLCJMaW5lQ29sb3IiOm51bGwsIkxpbmVXZWlnaHQiOjAuMCwiTGluZVR5cGUiOjAsIlBhcmVudFN0eWxlIjpudWxsfSwiUGFyZW50U3R5bGUiOm51bGx9LCJEYXRlU3R5bGUiOnsiJGlkIjoiMjk1IiwiRm9udFNldHRpbmdzIjp7IiRpZCI6IjI5NiIsIkZvbnRTaXplIjoxMCwiRm9udE5hbWUiOiJDYWxpYnJpIiwiSXNCb2xkIjpmYWxzZSwiSXNJdGFsaWMiOmZhbHNlLCJJc1VuZGVybGluZWQiOmZhbHNlLCJQYXJlbnRTdHlsZSI6bnVsbH0sIkF1dG9TaXplIjowLCJGb3JlZ3JvdW5kIjp7IiRpZCI6IjI5NyIsIkNvbG9yIjp7IiRyZWYiOiIxMjEifX0sIk1heFdpZHRoIjoyMDAuMCwiTWF4SGVpZ2h0IjoiSW5maW5pdHkiLCJTbWFydEZvcmVncm91bmRJc0FjdGl2ZSI6ZmFsc2UsIkhvcml6b250YWxBbGlnbm1lbnQiOjAsIlZlcnRpY2FsQWxpZ25tZW50IjowLCJTbWFydEZvcmVncm91bmQiOm51bGwsIkJhY2tncm91bmRGaWxsVHlwZSI6MCwiTWFyZ2luIjp7IiRpZCI6IjI5OCIsIlRvcCI6MCwiTGVmdCI6MCwiUmlnaHQiOjAsIkJvdHRvbSI6MH0sIlBhZGRpbmciOnsiJGlkIjoiMjk5IiwiVG9wIjowLCJMZWZ0IjowLCJSaWdodCI6MCwiQm90dG9tIjowfSwiQmFja2dyb3VuZCI6eyIkcmVmIjoiMTI0In0sIklzVmlzaWJsZSI6dHJ1ZSwiV2lkdGgiOjAuMCwiSGVpZ2h0IjowLjAsIkJvcmRlclN0eWxlIjp7IiRpZCI6IjMwMCIsIkxpbmVDb2xvciI6bnVsbCwiTGluZVdlaWdodCI6MC4wLCJMaW5lVHlwZSI6MCwiUGFyZW50U3R5bGUiOm51bGx9LCJQYXJlbnRTdHlsZSI6bnVsbH0sIkRhdGVGb3JtYXQiOnsiJGlkIjoiMzAxIiwiRm9ybWF0U3RyaW5nIjoiTU1NIGQiLCJTZXBhcmF0b3IiOiIvIiwiVXNlSW50ZXJuYXRpb25hbERhdGVGb3JtYXQiOmZhbHNlLCJEYXRlSXNWaXNpYmxlIjp0cnVlLCJUaW1lSXNWaXNpYmxlIjpmYWxzZSwiSG91ckRpZ2l0cyI6MSwiQW1QbURlc2lnbmF0b3IiOjIsIlRyaW0wME1pbnV0ZXMiOmZhbHNlLCJMYXN0S25vd25WaXNpYmlsaXR5U3RhdGUiOm51bGx9LCJJc1Zpc2libGUiOnRydWUsIlBhcmVudFN0eWxlIjpudWxsfSwiSW5kZXgiOjMsIlNtYXJ0RHVyYXRpb25BY3RpdmF0ZWQiOmZhbHNlLCJEYXRlRm9ybWF0Ijp7IiRyZWYiOiIzMDEifSwiSWQiOiJlYWVhOGFiMy1kN2I4LTRlYzAtOTMzYi00Nzg5ZTBjNWRjZTMiLCJJbXBvcnRJZCI6bnVsbCwiVGl0bGUiOiJSw6l1bmlyIGxlcyBzY3JpcHRzIGVuIHVuIHNldWwgIiwiTm90ZSI6bnVsbCwiSHlwZXJsaW5rIjp7IiRpZCI6IjMwMiIsIkFkZHJlc3MiOiIiLCJTdWJBZGRyZXNzIjoiIn0sIklzQ2hhbmdlZCI6ZmFsc2UsIklzTmV3IjpmYWxzZX0seyIkaWQiOiIzMDMiLCJHcm91cE5hbWUiOm51bGwsIlN0YXJ0RGF0ZSI6IjIwMjAtMDEtMTNUMDA6MDA6MDBaIiwiRW5kRGF0ZSI6IjIwMjAtMDItMjFUMjM6NTk6MDAiLCJQZXJjZW50YWdlQ29tcGxldGUiOm51bGwsIlN0eWxlIjp7IiRpZCI6IjMwNCIsIlNoYXBlIjowLCJTaGFwZVRoaWNrbmVzcyI6MiwiRHVyYXRpb25Gb3JtYXQiOjAsIkluY2x1ZGVOb25Xb3JraW5nRGF5c0luRHVyYXRpb24iOmZhbHNlLCJQZXJjZW50YWdlQ29tcGxldGVTdHlsZSI6eyIkaWQiOiIzMDUiLCJGb250U2V0dGluZ3MiOnsiJGlkIjoiMzA2IiwiRm9udFNpemUiOjEwLCJGb250TmFtZSI6IkNhbGlicmkiLCJJc0JvbGQiOmZhbHNlLCJJc0l0YWxpYyI6ZmFsc2UsIklzVW5kZXJsaW5lZCI6ZmFsc2UsIlBhcmVudFN0eWxlIjpudWxsfSwiQXV0b1NpemUiOjAsIkZvcmVncm91bmQiOnsiJHJlZiI6Ijg1In0sIk1heFdpZHRoIjoyMDAuMCwiTWF4SGVpZ2h0IjoiSW5maW5pdHkiLCJTbWFydEZvcmVncm91bmRJc0FjdGl2ZSI6ZmFsc2UsIkhvcml6b250YWxBbGlnbm1lbnQiOjAsIlZlcnRpY2FsQWxpZ25tZW50IjowLCJTbWFydEZvcmVncm91bmQiOm51bGwsIkJhY2tncm91bmRGaWxsVHlwZSI6MCwiTWFyZ2luIjp7IiRpZCI6IjMwNyIsIlRvcCI6MCwiTGVmdCI6MCwiUmlnaHQiOjAsIkJvdHRvbSI6MH0sIlBhZGRpbmciOnsiJGlkIjoiMzA4IiwiVG9wIjowLCJMZWZ0IjowLCJSaWdodCI6MCwiQm90dG9tIjowfSwiQmFja2dyb3VuZCI6eyIkcmVmIjoiODkifSwiSXNWaXNpYmxlIjp0cnVlLCJXaWR0aCI6MC4wLCJIZWlnaHQiOjAuMCwiQm9yZGVyU3R5bGUiOnsiJGlkIjoiMzA5IiwiTGluZUNvbG9yIjpudWxsLCJMaW5lV2VpZ2h0IjowLjAsIkxpbmVUeXBlIjowLCJQYXJlbnRTdHlsZSI6bnVsbH0sIlBhcmVudFN0eWxlIjpudWxsfSwiRHVyYXRpb25TdHlsZSI6eyIkaWQiOiIzMTAiLCJGb250U2V0dGluZ3MiOnsiJGlkIjoiMzExIiwiRm9udFNpemUiOjEwLCJGb250TmFtZSI6IkNhbGlicmkiLCJJc0JvbGQiOmZhbHNlLCJJc0l0YWxpYyI6ZmFsc2UsIklzVW5kZXJsaW5lZCI6ZmFsc2UsIlBhcmVudFN0eWxlIjpudWxsfSwiQXV0b1NpemUiOjAsIkZvcmVncm91bmQiOnsiJGlkIjoiMzEyIiwiQ29sb3IiOnsiJHJlZiI6IjkzIn19LCJNYXhXaWR0aCI6MjAwLjAsIk1heEhlaWdodCI6IkluZmluaXR5IiwiU21hcnRGb3JlZ3JvdW5kSXNBY3RpdmUiOmZhbHNlLCJIb3Jpem9udGFsQWxpZ25tZW50IjowLCJWZXJ0aWNhbEFsaWdubWVudCI6MCwiU21hcnRGb3JlZ3JvdW5kIjpudWxsLCJCYWNrZ3JvdW5kRmlsbFR5cGUiOjAsIk1hcmdpbiI6eyIkaWQiOiIzMTMiLCJUb3AiOjAsIkxlZnQiOjAsIlJpZ2h0IjowLCJCb3R0b20iOjB9LCJQYWRkaW5nIjp7IiRpZCI6IjMxNCIsIlRvcCI6MCwiTGVmdCI6MCwiUmlnaHQiOjAsIkJvdHRvbSI6MH0sIkJhY2tncm91bmQiOnsiJHJlZiI6Ijk2In0sIklzVmlzaWJsZSI6dHJ1ZSwiV2lkdGgiOjAuMCwiSGVpZ2h0IjowLjAsIkJvcmRlclN0eWxlIjp7IiRpZCI6IjMxNSIsIkxpbmVDb2xvciI6bnVsbCwiTGluZVdlaWdodCI6MC4wLCJMaW5lVHlwZSI6MCwiUGFyZW50U3R5bGUiOm51bGx9LCJQYXJlbnRTdHlsZSI6bnVsbH0sIkhvcml6b250YWxDb25uZWN0b3JTdHlsZSI6eyIkaWQiOiIzMTYiLCJMaW5lQ29sb3IiOnsiJHJlZiI6Ijk4In0sIkxpbmVXZWlnaHQiOjEuMCwiTGluZVR5cGUiOjAsIlBhcmVudFN0eWxlIjpudWxsfSwiVmVydGljYWxDb25uZWN0b3JTdHlsZSI6eyIkaWQiOiIzMTciLCJMaW5lQ29sb3IiOnsiJHJlZiI6IjEwMSJ9LCJMaW5lV2VpZ2h0IjoxLjAsIkxpbmVUeXBlIjowLCJQYXJlbnRTdHlsZSI6bnVsbH0sIk1hcmdpbiI6bnVsbCwiU3RhcnREYXRlUG9zaXRpb24iOjQsIkVuZERhdGVQb3NpdGlvbiI6NCwiRGF0ZUlzVmlzaWJsZSI6dHJ1ZSwiVGl0bGVQb3NpdGlvbiI6MywiRHVyYXRpb25Qb3NpdGlvbiI6NiwiUGVyY2VudGFnZUNvbXBsZXRlZFBvc2l0aW9uIjo2LCJTcGFjaW5nIjo1LCJJc0JlbG93VGltZWJhbmQiOmZhbHNlLCJQZXJjZW50YWdlQ29tcGxldGVTaGFwZU9wYWNpdHkiOjM1LCJTaGFwZVN0eWxlIjp7IiRpZCI6IjMxOCIsIk1hcmdpbiI6eyIkaWQiOiIzMTkiLCJUb3AiOjAsIkxlZnQiOjQsIlJpZ2h0Ijo0LCJCb3R0b20iOjB9LCJQYWRkaW5nIjp7IiRpZCI6IjMyMCIsIlRvcCI6MCwiTGVmdCI6MCwiUmlnaHQiOjAsIkJvdHRvbSI6MH0sIkJhY2tncm91bmQiOnsiJGlkIjoiMzIxIiwiQ29sb3IiOnsiJGlkIjoiMzIyIiwiQSI6MjU1LCJSIjoxMTIsIkciOjE3MywiQiI6NzF9fSwiSXNWaXNpYmxlIjp0cnVlLCJXaWR0aCI6MC4wLCJIZWlnaHQiOjIyLjAsIkJvcmRlclN0eWxlIjp7IiRpZCI6IjMyMyIsIkxpbmVDb2xvciI6eyIkcmVmIjoiMTA5In0sIkxpbmVXZWlnaHQiOjAuMCwiTGluZVR5cGUiOjAsIlBhcmVudFN0eWxlIjpudWxsfSwiUGFyZW50U3R5bGUiOm51bGx9LCJUaXRsZVN0eWxlIjp7IiRpZCI6IjMyNCIsIkZvbnRTZXR0aW5ncyI6eyIkaWQiOiIzMjUiLCJGb250U2l6ZSI6MTEsIkZvbnROYW1lIjoiQ2FsaWJyaSIsIklzQm9sZCI6dHJ1ZSwiSXNJdGFsaWMiOmZhbHNlLCJJc1VuZGVybGluZWQiOmZhbHNlLCJQYXJlbnRTdHlsZSI6bnVsbH0sIkF1dG9TaXplIjowLCJGb3JlZ3JvdW5kIjp7IiRpZCI6IjMyNiIsIkNvbG9yIjp7IiRyZWYiOiIxMTQifX0sIk1heFdpZHRoIjo3MjAuMCwiTWF4SGVpZ2h0IjoiSW5maW5pdHkiLCJTbWFydEZvcmVncm91bmRJc0FjdGl2ZSI6ZmFsc2UsIkhvcml6b250YWxBbGlnbm1lbnQiOjIsIlZlcnRpY2FsQWxpZ25tZW50IjowLCJTbWFydEZvcmVncm91bmQiOm51bGwsIkJhY2tncm91bmRGaWxsVHlwZSI6MCwiTWFyZ2luIjp7IiRpZCI6IjMyNyIsIlRvcCI6MCwiTGVmdCI6MCwiUmlnaHQiOjAsIkJvdHRvbSI6MH0sIlBhZGRpbmciOnsiJGlkIjoiMzI4IiwiVG9wIjowLCJMZWZ0IjowLCJSaWdodCI6MCwiQm90dG9tIjowfSwiQmFja2dyb3VuZCI6eyIkcmVmIjoiMTE3In0sIklzVmlzaWJsZSI6dHJ1ZSwiV2lkdGgiOjAuMCwiSGVpZ2h0IjowLjAsIkJvcmRlclN0eWxlIjp7IiRpZCI6IjMyOSIsIkxpbmVDb2xvciI6bnVsbCwiTGluZVdlaWdodCI6MC4wLCJMaW5lVHlwZSI6MCwiUGFyZW50U3R5bGUiOm51bGx9LCJQYXJlbnRTdHlsZSI6bnVsbH0sIkRhdGVTdHlsZSI6eyIkaWQiOiIzMzAiLCJGb250U2V0dGluZ3MiOnsiJGlkIjoiMzMxIiwiRm9udFNpemUiOjEwLCJGb250TmFtZSI6IkNhbGlicmkiLCJJc0JvbGQiOmZhbHNlLCJJc0l0YWxpYyI6ZmFsc2UsIklzVW5kZXJsaW5lZCI6ZmFsc2UsIlBhcmVudFN0eWxlIjpudWxsfSwiQXV0b1NpemUiOjAsIkZvcmVncm91bmQiOnsiJGlkIjoiMzMyIiwiQ29sb3IiOnsiJHJlZiI6IjEyMSJ9fSwiTWF4V2lkdGgiOjIwMC4wLCJNYXhIZWlnaHQiOiJJbmZpbml0eSIsIlNtYXJ0Rm9yZWdyb3VuZElzQWN0aXZlIjpmYWxzZSwiSG9yaXpvbnRhbEFsaWdubWVudCI6MCwiVmVydGljYWxBbGlnbm1lbnQiOjAsIlNtYXJ0Rm9yZWdyb3VuZCI6bnVsbCwiQmFja2dyb3VuZEZpbGxUeXBlIjowLCJNYXJnaW4iOnsiJGlkIjoiMzMzIiwiVG9wIjowLCJMZWZ0IjowLCJSaWdodCI6MCwiQm90dG9tIjowfSwiUGFkZGluZyI6eyIkaWQiOiIzMzQiLCJUb3AiOjAsIkxlZnQiOjAsIlJpZ2h0IjowLCJCb3R0b20iOjB9LCJCYWNrZ3JvdW5kIjp7IiRyZWYiOiIxMjQifSwiSXNWaXNpYmxlIjp0cnVlLCJXaWR0aCI6MC4wLCJIZWlnaHQiOjAuMCwiQm9yZGVyU3R5bGUiOnsiJGlkIjoiMzM1IiwiTGluZUNvbG9yIjpudWxsLCJMaW5lV2VpZ2h0IjowLjAsIkxpbmVUeXBlIjowLCJQYXJlbnRTdHlsZSI6bnVsbH0sIlBhcmVudFN0eWxlIjpudWxsfSwiRGF0ZUZvcm1hdCI6eyIkaWQiOiIzMzYiLCJGb3JtYXRTdHJpbmciOiJNTU0gZCIsIlNlcGFyYXRvciI6Ii8iLCJVc2VJbnRlcm5hdGlvbmFsRGF0ZUZvcm1hdCI6ZmFsc2UsIkRhdGVJc1Zpc2libGUiOnRydWUsIlRpbWVJc1Zpc2libGUiOmZhbHNlLCJIb3VyRGlnaXRzIjoxLCJBbVBtRGVzaWduYXRvciI6MiwiVHJpbTAwTWludXRlcyI6ZmFsc2UsIkxhc3RLbm93blZpc2liaWxpdHlTdGF0ZSI6bnVsbH0sIklzVmlzaWJsZSI6dHJ1ZSwiUGFyZW50U3R5bGUiOm51bGx9LCJJbmRleCI6NCwiU21hcnREdXJhdGlvbkFjdGl2YXRlZCI6ZmFsc2UsIkRhdGVGb3JtYXQiOnsiJHJlZiI6IjMzNiJ9LCJJZCI6IjY0NGE1Yzc4LWExODItNGNhNS1iYTc5LTNjZTRjZmI3YjMyMCIsIkltcG9ydElkIjpudWxsLCJUaXRsZSI6IkZhaXJlIGxlIGxpZW4gZW50cmUgbCdpbnRlcmZhY2Ugd2ViIGV0IGxlcyBzY3JpcHRzIFIgIiwiTm90ZSI6bnVsbCwiSHlwZXJsaW5rIjp7IiRpZCI6IjMzNyIsIkFkZHJlc3MiOiIiLCJTdWJBZGRyZXNzIjoiIn0sIklzQ2hhbmdlZCI6ZmFsc2UsIklzTmV3IjpmYWxzZX0seyIkaWQiOiIzMzgiLCJHcm91cE5hbWUiOm51bGwsIlN0YXJ0RGF0ZSI6IjIwMjAtMDEtMTNUMDA6MDA6MDBaIiwiRW5kRGF0ZSI6IjIwMjAtMDItMjFUMjM6NTk6MDAiLCJQZXJjZW50YWdlQ29tcGxldGUiOm51bGwsIlN0eWxlIjp7IiRpZCI6IjMzOSIsIlNoYXBlIjowLCJTaGFwZVRoaWNrbmVzcyI6MiwiRHVyYXRpb25Gb3JtYXQiOjAsIkluY2x1ZGVOb25Xb3JraW5nRGF5c0luRHVyYXRpb24iOmZhbHNlLCJQZXJjZW50YWdlQ29tcGxldGVTdHlsZSI6eyIkaWQiOiIzNDAiLCJGb250U2V0dGluZ3MiOnsiJGlkIjoiMzQxIiwiRm9udFNpemUiOjEwLCJGb250TmFtZSI6IkNhbGlicmkiLCJJc0JvbGQiOmZhbHNlLCJJc0l0YWxpYyI6ZmFsc2UsIklzVW5kZXJsaW5lZCI6ZmFsc2UsIlBhcmVudFN0eWxlIjpudWxsfSwiQXV0b1NpemUiOjAsIkZvcmVncm91bmQiOnsiJHJlZiI6Ijg1In0sIk1heFdpZHRoIjoyMDAuMCwiTWF4SGVpZ2h0IjoiSW5maW5pdHkiLCJTbWFydEZvcmVncm91bmRJc0FjdGl2ZSI6ZmFsc2UsIkhvcml6b250YWxBbGlnbm1lbnQiOjAsIlZlcnRpY2FsQWxpZ25tZW50IjowLCJTbWFydEZvcmVncm91bmQiOm51bGwsIkJhY2tncm91bmRGaWxsVHlwZSI6MCwiTWFyZ2luIjp7IiRpZCI6IjM0MiIsIlRvcCI6MCwiTGVmdCI6MCwiUmlnaHQiOjAsIkJvdHRvbSI6MH0sIlBhZGRpbmciOnsiJGlkIjoiMzQzIiwiVG9wIjowLCJMZWZ0IjowLCJSaWdodCI6MCwiQm90dG9tIjowfSwiQmFja2dyb3VuZCI6eyIkcmVmIjoiODkifSwiSXNWaXNpYmxlIjp0cnVlLCJXaWR0aCI6MC4wLCJIZWlnaHQiOjAuMCwiQm9yZGVyU3R5bGUiOnsiJGlkIjoiMzQ0IiwiTGluZUNvbG9yIjpudWxsLCJMaW5lV2VpZ2h0IjowLjAsIkxpbmVUeXBlIjowLCJQYXJlbnRTdHlsZSI6bnVsbH0sIlBhcmVudFN0eWxlIjpudWxsfSwiRHVyYXRpb25TdHlsZSI6eyIkaWQiOiIzNDUiLCJGb250U2V0dGluZ3MiOnsiJGlkIjoiMzQ2IiwiRm9udFNpemUiOjEwLCJGb250TmFtZSI6IkNhbGlicmkiLCJJc0JvbGQiOmZhbHNlLCJJc0l0YWxpYyI6ZmFsc2UsIklzVW5kZXJsaW5lZCI6ZmFsc2UsIlBhcmVudFN0eWxlIjpudWxsfSwiQXV0b1NpemUiOjAsIkZvcmVncm91bmQiOnsiJGlkIjoiMzQ3IiwiQ29sb3IiOnsiJHJlZiI6IjkzIn19LCJNYXhXaWR0aCI6MjAwLjAsIk1heEhlaWdodCI6IkluZmluaXR5IiwiU21hcnRGb3JlZ3JvdW5kSXNBY3RpdmUiOmZhbHNlLCJIb3Jpem9udGFsQWxpZ25tZW50IjowLCJWZXJ0aWNhbEFsaWdubWVudCI6MCwiU21hcnRGb3JlZ3JvdW5kIjpudWxsLCJCYWNrZ3JvdW5kRmlsbFR5cGUiOjAsIk1hcmdpbiI6eyIkaWQiOiIzNDgiLCJUb3AiOjAsIkxlZnQiOjAsIlJpZ2h0IjowLCJCb3R0b20iOjB9LCJQYWRkaW5nIjp7IiRpZCI6IjM0OSIsIlRvcCI6MCwiTGVmdCI6MCwiUmlnaHQiOjAsIkJvdHRvbSI6MH0sIkJhY2tncm91bmQiOnsiJHJlZiI6Ijk2In0sIklzVmlzaWJsZSI6dHJ1ZSwiV2lkdGgiOjAuMCwiSGVpZ2h0IjowLjAsIkJvcmRlclN0eWxlIjp7IiRpZCI6IjM1MCIsIkxpbmVDb2xvciI6bnVsbCwiTGluZVdlaWdodCI6MC4wLCJMaW5lVHlwZSI6MCwiUGFyZW50U3R5bGUiOm51bGx9LCJQYXJlbnRTdHlsZSI6bnVsbH0sIkhvcml6b250YWxDb25uZWN0b3JTdHlsZSI6eyIkaWQiOiIzNTEiLCJMaW5lQ29sb3IiOnsiJHJlZiI6Ijk4In0sIkxpbmVXZWlnaHQiOjEuMCwiTGluZVR5cGUiOjAsIlBhcmVudFN0eWxlIjpudWxsfSwiVmVydGljYWxDb25uZWN0b3JTdHlsZSI6eyIkaWQiOiIzNTIiLCJMaW5lQ29sb3IiOnsiJHJlZiI6IjEwMSJ9LCJMaW5lV2VpZ2h0IjoxLjAsIkxpbmVUeXBlIjowLCJQYXJlbnRTdHlsZSI6bnVsbH0sIk1hcmdpbiI6bnVsbCwiU3RhcnREYXRlUG9zaXRpb24iOjQsIkVuZERhdGVQb3NpdGlvbiI6NCwiRGF0ZUlzVmlzaWJsZSI6dHJ1ZSwiVGl0bGVQb3NpdGlvbiI6MiwiRHVyYXRpb25Qb3NpdGlvbiI6NiwiUGVyY2VudGFnZUNvbXBsZXRlZFBvc2l0aW9uIjo2LCJTcGFjaW5nIjo1LCJJc0JlbG93VGltZWJhbmQiOmZhbHNlLCJQZXJjZW50YWdlQ29tcGxldGVTaGFwZU9wYWNpdHkiOjM1LCJTaGFwZVN0eWxlIjp7IiRpZCI6IjM1MyIsIk1hcmdpbiI6eyIkaWQiOiIzNTQiLCJUb3AiOjAsIkxlZnQiOjQsIlJpZ2h0Ijo0LCJCb3R0b20iOjB9LCJQYWRkaW5nIjp7IiRpZCI6IjM1NSIsIlRvcCI6MCwiTGVmdCI6MCwiUmlnaHQiOjAsIkJvdHRvbSI6MH0sIkJhY2tncm91bmQiOnsiJGlkIjoiMzU2IiwiQ29sb3IiOnsiJGlkIjoiMzU3IiwiQSI6MjU1LCJSIjo5MSwiRyI6MTU1LCJCIjoyMTN9fSwiSXNWaXNpYmxlIjp0cnVlLCJXaWR0aCI6MC4wLCJIZWlnaHQiOjIyLjAsIkJvcmRlclN0eWxlIjp7IiRpZCI6IjM1OCIsIkxpbmVDb2xvciI6eyIkcmVmIjoiMTA5In0sIkxpbmVXZWlnaHQiOjAuMCwiTGluZVR5cGUiOjAsIlBhcmVudFN0eWxlIjpudWxsfSwiUGFyZW50U3R5bGUiOm51bGx9LCJUaXRsZVN0eWxlIjp7IiRpZCI6IjM1OSIsIkZvbnRTZXR0aW5ncyI6eyIkaWQiOiIzNjAiLCJGb250U2l6ZSI6MTEsIkZvbnROYW1lIjoiQ2FsaWJyaSIsIklzQm9sZCI6dHJ1ZSwiSXNJdGFsaWMiOmZhbHNlLCJJc1VuZGVybGluZWQiOmZhbHNlLCJQYXJlbnRTdHlsZSI6bnVsbH0sIkF1dG9TaXplIjowLCJGb3JlZ3JvdW5kIjp7IiRpZCI6IjM2MSIsIkNvbG9yIjp7IiRyZWYiOiIxMTQifX0sIk1heFdpZHRoIjo3MjAuMCwiTWF4SGVpZ2h0IjoiSW5maW5pdHkiLCJTbWFydEZvcmVncm91bmRJc0FjdGl2ZSI6ZmFsc2UsIkhvcml6b250YWxBbGlnbm1lbnQiOjEsIlZlcnRpY2FsQWxpZ25tZW50IjowLCJTbWFydEZvcmVncm91bmQiOm51bGwsIkJhY2tncm91bmRGaWxsVHlwZSI6MCwiTWFyZ2luIjp7IiRpZCI6IjM2MiIsIlRvcCI6MCwiTGVmdCI6MCwiUmlnaHQiOjAsIkJvdHRvbSI6MH0sIlBhZGRpbmciOnsiJGlkIjoiMzYzIiwiVG9wIjowLCJMZWZ0IjowLCJSaWdodCI6MCwiQm90dG9tIjowfSwiQmFja2dyb3VuZCI6eyIkcmVmIjoiMTE3In0sIklzVmlzaWJsZSI6dHJ1ZSwiV2lkdGgiOjAuMCwiSGVpZ2h0IjowLjAsIkJvcmRlclN0eWxlIjp7IiRpZCI6IjM2NCIsIkxpbmVDb2xvciI6bnVsbCwiTGluZVdlaWdodCI6MC4wLCJMaW5lVHlwZSI6MCwiUGFyZW50U3R5bGUiOm51bGx9LCJQYXJlbnRTdHlsZSI6bnVsbH0sIkRhdGVTdHlsZSI6eyIkaWQiOiIzNjUiLCJGb250U2V0dGluZ3MiOnsiJGlkIjoiMzY2IiwiRm9udFNpemUiOjEwLCJGb250TmFtZSI6IkNhbGlicmkiLCJJc0JvbGQiOmZhbHNlLCJJc0l0YWxpYyI6ZmFsc2UsIklzVW5kZXJsaW5lZCI6ZmFsc2UsIlBhcmVudFN0eWxlIjpudWxsfSwiQXV0b1NpemUiOjAsIkZvcmVncm91bmQiOnsiJGlkIjoiMzY3IiwiQ29sb3IiOnsiJHJlZiI6IjEyMSJ9fSwiTWF4V2lkdGgiOjIwMC4wLCJNYXhIZWlnaHQiOiJJbmZpbml0eSIsIlNtYXJ0Rm9yZWdyb3VuZElzQWN0aXZlIjpmYWxzZSwiSG9yaXpvbnRhbEFsaWdubWVudCI6MCwiVmVydGljYWxBbGlnbm1lbnQiOjAsIlNtYXJ0Rm9yZWdyb3VuZCI6bnVsbCwiQmFja2dyb3VuZEZpbGxUeXBlIjowLCJNYXJnaW4iOnsiJGlkIjoiMzY4IiwiVG9wIjowLCJMZWZ0IjowLCJSaWdodCI6MCwiQm90dG9tIjowfSwiUGFkZGluZyI6eyIkaWQiOiIzNjkiLCJUb3AiOjAsIkxlZnQiOjAsIlJpZ2h0IjowLCJCb3R0b20iOjB9LCJCYWNrZ3JvdW5kIjp7IiRyZWYiOiIxMjQifSwiSXNWaXNpYmxlIjp0cnVlLCJXaWR0aCI6MC4wLCJIZWlnaHQiOjAuMCwiQm9yZGVyU3R5bGUiOnsiJGlkIjoiMzcwIiwiTGluZUNvbG9yIjpudWxsLCJMaW5lV2VpZ2h0IjowLjAsIkxpbmVUeXBlIjowLCJQYXJlbnRTdHlsZSI6bnVsbH0sIlBhcmVudFN0eWxlIjpudWxsfSwiRGF0ZUZvcm1hdCI6eyIkaWQiOiIzNzEiLCJGb3JtYXRTdHJpbmciOiJNTU0gZCIsIlNlcGFyYXRvciI6Ii8iLCJVc2VJbnRlcm5hdGlvbmFsRGF0ZUZvcm1hdCI6ZmFsc2UsIkRhdGVJc1Zpc2libGUiOnRydWUsIlRpbWVJc1Zpc2libGUiOmZhbHNlLCJIb3VyRGlnaXRzIjoxLCJBbVBtRGVzaWduYXRvciI6MiwiVHJpbTAwTWludXRlcyI6ZmFsc2UsIkxhc3RLbm93blZpc2liaWxpdHlTdGF0ZSI6bnVsbH0sIklzVmlzaWJsZSI6dHJ1ZSwiUGFyZW50U3R5bGUiOm51bGx9LCJJbmRleCI6NSwiU21hcnREdXJhdGlvbkFjdGl2YXRlZCI6ZmFsc2UsIkRhdGVGb3JtYXQiOnsiJHJlZiI6IjM3MSJ9LCJJZCI6ImY1Y2UyZTJjLTZhYTUtNDI1My04NTAwLWUzMzljOGY4NGNmNSIsIkltcG9ydElkIjpudWxsLCJUaXRsZSI6IkFqb3V0ZXIgZGVzIHZvaWVzIG5vbi1jYW5vbmlxdWVzICIsIk5vdGUiOm51bGwsIkh5cGVybGluayI6eyIkaWQiOiIzNzIiLCJBZGRyZXNzIjoiIiwiU3ViQWRkcmVzcyI6IiJ9LCJJc0NoYW5nZWQiOmZhbHNlLCJJc05ldyI6ZmFsc2V9LHsiJGlkIjoiMzczIiwiR3JvdXBOYW1lIjpudWxsLCJTdGFydERhdGUiOiIyMDIwLTAzLTA5VDAwOjAwOjAwWiIsIkVuZERhdGUiOiIyMDIwLTAzLTIwVDIzOjU5OjAwIiwiUGVyY2VudGFnZUNvbXBsZXRlIjpudWxsLCJTdHlsZSI6eyIkaWQiOiIzNzQiLCJTaGFwZSI6MCwiU2hhcGVUaGlja25lc3MiOjIsIkR1cmF0aW9uRm9ybWF0IjowLCJJbmNsdWRlTm9uV29ya2luZ0RheXNJbkR1cmF0aW9uIjpmYWxzZSwiUGVyY2VudGFnZUNvbXBsZXRlU3R5bGUiOnsiJGlkIjoiMzc1IiwiRm9udFNldHRpbmdzIjp7IiRpZCI6IjM3NiIsIkZvbnRTaXplIjoxMCwiRm9udE5hbWUiOiJDYWxpYnJpIiwiSXNCb2xkIjpmYWxzZSwiSXNJdGFsaWMiOmZhbHNlLCJJc1VuZGVybGluZWQiOmZhbHNlLCJQYXJlbnRTdHlsZSI6bnVsbH0sIkF1dG9TaXplIjowLCJGb3JlZ3JvdW5kIjp7IiRyZWYiOiI4NSJ9LCJNYXhXaWR0aCI6MjAwLjAsIk1heEhlaWdodCI6IkluZmluaXR5IiwiU21hcnRGb3JlZ3JvdW5kSXNBY3RpdmUiOmZhbHNlLCJIb3Jpem9udGFsQWxpZ25tZW50IjowLCJWZXJ0aWNhbEFsaWdubWVudCI6MCwiU21hcnRGb3JlZ3JvdW5kIjpudWxsLCJCYWNrZ3JvdW5kRmlsbFR5cGUiOjAsIk1hcmdpbiI6eyIkaWQiOiIzNzciLCJUb3AiOjAsIkxlZnQiOjAsIlJpZ2h0IjowLCJCb3R0b20iOjB9LCJQYWRkaW5nIjp7IiRpZCI6IjM3OCIsIlRvcCI6MCwiTGVmdCI6MCwiUmlnaHQiOjAsIkJvdHRvbSI6MH0sIkJhY2tncm91bmQiOnsiJHJlZiI6Ijg5In0sIklzVmlzaWJsZSI6dHJ1ZSwiV2lkdGgiOjAuMCwiSGVpZ2h0IjowLjAsIkJvcmRlclN0eWxlIjp7IiRpZCI6IjM3OSIsIkxpbmVDb2xvciI6bnVsbCwiTGluZVdlaWdodCI6MC4wLCJMaW5lVHlwZSI6MCwiUGFyZW50U3R5bGUiOm51bGx9LCJQYXJlbnRTdHlsZSI6bnVsbH0sIkR1cmF0aW9uU3R5bGUiOnsiJGlkIjoiMzgwIiwiRm9udFNldHRpbmdzIjp7IiRpZCI6IjM4MSIsIkZvbnRTaXplIjoxMCwiRm9udE5hbWUiOiJDYWxpYnJpIiwiSXNCb2xkIjpmYWxzZSwiSXNJdGFsaWMiOmZhbHNlLCJJc1VuZGVybGluZWQiOmZhbHNlLCJQYXJlbnRTdHlsZSI6bnVsbH0sIkF1dG9TaXplIjowLCJGb3JlZ3JvdW5kIjp7IiRpZCI6IjM4MiIsIkNvbG9yIjp7IiRyZWYiOiI5MyJ9fSwiTWF4V2lkdGgiOjIwMC4wLCJNYXhIZWlnaHQiOiJJbmZpbml0eSIsIlNtYXJ0Rm9yZWdyb3VuZElzQWN0aXZlIjpmYWxzZSwiSG9yaXpvbnRhbEFsaWdubWVudCI6MCwiVmVydGljYWxBbGlnbm1lbnQiOjAsIlNtYXJ0Rm9yZWdyb3VuZCI6bnVsbCwiQmFja2dyb3VuZEZpbGxUeXBlIjowLCJNYXJnaW4iOnsiJGlkIjoiMzgzIiwiVG9wIjowLCJMZWZ0IjowLCJSaWdodCI6MCwiQm90dG9tIjowfSwiUGFkZGluZyI6eyIkaWQiOiIzODQiLCJUb3AiOjAsIkxlZnQiOjAsIlJpZ2h0IjowLCJCb3R0b20iOjB9LCJCYWNrZ3JvdW5kIjp7IiRyZWYiOiI5NiJ9LCJJc1Zpc2libGUiOnRydWUsIldpZHRoIjowLjAsIkhlaWdodCI6MC4wLCJCb3JkZXJTdHlsZSI6eyIkaWQiOiIzODUiLCJMaW5lQ29sb3IiOm51bGwsIkxpbmVXZWlnaHQiOjAuMCwiTGluZVR5cGUiOjAsIlBhcmVudFN0eWxlIjpudWxsfSwiUGFyZW50U3R5bGUiOm51bGx9LCJIb3Jpem9udGFsQ29ubmVjdG9yU3R5bGUiOnsiJGlkIjoiMzg2IiwiTGluZUNvbG9yIjp7IiRyZWYiOiI5OCJ9LCJMaW5lV2VpZ2h0IjoxLjAsIkxpbmVUeXBlIjowLCJQYXJlbnRTdHlsZSI6bnVsbH0sIlZlcnRpY2FsQ29ubmVjdG9yU3R5bGUiOnsiJGlkIjoiMzg3IiwiTGluZUNvbG9yIjp7IiRyZWYiOiIxMDEifSwiTGluZVdlaWdodCI6MS4wLCJMaW5lVHlwZSI6MCwiUGFyZW50U3R5bGUiOm51bGx9LCJNYXJnaW4iOm51bGwsIlN0YXJ0RGF0ZVBvc2l0aW9uIjo0LCJFbmREYXRlUG9zaXRpb24iOjQsIkRhdGVJc1Zpc2libGUiOnRydWUsIlRpdGxlUG9zaXRpb24iOjMsIkR1cmF0aW9uUG9zaXRpb24iOjYsIlBlcmNlbnRhZ2VDb21wbGV0ZWRQb3NpdGlvbiI6NiwiU3BhY2luZyI6NSwiSXNCZWxvd1RpbWViYW5kIjpmYWxzZSwiUGVyY2VudGFnZUNvbXBsZXRlU2hhcGVPcGFjaXR5IjozNSwiU2hhcGVTdHlsZSI6eyIkaWQiOiIzODgiLCJNYXJnaW4iOnsiJGlkIjoiMzg5IiwiVG9wIjowLCJMZWZ0Ijo0LCJSaWdodCI6NCwiQm90dG9tIjowfSwiUGFkZGluZyI6eyIkaWQiOiIzOTAiLCJUb3AiOjAsIkxlZnQiOjAsIlJpZ2h0IjowLCJCb3R0b20iOjB9LCJCYWNrZ3JvdW5kIjp7IiRpZCI6IjM5MSIsIkNvbG9yIjp7IiRpZCI6IjM5MiIsIkEiOjI1NSwiUiI6OTEsIkciOjE1NSwiQiI6MjEzfX0sIklzVmlzaWJsZSI6dHJ1ZSwiV2lkdGgiOjAuMCwiSGVpZ2h0IjoyMi4wLCJCb3JkZXJTdHlsZSI6eyIkaWQiOiIzOTMiLCJMaW5lQ29sb3IiOnsiJHJlZiI6IjEwOSJ9LCJMaW5lV2VpZ2h0IjowLjAsIkxpbmVUeXBlIjowLCJQYXJlbnRTdHlsZSI6bnVsbH0sIlBhcmVudFN0eWxlIjpudWxsfSwiVGl0bGVTdHlsZSI6eyIkaWQiOiIzOTQiLCJGb250U2V0dGluZ3MiOnsiJGlkIjoiMzk1IiwiRm9udFNpemUiOjExLCJGb250TmFtZSI6IkNhbGlicmkiLCJJc0JvbGQiOnRydWUsIklzSXRhbGljIjpmYWxzZSwiSXNVbmRlcmxpbmVkIjpmYWxzZSwiUGFyZW50U3R5bGUiOm51bGx9LCJBdXRvU2l6ZSI6MCwiRm9yZWdyb3VuZCI6eyIkaWQiOiIzOTYiLCJDb2xvciI6eyIkcmVmIjoiMTE0In19LCJNYXhXaWR0aCI6NzIwLjAsIk1heEhlaWdodCI6IkluZmluaXR5IiwiU21hcnRGb3JlZ3JvdW5kSXNBY3RpdmUiOmZhbHNlLCJIb3Jpem9udGFsQWxpZ25tZW50IjoyLCJWZXJ0aWNhbEFsaWdubWVudCI6MCwiU21hcnRGb3JlZ3JvdW5kIjpudWxsLCJCYWNrZ3JvdW5kRmlsbFR5cGUiOjAsIk1hcmdpbiI6eyIkaWQiOiIzOTciLCJUb3AiOjAsIkxlZnQiOjAsIlJpZ2h0IjowLCJCb3R0b20iOjB9LCJQYWRkaW5nIjp7IiRpZCI6IjM5OCIsIlRvcCI6MCwiTGVmdCI6MCwiUmlnaHQiOjAsIkJvdHRvbSI6MH0sIkJhY2tncm91bmQiOnsiJHJlZiI6IjExNyJ9LCJJc1Zpc2libGUiOnRydWUsIldpZHRoIjowLjAsIkhlaWdodCI6MC4wLCJCb3JkZXJTdHlsZSI6eyIkaWQiOiIzOTkiLCJMaW5lQ29sb3IiOm51bGwsIkxpbmVXZWlnaHQiOjAuMCwiTGluZVR5cGUiOjAsIlBhcmVudFN0eWxlIjpudWxsfSwiUGFyZW50U3R5bGUiOm51bGx9LCJEYXRlU3R5bGUiOnsiJGlkIjoiNDAwIiwiRm9udFNldHRpbmdzIjp7IiRpZCI6IjQwMSIsIkZvbnRTaXplIjoxMCwiRm9udE5hbWUiOiJDYWxpYnJpIiwiSXNCb2xkIjpmYWxzZSwiSXNJdGFsaWMiOmZhbHNlLCJJc1VuZGVybGluZWQiOmZhbHNlLCJQYXJlbnRTdHlsZSI6bnVsbH0sIkF1dG9TaXplIjowLCJGb3JlZ3JvdW5kIjp7IiRpZCI6IjQwMiIsIkNvbG9yIjp7IiRyZWYiOiIxMjEifX0sIk1heFdpZHRoIjoyMDAuMCwiTWF4SGVpZ2h0IjoiSW5maW5pdHkiLCJTbWFydEZvcmVncm91bmRJc0FjdGl2ZSI6ZmFsc2UsIkhvcml6b250YWxBbGlnbm1lbnQiOjAsIlZlcnRpY2FsQWxpZ25tZW50IjowLCJTbWFydEZvcmVncm91bmQiOm51bGwsIkJhY2tncm91bmRGaWxsVHlwZSI6MCwiTWFyZ2luIjp7IiRpZCI6IjQwMyIsIlRvcCI6MCwiTGVmdCI6MCwiUmlnaHQiOjAsIkJvdHRvbSI6MH0sIlBhZGRpbmciOnsiJGlkIjoiNDA0IiwiVG9wIjowLCJMZWZ0IjowLCJSaWdodCI6MCwiQm90dG9tIjowfSwiQmFja2dyb3VuZCI6eyIkcmVmIjoiMTI0In0sIklzVmlzaWJsZSI6dHJ1ZSwiV2lkdGgiOjAuMCwiSGVpZ2h0IjowLjAsIkJvcmRlclN0eWxlIjp7IiRpZCI6IjQwNSIsIkxpbmVDb2xvciI6bnVsbCwiTGluZVdlaWdodCI6MC4wLCJMaW5lVHlwZSI6MCwiUGFyZW50U3R5bGUiOm51bGx9LCJQYXJlbnRTdHlsZSI6bnVsbH0sIkRhdGVGb3JtYXQiOnsiJGlkIjoiNDA2IiwiRm9ybWF0U3RyaW5nIjoiTU1NIGQiLCJTZXBhcmF0b3IiOiIvIiwiVXNlSW50ZXJuYXRpb25hbERhdGVGb3JtYXQiOmZhbHNlLCJEYXRlSXNWaXNpYmxlIjp0cnVlLCJUaW1lSXNWaXNpYmxlIjpmYWxzZSwiSG91ckRpZ2l0cyI6MSwiQW1QbURlc2lnbmF0b3IiOjIsIlRyaW0wME1pbnV0ZXMiOmZhbHNlLCJMYXN0S25vd25WaXNpYmlsaXR5U3RhdGUiOm51bGx9LCJJc1Zpc2libGUiOnRydWUsIlBhcmVudFN0eWxlIjpudWxsfSwiSW5kZXgiOjYsIlNtYXJ0RHVyYXRpb25BY3RpdmF0ZWQiOmZhbHNlLCJEYXRlRm9ybWF0Ijp7IiRyZWYiOiI0MDYifSwiSWQiOiJlOWZlZDBmOS0yYTMwLTQ3MTgtODNkNy1lYjFmN2I5NGYyYzgiLCJJbXBvcnRJZCI6bnVsbCwiVGl0bGUiOiJJbXBsw6ltZW50ZXIgbCdvdXRpbHMgc3VyIGxlIHNlcnZldXIgY2xpZW50IiwiTm90ZSI6bnVsbCwiSHlwZXJsaW5rIjp7IiRpZCI6IjQwNyIsIkFkZHJlc3MiOiIiLCJTdWJBZGRyZXNzIjoiIn0sIklzQ2hhbmdlZCI6ZmFsc2UsIklzTmV3IjpmYWxzZX1dLCJTd2ltbGFuZXMiOltdLCJNc1Byb2plY3RJdGVtc1RyZWUiOnsiJGlkIjoiNDA4IiwiUm9vdCI6eyJJbXBvcnRJZCI6bnVsbCwiSXNJbXBvcnRlZCI6ZmFsc2UsIkNoaWxkcmVuIjpbXX19LCJNZXRhZGF0YSI6eyIkaWQiOiI0MDkiLCJSZWNlbnRDb2xvcnNDb2xsZWN0aW9uIjoiW1wiI0ZGRUQ3RDMxXCIsXCIjRkY3MEFENDdcIixcIiNGRkVBMTYxRVwiXSJ9LCJTZXR0aW5ncyI6eyIkaWQiOiI0MTAiLCJJbXBhT3B0aW9ucyI6eyIkaWQiOiI0MTEiLCJMZWZ0VG9SaWdodCI6ZmFsc2UsIlBheWxvYWRPcHRpb25zIjoyfSwiVXNlQ29tcHJlc3Npb24iOmZhbHNlLCJDb21wcmVzaW9uUGVyY2VudGFnZSI6NTAuMCwiSW5hY3RpdmVJbnRlcnZhbFdpZHRoVGhyZXNob2xkIjozMC4wLCJJbmFjdGl2ZUludGVydmFsV2lkdGgiOjEuMCwiU3BsaXRUYXNrcyI6ZmFsc2UsIlVzZUNsdXN0ZXIiOmZhbHNlLCJFcHNpbG9uIjo1LjAsIk1pblBvaW50c1RvRm9ybUFDbHVzdGVyIjoyLCJHZW5lcmF0ZUludmlzaWJsZVNoYXBlcyI6ZmFsc2UsIlNtYXJ0VGltZWxpbmVUYXNrUGVyY2VudGFnZUZpdCI6ZmFsc2V9LCJJc05ldyI6ZmFsc2UsIkltcG9ydFR5cGUiOjAsIkZpbGVQYXRoIjpudWxsLCJUaW1lQ29uZmlndXJhdGlvbiI6eyIkaWQiOiI0MTIiLCJVc2VUaW1lIjpmYWxzZSwiV29ya0RheVN0YXJ0IjoiMDA6MDA6MDAiLCJXb3JrRGF5RW5kIjoiMjM6NTk6MDAifSwiTGFzdFVzZWRUZW1wbGF0ZUlkIjoiOTVmYmYwZjctY2E2Yy00YmI5LWFlNzgtMWFhZjJjYTk2MGViIn0="/>
+  <p:tag name="__PART_0" val="eyIkaWQiOiIxIiwiQ3VsdHVyZUluZm9OYW1lIjoiZW4tVVMiLCJTdHlsZU5hbWUiOm51bGwsIlZlcnNpb24iOnsiJGlkIjoiMiIsIlZlcnNpb24iOiIzLjIuMCIsIk9yaWdpbmFsQXNzZW1ibHlWZXJzaW9uIjoiNC4wMS4wMC4wMCIsIkVkaXRpb24iOiJGcmVlIiwiSXNQbHVzRWRpdGlvbiI6ZmFsc2UsIklzUHJvRWRpdGlvbiI6ZmFsc2V9LCJFZmZlY3QiOjEsIlN0eWxlIjp7IiRpZCI6IjMiLCJUaW1lYmFuZFN0eWxlIjp7IiRpZCI6IjQiLCJTY2FsZU1hcmtpbmciOjAsIlNoYXBlIjozLCJTaGFwZVN0eWxlIjp7IiRpZCI6IjUiLCJNYXJnaW4iOnsiJGlkIjoiNiIsIlRvcCI6MCwiTGVmdCI6MTAsIlJpZ2h0IjoxMCwiQm90dG9tIjowfSwiUGFkZGluZyI6eyIkaWQiOiI3IiwiVG9wIjozLCJMZWZ0IjowLCJSaWdodCI6MCwiQm90dG9tIjozfSwiQmFja2dyb3VuZCI6eyIkaWQiOiI4IiwiQ29sb3IiOnsiJGlkIjoiOSIsIkEiOjI1NSwiUiI6MTc4LCJHIjoxNzgsIkIiOjE3OH19LCJJc1Zpc2libGUiOnRydWUsIldpZHRoIjowLjAsIkhlaWdodCI6MzAuMCwiQm9yZGVyU3R5bGUiOnsiJGlkIjoiMTAiLCJMaW5lQ29sb3IiOnsiJGlkIjoiMTEiLCIkdHlwZSI6Ik5MUkUuQ29tbW9uLkRvbS5Tb2xpZENvbG9yQnJ1c2gsIE5MUkUuQ29tbW9uIiwiQ29sb3IiOnsiJGlkIjoiMTIiLCJBIjoyNTUsIlIiOjI1NSwiRyI6MCwiQiI6MH19LCJMaW5lV2VpZ2h0IjowLjAsIkxpbmVUeXBlIjowLCJQYXJlbnRTdHlsZSI6bnVsbH0sIlBhcmVudFN0eWxlIjpudWxsfSwiUmlnaHRFbmRDYXBzU3R5bGUiOnsiJGlkIjoiMTMiLCJGb250U2V0dGluZ3MiOnsiJGlkIjoiMTQiLCJGb250U2l6ZSI6MTgsIkZvbnROYW1lIjoiQ2FsaWJyaSIsIklzQm9sZCI6dHJ1ZSwiSXNJdGFsaWMiOmZhbHNlLCJJc1VuZGVybGluZWQiOmZhbHNlLCJQYXJlbnRTdHlsZSI6bnVsbH0sIkF1dG9TaXplIjowLCJGb3JlZ3JvdW5kIjp7IiRpZCI6IjE1IiwiQ29sb3IiOnsiJGlkIjoiMTYiLCJBIjoyNTUsIlIiOjIzNywiRyI6MTI1LCJCIjo0OX19LCJNYXhXaWR0aCI6IkluZmluaXR5IiwiTWF4SGVpZ2h0IjoiSW5maW5pdHkiLCJTbWFydEZvcmVncm91bmRJc0FjdGl2ZSI6ZmFsc2UsIkhvcml6b250YWxBbGlnbm1lbnQiOjAsIlZlcnRpY2FsQWxpZ25tZW50IjowLCJTbWFydEZvcmVncm91bmQiOm51bGwsIkJhY2tncm91bmRGaWxsVHlwZSI6MCwiTWFyZ2luIjp7IiRpZCI6IjE3IiwiVG9wIjowLCJMZWZ0IjowLCJSaWdodCI6MjAsIkJvdHRvbSI6MH0sIlBhZGRpbmciOnsiJGlkIjoiMTgiLCJUb3AiOjAsIkxlZnQiOjAsIlJpZ2h0IjowLCJCb3R0b20iOjB9LCJCYWNrZ3JvdW5kIjp7IiRpZCI6IjE5IiwiQ29sb3IiOnsiJGlkIjoiMjAiLCJBIjo4OSwiUiI6MCwiRyI6MCwiQiI6MH19LCJJc1Zpc2libGUiOnRydWUsIldpZHRoIjowLjAsIkhlaWdodCI6MC4wLCJCb3JkZXJTdHlsZSI6bnVsbCwiUGFyZW50U3R5bGUiOm51bGx9LCJMZWZ0RW5kQ2Fwc1N0eWxlIjp7IiRpZCI6IjIxIiwiRm9udFNldHRpbmdzIjp7IiRpZCI6IjIyIiwiRm9udFNpemUiOjE4LCJGb250TmFtZSI6IkNhbGlicmkiLCJJc0JvbGQiOnRydWUsIklzSXRhbGljIjpmYWxzZSwiSXNVbmRlcmxpbmVkIjpmYWxzZSwiUGFyZW50U3R5bGUiOm51bGx9LCJBdXRvU2l6ZSI6MCwiRm9yZWdyb3VuZCI6eyIkaWQiOiIyMyIsIkNvbG9yIjp7IiRpZCI6IjI0IiwiQSI6MjU1LCJSIjoyMzcsIkciOjEyNSwiQiI6NDl9fSwiTWF4V2lkdGgiOiJJbmZpbml0eSIsIk1heEhlaWdodCI6IkluZmluaXR5IiwiU21hcnRGb3JlZ3JvdW5kSXNBY3RpdmUiOmZhbHNlLCJIb3Jpem9udGFsQWxpZ25tZW50IjowLCJWZXJ0aWNhbEFsaWdubWVudCI6MCwiU21hcnRGb3JlZ3JvdW5kIjpudWxsLCJCYWNrZ3JvdW5kRmlsbFR5cGUiOjAsIk1hcmdpbiI6eyIkaWQiOiIyNSIsIlRvcCI6MCwiTGVmdCI6MjAsIlJpZ2h0IjowLCJCb3R0b20iOjB9LCJQYWRkaW5nIjp7IiRpZCI6IjI2IiwiVG9wIjowLCJMZWZ0IjowLCJSaWdodCI6MCwiQm90dG9tIjowfSwiQmFja2dyb3VuZCI6eyIkaWQiOiIyNyIsIkNvbG9yIjp7IiRyZWYiOiIyMCJ9fSwiSXNWaXNpYmxlIjpmYWxzZSwiV2lkdGgiOjAuMCwiSGVpZ2h0IjowLjAsIkJvcmRlclN0eWxlIjpudWxsLCJQYXJlbnRTdHlsZSI6bnVsbH0sIlRvZGF5VGV4dFN0eWxlIjp7IiRpZCI6IjI4IiwiRm9udFNldHRpbmdzIjp7IiRpZCI6IjI5IiwiRm9udFNpemUiOjEyLCJGb250TmFtZSI6IkNhbGlicmkiLCJJc0JvbGQiOmZhbHNlLCJJc0l0YWxpYyI6ZmFsc2UsIklzVW5kZXJsaW5lZCI6ZmFsc2UsIlBhcmVudFN0eWxlIjpudWxsfSwiQXV0b1NpemUiOjAsIkZvcmVncm91bmQiOnsiJGlkIjoiMzAiLCJDb2xvciI6eyIkaWQiOiIzMSIsIkEiOjI1NSwiUiI6MCwiRyI6MCwiQiI6MH19LCJNYXhXaWR0aCI6MjAwLjAsIk1heEhlaWdodCI6IkluZmluaXR5IiwiU21hcnRGb3JlZ3JvdW5kSXNBY3RpdmUiOmZhbHNlLCJIb3Jpem9udGFsQWxpZ25tZW50IjowLCJWZXJ0aWNhbEFsaWdubWVudCI6MCwiU21hcnRGb3JlZ3JvdW5kIjpudWxsLCJCYWNrZ3JvdW5kRmlsbFR5cGUiOjAsIk1hcmdpbiI6eyIkaWQiOiIzMiIsIlRvcCI6MCwiTGVmdCI6MCwiUmlnaHQiOjAsIkJvdHRvbSI6MH0sIlBhZGRpbmciOnsiJGlkIjoiMzMiLCJUb3AiOjAsIkxlZnQiOjAsIlJpZ2h0IjowLCJCb3R0b20iOjB9LCJCYWNrZ3JvdW5kIjp7IiRpZCI6IjM0IiwiQ29sb3IiOnsiJHJlZiI6IjIwIn19LCJJc1Zpc2libGUiOnRydWUsIldpZHRoIjowLjAsIkhlaWdodCI6MC4wLCJCb3JkZXJTdHlsZSI6bnVsbCwiUGFyZW50U3R5bGUiOm51bGx9LCJUb2RheU1hcmtlclN0eWxlIjp7IiRpZCI6IjM1IiwiTWFyZ2luIjp7IiRpZCI6IjM2IiwiVG9wIjowLCJMZWZ0IjowLCJSaWdodCI6MCwiQm90dG9tIjowfSwiUGFkZGluZyI6eyIkaWQiOiIzNyIsIlRvcCI6MCwiTGVmdCI6MCwiUmlnaHQiOjAsIkJvdHRvbSI6MH0sIkJhY2tncm91bmQiOnsiJGlkIjoiMzgiLCJDb2xvciI6eyIkaWQiOiIzOSIsIkEiOjI1NSwiUiI6MjU1LCJHIjowLCJCIjowfX0sIklzVmlzaWJsZSI6dHJ1ZSwiV2lkdGgiOjAuMCwiSGVpZ2h0IjowLjAsIkJvcmRlclN0eWxlIjpudWxsLCJQYXJlbnRTdHlsZSI6bnVsbH0sIlNjYWxlU3R5bGUiOnsiJGlkIjoiNDAiLCJTaG93U2VnbWVudFNlcGFyYXRvcnMiOmZhbHNlLCJTZWdtZW50U2VwYXJhdG9yT3BhY2l0eSI6MzAsIkZvbnRTZXR0aW5ncyI6eyIkaWQiOiI0MSIsIkZvbnRTaXplIjoxMiwiRm9udE5hbWUiOiJDYWxpYnJpIiwiSXNCb2xkIjpmYWxzZSwiSXNJdGFsaWMiOmZhbHNlLCJJc1VuZGVybGluZWQiOmZhbHNlLCJQYXJlbnRTdHlsZSI6bnVsbH0sIkF1dG9TaXplIjowLCJGb3JlZ3JvdW5kIjp7IiRpZCI6IjQyIiwiQ29sb3IiOnsiJGlkIjoiNDMiLCJBIjoyNTUsIlIiOjAsIkciOjAsIkIiOjB9fSwiTWF4V2lkdGgiOjIwMC4wLCJNYXhIZWlnaHQiOiJJbmZpbml0eSIsIlNtYXJ0Rm9yZWdyb3VuZElzQWN0aXZlIjpmYWxzZSwiSG9yaXpvbnRhbEFsaWdubWVudCI6MCwiVmVydGljYWxBbGlnbm1lbnQiOjEsIlNtYXJ0Rm9yZWdyb3VuZCI6bnVsbCwiQmFja2dyb3VuZEZpbGxUeXBlIjowLCJNYXJnaW4iOnsiJGlkIjoiNDQiLCJUb3AiOjAsIkxlZnQiOjUsIlJpZ2h0IjowLCJCb3R0b20iOjB9LCJQYWRkaW5nIjp7IiRpZCI6IjQ1IiwiVG9wIjowLCJMZWZ0IjowLCJSaWdodCI6MCwiQm90dG9tIjowfSwiQmFja2dyb3VuZCI6eyIkaWQiOiI0NiIsIkNvbG9yIjp7IiRyZWYiOiIyMCJ9fSwiSXNWaXNpYmxlIjp0cnVlLCJXaWR0aCI6MC4wLCJIZWlnaHQiOjAuMCwiQm9yZGVyU3R5bGUiOm51bGwsIlBhcmVudFN0eWxlIjpudWxsfSwiRWxhcHNlZFRpbWVCYWNrZ3JvdW5kIjp7IiRpZCI6IjQ3IiwiQ29sb3IiOnsiJGlkIjoiNDgiLCJBIjo3NywiUiI6MjU1LCJHIjoxOTIsIkIiOjB9fSwiQXBwZW5kWWVhck9uWWVhckNoYW5nZSI6dHJ1ZSwiRWxhcHNlZFRpbWVGb3JtYXQiOjEsIlRvZGF5TWFya2VyUG9zaXRpb24iOjMsIlF1aWNrUG9zaXRpb24iOjIsIkFic29sdXRlUG9zaXRpb24iOjQwNS4wLCJNYXJnaW4iOnsiJGlkIjoiNDkiLCJUb3AiOjAsIkxlZnQiOjEwLCJSaWdodCI6MTAsIkJvdHRvbSI6MH0sIlBhZGRpbmciOnsiJGlkIjoiNTAiLCJUb3AiOjAsIkxlZnQiOjAsIlJpZ2h0IjowLCJCb3R0b20iOjB9LCJCYWNrZ3JvdW5kIjp7IiRpZCI6IjUxIiwiQ29sb3IiOnsiJGlkIjoiNTIiLCJBIjoyNTUsIlIiOjE3OCwiRyI6MTc4LCJCIjoxNzh9fSwiSXNWaXNpYmxlIjp0cnVlLCJXaWR0aCI6MC4wLCJIZWlnaHQiOjAuMCwiQm9yZGVyU3R5bGUiOm51bGwsIlBhcmVudFN0eWxlIjpudWxsfSwiRGVmYXVsdE1pbGVzdG9uZVN0eWxlIjp7IiRpZCI6IjUzIiwiU2hhcGUiOjcsIkNvbm5lY3Rvck1hcmdpbiI6eyIkaWQiOiI1NCIsIlRvcCI6MCwiTGVmdCI6MiwiUmlnaHQiOjIsIkJvdHRvbSI6MH0sIkNvbm5lY3RvclN0eWxlIjp7IiRpZCI6IjU1IiwiTGluZUNvbG9yIjp7IiRpZCI6IjU2IiwiJHR5cGUiOiJOTFJFLkNvbW1vbi5Eb20uU29saWRDb2xvckJydXNoLCBOTFJFLkNvbW1vbiIsIkNvbG9yIjp7IiRpZCI6IjU3IiwiQSI6MTI3LCJSIjozMSwiRyI6NzMsIkIiOjEyNn19LCJMaW5lV2VpZ2h0IjoxLjAsIkxpbmVUeXBlIjowLCJQYXJlbnRTdHlsZSI6bnVsbH0sIklzQmVsb3dUaW1lYmFuZCI6ZmFsc2UsIlBvc2l0aW9uT25UYXNrIjowLCJIaWRlRGF0ZSI6ZmFsc2UsIlNoYXBlU2l6ZSI6MSwiU3BhY2luZyI6Mi4wLCJQYWRkaW5nIjp7IiRpZCI6IjU4IiwiVG9wIjo3LCJMZWZ0IjozLCJSaWdodCI6MCwiQm90dG9tIjoyfSwiU2hhcGVTdHlsZSI6eyIkaWQiOiI1OSIsIk1hcmdpbiI6eyIkaWQiOiI2MCIsIlRvcCI6MCwiTGVmdCI6MCwiUmlnaHQiOjAsIkJvdHRvbSI6MH0sIlBhZGRpbmciOnsiJGlkIjoiNjEiLCJUb3AiOjAsIkxlZnQiOjAsIlJpZ2h0IjowLCJCb3R0b20iOjB9LCJCYWNrZ3JvdW5kIjp7IiRpZCI6IjYyIiwiQ29sb3IiOnsiJGlkIjoiNjMiLCJBIjoyNTUsIlIiOjAsIkciOjExNCwiQiI6MTg4fX0sIklzVmlzaWJsZSI6dHJ1ZSwiV2lkdGgiOjE4LjAsIkhlaWdodCI6MjAuMCwiQm9yZGVyU3R5bGUiOnsiJGlkIjoiNjQiLCJMaW5lQ29sb3IiOnsiJGlkIjoiNjUiLCIkdHlwZSI6Ik5MUkUuQ29tbW9uLkRvbS5Tb2xpZENvbG9yQnJ1c2gsIE5MUkUuQ29tbW9uIiwiQ29sb3IiOnsiJGlkIjoiNjYiLCJBIjoyNTUsIlIiOjI1NSwiRyI6MCwiQiI6MH19LCJMaW5lV2VpZ2h0IjowLjAsIkxpbmVUeXBlIjowLCJQYXJlbnRTdHlsZSI6bnVsbH0sIlBhcmVudFN0eWxlIjpudWxsfSwiVGl0bGVTdHlsZSI6eyIkaWQiOiI2NyIsIkZvbnRTZXR0aW5ncyI6eyIkaWQiOiI2OCIsIkZvbnRTaXplIjoxMSwiRm9udE5hbWUiOiJDYWxpYnJpIiwiSXNCb2xkIjp0cnVlLCJJc0l0YWxpYyI6ZmFsc2UsIklzVW5kZXJsaW5lZCI6ZmFsc2UsIlBhcmVudFN0eWxlIjpudWxsfSwiQXV0b1NpemUiOjAsIkZvcmVncm91bmQiOnsiJGlkIjoiNjkiLCJDb2xvciI6eyIkaWQiOiI3MCIsIkEiOjI1NSwiUiI6MCwiRyI6MCwiQiI6MH19LCJNYXhXaWR0aCI6MjAwLjAsIk1heEhlaWdodCI6IkluZmluaXR5IiwiU21hcnRGb3JlZ3JvdW5kSXNBY3RpdmUiOmZhbHNlLCJIb3Jpem9udGFsQWxpZ25tZW50IjoxLCJWZXJ0aWNhbEFsaWdubWVudCI6MCwiU21hcnRGb3JlZ3JvdW5kIjpudWxsLCJCYWNrZ3JvdW5kRmlsbFR5cGUiOjAsIk1hcmdpbiI6eyIkaWQiOiI3MSIsIlRvcCI6MCwiTGVmdCI6MCwiUmlnaHQiOjAsIkJvdHRvbSI6MH0sIlBhZGRpbmciOnsiJGlkIjoiNzIiLCJUb3AiOjAsIkxlZnQiOjAsIlJpZ2h0IjowLCJCb3R0b20iOjB9LCJCYWNrZ3JvdW5kIjp7IiRpZCI6IjczIiwiQ29sb3IiOnsiJHJlZiI6IjIwIn19LCJJc1Zpc2libGUiOnRydWUsIldpZHRoIjowLjAsIkhlaWdodCI6MC4wLCJCb3JkZXJTdHlsZSI6bnVsbCwiUGFyZW50U3R5bGUiOm51bGx9LCJEYXRlU3R5bGUiOnsiJGlkIjoiNzQiLCJGb250U2V0dGluZ3MiOnsiJGlkIjoiNzUiLCJGb250U2l6ZSI6MTAsIkZvbnROYW1lIjoiQ2FsaWJyaSIsIklzQm9sZCI6ZmFsc2UsIklzSXRhbGljIjpmYWxzZSwiSXNVbmRlcmxpbmVkIjpmYWxzZSwiUGFyZW50U3R5bGUiOm51bGx9LCJBdXRvU2l6ZSI6MCwiRm9yZWdyb3VuZCI6eyIkaWQiOiI3NiIsIkNvbG9yIjp7IiRpZCI6Ijc3IiwiQSI6MjU1LCJSIjo2OCwiRyI6ODQsIkIiOjEwNn19LCJNYXhXaWR0aCI6MjAwLjAsIk1heEhlaWdodCI6IkluZmluaXR5IiwiU21hcnRGb3JlZ3JvdW5kSXNBY3RpdmUiOmZhbHNlLCJIb3Jpem9udGFsQWxpZ25tZW50IjowLCJWZXJ0aWNhbEFsaWdubWVudCI6MCwiU21hcnRGb3JlZ3JvdW5kIjpudWxsLCJCYWNrZ3JvdW5kRmlsbFR5cGUiOjAsIk1hcmdpbiI6eyIkaWQiOiI3OCIsIlRvcCI6MCwiTGVmdCI6MCwiUmlnaHQiOjAsIkJvdHRvbSI6MH0sIlBhZGRpbmciOnsiJGlkIjoiNzkiLCJUb3AiOjAsIkxlZnQiOjAsIlJpZ2h0IjowLCJCb3R0b20iOjB9LCJCYWNrZ3JvdW5kIjp7IiRpZCI6IjgwIiwiQ29sb3IiOnsiJHJlZiI6IjIwIn19LCJJc1Zpc2libGUiOnRydWUsIldpZHRoIjowLjAsIkhlaWdodCI6MC4wLCJCb3JkZXJTdHlsZSI6bnVsbCwiUGFyZW50U3R5bGUiOm51bGx9LCJEYXRlRm9ybWF0Ijp7IiRpZCI6IjgxIiwiRm9ybWF0U3RyaW5nIjoiTU1NIGQiLCJTZXBhcmF0b3IiOiIvIiwiVXNlSW50ZXJuYXRpb25hbERhdGVGb3JtYXQiOmZhbHNlLCJEYXRlSXNWaXNpYmxlIjp0cnVlLCJUaW1lSXNWaXNpYmxlIjpmYWxzZSwiSG91ckRpZ2l0cyI6MSwiQW1QbURlc2lnbmF0b3IiOjIsIlRyaW0wME1pbnV0ZXMiOmZhbHNlLCJMYXN0S25vd25WaXNpYmlsaXR5U3RhdGUiOm51bGx9LCJJc1Zpc2libGUiOnRydWUsIlBhcmVudFN0eWxlIjpudWxsfSwiRGVmYXVsdFRhc2tTdHlsZSI6eyIkaWQiOiI4MiIsIlNoYXBlIjowLCJTaGFwZVRoaWNrbmVzcyI6MiwiRHVyYXRpb25Gb3JtYXQiOjAsIkluY2x1ZGVOb25Xb3JraW5nRGF5c0luRHVyYXRpb24iOmZhbHNlLCJQZXJjZW50YWdlQ29tcGxldGVTdHlsZSI6eyIkaWQiOiI4MyIsIkZvbnRTZXR0aW5ncyI6eyIkaWQiOiI4NCIsIkZvbnRTaXplIjoxMCwiRm9udE5hbWUiOiJDYWxpYnJpIiwiSXNCb2xkIjpmYWxzZSwiSXNJdGFsaWMiOmZhbHNlLCJJc1VuZGVybGluZWQiOmZhbHNlLCJQYXJlbnRTdHlsZSI6bnVsbH0sIkF1dG9TaXplIjowLCJGb3JlZ3JvdW5kIjp7IiRpZCI6Ijg1IiwiQ29sb3IiOnsiJGlkIjoiODYiLCJBIjoyNTUsIlIiOjIzOCwiRyI6MjM2LCJCIjoyMjV9fSwiTWF4V2lkdGgiOjIwMC4wLCJNYXhIZWlnaHQiOiJJbmZpbml0eSIsIlNtYXJ0Rm9yZWdyb3VuZElzQWN0aXZlIjpmYWxzZSwiSG9yaXpvbnRhbEFsaWdubWVudCI6MSwiVmVydGljYWxBbGlnbm1lbnQiOjAsIlNtYXJ0Rm9yZWdyb3VuZCI6bnVsbCwiQmFja2dyb3VuZEZpbGxUeXBlIjowLCJNYXJnaW4iOnsiJGlkIjoiODciLCJUb3AiOjAsIkxlZnQiOjAsIlJpZ2h0IjowLCJCb3R0b20iOjB9LCJQYWRkaW5nIjp7IiRpZCI6Ijg4IiwiVG9wIjowLCJMZWZ0IjowLCJSaWdodCI6MCwiQm90dG9tIjowfSwiQmFja2dyb3VuZCI6eyIkaWQiOiI4OSIsIkNvbG9yIjp7IiRyZWYiOiIyMCJ9fSwiSXNWaXNpYmxlIjp0cnVlLCJXaWR0aCI6MC4wLCJIZWlnaHQiOjAuMCwiQm9yZGVyU3R5bGUiOm51bGwsIlBhcmVudFN0eWxlIjpudWxsfSwiRHVyYXRpb25TdHlsZSI6eyIkaWQiOiI5MCIsIkZvbnRTZXR0aW5ncyI6eyIkaWQiOiI5MSIsIkZvbnRTaXplIjoxMCwiRm9udE5hbWUiOiJDYWxpYnJpIiwiSXNCb2xkIjpmYWxzZSwiSXNJdGFsaWMiOmZhbHNlLCJJc1VuZGVybGluZWQiOmZhbHNlLCJQYXJlbnRTdHlsZSI6bnVsbH0sIkF1dG9TaXplIjowLCJGb3JlZ3JvdW5kIjp7IiRpZCI6IjkyIiwiQ29sb3IiOnsiJGlkIjoiOTMiLCJBIjoyNTUsIlIiOjIzNywiRyI6MTI1LCJCIjo0OX19LCJNYXhXaWR0aCI6MjAwLjAsIk1heEhlaWdodCI6IkluZmluaXR5IiwiU21hcnRGb3JlZ3JvdW5kSXNBY3RpdmUiOmZhbHNlLCJIb3Jpem9udGFsQWxpZ25tZW50IjowLCJWZXJ0aWNhbEFsaWdubWVudCI6MCwiU21hcnRGb3JlZ3JvdW5kIjpudWxsLCJCYWNrZ3JvdW5kRmlsbFR5cGUiOjAsIk1hcmdpbiI6eyIkaWQiOiI5NCIsIlRvcCI6MCwiTGVmdCI6MCwiUmlnaHQiOjAsIkJvdHRvbSI6MH0sIlBhZGRpbmciOnsiJGlkIjoiOTUiLCJUb3AiOjAsIkxlZnQiOjAsIlJpZ2h0IjowLCJCb3R0b20iOjB9LCJCYWNrZ3JvdW5kIjp7IiRpZCI6Ijk2IiwiQ29sb3IiOnsiJHJlZiI6IjIwIn19LCJJc1Zpc2libGUiOnRydWUsIldpZHRoIjowLjAsIkhlaWdodCI6MC4wLCJCb3JkZXJTdHlsZSI6bnVsbCwiUGFyZW50U3R5bGUiOm51bGx9LCJIb3Jpem9udGFsQ29ubmVjdG9yU3R5bGUiOnsiJGlkIjoiOTciLCJMaW5lQ29sb3IiOnsiJGlkIjoiOTgiLCIkdHlwZSI6Ik5MUkUuQ29tbW9uLkRvbS5Tb2xpZENvbG9yQnJ1c2gsIE5MUkUuQ29tbW9uIiwiQ29sb3IiOnsiJGlkIjoiOTkiLCJBIjoyNTUsIlIiOjIwNCwiRyI6MjA0LCJCIjoyMDR9fSwiTGluZVdlaWdodCI6MS4wLCJMaW5lVHlwZSI6MCwiUGFyZW50U3R5bGUiOm51bGx9LCJWZXJ0aWNhbENvbm5lY3RvclN0eWxlIjp7IiRpZCI6IjEwMCIsIkxpbmVDb2xvciI6eyIkaWQiOiIxMDEiLCIkdHlwZSI6Ik5MUkUuQ29tbW9uLkRvbS5Tb2xpZENvbG9yQnJ1c2gsIE5MUkUuQ29tbW9uIiwiQ29sb3IiOnsiJGlkIjoiMTAyIiwiQSI6MjU1LCJSIjoyMDQsIkciOjIwNCwiQiI6MjA0fX0sIkxpbmVXZWlnaHQiOjEuMCwiTGluZVR5cGUiOjAsIlBhcmVudFN0eWxlIjpudWxsfSwiTWFyZ2luIjpudWxsLCJTdGFydERhdGVQb3NpdGlvbiI6NCwiRW5kRGF0ZVBvc2l0aW9uIjo0LCJEYXRlSXNWaXNpYmxlIjp0cnVlLCJUaXRsZVBvc2l0aW9uIjoyLCJEdXJhdGlvblBvc2l0aW9uIjo2LCJQZXJjZW50YWdlQ29tcGxldGVkUG9zaXRpb24iOjIsIlNwYWNpbmciOjUsIklzQmVsb3dUaW1lYmFuZCI6ZmFsc2UsIlBlcmNlbnRhZ2VDb21wbGV0ZVNoYXBlT3BhY2l0eSI6MzUsIlNoYXBlU3R5bGUiOnsiJGlkIjoiMTAzIiwiTWFyZ2luIjp7IiRpZCI6IjEwNCIsIlRvcCI6MCwiTGVmdCI6NCwiUmlnaHQiOjQsIkJvdHRvbSI6MH0sIlBhZGRpbmciOnsiJGlkIjoiMTA1IiwiVG9wIjowLCJMZWZ0IjowLCJSaWdodCI6MCwiQm90dG9tIjowfSwiQmFja2dyb3VuZCI6eyIkaWQiOiIxMDYiLCJDb2xvciI6eyIkaWQiOiIxMDciLCJBIjoyNTUsIlIiOjAsIkciOjExNCwiQiI6MTg4fX0sIklzVmlzaWJsZSI6dHJ1ZSwiV2lkdGgiOjAuMCwiSGVpZ2h0IjoyMi4wLCJCb3JkZXJTdHlsZSI6eyIkaWQiOiIxMDgiLCJMaW5lQ29sb3IiOnsiJGlkIjoiMTA5IiwiJHR5cGUiOiJOTFJFLkNvbW1vbi5Eb20uU29saWRDb2xvckJydXNoLCBOTFJFLkNvbW1vbiIsIkNvbG9yIjp7IiRpZCI6IjExMCIsIkEiOjI1NSwiUiI6MjU1LCJHIjowLCJCIjowfX0sIkxpbmVXZWlnaHQiOjAuMCwiTGluZVR5cGUiOjAsIlBhcmVudFN0eWxlIjpudWxsfSwiUGFyZW50U3R5bGUiOm51bGx9LCJUaXRsZVN0eWxlIjp7IiRpZCI6IjExMSIsIkZvbnRTZXR0aW5ncyI6eyIkaWQiOiIxMTIiLCJGb250U2l6ZSI6MTEsIkZvbnROYW1lIjoiQ2FsaWJyaSIsIklzQm9sZCI6dHJ1ZSwiSXNJdGFsaWMiOmZhbHNlLCJJc1VuZGVybGluZWQiOmZhbHNlLCJQYXJlbnRTdHlsZSI6bnVsbH0sIkF1dG9TaXplIjowLCJGb3JlZ3JvdW5kIjp7IiRpZCI6IjExMyIsIkNvbG9yIjp7IiRpZCI6IjExNCIsIkEiOjI1NSwiUiI6MCwiRyI6MCwiQiI6MH19LCJNYXhXaWR0aCI6OTYwLjAsIk1heEhlaWdodCI6IkluZmluaXR5IiwiU21hcnRGb3JlZ3JvdW5kSXNBY3RpdmUiOmZhbHNlLCJIb3Jpem9udGFsQWxpZ25tZW50IjoxLCJWZXJ0aWNhbEFsaWdubWVudCI6MCwiU21hcnRGb3JlZ3JvdW5kIjpudWxsLCJCYWNrZ3JvdW5kRmlsbFR5cGUiOjAsIk1hcmdpbiI6eyIkaWQiOiIxMTUiLCJUb3AiOjAsIkxlZnQiOjAsIlJpZ2h0IjowLCJCb3R0b20iOjB9LCJQYWRkaW5nIjp7IiRpZCI6IjExNiIsIlRvcCI6MCwiTGVmdCI6MCwiUmlnaHQiOjAsIkJvdHRvbSI6MH0sIkJhY2tncm91bmQiOnsiJGlkIjoiMTE3IiwiQ29sb3IiOnsiJHJlZiI6IjIwIn19LCJJc1Zpc2libGUiOnRydWUsIldpZHRoIjowLjAsIkhlaWdodCI6MC4wLCJCb3JkZXJTdHlsZSI6bnVsbCwiUGFyZW50U3R5bGUiOm51bGx9LCJEYXRlU3R5bGUiOnsiJGlkIjoiMTE4IiwiRm9udFNldHRpbmdzIjp7IiRpZCI6IjExOSIsIkZvbnRTaXplIjoxMCwiRm9udE5hbWUiOiJDYWxpYnJpIiwiSXNCb2xkIjpmYWxzZSwiSXNJdGFsaWMiOmZhbHNlLCJJc1VuZGVybGluZWQiOmZhbHNlLCJQYXJlbnRTdHlsZSI6bnVsbH0sIkF1dG9TaXplIjowLCJGb3JlZ3JvdW5kIjp7IiRpZCI6IjEyMCIsIkNvbG9yIjp7IiRpZCI6IjEyMSIsIkEiOjI1NSwiUiI6NjgsIkciOjg0LCJCIjoxMDZ9fSwiTWF4V2lkdGgiOjIwMC4wLCJNYXhIZWlnaHQiOiJJbmZpbml0eSIsIlNtYXJ0Rm9yZWdyb3VuZElzQWN0aXZlIjpmYWxzZSwiSG9yaXpvbnRhbEFsaWdubWVudCI6MCwiVmVydGljYWxBbGlnbm1lbnQiOjAsIlNtYXJ0Rm9yZWdyb3VuZCI6bnVsbCwiQmFja2dyb3VuZEZpbGxUeXBlIjowLCJNYXJnaW4iOnsiJGlkIjoiMTIyIiwiVG9wIjowLCJMZWZ0IjowLCJSaWdodCI6MCwiQm90dG9tIjowfSwiUGFkZGluZyI6eyIkaWQiOiIxMjMiLCJUb3AiOjAsIkxlZnQiOjAsIlJpZ2h0IjowLCJCb3R0b20iOjB9LCJCYWNrZ3JvdW5kIjp7IiRpZCI6IjEyNCIsIkNvbG9yIjp7IiRyZWYiOiIyMCJ9fSwiSXNWaXNpYmxlIjp0cnVlLCJXaWR0aCI6MC4wLCJIZWlnaHQiOjAuMCwiQm9yZGVyU3R5bGUiOm51bGwsIlBhcmVudFN0eWxlIjpudWxsfSwiRGF0ZUZvcm1hdCI6eyIkaWQiOiIxMjUiLCJGb3JtYXRTdHJpbmciOiJNTU0gZCIsIlNlcGFyYXRvciI6Ii8iLCJVc2VJbnRlcm5hdGlvbmFsRGF0ZUZvcm1hdCI6ZmFsc2UsIkRhdGVJc1Zpc2libGUiOnRydWUsIlRpbWVJc1Zpc2libGUiOmZhbHNlLCJIb3VyRGlnaXRzIjoxLCJBbVBtRGVzaWduYXRvciI6MiwiVHJpbTAwTWludXRlcyI6ZmFsc2UsIkxhc3RLbm93blZpc2liaWxpdHlTdGF0ZSI6bnVsbH0sIklzVmlzaWJsZSI6dHJ1ZSwiUGFyZW50U3R5bGUiOm51bGwsIl9leHBsaWNpdGx5U2V0Ijp7IiRpZCI6IjEyNiIsIlNoYXBlU3R5bGUiOmZhbHNlLCJUaXRsZVN0eWxlIjpmYWxzZSwiRGF0ZVN0eWxlIjpmYWxzZSwiSG9yaXpvbnRhbENvbm5lY3RvclN0eWxlIjpmYWxzZSwiVmVydGljYWxDb25uZWN0b3JTdHlsZSI6ZmFsc2UsIlBlcmNlbnRhZ2VDb21wbGV0ZVNoYXBlT3BhY2l0eSI6ZmFsc2UsIlNoYXBlIjpmYWxzZSwiU2hhcGVUaGlja25lc3MiOmZhbHNlLCJEdXJhdGlvbkZvcm1hdCI6ZmFsc2UsIkluY2x1ZGVOb25Xb3JraW5nRGF5c0luRHVyYXRpb24iOmZhbHNlLCJNYXJnaW4iOmZhbHNlLCJTdGFydERhdGVQb3NpdGlvbiI6ZmFsc2UsIkVuZERhdGVQb3NpdGlvbiI6ZmFsc2UsIlRpdGxlUG9zaXRpb24iOmZhbHNlLCJEdXJhdGlvblBvc2l0aW9uIjpmYWxzZSwiUGVyY2VudGFnZUNvbXBsZXRlZFBvc2l0aW9uIjpmYWxzZSwiU3BhY2luZyI6ZmFsc2UsIklzQmVsb3dUaW1lYmFuZCI6ZmFsc2UsIkRhdGVGb3JtYXQiOmZhbHNlLCJJc1Zpc2libGUiOmZhbHNlfX0sIkdyaWRsaW5lUGFuZWxTdHlsZSI6eyIkaWQiOiIxMjciLCJHcmlkbGluZVN0eWxlIjp7IiRpZCI6IjEyOCIsIkxpbmVDb2xvciI6eyIkaWQiOiIxMjkiLCIkdHlwZSI6Ik5MUkUuQ29tbW9uLkRvbS5Tb2xpZENvbG9yQnJ1c2gsIE5MUkUuQ29tbW9uIiwiQ29sb3IiOnsiJGlkIjoiMTMwIiwiQSI6MzgsIlIiOjkxLCJHIjoxNTUsIkIiOjIxM319LCJMaW5lV2VpZ2h0IjoxLjAsIkxpbmVUeXBlIjowLCJQYXJlbnRTdHlsZSI6bnVsbH0sIk1hcmdpbiI6eyIkaWQiOiIxMzEiLCJUb3AiOjAsIkxlZnQiOjAsIlJpZ2h0IjowLCJCb3R0b20iOjB9LCJQYWRkaW5nIjp7IiRpZCI6IjEzMiIsIlRvcCI6MCwiTGVmdCI6MCwiUmlnaHQiOjAsIkJvdHRvbSI6MH0sIkJhY2tncm91bmQiOm51bGwsIklzVmlzaWJsZSI6dHJ1ZSwiV2lkdGgiOjAuMCwiSGVpZ2h0IjowLjAsIkJvcmRlclN0eWxlIjp7IiRpZCI6IjEzMyIsIkxpbmVDb2xvciI6bnVsbCwiTGluZVdlaWdodCI6MC4wLCJMaW5lVHlwZSI6MCwiUGFyZW50U3R5bGUiOm51bGx9LCJQYXJlbnRTdHlsZSI6bnVsbH0sIlNob3dFbGFwc2VkVGltZUdyYWRpZW50U3R5bGUiOnRydWUsIkRlZmF1bHRTd2ltbGFuZVN0eWxlIjp7IiRpZCI6IjEzNCIsIkhlYWRlclN0eWxlIjp7IiRpZCI6IjEzNSIsIlRleHRTdHlsZSI6eyIkaWQiOiIxMzYiLCJGb250U2V0dGluZ3MiOnsiJGlkIjoiMTM3IiwiRm9udFNpemUiOjEyLCJGb250TmFtZSI6IkNhbGlicmkiLCJJc0JvbGQiOmZhbHNlLCJJc0l0YWxpYyI6ZmFsc2UsIklzVW5kZXJsaW5lZCI6ZmFsc2UsIlBhcmVudFN0eWxlIjpudWxsfSwiQXV0b1NpemUiOjAsIkZvcmVncm91bmQiOnsiJGlkIjoiMTM4IiwiQ29sb3IiOnsiJGlkIjoiMTM5IiwiQSI6MjU1LCJSIjozMiwiRyI6NTYsIkIiOjEwMH19LCJNYXhXaWR0aCI6MC4wLCJNYXhIZWlnaHQiOjAuMCwiU21hcnRGb3JlZ3JvdW5kSXNBY3RpdmUiOmZhbHNlLCJIb3Jpem9udGFsQWxpZ25tZW50IjowLCJWZXJ0aWNhbEFsaWdubWVudCI6MCwiU21hcnRGb3JlZ3JvdW5kIjpudWxsLCJCYWNrZ3JvdW5kRmlsbFR5cGUiOjAsIk1hcmdpbiI6eyIkaWQiOiIxNDAiLCJUb3AiOjAsIkxlZnQiOjAsIlJpZ2h0IjowLCJCb3R0b20iOjB9LCJQYWRkaW5nIjp7IiRpZCI6IjE0MSIsIlRvcCI6MCwiTGVmdCI6MCwiUmlnaHQiOjAsIkJvdHRvbSI6MH0sIkJhY2tncm91bmQiOm51bGwsIklzVmlzaWJsZSI6ZmFsc2UsIldpZHRoIjowLjAsIkhlaWdodCI6MC4wLCJCb3JkZXJTdHlsZSI6bnVsbCwiUGFyZW50U3R5bGUiOm51bGx9LCJSZWN0YW5nbGVTdHlsZSI6eyIkaWQiOiIxNDIiLCJNYXJnaW4iOnsiJGlkIjoiMTQzIiwiVG9wIjowLCJMZWZ0IjowLCJSaWdodCI6MCwiQm90dG9tIjowfSwiUGFkZGluZyI6eyIkaWQiOiIxNDQiLCJUb3AiOjAsIkxlZnQiOjAsIlJpZ2h0IjowLCJCb3R0b20iOjB9LCJCYWNrZ3JvdW5kIjp7IiRpZCI6IjE0NSIsIkNvbG9yIjp7IiRpZCI6IjE0NiIsIkEiOjEyNywiUiI6OTEsIkciOjE1NSwiQiI6MjEzfX0sIklzVmlzaWJsZSI6ZmFsc2UsIldpZHRoIjowLjAsIkhlaWdodCI6MC4wLCJCb3JkZXJTdHlsZSI6eyIkaWQiOiIxNDciLCJMaW5lQ29sb3IiOnsiJGlkIjoiMTQ4IiwiJHR5cGUiOiJOTFJFLkNvbW1vbi5Eb20uU29saWRDb2xvckJydXNoLCBOTFJFLkNvbW1vbiIsIkNvbG9yIjp7IiRpZCI6IjE0OSIsIkEiOjI1NSwiUiI6MjU1LCJHIjowLCJCIjowfX0sIkxpbmVXZWlnaHQiOjAuMCwiTGluZVR5cGUiOjAsIlBhcmVudFN0eWxlIjpudWxsfSwiUGFyZW50U3R5bGUiOm51bGx9LCJNYXJnaW4iOnsiJGlkIjoiMTUwIiwiVG9wIjowLCJMZWZ0IjowLCJSaWdodCI6MCwiQm90dG9tIjowfSwiUGFkZGluZyI6eyIkaWQiOiIxNTEiLCJUb3AiOjAsIkxlZnQiOjAsIlJpZ2h0IjowLCJCb3R0b20iOjB9LCJCYWNrZ3JvdW5kIjpudWxsLCJJc1Zpc2libGUiOnRydWUsIldpZHRoIjowLjAsIkhlaWdodCI6MC4wLCJCb3JkZXJTdHlsZSI6bnVsbCwiUGFyZW50U3R5bGUiOm51bGx9LCJCYWNrZ3JvdW5kU3R5bGUiOnsiJGlkIjoiMTUyIiwiTWFyZ2luIjp7IiRpZCI6IjE1MyIsIlRvcCI6MCwiTGVmdCI6MCwiUmlnaHQiOjAsIkJvdHRvbSI6MH0sIlBhZGRpbmciOnsiJGlkIjoiMTU0IiwiVG9wIjowLCJMZWZ0IjowLCJSaWdodCI6MCwiQm90dG9tIjowfSwiQmFja2dyb3VuZCI6eyIkaWQiOiIxNTUiLCJDb2xvciI6eyIkaWQiOiIxNTYiLCJBIjozOCwiUiI6OTEsIkciOjE1NSwiQiI6MjEzfX0sIklzVmlzaWJsZSI6dHJ1ZSwiV2lkdGgiOjAuMCwiSGVpZ2h0IjowLjAsIkJvcmRlclN0eWxlIjp7IiRpZCI6IjE1NyIsIkxpbmVDb2xvciI6eyIkaWQiOiIxNTgiLCIkdHlwZSI6Ik5MUkUuQ29tbW9uLkRvbS5Tb2xpZENvbG9yQnJ1c2gsIE5MUkUuQ29tbW9uIiwiQ29sb3IiOnsiJGlkIjoiMTU5IiwiQSI6MjU1LCJSIjoyNTUsIkciOjAsIkIiOjB9fSwiTGluZVdlaWdodCI6MC4wLCJMaW5lVHlwZSI6MCwiUGFyZW50U3R5bGUiOm51bGx9LCJQYXJlbnRTdHlsZSI6bnVsbH0sIklzQWJvdmVUaW1lYmFuZCI6ZmFsc2UsIk1hcmdpbiI6eyIkaWQiOiIxNjAiLCJUb3AiOjAsIkxlZnQiOjAsIlJpZ2h0IjowLCJCb3R0b20iOjB9LCJQYWRkaW5nIjp7IiRpZCI6IjE2MSIsIlRvcCI6MCwiTGVmdCI6MCwiUmlnaHQiOjAsIkJvdHRvbSI6MH0sIklzVmlzaWJsZSI6dHJ1ZSwiV2lkdGgiOjAuMCwiSGVpZ2h0IjowLjAsIkJvcmRlclN0eWxlIjpudWxsLCJQYXJlbnRTdHlsZSI6bnVsbH19LCJTY2FsZSI6eyIkaWQiOiIxNjIiLCJTdGFydERhdGUiOiIwMDAxLTAxLTAxVDAwOjAwOjAwIiwiRW5kRGF0ZSI6IjIwMjAtMDMtMjBUMjM6NTk6MDAiLCJGb3JtYXQiOiJNTU0iLCJUeXBlIjoyLCJBdXRvRGF0ZVJhbmdlIjp0cnVlLCJXb3JraW5nRGF5cyI6MzEsIlRvZGF5TWFya2VyVGV4dCI6IlRvZGF5IiwiQXV0b1NjYWxlVHlwZSI6dHJ1ZX0sIk1pbGVzdG9uZXMiOltdLCJUYXNrcyI6W3siJGlkIjoiMTYzIiwiR3JvdXBOYW1lIjpudWxsLCJTdGFydERhdGUiOiIyMDE5LTExLTExVDAwOjAwOjAwIiwiRW5kRGF0ZSI6IjIwMTktMTEtMjJUMjM6NTk6MDAiLCJQZXJjZW50YWdlQ29tcGxldGUiOjEwMC4wLCJTdHlsZSI6eyIkaWQiOiIxNjQiLCJTaGFwZSI6MCwiU2hhcGVUaGlja25lc3MiOjIsIkR1cmF0aW9uRm9ybWF0IjowLCJJbmNsdWRlTm9uV29ya2luZ0RheXNJbkR1cmF0aW9uIjpmYWxzZSwiUGVyY2VudGFnZUNvbXBsZXRlU3R5bGUiOnsiJGlkIjoiMTY1IiwiRm9udFNldHRpbmdzIjp7IiRpZCI6IjE2NiIsIkZvbnRTaXplIjoxMCwiRm9udE5hbWUiOiJDYWxpYnJpIiwiSXNCb2xkIjpmYWxzZSwiSXNJdGFsaWMiOmZhbHNlLCJJc1VuZGVybGluZWQiOmZhbHNlLCJQYXJlbnRTdHlsZSI6bnVsbH0sIkF1dG9TaXplIjowLCJGb3JlZ3JvdW5kIjp7IiRyZWYiOiI4NSJ9LCJNYXhXaWR0aCI6MjAwLjAsIk1heEhlaWdodCI6IkluZmluaXR5IiwiU21hcnRGb3JlZ3JvdW5kSXNBY3RpdmUiOmZhbHNlLCJIb3Jpem9udGFsQWxpZ25tZW50IjowLCJWZXJ0aWNhbEFsaWdubWVudCI6MCwiU21hcnRGb3JlZ3JvdW5kIjpudWxsLCJCYWNrZ3JvdW5kRmlsbFR5cGUiOjAsIk1hcmdpbiI6eyIkaWQiOiIxNjciLCJUb3AiOjAsIkxlZnQiOjAsIlJpZ2h0IjowLCJCb3R0b20iOjB9LCJQYWRkaW5nIjp7IiRpZCI6IjE2OCIsIlRvcCI6MCwiTGVmdCI6MCwiUmlnaHQiOjAsIkJvdHRvbSI6MH0sIkJhY2tncm91bmQiOnsiJHJlZiI6Ijg5In0sIklzVmlzaWJsZSI6dHJ1ZSwiV2lkdGgiOjAuMCwiSGVpZ2h0IjowLjAsIkJvcmRlclN0eWxlIjp7IiRpZCI6IjE2OSIsIkxpbmVDb2xvciI6bnVsbCwiTGluZVdlaWdodCI6MC4wLCJMaW5lVHlwZSI6MCwiUGFyZW50U3R5bGUiOm51bGx9LCJQYXJlbnRTdHlsZSI6bnVsbH0sIkR1cmF0aW9uU3R5bGUiOnsiJGlkIjoiMTcwIiwiRm9udFNldHRpbmdzIjp7IiRpZCI6IjE3MSIsIkZvbnRTaXplIjoxMCwiRm9udE5hbWUiOiJDYWxpYnJpIiwiSXNCb2xkIjpmYWxzZSwiSXNJdGFsaWMiOmZhbHNlLCJJc1VuZGVybGluZWQiOmZhbHNlLCJQYXJlbnRTdHlsZSI6bnVsbH0sIkF1dG9TaXplIjowLCJGb3JlZ3JvdW5kIjp7IiRpZCI6IjE3MiIsIkNvbG9yIjp7IiRyZWYiOiI5MyJ9fSwiTWF4V2lkdGgiOjIwMC4wLCJNYXhIZWlnaHQiOiJJbmZpbml0eSIsIlNtYXJ0Rm9yZWdyb3VuZElzQWN0aXZlIjpmYWxzZSwiSG9yaXpvbnRhbEFsaWdubWVudCI6MCwiVmVydGljYWxBbGlnbm1lbnQiOjAsIlNtYXJ0Rm9yZWdyb3VuZCI6bnVsbCwiQmFja2dyb3VuZEZpbGxUeXBlIjowLCJNYXJnaW4iOnsiJGlkIjoiMTczIiwiVG9wIjowLCJMZWZ0IjowLCJSaWdodCI6MCwiQm90dG9tIjowfSwiUGFkZGluZyI6eyIkaWQiOiIxNzQiLCJUb3AiOjAsIkxlZnQiOjAsIlJpZ2h0IjowLCJCb3R0b20iOjB9LCJCYWNrZ3JvdW5kIjp7IiRyZWYiOiI5NiJ9LCJJc1Zpc2libGUiOnRydWUsIldpZHRoIjowLjAsIkhlaWdodCI6MC4wLCJCb3JkZXJTdHlsZSI6eyIkaWQiOiIxNzUiLCJMaW5lQ29sb3IiOm51bGwsIkxpbmVXZWlnaHQiOjAuMCwiTGluZVR5cGUiOjAsIlBhcmVudFN0eWxlIjpudWxsfSwiUGFyZW50U3R5bGUiOm51bGx9LCJIb3Jpem9udGFsQ29ubmVjdG9yU3R5bGUiOnsiJGlkIjoiMTc2IiwiTGluZUNvbG9yIjp7IiRyZWYiOiI5OCJ9LCJMaW5lV2VpZ2h0IjoxLjAsIkxpbmVUeXBlIjowLCJQYXJlbnRTdHlsZSI6bnVsbH0sIlZlcnRpY2FsQ29ubmVjdG9yU3R5bGUiOnsiJGlkIjoiMTc3IiwiTGluZUNvbG9yIjp7IiRyZWYiOiIxMDEifSwiTGluZVdlaWdodCI6MS4wLCJMaW5lVHlwZSI6MCwiUGFyZW50U3R5bGUiOm51bGx9LCJNYXJnaW4iOm51bGwsIlN0YXJ0RGF0ZVBvc2l0aW9uIjo0LCJFbmREYXRlUG9zaXRpb24iOjQsIkRhdGVJc1Zpc2libGUiOnRydWUsIlRpdGxlUG9zaXRpb24iOjMsIkR1cmF0aW9uUG9zaXRpb24iOjYsIlBlcmNlbnRhZ2VDb21wbGV0ZWRQb3NpdGlvbiI6MiwiU3BhY2luZyI6NSwiSXNCZWxvd1RpbWViYW5kIjpmYWxzZSwiUGVyY2VudGFnZUNvbXBsZXRlU2hhcGVPcGFjaXR5IjozNSwiU2hhcGVTdHlsZSI6eyIkaWQiOiIxNzgiLCJNYXJnaW4iOnsiJGlkIjoiMTc5IiwiVG9wIjowLCJMZWZ0Ijo0LCJSaWdodCI6NCwiQm90dG9tIjowfSwiUGFkZGluZyI6eyIkaWQiOiIxODAiLCJUb3AiOjAsIkxlZnQiOjAsIlJpZ2h0IjowLCJCb3R0b20iOjB9LCJCYWNrZ3JvdW5kIjp7IiRpZCI6IjE4MSIsIkNvbG9yIjp7IiRpZCI6IjE4MiIsIkEiOjI1NSwiUiI6MjM3LCJHIjoxMjUsIkIiOjQ5fX0sIklzVmlzaWJsZSI6dHJ1ZSwiV2lkdGgiOjAuMCwiSGVpZ2h0IjoyMi4wLCJCb3JkZXJTdHlsZSI6eyIkaWQiOiIxODMiLCJMaW5lQ29sb3IiOnsiJHJlZiI6IjEwOSJ9LCJMaW5lV2VpZ2h0IjowLjAsIkxpbmVUeXBlIjowLCJQYXJlbnRTdHlsZSI6bnVsbH0sIlBhcmVudFN0eWxlIjpudWxsfSwiVGl0bGVTdHlsZSI6eyIkaWQiOiIxODQiLCJGb250U2V0dGluZ3MiOnsiJGlkIjoiMTg1IiwiRm9udFNpemUiOjExLCJGb250TmFtZSI6IkNhbGlicmkiLCJJc0JvbGQiOnRydWUsIklzSXRhbGljIjpmYWxzZSwiSXNVbmRlcmxpbmVkIjpmYWxzZSwiUGFyZW50U3R5bGUiOm51bGx9LCJBdXRvU2l6ZSI6MCwiRm9yZWdyb3VuZCI6eyIkaWQiOiIxODYiLCJDb2xvciI6eyIkcmVmIjoiMTE0In19LCJNYXhXaWR0aCI6NzIwLjAsIk1heEhlaWdodCI6IkluZmluaXR5IiwiU21hcnRGb3JlZ3JvdW5kSXNBY3RpdmUiOmZhbHNlLCJIb3Jpem9udGFsQWxpZ25tZW50IjoyLCJWZXJ0aWNhbEFsaWdubWVudCI6MCwiU21hcnRGb3JlZ3JvdW5kIjpudWxsLCJCYWNrZ3JvdW5kRmlsbFR5cGUiOjAsIk1hcmdpbiI6eyIkaWQiOiIxODciLCJUb3AiOjAsIkxlZnQiOjAsIlJpZ2h0IjowLCJCb3R0b20iOjB9LCJQYWRkaW5nIjp7IiRpZCI6IjE4OCIsIlRvcCI6MCwiTGVmdCI6MCwiUmlnaHQiOjAsIkJvdHRvbSI6MH0sIkJhY2tncm91bmQiOnsiJHJlZiI6IjExNyJ9LCJJc1Zpc2libGUiOnRydWUsIldpZHRoIjowLjAsIkhlaWdodCI6MC4wLCJCb3JkZXJTdHlsZSI6eyIkaWQiOiIxODkiLCJMaW5lQ29sb3IiOm51bGwsIkxpbmVXZWlnaHQiOjAuMCwiTGluZVR5cGUiOjAsIlBhcmVudFN0eWxlIjpudWxsfSwiUGFyZW50U3R5bGUiOm51bGx9LCJEYXRlU3R5bGUiOnsiJGlkIjoiMTkwIiwiRm9udFNldHRpbmdzIjp7IiRpZCI6IjE5MSIsIkZvbnRTaXplIjoxMCwiRm9udE5hbWUiOiJDYWxpYnJpIiwiSXNCb2xkIjpmYWxzZSwiSXNJdGFsaWMiOmZhbHNlLCJJc1VuZGVybGluZWQiOmZhbHNlLCJQYXJlbnRTdHlsZSI6bnVsbH0sIkF1dG9TaXplIjowLCJGb3JlZ3JvdW5kIjp7IiRpZCI6IjE5MiIsIkNvbG9yIjp7IiRyZWYiOiIxMjEifX0sIk1heFdpZHRoIjoyMDAuMCwiTWF4SGVpZ2h0IjoiSW5maW5pdHkiLCJTbWFydEZvcmVncm91bmRJc0FjdGl2ZSI6ZmFsc2UsIkhvcml6b250YWxBbGlnbm1lbnQiOjAsIlZlcnRpY2FsQWxpZ25tZW50IjowLCJTbWFydEZvcmVncm91bmQiOm51bGwsIkJhY2tncm91bmRGaWxsVHlwZSI6MCwiTWFyZ2luIjp7IiRpZCI6IjE5MyIsIlRvcCI6MCwiTGVmdCI6MCwiUmlnaHQiOjAsIkJvdHRvbSI6MH0sIlBhZGRpbmciOnsiJGlkIjoiMTk0IiwiVG9wIjowLCJMZWZ0IjowLCJSaWdodCI6MCwiQm90dG9tIjowfSwiQmFja2dyb3VuZCI6eyIkcmVmIjoiMTI0In0sIklzVmlzaWJsZSI6dHJ1ZSwiV2lkdGgiOjAuMCwiSGVpZ2h0IjowLjAsIkJvcmRlclN0eWxlIjp7IiRpZCI6IjE5NSIsIkxpbmVDb2xvciI6bnVsbCwiTGluZVdlaWdodCI6MC4wLCJMaW5lVHlwZSI6MCwiUGFyZW50U3R5bGUiOm51bGx9LCJQYXJlbnRTdHlsZSI6bnVsbH0sIkRhdGVGb3JtYXQiOnsiJGlkIjoiMTk2IiwiRm9ybWF0U3RyaW5nIjoiTU1NIGQiLCJTZXBhcmF0b3IiOiIvIiwiVXNlSW50ZXJuYXRpb25hbERhdGVGb3JtYXQiOmZhbHNlLCJEYXRlSXNWaXNpYmxlIjp0cnVlLCJUaW1lSXNWaXNpYmxlIjpmYWxzZSwiSG91ckRpZ2l0cyI6MSwiQW1QbURlc2lnbmF0b3IiOjIsIlRyaW0wME1pbnV0ZXMiOmZhbHNlLCJMYXN0S25vd25WaXNpYmlsaXR5U3RhdGUiOm51bGx9LCJJc1Zpc2libGUiOnRydWUsIlBhcmVudFN0eWxlIjpudWxsfSwiSW5kZXgiOjAsIlNtYXJ0RHVyYXRpb25BY3RpdmF0ZWQiOmZhbHNlLCJEYXRlRm9ybWF0Ijp7IiRyZWYiOiIxOTYifSwiSWQiOiJjZTAxOTMzNy1mMjM5LTRjM2MtOTU2ZS05NTQzMWY0ZDExN2QiLCJJbXBvcnRJZCI6bnVsbCwiVGl0bGUiOiJDb21wcmVuZHJlIGwnb3V0aWwgUk9udG9Ub29scyIsIk5vdGUiOm51bGwsIkh5cGVybGluayI6eyIkaWQiOiIxOTciLCJBZGRyZXNzIjoiIiwiU3ViQWRkcmVzcyI6IiJ9LCJJc0NoYW5nZWQiOmZhbHNlLCJJc05ldyI6ZmFsc2V9LHsiJGlkIjoiMTk4IiwiR3JvdXBOYW1lIjpudWxsLCJTdGFydERhdGUiOiIyMDE5LTExLTExVDAwOjAwOjAwIiwiRW5kRGF0ZSI6IjIwMTktMTItMjBUMjM6NTk6MDAiLCJQZXJjZW50YWdlQ29tcGxldGUiOjIwLjAsIlN0eWxlIjp7IiRpZCI6IjE5OSIsIlNoYXBlIjowLCJTaGFwZVRoaWNrbmVzcyI6MiwiRHVyYXRpb25Gb3JtYXQiOjAsIkluY2x1ZGVOb25Xb3JraW5nRGF5c0luRHVyYXRpb24iOmZhbHNlLCJQZXJjZW50YWdlQ29tcGxldGVTdHlsZSI6eyIkaWQiOiIyMDAiLCJGb250U2V0dGluZ3MiOnsiJGlkIjoiMjAxIiwiRm9udFNpemUiOjEwLCJGb250TmFtZSI6IkNhbGlicmkiLCJJc0JvbGQiOmZhbHNlLCJJc0l0YWxpYyI6ZmFsc2UsIklzVW5kZXJsaW5lZCI6ZmFsc2UsIlBhcmVudFN0eWxlIjpudWxsfSwiQXV0b1NpemUiOjAsIkZvcmVncm91bmQiOnsiJHJlZiI6Ijg1In0sIk1heFdpZHRoIjoyMDAuMCwiTWF4SGVpZ2h0IjoiSW5maW5pdHkiLCJTbWFydEZvcmVncm91bmRJc0FjdGl2ZSI6ZmFsc2UsIkhvcml6b250YWxBbGlnbm1lbnQiOjAsIlZlcnRpY2FsQWxpZ25tZW50IjowLCJTbWFydEZvcmVncm91bmQiOm51bGwsIkJhY2tncm91bmRGaWxsVHlwZSI6MCwiTWFyZ2luIjp7IiRpZCI6IjIwMiIsIlRvcCI6MCwiTGVmdCI6MCwiUmlnaHQiOjAsIkJvdHRvbSI6MH0sIlBhZGRpbmciOnsiJGlkIjoiMjAzIiwiVG9wIjowLCJMZWZ0IjowLCJSaWdodCI6MCwiQm90dG9tIjowfSwiQmFja2dyb3VuZCI6eyIkcmVmIjoiODkifSwiSXNWaXNpYmxlIjp0cnVlLCJXaWR0aCI6MC4wLCJIZWlnaHQiOjAuMCwiQm9yZGVyU3R5bGUiOnsiJGlkIjoiMjA0IiwiTGluZUNvbG9yIjpudWxsLCJMaW5lV2VpZ2h0IjowLjAsIkxpbmVUeXBlIjowLCJQYXJlbnRTdHlsZSI6bnVsbH0sIlBhcmVudFN0eWxlIjpudWxsfSwiRHVyYXRpb25TdHlsZSI6eyIkaWQiOiIyMDUiLCJGb250U2V0dGluZ3MiOnsiJGlkIjoiMjA2IiwiRm9udFNpemUiOjEwLCJGb250TmFtZSI6IkNhbGlicmkiLCJJc0JvbGQiOmZhbHNlLCJJc0l0YWxpYyI6ZmFsc2UsIklzVW5kZXJsaW5lZCI6ZmFsc2UsIlBhcmVudFN0eWxlIjpudWxsfSwiQXV0b1NpemUiOjAsIkZvcmVncm91bmQiOnsiJGlkIjoiMjA3IiwiQ29sb3IiOnsiJHJlZiI6IjkzIn19LCJNYXhXaWR0aCI6MjAwLjAsIk1heEhlaWdodCI6IkluZmluaXR5IiwiU21hcnRGb3JlZ3JvdW5kSXNBY3RpdmUiOmZhbHNlLCJIb3Jpem9udGFsQWxpZ25tZW50IjowLCJWZXJ0aWNhbEFsaWdubWVudCI6MCwiU21hcnRGb3JlZ3JvdW5kIjpudWxsLCJCYWNrZ3JvdW5kRmlsbFR5cGUiOjAsIk1hcmdpbiI6eyIkaWQiOiIyMDgiLCJUb3AiOjAsIkxlZnQiOjAsIlJpZ2h0IjowLCJCb3R0b20iOjB9LCJQYWRkaW5nIjp7IiRpZCI6IjIwOSIsIlRvcCI6MCwiTGVmdCI6MCwiUmlnaHQiOjAsIkJvdHRvbSI6MH0sIkJhY2tncm91bmQiOnsiJHJlZiI6Ijk2In0sIklzVmlzaWJsZSI6dHJ1ZSwiV2lkdGgiOjAuMCwiSGVpZ2h0IjowLjAsIkJvcmRlclN0eWxlIjp7IiRpZCI6IjIxMCIsIkxpbmVDb2xvciI6bnVsbCwiTGluZVdlaWdodCI6MC4wLCJMaW5lVHlwZSI6MCwiUGFyZW50U3R5bGUiOm51bGx9LCJQYXJlbnRTdHlsZSI6bnVsbH0sIkhvcml6b250YWxDb25uZWN0b3JTdHlsZSI6eyIkaWQiOiIyMTEiLCJMaW5lQ29sb3IiOnsiJHJlZiI6Ijk4In0sIkxpbmVXZWlnaHQiOjEuMCwiTGluZVR5cGUiOjAsIlBhcmVudFN0eWxlIjpudWxsfSwiVmVydGljYWxDb25uZWN0b3JTdHlsZSI6eyIkaWQiOiIyMTIiLCJMaW5lQ29sb3IiOnsiJHJlZiI6IjEwMSJ9LCJMaW5lV2VpZ2h0IjoxLjAsIkxpbmVUeXBlIjowLCJQYXJlbnRTdHlsZSI6bnVsbH0sIk1hcmdpbiI6bnVsbCwiU3RhcnREYXRlUG9zaXRpb24iOjQsIkVuZERhdGVQb3NpdGlvbiI6NCwiRGF0ZUlzVmlzaWJsZSI6dHJ1ZSwiVGl0bGVQb3NpdGlvbiI6MiwiRHVyYXRpb25Qb3NpdGlvbiI6NiwiUGVyY2VudGFnZUNvbXBsZXRlZFBvc2l0aW9uIjoyLCJTcGFjaW5nIjo1LCJJc0JlbG93VGltZWJhbmQiOmZhbHNlLCJQZXJjZW50YWdlQ29tcGxldGVTaGFwZU9wYWNpdHkiOjM1LCJTaGFwZVN0eWxlIjp7IiRpZCI6IjIxMyIsIk1hcmdpbiI6eyIkaWQiOiIyMTQiLCJUb3AiOjAsIkxlZnQiOjQsIlJpZ2h0Ijo0LCJCb3R0b20iOjB9LCJQYWRkaW5nIjp7IiRpZCI6IjIxNSIsIlRvcCI6MCwiTGVmdCI6MCwiUmlnaHQiOjAsIkJvdHRvbSI6MH0sIkJhY2tncm91bmQiOnsiJGlkIjoiMjE2IiwiQ29sb3IiOnsiJGlkIjoiMjE3IiwiQSI6MjU1LCJSIjo5MSwiRyI6MTU1LCJCIjoyMTN9fSwiSXNWaXNpYmxlIjp0cnVlLCJXaWR0aCI6MC4wLCJIZWlnaHQiOjIyLjAsIkJvcmRlclN0eWxlIjp7IiRpZCI6IjIxOCIsIkxpbmVDb2xvciI6eyIkcmVmIjoiMTA5In0sIkxpbmVXZWlnaHQiOjAuMCwiTGluZVR5cGUiOjAsIlBhcmVudFN0eWxlIjpudWxsfSwiUGFyZW50U3R5bGUiOm51bGx9LCJUaXRsZVN0eWxlIjp7IiRpZCI6IjIxOSIsIkZvbnRTZXR0aW5ncyI6eyIkaWQiOiIyMjAiLCJGb250U2l6ZSI6MTEsIkZvbnROYW1lIjoiQ2FsaWJyaSIsIklzQm9sZCI6dHJ1ZSwiSXNJdGFsaWMiOmZhbHNlLCJJc1VuZGVybGluZWQiOmZhbHNlLCJQYXJlbnRTdHlsZSI6bnVsbH0sIkF1dG9TaXplIjowLCJGb3JlZ3JvdW5kIjp7IiRpZCI6IjIyMSIsIkNvbG9yIjp7IiRyZWYiOiIxMTQifX0sIk1heFdpZHRoIjo3MjAuMCwiTWF4SGVpZ2h0IjoiSW5maW5pdHkiLCJTbWFydEZvcmVncm91bmRJc0FjdGl2ZSI6ZmFsc2UsIkhvcml6b250YWxBbGlnbm1lbnQiOjEsIlZlcnRpY2FsQWxpZ25tZW50IjowLCJTbWFydEZvcmVncm91bmQiOm51bGwsIkJhY2tncm91bmRGaWxsVHlwZSI6MCwiTWFyZ2luIjp7IiRpZCI6IjIyMiIsIlRvcCI6MCwiTGVmdCI6MCwiUmlnaHQiOjAsIkJvdHRvbSI6MH0sIlBhZGRpbmciOnsiJGlkIjoiMjIzIiwiVG9wIjowLCJMZWZ0IjowLCJSaWdodCI6MCwiQm90dG9tIjowfSwiQmFja2dyb3VuZCI6eyIkcmVmIjoiMTE3In0sIklzVmlzaWJsZSI6dHJ1ZSwiV2lkdGgiOjAuMCwiSGVpZ2h0IjowLjAsIkJvcmRlclN0eWxlIjp7IiRpZCI6IjIyNCIsIkxpbmVDb2xvciI6bnVsbCwiTGluZVdlaWdodCI6MC4wLCJMaW5lVHlwZSI6MCwiUGFyZW50U3R5bGUiOm51bGx9LCJQYXJlbnRTdHlsZSI6bnVsbH0sIkRhdGVTdHlsZSI6eyIkaWQiOiIyMjUiLCJGb250U2V0dGluZ3MiOnsiJGlkIjoiMjI2IiwiRm9udFNpemUiOjEwLCJGb250TmFtZSI6IkNhbGlicmkiLCJJc0JvbGQiOmZhbHNlLCJJc0l0YWxpYyI6ZmFsc2UsIklzVW5kZXJsaW5lZCI6ZmFsc2UsIlBhcmVudFN0eWxlIjpudWxsfSwiQXV0b1NpemUiOjAsIkZvcmVncm91bmQiOnsiJGlkIjoiMjI3IiwiQ29sb3IiOnsiJHJlZiI6IjEyMSJ9fSwiTWF4V2lkdGgiOjIwMC4wLCJNYXhIZWlnaHQiOiJJbmZpbml0eSIsIlNtYXJ0Rm9yZWdyb3VuZElzQWN0aXZlIjpmYWxzZSwiSG9yaXpvbnRhbEFsaWdubWVudCI6MCwiVmVydGljYWxBbGlnbm1lbnQiOjAsIlNtYXJ0Rm9yZWdyb3VuZCI6bnVsbCwiQmFja2dyb3VuZEZpbGxUeXBlIjowLCJNYXJnaW4iOnsiJGlkIjoiMjI4IiwiVG9wIjowLCJMZWZ0IjowLCJSaWdodCI6MCwiQm90dG9tIjowfSwiUGFkZGluZyI6eyIkaWQiOiIyMjkiLCJUb3AiOjAsIkxlZnQiOjAsIlJpZ2h0IjowLCJCb3R0b20iOjB9LCJCYWNrZ3JvdW5kIjp7IiRyZWYiOiIxMjQifSwiSXNWaXNpYmxlIjp0cnVlLCJXaWR0aCI6MC4wLCJIZWlnaHQiOjAuMCwiQm9yZGVyU3R5bGUiOnsiJGlkIjoiMjMwIiwiTGluZUNvbG9yIjpudWxsLCJMaW5lV2VpZ2h0IjowLjAsIkxpbmVUeXBlIjowLCJQYXJlbnRTdHlsZSI6bnVsbH0sIlBhcmVudFN0eWxlIjpudWxsfSwiRGF0ZUZvcm1hdCI6eyIkaWQiOiIyMzEiLCJGb3JtYXRTdHJpbmciOiJNTU0gZCIsIlNlcGFyYXRvciI6Ii8iLCJVc2VJbnRlcm5hdGlvbmFsRGF0ZUZvcm1hdCI6ZmFsc2UsIkRhdGVJc1Zpc2libGUiOnRydWUsIlRpbWVJc1Zpc2libGUiOmZhbHNlLCJIb3VyRGlnaXRzIjoxLCJBbVBtRGVzaWduYXRvciI6MiwiVHJpbTAwTWludXRlcyI6ZmFsc2UsIkxhc3RLbm93blZpc2liaWxpdHlTdGF0ZSI6bnVsbH0sIklzVmlzaWJsZSI6dHJ1ZSwiUGFyZW50U3R5bGUiOm51bGx9LCJJbmRleCI6MSwiU21hcnREdXJhdGlvbkFjdGl2YXRlZCI6ZmFsc2UsIkRhdGVGb3JtYXQiOnsiJHJlZiI6IjIzMSJ9LCJJZCI6IjE2ODQyZjMyLWViZDMtNDEzZS1hMGJlLTlhMTBiZTNlN2VlOSIsIkltcG9ydElkIjpudWxsLCJUaXRsZSI6IkNyw6llciBsJ2ludGVyZmFjZSB3ZWIiLCJOb3RlIjpudWxsLCJIeXBlcmxpbmsiOnsiJGlkIjoiMjMyIiwiQWRkcmVzcyI6IiIsIlN1YkFkZHJlc3MiOiIifSwiSXNDaGFuZ2VkIjpmYWxzZSwiSXNOZXciOmZhbHNlfSx7IiRpZCI6IjIzMyIsIkdyb3VwTmFtZSI6bnVsbCwiU3RhcnREYXRlIjoiMjAxOS0xMS0xMVQwMDowMDowMCIsIkVuZERhdGUiOiIyMDE5LTExLTIyVDIzOjU5OjAwIiwiUGVyY2VudGFnZUNvbXBsZXRlIjoxMDAuMCwiU3R5bGUiOnsiJGlkIjoiMjM0IiwiU2hhcGUiOjAsIlNoYXBlVGhpY2tuZXNzIjoyLCJEdXJhdGlvbkZvcm1hdCI6MCwiSW5jbHVkZU5vbldvcmtpbmdEYXlzSW5EdXJhdGlvbiI6ZmFsc2UsIlBlcmNlbnRhZ2VDb21wbGV0ZVN0eWxlIjp7IiRpZCI6IjIzNSIsIkZvbnRTZXR0aW5ncyI6eyIkaWQiOiIyMzYiLCJGb250U2l6ZSI6MTAsIkZvbnROYW1lIjoiQ2FsaWJyaSIsIklzQm9sZCI6ZmFsc2UsIklzSXRhbGljIjpmYWxzZSwiSXNVbmRlcmxpbmVkIjpmYWxzZSwiUGFyZW50U3R5bGUiOm51bGx9LCJBdXRvU2l6ZSI6MCwiRm9yZWdyb3VuZCI6eyIkcmVmIjoiODUifSwiTWF4V2lkdGgiOjIwMC4wLCJNYXhIZWlnaHQiOiJJbmZpbml0eSIsIlNtYXJ0Rm9yZWdyb3VuZElzQWN0aXZlIjpmYWxzZSwiSG9yaXpvbnRhbEFsaWdubWVudCI6MCwiVmVydGljYWxBbGlnbm1lbnQiOjAsIlNtYXJ0Rm9yZWdyb3VuZCI6bnVsbCwiQmFja2dyb3VuZEZpbGxUeXBlIjowLCJNYXJnaW4iOnsiJGlkIjoiMjM3IiwiVG9wIjowLCJMZWZ0IjowLCJSaWdodCI6MCwiQm90dG9tIjowfSwiUGFkZGluZyI6eyIkaWQiOiIyMzgiLCJUb3AiOjAsIkxlZnQiOjAsIlJpZ2h0IjowLCJCb3R0b20iOjB9LCJCYWNrZ3JvdW5kIjp7IiRyZWYiOiI4OSJ9LCJJc1Zpc2libGUiOnRydWUsIldpZHRoIjowLjAsIkhlaWdodCI6MC4wLCJCb3JkZXJTdHlsZSI6eyIkaWQiOiIyMzkiLCJMaW5lQ29sb3IiOm51bGwsIkxpbmVXZWlnaHQiOjAuMCwiTGluZVR5cGUiOjAsIlBhcmVudFN0eWxlIjpudWxsfSwiUGFyZW50U3R5bGUiOm51bGx9LCJEdXJhdGlvblN0eWxlIjp7IiRpZCI6IjI0MCIsIkZvbnRTZXR0aW5ncyI6eyIkaWQiOiIyNDEiLCJGb250U2l6ZSI6MTAsIkZvbnROYW1lIjoiQ2FsaWJyaSIsIklzQm9sZCI6ZmFsc2UsIklzSXRhbGljIjpmYWxzZSwiSXNVbmRlcmxpbmVkIjpmYWxzZSwiUGFyZW50U3R5bGUiOm51bGx9LCJBdXRvU2l6ZSI6MCwiRm9yZWdyb3VuZCI6eyIkaWQiOiIyNDIiLCJDb2xvciI6eyIkcmVmIjoiOTMifX0sIk1heFdpZHRoIjoyMDAuMCwiTWF4SGVpZ2h0IjoiSW5maW5pdHkiLCJTbWFydEZvcmVncm91bmRJc0FjdGl2ZSI6ZmFsc2UsIkhvcml6b250YWxBbGlnbm1lbnQiOjAsIlZlcnRpY2FsQWxpZ25tZW50IjowLCJTbWFydEZvcmVncm91bmQiOm51bGwsIkJhY2tncm91bmRGaWxsVHlwZSI6MCwiTWFyZ2luIjp7IiRpZCI6IjI0MyIsIlRvcCI6MCwiTGVmdCI6MCwiUmlnaHQiOjAsIkJvdHRvbSI6MH0sIlBhZGRpbmciOnsiJGlkIjoiMjQ0IiwiVG9wIjowLCJMZWZ0IjowLCJSaWdodCI6MCwiQm90dG9tIjowfSwiQmFja2dyb3VuZCI6eyIkcmVmIjoiOTYifSwiSXNWaXNpYmxlIjp0cnVlLCJXaWR0aCI6MC4wLCJIZWlnaHQiOjAuMCwiQm9yZGVyU3R5bGUiOnsiJGlkIjoiMjQ1IiwiTGluZUNvbG9yIjpudWxsLCJMaW5lV2VpZ2h0IjowLjAsIkxpbmVUeXBlIjowLCJQYXJlbnRTdHlsZSI6bnVsbH0sIlBhcmVudFN0eWxlIjpudWxsfSwiSG9yaXpvbnRhbENvbm5lY3RvclN0eWxlIjp7IiRpZCI6IjI0NiIsIkxpbmVDb2xvciI6eyIkcmVmIjoiOTgifSwiTGluZVdlaWdodCI6MS4wLCJMaW5lVHlwZSI6MCwiUGFyZW50U3R5bGUiOm51bGx9LCJWZXJ0aWNhbENvbm5lY3RvclN0eWxlIjp7IiRpZCI6IjI0NyIsIkxpbmVDb2xvciI6eyIkcmVmIjoiMTAxIn0sIkxpbmVXZWlnaHQiOjEuMCwiTGluZVR5cGUiOjAsIlBhcmVudFN0eWxlIjpudWxsfSwiTWFyZ2luIjpudWxsLCJTdGFydERhdGVQb3NpdGlvbiI6NCwiRW5kRGF0ZVBvc2l0aW9uIjo0LCJEYXRlSXNWaXNpYmxlIjp0cnVlLCJUaXRsZVBvc2l0aW9uIjozLCJEdXJhdGlvblBvc2l0aW9uIjo2LCJQZXJjZW50YWdlQ29tcGxldGVkUG9zaXRpb24iOjIsIlNwYWNpbmciOjUsIklzQmVsb3dUaW1lYmFuZCI6ZmFsc2UsIlBlcmNlbnRhZ2VDb21wbGV0ZVNoYXBlT3BhY2l0eSI6MzUsIlNoYXBlU3R5bGUiOnsiJGlkIjoiMjQ4IiwiTWFyZ2luIjp7IiRpZCI6IjI0OSIsIlRvcCI6MCwiTGVmdCI6NCwiUmlnaHQiOjQsIkJvdHRvbSI6MH0sIlBhZGRpbmciOnsiJGlkIjoiMjUwIiwiVG9wIjowLCJMZWZ0IjowLCJSaWdodCI6MCwiQm90dG9tIjowfSwiQmFja2dyb3VuZCI6eyIkaWQiOiIyNTEiLCJDb2xvciI6eyIkaWQiOiIyNTIiLCJBIjoyNTUsIlIiOjIzNywiRyI6MTI1LCJCIjo0OX19LCJJc1Zpc2libGUiOnRydWUsIldpZHRoIjowLjAsIkhlaWdodCI6MjIuMCwiQm9yZGVyU3R5bGUiOnsiJGlkIjoiMjUzIiwiTGluZUNvbG9yIjp7IiRyZWYiOiIxMDkifSwiTGluZVdlaWdodCI6MC4wLCJMaW5lVHlwZSI6MCwiUGFyZW50U3R5bGUiOm51bGx9LCJQYXJlbnRTdHlsZSI6bnVsbH0sIlRpdGxlU3R5bGUiOnsiJGlkIjoiMjU0IiwiRm9udFNldHRpbmdzIjp7IiRpZCI6IjI1NSIsIkZvbnRTaXplIjoxMSwiRm9udE5hbWUiOiJDYWxpYnJpIiwiSXNCb2xkIjp0cnVlLCJJc0l0YWxpYyI6ZmFsc2UsIklzVW5kZXJsaW5lZCI6ZmFsc2UsIlBhcmVudFN0eWxlIjpudWxsfSwiQXV0b1NpemUiOjAsIkZvcmVncm91bmQiOnsiJGlkIjoiMjU2IiwiQ29sb3IiOnsiJHJlZiI6IjExNCJ9fSwiTWF4V2lkdGgiOjcyMC4wLCJNYXhIZWlnaHQiOiJJbmZpbml0eSIsIlNtYXJ0Rm9yZWdyb3VuZElzQWN0aXZlIjpmYWxzZSwiSG9yaXpvbnRhbEFsaWdubWVudCI6MiwiVmVydGljYWxBbGlnbm1lbnQiOjAsIlNtYXJ0Rm9yZWdyb3VuZCI6bnVsbCwiQmFja2dyb3VuZEZpbGxUeXBlIjowLCJNYXJnaW4iOnsiJGlkIjoiMjU3IiwiVG9wIjowLCJMZWZ0IjowLCJSaWdodCI6MCwiQm90dG9tIjowfSwiUGFkZGluZyI6eyIkaWQiOiIyNTgiLCJUb3AiOjAsIkxlZnQiOjAsIlJpZ2h0IjowLCJCb3R0b20iOjB9LCJCYWNrZ3JvdW5kIjp7IiRyZWYiOiIxMTcifSwiSXNWaXNpYmxlIjp0cnVlLCJXaWR0aCI6MC4wLCJIZWlnaHQiOjAuMCwiQm9yZGVyU3R5bGUiOnsiJGlkIjoiMjU5IiwiTGluZUNvbG9yIjpudWxsLCJMaW5lV2VpZ2h0IjowLjAsIkxpbmVUeXBlIjowLCJQYXJlbnRTdHlsZSI6bnVsbH0sIlBhcmVudFN0eWxlIjpudWxsfSwiRGF0ZVN0eWxlIjp7IiRpZCI6IjI2MCIsIkZvbnRTZXR0aW5ncyI6eyIkaWQiOiIyNjEiLCJGb250U2l6ZSI6MTAsIkZvbnROYW1lIjoiQ2FsaWJyaSIsIklzQm9sZCI6ZmFsc2UsIklzSXRhbGljIjpmYWxzZSwiSXNVbmRlcmxpbmVkIjpmYWxzZSwiUGFyZW50U3R5bGUiOm51bGx9LCJBdXRvU2l6ZSI6MCwiRm9yZWdyb3VuZCI6eyIkaWQiOiIyNjIiLCJDb2xvciI6eyIkcmVmIjoiMTIxIn19LCJNYXhXaWR0aCI6MjAwLjAsIk1heEhlaWdodCI6IkluZmluaXR5IiwiU21hcnRGb3JlZ3JvdW5kSXNBY3RpdmUiOmZhbHNlLCJIb3Jpem9udGFsQWxpZ25tZW50IjowLCJWZXJ0aWNhbEFsaWdubWVudCI6MCwiU21hcnRGb3JlZ3JvdW5kIjpudWxsLCJCYWNrZ3JvdW5kRmlsbFR5cGUiOjAsIk1hcmdpbiI6eyIkaWQiOiIyNjMiLCJUb3AiOjAsIkxlZnQiOjAsIlJpZ2h0IjowLCJCb3R0b20iOjB9LCJQYWRkaW5nIjp7IiRpZCI6IjI2NCIsIlRvcCI6MCwiTGVmdCI6MCwiUmlnaHQiOjAsIkJvdHRvbSI6MH0sIkJhY2tncm91bmQiOnsiJHJlZiI6IjEyNCJ9LCJJc1Zpc2libGUiOnRydWUsIldpZHRoIjowLjAsIkhlaWdodCI6MC4wLCJCb3JkZXJTdHlsZSI6eyIkaWQiOiIyNjUiLCJMaW5lQ29sb3IiOm51bGwsIkxpbmVXZWlnaHQiOjAuMCwiTGluZVR5cGUiOjAsIlBhcmVudFN0eWxlIjpudWxsfSwiUGFyZW50U3R5bGUiOm51bGx9LCJEYXRlRm9ybWF0Ijp7IiRpZCI6IjI2NiIsIkZvcm1hdFN0cmluZyI6Ik1NTSBkIiwiU2VwYXJhdG9yIjoiLyIsIlVzZUludGVybmF0aW9uYWxEYXRlRm9ybWF0IjpmYWxzZSwiRGF0ZUlzVmlzaWJsZSI6dHJ1ZSwiVGltZUlzVmlzaWJsZSI6ZmFsc2UsIkhvdXJEaWdpdHMiOjEsIkFtUG1EZXNpZ25hdG9yIjoyLCJUcmltMDBNaW51dGVzIjpmYWxzZSwiTGFzdEtub3duVmlzaWJpbGl0eVN0YXRlIjpudWxsfSwiSXNWaXNpYmxlIjp0cnVlLCJQYXJlbnRTdHlsZSI6bnVsbH0sIkluZGV4IjoyLCJTbWFydER1cmF0aW9uQWN0aXZhdGVkIjpmYWxzZSwiRGF0ZUZvcm1hdCI6eyIkcmVmIjoiMjY2In0sIklkIjoiNDYzNGVmZmQtMTAzZi00NGIwLTg2MjYtNWU5ZDU2MzU2MzQwIiwiSW1wb3J0SWQiOm51bGwsIlRpdGxlIjoiw4ljcmlyZSBsZXMgZGlmZsOpcmVudHMgc2NyaXB0IGZvbmN0aW9ubmVscyAiLCJOb3RlIjoiZTF4eWRHWXhYR0Z1YzJsY1lXNXphV053WnpFeU5USmNkV014WEdoMGJXRjFkSE53WEdSbFptWXllMXhtYjI1MGRHSnNlMXhtTUZ4bVkyaGhjbk5sZERBZ1ZHbHRaWE1nVG1WM0lGSnZiV0Z1TzMxN1hHWXlYR1pqYUdGeWMyVjBNQ0JUWldkdlpTQlZTVHQ5Zlh0Y1kyOXNiM0owWW14Y2NtVmtNRnhuY21WbGJqQmNZbXgxWlRBN1hISmxaREkxTlZ4bmNtVmxiakkxTlZ4aWJIVmxNalUxTzF4eVpXUTFNVnhuY21WbGJqVXhYR0pzZFdVMU1UdDlYR3h2WTJoY2FHbGphRnhrWW1Ob1hIQmhjbVJjY0d4aGFXNWNiSFJ5Y0dGeVhHbDBZWEF3ZTF4c1lXNW5NVEF6TTF4bWN6RTRYR1l5WEdObU1pQmNZMll5WEhGc2UxeG1NaUI3WEd4aGJtY3hNRE0yWEd4MGNtTm9JRElnYzJWdFlXbHVaWE45WEd4cE1GeHlhVEJjYzJFd1hITmlNRnhtYVRCY2NXeGNjR0Z5ZlEwS2ZRMEtmUT09IiwiSHlwZXJsaW5rIjp7IiRpZCI6IjI2NyIsIkFkZHJlc3MiOiIiLCJTdWJBZGRyZXNzIjoiIn0sIklzQ2hhbmdlZCI6ZmFsc2UsIklzTmV3IjpmYWxzZX0seyIkaWQiOiIyNjgiLCJHcm91cE5hbWUiOm51bGwsIlN0YXJ0RGF0ZSI6IjIwMTktMTItMDlUMDA6MDA6MDBaIiwiRW5kRGF0ZSI6IjIwMTktMTItMjBUMjM6NTk6MDAiLCJQZXJjZW50YWdlQ29tcGxldGUiOm51bGwsIlN0eWxlIjp7IiRpZCI6IjI2OSIsIlNoYXBlIjowLCJTaGFwZVRoaWNrbmVzcyI6MiwiRHVyYXRpb25Gb3JtYXQiOjAsIkluY2x1ZGVOb25Xb3JraW5nRGF5c0luRHVyYXRpb24iOmZhbHNlLCJQZXJjZW50YWdlQ29tcGxldGVTdHlsZSI6eyIkaWQiOiIyNzAiLCJGb250U2V0dGluZ3MiOnsiJGlkIjoiMjcxIiwiRm9udFNpemUiOjEwLCJGb250TmFtZSI6IkNhbGlicmkiLCJJc0JvbGQiOmZhbHNlLCJJc0l0YWxpYyI6ZmFsc2UsIklzVW5kZXJsaW5lZCI6ZmFsc2UsIlBhcmVudFN0eWxlIjpudWxsfSwiQXV0b1NpemUiOjAsIkZvcmVncm91bmQiOnsiJHJlZiI6Ijg1In0sIk1heFdpZHRoIjoyMDAuMCwiTWF4SGVpZ2h0IjoiSW5maW5pdHkiLCJTbWFydEZvcmVncm91bmRJc0FjdGl2ZSI6ZmFsc2UsIkhvcml6b250YWxBbGlnbm1lbnQiOjAsIlZlcnRpY2FsQWxpZ25tZW50IjowLCJTbWFydEZvcmVncm91bmQiOm51bGwsIkJhY2tncm91bmRGaWxsVHlwZSI6MCwiTWFyZ2luIjp7IiRpZCI6IjI3MiIsIlRvcCI6MCwiTGVmdCI6MCwiUmlnaHQiOjAsIkJvdHRvbSI6MH0sIlBhZGRpbmciOnsiJGlkIjoiMjczIiwiVG9wIjowLCJMZWZ0IjowLCJSaWdodCI6MCwiQm90dG9tIjowfSwiQmFja2dyb3VuZCI6eyIkcmVmIjoiODkifSwiSXNWaXNpYmxlIjp0cnVlLCJXaWR0aCI6MC4wLCJIZWlnaHQiOjAuMCwiQm9yZGVyU3R5bGUiOnsiJGlkIjoiMjc0IiwiTGluZUNvbG9yIjpudWxsLCJMaW5lV2VpZ2h0IjowLjAsIkxpbmVUeXBlIjowLCJQYXJlbnRTdHlsZSI6bnVsbH0sIlBhcmVudFN0eWxlIjpudWxsfSwiRHVyYXRpb25TdHlsZSI6eyIkaWQiOiIyNzUiLCJGb250U2V0dGluZ3MiOnsiJGlkIjoiMjc2IiwiRm9udFNpemUiOjEwLCJGb250TmFtZSI6IkNhbGlicmkiLCJJc0JvbGQiOmZhbHNlLCJJc0l0YWxpYyI6ZmFsc2UsIklzVW5kZXJsaW5lZCI6ZmFsc2UsIlBhcmVudFN0eWxlIjpudWxsfSwiQXV0b1NpemUiOjAsIkZvcmVncm91bmQiOnsiJGlkIjoiMjc3IiwiQ29sb3IiOnsiJHJlZiI6IjkzIn19LCJNYXhXaWR0aCI6MjAwLjAsIk1heEhlaWdodCI6IkluZmluaXR5IiwiU21hcnRGb3JlZ3JvdW5kSXNBY3RpdmUiOmZhbHNlLCJIb3Jpem9udGFsQWxpZ25tZW50IjowLCJWZXJ0aWNhbEFsaWdubWVudCI6MCwiU21hcnRGb3JlZ3JvdW5kIjpudWxsLCJCYWNrZ3JvdW5kRmlsbFR5cGUiOjAsIk1hcmdpbiI6eyIkaWQiOiIyNzgiLCJUb3AiOjAsIkxlZnQiOjAsIlJpZ2h0IjowLCJCb3R0b20iOjB9LCJQYWRkaW5nIjp7IiRpZCI6IjI3OSIsIlRvcCI6MCwiTGVmdCI6MCwiUmlnaHQiOjAsIkJvdHRvbSI6MH0sIkJhY2tncm91bmQiOnsiJHJlZiI6Ijk2In0sIklzVmlzaWJsZSI6dHJ1ZSwiV2lkdGgiOjAuMCwiSGVpZ2h0IjowLjAsIkJvcmRlclN0eWxlIjp7IiRpZCI6IjI4MCIsIkxpbmVDb2xvciI6bnVsbCwiTGluZVdlaWdodCI6MC4wLCJMaW5lVHlwZSI6MCwiUGFyZW50U3R5bGUiOm51bGx9LCJQYXJlbnRTdHlsZSI6bnVsbH0sIkhvcml6b250YWxDb25uZWN0b3JTdHlsZSI6eyIkaWQiOiIyODEiLCJMaW5lQ29sb3IiOnsiJHJlZiI6Ijk4In0sIkxpbmVXZWlnaHQiOjEuMCwiTGluZVR5cGUiOjAsIlBhcmVudFN0eWxlIjpudWxsfSwiVmVydGljYWxDb25uZWN0b3JTdHlsZSI6eyIkaWQiOiIyODIiLCJMaW5lQ29sb3IiOnsiJHJlZiI6IjEwMSJ9LCJMaW5lV2VpZ2h0IjoxLjAsIkxpbmVUeXBlIjowLCJQYXJlbnRTdHlsZSI6bnVsbH0sIk1hcmdpbiI6bnVsbCwiU3RhcnREYXRlUG9zaXRpb24iOjQsIkVuZERhdGVQb3NpdGlvbiI6NCwiRGF0ZUlzVmlzaWJsZSI6dHJ1ZSwiVGl0bGVQb3NpdGlvbiI6MywiRHVyYXRpb25Qb3NpdGlvbiI6NiwiUGVyY2VudGFnZUNvbXBsZXRlZFBvc2l0aW9uIjo2LCJTcGFjaW5nIjo1LCJJc0JlbG93VGltZWJhbmQiOmZhbHNlLCJQZXJjZW50YWdlQ29tcGxldGVTaGFwZU9wYWNpdHkiOjM1LCJTaGFwZVN0eWxlIjp7IiRpZCI6IjI4MyIsIk1hcmdpbiI6eyIkaWQiOiIyODQiLCJUb3AiOjAsIkxlZnQiOjQsIlJpZ2h0Ijo0LCJCb3R0b20iOjB9LCJQYWRkaW5nIjp7IiRpZCI6IjI4NSIsIlRvcCI6MCwiTGVmdCI6MCwiUmlnaHQiOjAsIkJvdHRvbSI6MH0sIkJhY2tncm91bmQiOnsiJGlkIjoiMjg2IiwiQ29sb3IiOnsiJGlkIjoiMjg3IiwiQSI6MjU1LCJSIjoyMzcsIkciOjEyNSwiQiI6NDl9fSwiSXNWaXNpYmxlIjp0cnVlLCJXaWR0aCI6MC4wLCJIZWlnaHQiOjIyLjAsIkJvcmRlclN0eWxlIjp7IiRpZCI6IjI4OCIsIkxpbmVDb2xvciI6eyIkcmVmIjoiMTA5In0sIkxpbmVXZWlnaHQiOjAuMCwiTGluZVR5cGUiOjAsIlBhcmVudFN0eWxlIjpudWxsfSwiUGFyZW50U3R5bGUiOm51bGx9LCJUaXRsZVN0eWxlIjp7IiRpZCI6IjI4OSIsIkZvbnRTZXR0aW5ncyI6eyIkaWQiOiIyOTAiLCJGb250U2l6ZSI6MTEsIkZvbnROYW1lIjoiQ2FsaWJyaSIsIklzQm9sZCI6dHJ1ZSwiSXNJdGFsaWMiOmZhbHNlLCJJc1VuZGVybGluZWQiOmZhbHNlLCJQYXJlbnRTdHlsZSI6bnVsbH0sIkF1dG9TaXplIjowLCJGb3JlZ3JvdW5kIjp7IiRpZCI6IjI5MSIsIkNvbG9yIjp7IiRyZWYiOiIxMTQifX0sIk1heFdpZHRoIjo3MjAuMCwiTWF4SGVpZ2h0IjoiSW5maW5pdHkiLCJTbWFydEZvcmVncm91bmRJc0FjdGl2ZSI6ZmFsc2UsIkhvcml6b250YWxBbGlnbm1lbnQiOjIsIlZlcnRpY2FsQWxpZ25tZW50IjowLCJTbWFydEZvcmVncm91bmQiOm51bGwsIkJhY2tncm91bmRGaWxsVHlwZSI6MCwiTWFyZ2luIjp7IiRpZCI6IjI5MiIsIlRvcCI6MCwiTGVmdCI6MCwiUmlnaHQiOjAsIkJvdHRvbSI6MH0sIlBhZGRpbmciOnsiJGlkIjoiMjkzIiwiVG9wIjowLCJMZWZ0IjowLCJSaWdodCI6MCwiQm90dG9tIjowfSwiQmFja2dyb3VuZCI6eyIkcmVmIjoiMTE3In0sIklzVmlzaWJsZSI6dHJ1ZSwiV2lkdGgiOjAuMCwiSGVpZ2h0IjowLjAsIkJvcmRlclN0eWxlIjp7IiRpZCI6IjI5NCIsIkxpbmVDb2xvciI6bnVsbCwiTGluZVdlaWdodCI6MC4wLCJMaW5lVHlwZSI6MCwiUGFyZW50U3R5bGUiOm51bGx9LCJQYXJlbnRTdHlsZSI6bnVsbH0sIkRhdGVTdHlsZSI6eyIkaWQiOiIyOTUiLCJGb250U2V0dGluZ3MiOnsiJGlkIjoiMjk2IiwiRm9udFNpemUiOjEwLCJGb250TmFtZSI6IkNhbGlicmkiLCJJc0JvbGQiOmZhbHNlLCJJc0l0YWxpYyI6ZmFsc2UsIklzVW5kZXJsaW5lZCI6ZmFsc2UsIlBhcmVudFN0eWxlIjpudWxsfSwiQXV0b1NpemUiOjAsIkZvcmVncm91bmQiOnsiJGlkIjoiMjk3IiwiQ29sb3IiOnsiJHJlZiI6IjEyMSJ9fSwiTWF4V2lkdGgiOjIwMC4wLCJNYXhIZWlnaHQiOiJJbmZpbml0eSIsIlNtYXJ0Rm9yZWdyb3VuZElzQWN0aXZlIjpmYWxzZSwiSG9yaXpvbnRhbEFsaWdubWVudCI6MCwiVmVydGljYWxBbGlnbm1lbnQiOjAsIlNtYXJ0Rm9yZWdyb3VuZCI6bnVsbCwiQmFja2dyb3VuZEZpbGxUeXBlIjowLCJNYXJnaW4iOnsiJGlkIjoiMjk4IiwiVG9wIjowLCJMZWZ0IjowLCJSaWdodCI6MCwiQm90dG9tIjowfSwiUGFkZGluZyI6eyIkaWQiOiIyOTkiLCJUb3AiOjAsIkxlZnQiOjAsIlJpZ2h0IjowLCJCb3R0b20iOjB9LCJCYWNrZ3JvdW5kIjp7IiRyZWYiOiIxMjQifSwiSXNWaXNpYmxlIjp0cnVlLCJXaWR0aCI6MC4wLCJIZWlnaHQiOjAuMCwiQm9yZGVyU3R5bGUiOnsiJGlkIjoiMzAwIiwiTGluZUNvbG9yIjpudWxsLCJMaW5lV2VpZ2h0IjowLjAsIkxpbmVUeXBlIjowLCJQYXJlbnRTdHlsZSI6bnVsbH0sIlBhcmVudFN0eWxlIjpudWxsfSwiRGF0ZUZvcm1hdCI6eyIkaWQiOiIzMDEiLCJGb3JtYXRTdHJpbmciOiJNTU0gZCIsIlNlcGFyYXRvciI6Ii8iLCJVc2VJbnRlcm5hdGlvbmFsRGF0ZUZvcm1hdCI6ZmFsc2UsIkRhdGVJc1Zpc2libGUiOnRydWUsIlRpbWVJc1Zpc2libGUiOmZhbHNlLCJIb3VyRGlnaXRzIjoxLCJBbVBtRGVzaWduYXRvciI6MiwiVHJpbTAwTWludXRlcyI6ZmFsc2UsIkxhc3RLbm93blZpc2liaWxpdHlTdGF0ZSI6bnVsbH0sIklzVmlzaWJsZSI6dHJ1ZSwiUGFyZW50U3R5bGUiOm51bGx9LCJJbmRleCI6MywiU21hcnREdXJhdGlvbkFjdGl2YXRlZCI6ZmFsc2UsIkRhdGVGb3JtYXQiOnsiJHJlZiI6IjMwMSJ9LCJJZCI6ImVhZWE4YWIzLWQ3YjgtNGVjMC05MzNiLTQ3ODllMGM1ZGNlMyIsIkltcG9ydElkIjpudWxsLCJUaXRsZSI6IlLDqXVuaXIgbGVzIHNjcmlwdHMgZW4gdW4gc2V1bCAiLCJOb3RlIjpudWxsLCJIeXBlcmxpbmsiOnsiJGlkIjoiMzAyIiwiQWRkcmVzcyI6IiIsIlN1YkFkZHJlc3MiOiIifSwiSXNDaGFuZ2VkIjpmYWxzZSwiSXNOZXciOmZhbHNlfSx7IiRpZCI6IjMwMyIsIkdyb3VwTmFtZSI6bnVsbCwiU3RhcnREYXRlIjoiMjAyMC0wMS0xM1QwMDowMDowMFoiLCJFbmREYXRlIjoiMjAyMC0wMi0yMVQyMzo1OTowMCIsIlBlcmNlbnRhZ2VDb21wbGV0ZSI6bnVsbCwiU3R5bGUiOnsiJGlkIjoiMzA0IiwiU2hhcGUiOjAsIlNoYXBlVGhpY2tuZXNzIjoyLCJEdXJhdGlvbkZvcm1hdCI6MCwiSW5jbHVkZU5vbldvcmtpbmdEYXlzSW5EdXJhdGlvbiI6ZmFsc2UsIlBlcmNlbnRhZ2VDb21wbGV0ZVN0eWxlIjp7IiRpZCI6IjMwNSIsIkZvbnRTZXR0aW5ncyI6eyIkaWQiOiIzMDYiLCJGb250U2l6ZSI6MTAsIkZvbnROYW1lIjoiQ2FsaWJyaSIsIklzQm9sZCI6ZmFsc2UsIklzSXRhbGljIjpmYWxzZSwiSXNVbmRlcmxpbmVkIjpmYWxzZSwiUGFyZW50U3R5bGUiOm51bGx9LCJBdXRvU2l6ZSI6MCwiRm9yZWdyb3VuZCI6eyIkcmVmIjoiODUifSwiTWF4V2lkdGgiOjIwMC4wLCJNYXhIZWlnaHQiOiJJbmZpbml0eSIsIlNtYXJ0Rm9yZWdyb3VuZElzQWN0aXZlIjpmYWxzZSwiSG9yaXpvbnRhbEFsaWdubWVudCI6MCwiVmVydGljYWxBbGlnbm1lbnQiOjAsIlNtYXJ0Rm9yZWdyb3VuZCI6bnVsbCwiQmFja2dyb3VuZEZpbGxUeXBlIjowLCJNYXJnaW4iOnsiJGlkIjoiMzA3IiwiVG9wIjowLCJMZWZ0IjowLCJSaWdodCI6MCwiQm90dG9tIjowfSwiUGFkZGluZyI6eyIkaWQiOiIzMDgiLCJUb3AiOjAsIkxlZnQiOjAsIlJpZ2h0IjowLCJCb3R0b20iOjB9LCJCYWNrZ3JvdW5kIjp7IiRyZWYiOiI4OSJ9LCJJc1Zpc2libGUiOnRydWUsIldpZHRoIjowLjAsIkhlaWdodCI6MC4wLCJCb3JkZXJTdHlsZSI6eyIkaWQiOiIzMDkiLCJMaW5lQ29sb3IiOm51bGwsIkxpbmVXZWlnaHQiOjAuMCwiTGluZVR5cGUiOjAsIlBhcmVudFN0eWxlIjpudWxsfSwiUGFyZW50U3R5bGUiOm51bGx9LCJEdXJhdGlvblN0eWxlIjp7IiRpZCI6IjMxMCIsIkZvbnRTZXR0aW5ncyI6eyIkaWQiOiIzMTEiLCJGb250U2l6ZSI6MTAsIkZvbnROYW1lIjoiQ2FsaWJyaSIsIklzQm9sZCI6ZmFsc2UsIklzSXRhbGljIjpmYWxzZSwiSXNVbmRlcmxpbmVkIjpmYWxzZSwiUGFyZW50U3R5bGUiOm51bGx9LCJBdXRvU2l6ZSI6MCwiRm9yZWdyb3VuZCI6eyIkaWQiOiIzMTIiLCJDb2xvciI6eyIkcmVmIjoiOTMifX0sIk1heFdpZHRoIjoyMDAuMCwiTWF4SGVpZ2h0IjoiSW5maW5pdHkiLCJTbWFydEZvcmVncm91bmRJc0FjdGl2ZSI6ZmFsc2UsIkhvcml6b250YWxBbGlnbm1lbnQiOjAsIlZlcnRpY2FsQWxpZ25tZW50IjowLCJTbWFydEZvcmVncm91bmQiOm51bGwsIkJhY2tncm91bmRGaWxsVHlwZSI6MCwiTWFyZ2luIjp7IiRpZCI6IjMxMyIsIlRvcCI6MCwiTGVmdCI6MCwiUmlnaHQiOjAsIkJvdHRvbSI6MH0sIlBhZGRpbmciOnsiJGlkIjoiMzE0IiwiVG9wIjowLCJMZWZ0IjowLCJSaWdodCI6MCwiQm90dG9tIjowfSwiQmFja2dyb3VuZCI6eyIkcmVmIjoiOTYifSwiSXNWaXNpYmxlIjp0cnVlLCJXaWR0aCI6MC4wLCJIZWlnaHQiOjAuMCwiQm9yZGVyU3R5bGUiOnsiJGlkIjoiMzE1IiwiTGluZUNvbG9yIjpudWxsLCJMaW5lV2VpZ2h0IjowLjAsIkxpbmVUeXBlIjowLCJQYXJlbnRTdHlsZSI6bnVsbH0sIlBhcmVudFN0eWxlIjpudWxsfSwiSG9yaXpvbnRhbENvbm5lY3RvclN0eWxlIjp7IiRpZCI6IjMxNiIsIkxpbmVDb2xvciI6eyIkcmVmIjoiOTgifSwiTGluZVdlaWdodCI6MS4wLCJMaW5lVHlwZSI6MCwiUGFyZW50U3R5bGUiOm51bGx9LCJWZXJ0aWNhbENvbm5lY3RvclN0eWxlIjp7IiRpZCI6IjMxNyIsIkxpbmVDb2xvciI6eyIkcmVmIjoiMTAxIn0sIkxpbmVXZWlnaHQiOjEuMCwiTGluZVR5cGUiOjAsIlBhcmVudFN0eWxlIjpudWxsfSwiTWFyZ2luIjpudWxsLCJTdGFydERhdGVQb3NpdGlvbiI6NCwiRW5kRGF0ZVBvc2l0aW9uIjo0LCJEYXRlSXNWaXNpYmxlIjp0cnVlLCJUaXRsZVBvc2l0aW9uIjozLCJEdXJhdGlvblBvc2l0aW9uIjo2LCJQZXJjZW50YWdlQ29tcGxldGVkUG9zaXRpb24iOjYsIlNwYWNpbmciOjUsIklzQmVsb3dUaW1lYmFuZCI6ZmFsc2UsIlBlcmNlbnRhZ2VDb21wbGV0ZVNoYXBlT3BhY2l0eSI6MzUsIlNoYXBlU3R5bGUiOnsiJGlkIjoiMzE4IiwiTWFyZ2luIjp7IiRpZCI6IjMxOSIsIlRvcCI6MCwiTGVmdCI6NCwiUmlnaHQiOjQsIkJvdHRvbSI6MH0sIlBhZGRpbmciOnsiJGlkIjoiMzIwIiwiVG9wIjowLCJMZWZ0IjowLCJSaWdodCI6MCwiQm90dG9tIjowfSwiQmFja2dyb3VuZCI6eyIkaWQiOiIzMjEiLCJDb2xvciI6eyIkaWQiOiIzMjIiLCJBIjoyNTUsIlIiOjExMiwiRyI6MTczLCJCIjo3MX19LCJJc1Zpc2libGUiOnRydWUsIldpZHRoIjowLjAsIkhlaWdodCI6MjIuMCwiQm9yZGVyU3R5bGUiOnsiJGlkIjoiMzIzIiwiTGluZUNvbG9yIjp7IiRyZWYiOiIxMDkifSwiTGluZVdlaWdodCI6MC4wLCJMaW5lVHlwZSI6MCwiUGFyZW50U3R5bGUiOm51bGx9LCJQYXJlbnRTdHlsZSI6bnVsbH0sIlRpdGxlU3R5bGUiOnsiJGlkIjoiMzI0IiwiRm9udFNldHRpbmdzIjp7IiRpZCI6IjMyNSIsIkZvbnRTaXplIjoxMSwiRm9udE5hbWUiOiJDYWxpYnJpIiwiSXNCb2xkIjp0cnVlLCJJc0l0YWxpYyI6ZmFsc2UsIklzVW5kZXJsaW5lZCI6ZmFsc2UsIlBhcmVudFN0eWxlIjpudWxsfSwiQXV0b1NpemUiOjAsIkZvcmVncm91bmQiOnsiJGlkIjoiMzI2IiwiQ29sb3IiOnsiJHJlZiI6IjExNCJ9fSwiTWF4V2lkdGgiOjcyMC4wLCJNYXhIZWlnaHQiOiJJbmZpbml0eSIsIlNtYXJ0Rm9yZWdyb3VuZElzQWN0aXZlIjpmYWxzZSwiSG9yaXpvbnRhbEFsaWdubWVudCI6MiwiVmVydGljYWxBbGlnbm1lbnQiOjAsIlNtYXJ0Rm9yZWdyb3VuZCI6bnVsbCwiQmFja2dyb3VuZEZpbGxUeXBlIjowLCJNYXJnaW4iOnsiJGlkIjoiMzI3IiwiVG9wIjowLCJMZWZ0IjowLCJSaWdodCI6MCwiQm90dG9tIjowfSwiUGFkZGluZyI6eyIkaWQiOiIzMjgiLCJUb3AiOjAsIkxlZnQiOjAsIlJpZ2h0IjowLCJCb3R0b20iOjB9LCJCYWNrZ3JvdW5kIjp7IiRyZWYiOiIxMTcifSwiSXNWaXNpYmxlIjp0cnVlLCJXaWR0aCI6MC4wLCJIZWlnaHQiOjAuMCwiQm9yZGVyU3R5bGUiOnsiJGlkIjoiMzI5IiwiTGluZUNvbG9yIjpudWxsLCJMaW5lV2VpZ2h0IjowLjAsIkxpbmVUeXBlIjowLCJQYXJlbnRTdHlsZSI6bnVsbH0sIlBhcmVudFN0eWxlIjpudWxsfSwiRGF0ZVN0eWxlIjp7IiRpZCI6IjMzMCIsIkZvbnRTZXR0aW5ncyI6eyIkaWQiOiIzMzEiLCJGb250U2l6ZSI6MTAsIkZvbnROYW1lIjoiQ2FsaWJyaSIsIklzQm9sZCI6ZmFsc2UsIklzSXRhbGljIjpmYWxzZSwiSXNVbmRlcmxpbmVkIjpmYWxzZSwiUGFyZW50U3R5bGUiOm51bGx9LCJBdXRvU2l6ZSI6MCwiRm9yZWdyb3VuZCI6eyIkaWQiOiIzMzIiLCJDb2xvciI6eyIkcmVmIjoiMTIxIn19LCJNYXhXaWR0aCI6MjAwLjAsIk1heEhlaWdodCI6IkluZmluaXR5IiwiU21hcnRGb3JlZ3JvdW5kSXNBY3RpdmUiOmZhbHNlLCJIb3Jpem9udGFsQWxpZ25tZW50IjowLCJWZXJ0aWNhbEFsaWdubWVudCI6MCwiU21hcnRGb3JlZ3JvdW5kIjpudWxsLCJCYWNrZ3JvdW5kRmlsbFR5cGUiOjAsIk1hcmdpbiI6eyIkaWQiOiIzMzMiLCJUb3AiOjAsIkxlZnQiOjAsIlJpZ2h0IjowLCJCb3R0b20iOjB9LCJQYWRkaW5nIjp7IiRpZCI6IjMzNCIsIlRvcCI6MCwiTGVmdCI6MCwiUmlnaHQiOjAsIkJvdHRvbSI6MH0sIkJhY2tncm91bmQiOnsiJHJlZiI6IjEyNCJ9LCJJc1Zpc2libGUiOnRydWUsIldpZHRoIjowLjAsIkhlaWdodCI6MC4wLCJCb3JkZXJTdHlsZSI6eyIkaWQiOiIzMzUiLCJMaW5lQ29sb3IiOm51bGwsIkxpbmVXZWlnaHQiOjAuMCwiTGluZVR5cGUiOjAsIlBhcmVudFN0eWxlIjpudWxsfSwiUGFyZW50U3R5bGUiOm51bGx9LCJEYXRlRm9ybWF0Ijp7IiRpZCI6IjMzNiIsIkZvcm1hdFN0cmluZyI6Ik1NTSBkIiwiU2VwYXJhdG9yIjoiLyIsIlVzZUludGVybmF0aW9uYWxEYXRlRm9ybWF0IjpmYWxzZSwiRGF0ZUlzVmlzaWJsZSI6dHJ1ZSwiVGltZUlzVmlzaWJsZSI6ZmFsc2UsIkhvdXJEaWdpdHMiOjEsIkFtUG1EZXNpZ25hdG9yIjoyLCJUcmltMDBNaW51dGVzIjpmYWxzZSwiTGFzdEtub3duVmlzaWJpbGl0eVN0YXRlIjpudWxsfSwiSXNWaXNpYmxlIjp0cnVlLCJQYXJlbnRTdHlsZSI6bnVsbH0sIkluZGV4Ijo0LCJTbWFydER1cmF0aW9uQWN0aXZhdGVkIjpmYWxzZSwiRGF0ZUZvcm1hdCI6eyIkcmVmIjoiMzM2In0sIklkIjoiNjQ0YTVjNzgtYTE4Mi00Y2E1LWJhNzktM2NlNGNmYjdiMzIwIiwiSW1wb3J0SWQiOm51bGwsIlRpdGxlIjoiRmFpcmUgbGUgbGllbiBlbnRyZSBsJ2ludGVyZmFjZSB3ZWIgZXQgbGVzIHNjcmlwdHMgUiAiLCJOb3RlIjpudWxsLCJIeXBlcmxpbmsiOnsiJGlkIjoiMzM3IiwiQWRkcmVzcyI6IiIsIlN1YkFkZHJlc3MiOiIifSwiSXNDaGFuZ2VkIjpmYWxzZSwiSXNOZXciOmZhbHNlfSx7IiRpZCI6IjMzOCIsIkdyb3VwTmFtZSI6bnVsbCwiU3RhcnREYXRlIjoiMjAyMC0wMS0xM1QwMDowMDowMFoiLCJFbmREYXRlIjoiMjAyMC0wMi0yMVQyMzo1OTowMCIsIlBlcmNlbnRhZ2VDb21wbGV0ZSI6bnVsbCwiU3R5bGUiOnsiJGlkIjoiMzM5IiwiU2hhcGUiOjAsIlNoYXBlVGhpY2tuZXNzIjoyLCJEdXJhdGlvbkZvcm1hdCI6MCwiSW5jbHVkZU5vbldvcmtpbmdEYXlzSW5EdXJhdGlvbiI6ZmFsc2UsIlBlcmNlbnRhZ2VDb21wbGV0ZVN0eWxlIjp7IiRpZCI6IjM0MCIsIkZvbnRTZXR0aW5ncyI6eyIkaWQiOiIzNDEiLCJGb250U2l6ZSI6MTAsIkZvbnROYW1lIjoiQ2FsaWJyaSIsIklzQm9sZCI6ZmFsc2UsIklzSXRhbGljIjpmYWxzZSwiSXNVbmRlcmxpbmVkIjpmYWxzZSwiUGFyZW50U3R5bGUiOm51bGx9LCJBdXRvU2l6ZSI6MCwiRm9yZWdyb3VuZCI6eyIkcmVmIjoiODUifSwiTWF4V2lkdGgiOjIwMC4wLCJNYXhIZWlnaHQiOiJJbmZpbml0eSIsIlNtYXJ0Rm9yZWdyb3VuZElzQWN0aXZlIjpmYWxzZSwiSG9yaXpvbnRhbEFsaWdubWVudCI6MCwiVmVydGljYWxBbGlnbm1lbnQiOjAsIlNtYXJ0Rm9yZWdyb3VuZCI6bnVsbCwiQmFja2dyb3VuZEZpbGxUeXBlIjowLCJNYXJnaW4iOnsiJGlkIjoiMzQyIiwiVG9wIjowLCJMZWZ0IjowLCJSaWdodCI6MCwiQm90dG9tIjowfSwiUGFkZGluZyI6eyIkaWQiOiIzNDMiLCJUb3AiOjAsIkxlZnQiOjAsIlJpZ2h0IjowLCJCb3R0b20iOjB9LCJCYWNrZ3JvdW5kIjp7IiRyZWYiOiI4OSJ9LCJJc1Zpc2libGUiOnRydWUsIldpZHRoIjowLjAsIkhlaWdodCI6MC4wLCJCb3JkZXJTdHlsZSI6eyIkaWQiOiIzNDQiLCJMaW5lQ29sb3IiOm51bGwsIkxpbmVXZWlnaHQiOjAuMCwiTGluZVR5cGUiOjAsIlBhcmVudFN0eWxlIjpudWxsfSwiUGFyZW50U3R5bGUiOm51bGx9LCJEdXJhdGlvblN0eWxlIjp7IiRpZCI6IjM0NSIsIkZvbnRTZXR0aW5ncyI6eyIkaWQiOiIzNDYiLCJGb250U2l6ZSI6MTAsIkZvbnROYW1lIjoiQ2FsaWJyaSIsIklzQm9sZCI6ZmFsc2UsIklzSXRhbGljIjpmYWxzZSwiSXNVbmRlcmxpbmVkIjpmYWxzZSwiUGFyZW50U3R5bGUiOm51bGx9LCJBdXRvU2l6ZSI6MCwiRm9yZWdyb3VuZCI6eyIkaWQiOiIzNDciLCJDb2xvciI6eyIkcmVmIjoiOTMifX0sIk1heFdpZHRoIjoyMDAuMCwiTWF4SGVpZ2h0IjoiSW5maW5pdHkiLCJTbWFydEZvcmVncm91bmRJc0FjdGl2ZSI6ZmFsc2UsIkhvcml6b250YWxBbGlnbm1lbnQiOjAsIlZlcnRpY2FsQWxpZ25tZW50IjowLCJTbWFydEZvcmVncm91bmQiOm51bGwsIkJhY2tncm91bmRGaWxsVHlwZSI6MCwiTWFyZ2luIjp7IiRpZCI6IjM0OCIsIlRvcCI6MCwiTGVmdCI6MCwiUmlnaHQiOjAsIkJvdHRvbSI6MH0sIlBhZGRpbmciOnsiJGlkIjoiMzQ5IiwiVG9wIjowLCJMZWZ0IjowLCJSaWdodCI6MCwiQm90dG9tIjowfSwiQmFja2dyb3VuZCI6eyIkcmVmIjoiOTYifSwiSXNWaXNpYmxlIjp0cnVlLCJXaWR0aCI6MC4wLCJIZWlnaHQiOjAuMCwiQm9yZGVyU3R5bGUiOnsiJGlkIjoiMzUwIiwiTGluZUNvbG9yIjpudWxsLCJMaW5lV2VpZ2h0IjowLjAsIkxpbmVUeXBlIjowLCJQYXJlbnRTdHlsZSI6bnVsbH0sIlBhcmVudFN0eWxlIjpudWxsfSwiSG9yaXpvbnRhbENvbm5lY3RvclN0eWxlIjp7IiRpZCI6IjM1MSIsIkxpbmVDb2xvciI6eyIkcmVmIjoiOTgifSwiTGluZVdlaWdodCI6MS4wLCJMaW5lVHlwZSI6MCwiUGFyZW50U3R5bGUiOm51bGx9LCJWZXJ0aWNhbENvbm5lY3RvclN0eWxlIjp7IiRpZCI6IjM1MiIsIkxpbmVDb2xvciI6eyIkcmVmIjoiMTAxIn0sIkxpbmVXZWlnaHQiOjEuMCwiTGluZVR5cGUiOjAsIlBhcmVudFN0eWxlIjpudWxsfSwiTWFyZ2luIjpudWxsLCJTdGFydERhdGVQb3NpdGlvbiI6NCwiRW5kRGF0ZVBvc2l0aW9uIjo0LCJEYXRlSXNWaXNpYmxlIjp0cnVlLCJUaXRsZVBvc2l0aW9uIjoyLCJEdXJhdGlvblBvc2l0aW9uIjo2LCJQZXJjZW50YWdlQ29tcGxldGVkUG9zaXRpb24iOjYsIlNwYWNpbmciOjUsIklzQmVsb3dUaW1lYmFuZCI6ZmFsc2UsIlBlcmNlbnRhZ2VDb21wbGV0ZVNoYXBlT3BhY2l0eSI6MzUsIlNoYXBlU3R5bGUiOnsiJGlkIjoiMzUzIiwiTWFyZ2luIjp7IiRpZCI6IjM1NCIsIlRvcCI6MCwiTGVmdCI6NCwiUmlnaHQiOjQsIkJvdHRvbSI6MH0sIlBhZGRpbmciOnsiJGlkIjoiMzU1IiwiVG9wIjowLCJMZWZ0IjowLCJSaWdodCI6MCwiQm90dG9tIjowfSwiQmFja2dyb3VuZCI6eyIkaWQiOiIzNTYiLCJDb2xvciI6eyIkaWQiOiIzNTciLCJBIjoyNTUsIlIiOjkxLCJHIjoxNTUsIkIiOjIxM319LCJJc1Zpc2libGUiOnRydWUsIldpZHRoIjowLjAsIkhlaWdodCI6MjIuMCwiQm9yZGVyU3R5bGUiOnsiJGlkIjoiMzU4IiwiTGluZUNvbG9yIjp7IiRyZWYiOiIxMDkifSwiTGluZVdlaWdodCI6MC4wLCJMaW5lVHlwZSI6MCwiUGFyZW50U3R5bGUiOm51bGx9LCJQYXJlbnRTdHlsZSI6bnVsbH0sIlRpdGxlU3R5bGUiOnsiJGlkIjoiMzU5IiwiRm9udFNldHRpbmdzIjp7IiRpZCI6IjM2MCIsIkZvbnRTaXplIjoxMSwiRm9udE5hbWUiOiJDYWxpYnJpIiwiSXNCb2xkIjp0cnVlLCJJc0l0YWxpYyI6ZmFsc2UsIklzVW5kZXJsaW5lZCI6ZmFsc2UsIlBhcmVudFN0eWxlIjpudWxsfSwiQXV0b1NpemUiOjAsIkZvcmVncm91bmQiOnsiJGlkIjoiMzYxIiwiQ29sb3IiOnsiJHJlZiI6IjExNCJ9fSwiTWF4V2lkdGgiOjcyMC4wLCJNYXhIZWlnaHQiOiJJbmZpbml0eSIsIlNtYXJ0Rm9yZWdyb3VuZElzQWN0aXZlIjpmYWxzZSwiSG9yaXpvbnRhbEFsaWdubWVudCI6MSwiVmVydGljYWxBbGlnbm1lbnQiOjAsIlNtYXJ0Rm9yZWdyb3VuZCI6bnVsbCwiQmFja2dyb3VuZEZpbGxUeXBlIjowLCJNYXJnaW4iOnsiJGlkIjoiMzYyIiwiVG9wIjowLCJMZWZ0IjowLCJSaWdodCI6MCwiQm90dG9tIjowfSwiUGFkZGluZyI6eyIkaWQiOiIzNjMiLCJUb3AiOjAsIkxlZnQiOjAsIlJpZ2h0IjowLCJCb3R0b20iOjB9LCJCYWNrZ3JvdW5kIjp7IiRyZWYiOiIxMTcifSwiSXNWaXNpYmxlIjp0cnVlLCJXaWR0aCI6MC4wLCJIZWlnaHQiOjAuMCwiQm9yZGVyU3R5bGUiOnsiJGlkIjoiMzY0IiwiTGluZUNvbG9yIjpudWxsLCJMaW5lV2VpZ2h0IjowLjAsIkxpbmVUeXBlIjowLCJQYXJlbnRTdHlsZSI6bnVsbH0sIlBhcmVudFN0eWxlIjpudWxsfSwiRGF0ZVN0eWxlIjp7IiRpZCI6IjM2NSIsIkZvbnRTZXR0aW5ncyI6eyIkaWQiOiIzNjYiLCJGb250U2l6ZSI6MTAsIkZvbnROYW1lIjoiQ2FsaWJyaSIsIklzQm9sZCI6ZmFsc2UsIklzSXRhbGljIjpmYWxzZSwiSXNVbmRlcmxpbmVkIjpmYWxzZSwiUGFyZW50U3R5bGUiOm51bGx9LCJBdXRvU2l6ZSI6MCwiRm9yZWdyb3VuZCI6eyIkaWQiOiIzNjciLCJDb2xvciI6eyIkcmVmIjoiMTIxIn19LCJNYXhXaWR0aCI6MjAwLjAsIk1heEhlaWdodCI6IkluZmluaXR5IiwiU21hcnRGb3JlZ3JvdW5kSXNBY3RpdmUiOmZhbHNlLCJIb3Jpem9udGFsQWxpZ25tZW50IjowLCJWZXJ0aWNhbEFsaWdubWVudCI6MCwiU21hcnRGb3JlZ3JvdW5kIjpudWxsLCJCYWNrZ3JvdW5kRmlsbFR5cGUiOjAsIk1hcmdpbiI6eyIkaWQiOiIzNjgiLCJUb3AiOjAsIkxlZnQiOjAsIlJpZ2h0IjowLCJCb3R0b20iOjB9LCJQYWRkaW5nIjp7IiRpZCI6IjM2OSIsIlRvcCI6MCwiTGVmdCI6MCwiUmlnaHQiOjAsIkJvdHRvbSI6MH0sIkJhY2tncm91bmQiOnsiJHJlZiI6IjEyNCJ9LCJJc1Zpc2libGUiOnRydWUsIldpZHRoIjowLjAsIkhlaWdodCI6MC4wLCJCb3JkZXJTdHlsZSI6eyIkaWQiOiIzNzAiLCJMaW5lQ29sb3IiOm51bGwsIkxpbmVXZWlnaHQiOjAuMCwiTGluZVR5cGUiOjAsIlBhcmVudFN0eWxlIjpudWxsfSwiUGFyZW50U3R5bGUiOm51bGx9LCJEYXRlRm9ybWF0Ijp7IiRpZCI6IjM3MSIsIkZvcm1hdFN0cmluZyI6Ik1NTSBkIiwiU2VwYXJhdG9yIjoiLyIsIlVzZUludGVybmF0aW9uYWxEYXRlRm9ybWF0IjpmYWxzZSwiRGF0ZUlzVmlzaWJsZSI6dHJ1ZSwiVGltZUlzVmlzaWJsZSI6ZmFsc2UsIkhvdXJEaWdpdHMiOjEsIkFtUG1EZXNpZ25hdG9yIjoyLCJUcmltMDBNaW51dGVzIjpmYWxzZSwiTGFzdEtub3duVmlzaWJpbGl0eVN0YXRlIjpudWxsfSwiSXNWaXNpYmxlIjp0cnVlLCJQYXJlbnRTdHlsZSI6bnVsbH0sIkluZGV4Ijo1LCJTbWFydER1cmF0aW9uQWN0aXZhdGVkIjpmYWxzZSwiRGF0ZUZvcm1hdCI6eyIkcmVmIjoiMzcxIn0sIklkIjoiZjVjZTJlMmMtNmFhNS00MjUzLTg1MDAtZTMzOWM4Zjg0Y2Y1IiwiSW1wb3J0SWQiOm51bGwsIlRpdGxlIjoiQWpvdXRlciBkZXMgdm9pZXMgbm9uLWNhbm9uaXF1ZXMgIiwiTm90ZSI6bnVsbCwiSHlwZXJsaW5rIjp7IiRpZCI6IjM3MiIsIkFkZHJlc3MiOiIiLCJTdWJBZGRyZXNzIjoiIn0sIklzQ2hhbmdlZCI6ZmFsc2UsIklzTmV3IjpmYWxzZX0seyIkaWQiOiIzNzMiLCJHcm91cE5hbWUiOm51bGwsIlN0YXJ0RGF0ZSI6IjIwMjAtMDMtMDlUMDA6MDA6MDBaIiwiRW5kRGF0ZSI6IjIwMjAtMDMtMjBUMjM6NTk6MDAiLCJQZXJjZW50YWdlQ29tcGxldGUiOm51bGwsIlN0eWxlIjp7IiRpZCI6IjM3NCIsIlNoYXBlIjowLCJTaGFwZVRoaWNrbmVzcyI6MiwiRHVyYXRpb25Gb3JtYXQiOjAsIkluY2x1ZGVOb25Xb3JraW5nRGF5c0luRHVyYXRpb24iOmZhbHNlLCJQZXJjZW50YWdlQ29tcGxldGVTdHlsZSI6eyIkaWQiOiIzNzUiLCJGb250U2V0dGluZ3MiOnsiJGlkIjoiMzc2IiwiRm9udFNpemUiOjEwLCJGb250TmFtZSI6IkNhbGlicmkiLCJJc0JvbGQiOmZhbHNlLCJJc0l0YWxpYyI6ZmFsc2UsIklzVW5kZXJsaW5lZCI6ZmFsc2UsIlBhcmVudFN0eWxlIjpudWxsfSwiQXV0b1NpemUiOjAsIkZvcmVncm91bmQiOnsiJHJlZiI6Ijg1In0sIk1heFdpZHRoIjoyMDAuMCwiTWF4SGVpZ2h0IjoiSW5maW5pdHkiLCJTbWFydEZvcmVncm91bmRJc0FjdGl2ZSI6ZmFsc2UsIkhvcml6b250YWxBbGlnbm1lbnQiOjAsIlZlcnRpY2FsQWxpZ25tZW50IjowLCJTbWFydEZvcmVncm91bmQiOm51bGwsIkJhY2tncm91bmRGaWxsVHlwZSI6MCwiTWFyZ2luIjp7IiRpZCI6IjM3NyIsIlRvcCI6MCwiTGVmdCI6MCwiUmlnaHQiOjAsIkJvdHRvbSI6MH0sIlBhZGRpbmciOnsiJGlkIjoiMzc4IiwiVG9wIjowLCJMZWZ0IjowLCJSaWdodCI6MCwiQm90dG9tIjowfSwiQmFja2dyb3VuZCI6eyIkcmVmIjoiODkifSwiSXNWaXNpYmxlIjp0cnVlLCJXaWR0aCI6MC4wLCJIZWlnaHQiOjAuMCwiQm9yZGVyU3R5bGUiOnsiJGlkIjoiMzc5IiwiTGluZUNvbG9yIjpudWxsLCJMaW5lV2VpZ2h0IjowLjAsIkxpbmVUeXBlIjowLCJQYXJlbnRTdHlsZSI6bnVsbH0sIlBhcmVudFN0eWxlIjpudWxsfSwiRHVyYXRpb25TdHlsZSI6eyIkaWQiOiIzODAiLCJGb250U2V0dGluZ3MiOnsiJGlkIjoiMzgxIiwiRm9udFNpemUiOjEwLCJGb250TmFtZSI6IkNhbGlicmkiLCJJc0JvbGQiOmZhbHNlLCJJc0l0YWxpYyI6ZmFsc2UsIklzVW5kZXJsaW5lZCI6ZmFsc2UsIlBhcmVudFN0eWxlIjpudWxsfSwiQXV0b1NpemUiOjAsIkZvcmVncm91bmQiOnsiJGlkIjoiMzgyIiwiQ29sb3IiOnsiJHJlZiI6IjkzIn19LCJNYXhXaWR0aCI6MjAwLjAsIk1heEhlaWdodCI6IkluZmluaXR5IiwiU21hcnRGb3JlZ3JvdW5kSXNBY3RpdmUiOmZhbHNlLCJIb3Jpem9udGFsQWxpZ25tZW50IjowLCJWZXJ0aWNhbEFsaWdubWVudCI6MCwiU21hcnRGb3JlZ3JvdW5kIjpudWxsLCJCYWNrZ3JvdW5kRmlsbFR5cGUiOjAsIk1hcmdpbiI6eyIkaWQiOiIzODMiLCJUb3AiOjAsIkxlZnQiOjAsIlJpZ2h0IjowLCJCb3R0b20iOjB9LCJQYWRkaW5nIjp7IiRpZCI6IjM4NCIsIlRvcCI6MCwiTGVmdCI6MCwiUmlnaHQiOjAsIkJvdHRvbSI6MH0sIkJhY2tncm91bmQiOnsiJHJlZiI6Ijk2In0sIklzVmlzaWJsZSI6dHJ1ZSwiV2lkdGgiOjAuMCwiSGVpZ2h0IjowLjAsIkJvcmRlclN0eWxlIjp7IiRpZCI6IjM4NSIsIkxpbmVDb2xvciI6bnVsbCwiTGluZVdlaWdodCI6MC4wLCJMaW5lVHlwZSI6MCwiUGFyZW50U3R5bGUiOm51bGx9LCJQYXJlbnRTdHlsZSI6bnVsbH0sIkhvcml6b250YWxDb25uZWN0b3JTdHlsZSI6eyIkaWQiOiIzODYiLCJMaW5lQ29sb3IiOnsiJHJlZiI6Ijk4In0sIkxpbmVXZWlnaHQiOjEuMCwiTGluZVR5cGUiOjAsIlBhcmVudFN0eWxlIjpudWxsfSwiVmVydGljYWxDb25uZWN0b3JTdHlsZSI6eyIkaWQiOiIzODciLCJMaW5lQ29sb3IiOnsiJHJlZiI6IjEwMSJ9LCJMaW5lV2VpZ2h0IjoxLjAsIkxpbmVUeXBlIjowLCJQYXJlbnRTdHlsZSI6bnVsbH0sIk1hcmdpbiI6bnVsbCwiU3RhcnREYXRlUG9zaXRpb24iOjQsIkVuZERhdGVQb3NpdGlvbiI6NCwiRGF0ZUlzVmlzaWJsZSI6dHJ1ZSwiVGl0bGVQb3NpdGlvbiI6MywiRHVyYXRpb25Qb3NpdGlvbiI6NiwiUGVyY2VudGFnZUNvbXBsZXRlZFBvc2l0aW9uIjo2LCJTcGFjaW5nIjo1LCJJc0JlbG93VGltZWJhbmQiOmZhbHNlLCJQZXJjZW50YWdlQ29tcGxldGVTaGFwZU9wYWNpdHkiOjM1LCJTaGFwZVN0eWxlIjp7IiRpZCI6IjM4OCIsIk1hcmdpbiI6eyIkaWQiOiIzODkiLCJUb3AiOjAsIkxlZnQiOjQsIlJpZ2h0Ijo0LCJCb3R0b20iOjB9LCJQYWRkaW5nIjp7IiRpZCI6IjM5MCIsIlRvcCI6MCwiTGVmdCI6MCwiUmlnaHQiOjAsIkJvdHRvbSI6MH0sIkJhY2tncm91bmQiOnsiJGlkIjoiMzkxIiwiQ29sb3IiOnsiJGlkIjoiMzkyIiwiQSI6MjU1LCJSIjo5MSwiRyI6MTU1LCJCIjoyMTN9fSwiSXNWaXNpYmxlIjp0cnVlLCJXaWR0aCI6MC4wLCJIZWlnaHQiOjIyLjAsIkJvcmRlclN0eWxlIjp7IiRpZCI6IjM5MyIsIkxpbmVDb2xvciI6eyIkcmVmIjoiMTA5In0sIkxpbmVXZWlnaHQiOjAuMCwiTGluZVR5cGUiOjAsIlBhcmVudFN0eWxlIjpudWxsfSwiUGFyZW50U3R5bGUiOm51bGx9LCJUaXRsZVN0eWxlIjp7IiRpZCI6IjM5NCIsIkZvbnRTZXR0aW5ncyI6eyIkaWQiOiIzOTUiLCJGb250U2l6ZSI6MTEsIkZvbnROYW1lIjoiQ2FsaWJyaSIsIklzQm9sZCI6dHJ1ZSwiSXNJdGFsaWMiOmZhbHNlLCJJc1VuZGVybGluZWQiOmZhbHNlLCJQYXJlbnRTdHlsZSI6bnVsbH0sIkF1dG9TaXplIjowLCJGb3JlZ3JvdW5kIjp7IiRpZCI6IjM5NiIsIkNvbG9yIjp7IiRyZWYiOiIxMTQifX0sIk1heFdpZHRoIjo3MjAuMCwiTWF4SGVpZ2h0IjoiSW5maW5pdHkiLCJTbWFydEZvcmVncm91bmRJc0FjdGl2ZSI6ZmFsc2UsIkhvcml6b250YWxBbGlnbm1lbnQiOjIsIlZlcnRpY2FsQWxpZ25tZW50IjowLCJTbWFydEZvcmVncm91bmQiOm51bGwsIkJhY2tncm91bmRGaWxsVHlwZSI6MCwiTWFyZ2luIjp7IiRpZCI6IjM5NyIsIlRvcCI6MCwiTGVmdCI6MCwiUmlnaHQiOjAsIkJvdHRvbSI6MH0sIlBhZGRpbmciOnsiJGlkIjoiMzk4IiwiVG9wIjowLCJMZWZ0IjowLCJSaWdodCI6MCwiQm90dG9tIjowfSwiQmFja2dyb3VuZCI6eyIkcmVmIjoiMTE3In0sIklzVmlzaWJsZSI6dHJ1ZSwiV2lkdGgiOjAuMCwiSGVpZ2h0IjowLjAsIkJvcmRlclN0eWxlIjp7IiRpZCI6IjM5OSIsIkxpbmVDb2xvciI6bnVsbCwiTGluZVdlaWdodCI6MC4wLCJMaW5lVHlwZSI6MCwiUGFyZW50U3R5bGUiOm51bGx9LCJQYXJlbnRTdHlsZSI6bnVsbH0sIkRhdGVTdHlsZSI6eyIkaWQiOiI0MDAiLCJGb250U2V0dGluZ3MiOnsiJGlkIjoiNDAxIiwiRm9udFNpemUiOjEwLCJGb250TmFtZSI6IkNhbGlicmkiLCJJc0JvbGQiOmZhbHNlLCJJc0l0YWxpYyI6ZmFsc2UsIklzVW5kZXJsaW5lZCI6ZmFsc2UsIlBhcmVudFN0eWxlIjpudWxsfSwiQXV0b1NpemUiOjAsIkZvcmVncm91bmQiOnsiJGlkIjoiNDAyIiwiQ29sb3IiOnsiJHJlZiI6IjEyMSJ9fSwiTWF4V2lkdGgiOjIwMC4wLCJNYXhIZWlnaHQiOiJJbmZpbml0eSIsIlNtYXJ0Rm9yZWdyb3VuZElzQWN0aXZlIjpmYWxzZSwiSG9yaXpvbnRhbEFsaWdubWVudCI6MCwiVmVydGljYWxBbGlnbm1lbnQiOjAsIlNtYXJ0Rm9yZWdyb3VuZCI6bnVsbCwiQmFja2dyb3VuZEZpbGxUeXBlIjowLCJNYXJnaW4iOnsiJGlkIjoiNDAzIiwiVG9wIjowLCJMZWZ0IjowLCJSaWdodCI6MCwiQm90dG9tIjowfSwiUGFkZGluZyI6eyIkaWQiOiI0MDQiLCJUb3AiOjAsIkxlZnQiOjAsIlJpZ2h0IjowLCJCb3R0b20iOjB9LCJCYWNrZ3JvdW5kIjp7IiRyZWYiOiIxMjQifSwiSXNWaXNpYmxlIjp0cnVlLCJXaWR0aCI6MC4wLCJIZWlnaHQiOjAuMCwiQm9yZGVyU3R5bGUiOnsiJGlkIjoiNDA1IiwiTGluZUNvbG9yIjpudWxsLCJMaW5lV2VpZ2h0IjowLjAsIkxpbmVUeXBlIjowLCJQYXJlbnRTdHlsZSI6bnVsbH0sIlBhcmVudFN0eWxlIjpudWxsfSwiRGF0ZUZvcm1hdCI6eyIkaWQiOiI0MDYiLCJGb3JtYXRTdHJpbmciOiJNTU0gZCIsIlNlcGFyYXRvciI6Ii8iLCJVc2VJbnRlcm5hdGlvbmFsRGF0ZUZvcm1hdCI6ZmFsc2UsIkRhdGVJc1Zpc2libGUiOnRydWUsIlRpbWVJc1Zpc2libGUiOmZhbHNlLCJIb3VyRGlnaXRzIjoxLCJBbVBtRGVzaWduYXRvciI6MiwiVHJpbTAwTWludXRlcyI6ZmFsc2UsIkxhc3RLbm93blZpc2liaWxpdHlTdGF0ZSI6bnVsbH0sIklzVmlzaWJsZSI6dHJ1ZSwiUGFyZW50U3R5bGUiOm51bGx9LCJJbmRleCI6NiwiU21hcnREdXJhdGlvbkFjdGl2YXRlZCI6ZmFsc2UsIkRhdGVGb3JtYXQiOnsiJHJlZiI6IjQwNiJ9LCJJZCI6ImU5ZmVkMGY5LTJhMzAtNDcxOC04M2Q3LWViMWY3Yjk0ZjJjOCIsIkltcG9ydElkIjpudWxsLCJUaXRsZSI6IkltcGzDqW1lbnRlciBsJ291dGlscyBzdXIgbGUgc2VydmV1ciBjbGllbnQiLCJOb3RlIjpudWxsLCJIeXBlcmxpbmsiOnsiJGlkIjoiNDA3IiwiQWRkcmVzcyI6IiIsIlN1YkFkZHJlc3MiOiIifSwiSXNDaGFuZ2VkIjpmYWxzZSwiSXNOZXciOmZhbHNlfV0sIlN3aW1sYW5lcyI6W10sIk1zUHJvamVjdEl0ZW1zVHJlZSI6eyIkaWQiOiI0MDgiLCJSb290Ijp7IkltcG9ydElkIjpudWxsLCJJc0ltcG9ydGVkIjpmYWxzZSwiQ2hpbGRyZW4iOltdfX0sIk1ldGFkYXRhIjp7IiRpZCI6IjQwOSIsIlJlY2VudENvbG9yc0NvbGxlY3Rpb24iOiJbXCIjRkZFRDdEMzFcIixcIiNGRjcwQUQ0N1wiLFwiI0ZGRUExNjFFXCJdIn0sIlNldHRpbmdzIjp7IiRpZCI6IjQxMCIsIkltcGFPcHRpb25zIjp7IiRpZCI6IjQxMSIsIkxlZnRUb1JpZ2h0IjpmYWxzZSwiUGF5bG9hZE9wdGlvbnMiOjJ9LCJVc2VDb21wcmVzc2lvbiI6ZmFsc2UsIkNvbXByZXNpb25QZXJjZW50YWdlIjo1MC4wLCJJbmFjdGl2ZUludGVydmFsV2lkdGhUaHJlc2hvbGQiOjMwLjAsIkluYWN0aXZlSW50ZXJ2YWxXaWR0aCI6MS4wLCJTcGxpdFRhc2tzIjpmYWxzZSwiVXNlQ2x1c3RlciI6ZmFsc2UsIkVwc2lsb24iOjUuMCwiTWluUG9pbnRzVG9Gb3JtQUNsdXN0ZXIiOjIsIkdlbmVyYXRlSW52aXNpYmxlU2hhcGVzIjpmYWxzZSwiU21hcnRUaW1lbGluZVRhc2tQZXJjZW50YWdlRml0IjpmYWxzZX0sIklzTmV3IjpmYWxzZSwiSW1wb3J0VHlwZSI6MCwiRmlsZVBhdGgiOm51bGwsIlRpbWVDb25maWd1cmF0aW9uIjp7IiRpZCI6IjQxMiIsIlVzZVRpbWUiOmZhbHNlLCJXb3JrRGF5U3RhcnQiOiIwMDowMDowMCIsIldvcmtEYXlFbmQiOiIyMzo1OTowMCJ9LCJMYXN0VXNlZFRlbXBsYXRlSWQiOiI5NWZiZjBmNy1jYTZjLTRiYjktYWU3OC0xYWFmMmNhOTYwZWIifQ=="/>
   <p:tag name="__MASTER" val="__part_0"/>
 </p:tagLst>
 </file>

</xml_diff>

<commit_message>
Traduction en FR du SWOT
</commit_message>
<xml_diff>
--- a/Diapos_Suivit_projet.pptx
+++ b/Diapos_Suivit_projet.pptx
@@ -2024,17 +2024,21 @@
       </dgm:t>
     </dgm:pt>
     <dgm:pt modelId="{35F1F2D2-FC47-4990-98DB-731AFE036343}">
-      <dgm:prSet phldrT="[Text]"/>
+      <dgm:prSet phldrT="[Text]" custT="1"/>
       <dgm:spPr/>
       <dgm:t>
         <a:bodyPr/>
         <a:lstStyle/>
         <a:p>
           <a:r>
-            <a:rPr lang="fr-FR" dirty="0" smtClean="0"/>
-            <a:t>Diverses compétences</a:t>
+            <a:rPr lang="fr-FR" sz="900" dirty="0" smtClean="0"/>
+            <a:t>Différentes </a:t>
           </a:r>
-          <a:endParaRPr lang="fr-FR" dirty="0"/>
+          <a:r>
+            <a:rPr lang="fr-FR" sz="900" dirty="0" smtClean="0"/>
+            <a:t>compétences</a:t>
+          </a:r>
+          <a:endParaRPr lang="fr-FR" sz="900" dirty="0"/>
         </a:p>
       </dgm:t>
     </dgm:pt>
@@ -2254,7 +2258,11 @@
         <a:p>
           <a:r>
             <a:rPr lang="fr-FR" dirty="0" smtClean="0"/>
-            <a:t>Pas de compétition</a:t>
+            <a:t>Pas de </a:t>
+          </a:r>
+          <a:r>
+            <a:rPr lang="fr-FR" dirty="0" smtClean="0"/>
+            <a:t>concurrents</a:t>
           </a:r>
           <a:endParaRPr lang="fr-FR" dirty="0"/>
         </a:p>
@@ -2283,17 +2291,21 @@
       </dgm:t>
     </dgm:pt>
     <dgm:pt modelId="{21C7A246-DDB5-40DD-9118-CC4963BF878A}">
-      <dgm:prSet phldrT="[Text]"/>
+      <dgm:prSet phldrT="[Text]" custT="1"/>
       <dgm:spPr/>
       <dgm:t>
         <a:bodyPr/>
         <a:lstStyle/>
         <a:p>
           <a:r>
-            <a:rPr lang="fr-FR" dirty="0" smtClean="0"/>
-            <a:t>Accès à un expert</a:t>
+            <a:rPr lang="fr-FR" sz="900" dirty="0" smtClean="0"/>
+            <a:t>Contact avec un </a:t>
           </a:r>
-          <a:endParaRPr lang="fr-FR" dirty="0"/>
+          <a:r>
+            <a:rPr lang="fr-FR" sz="900" dirty="0" smtClean="0"/>
+            <a:t>expert</a:t>
+          </a:r>
+          <a:endParaRPr lang="fr-FR" sz="900" dirty="0"/>
         </a:p>
       </dgm:t>
     </dgm:pt>
@@ -2328,7 +2340,11 @@
         <a:p>
           <a:r>
             <a:rPr lang="fr-FR" dirty="0" smtClean="0"/>
-            <a:t>Mauvaise documentation</a:t>
+            <a:t>Faible </a:t>
+          </a:r>
+          <a:r>
+            <a:rPr lang="fr-FR" dirty="0" smtClean="0"/>
+            <a:t>documentation</a:t>
           </a:r>
           <a:endParaRPr lang="fr-FR" dirty="0"/>
         </a:p>
@@ -2431,17 +2447,17 @@
       </dgm:t>
     </dgm:pt>
     <dgm:pt modelId="{62885FA7-E7FB-4933-9935-6A8AA90289B4}">
-      <dgm:prSet phldrT="[Text]"/>
+      <dgm:prSet phldrT="[Text]" custT="1"/>
       <dgm:spPr/>
       <dgm:t>
         <a:bodyPr/>
         <a:lstStyle/>
         <a:p>
           <a:r>
-            <a:rPr lang="fr-FR" dirty="0" smtClean="0"/>
+            <a:rPr lang="fr-FR" sz="900" dirty="0" smtClean="0"/>
             <a:t>Utilisation de package ‘open source ’</a:t>
           </a:r>
-          <a:endParaRPr lang="fr-FR" dirty="0"/>
+          <a:endParaRPr lang="fr-FR" sz="900" dirty="0"/>
         </a:p>
       </dgm:t>
     </dgm:pt>
@@ -3835,7 +3851,11 @@
           </a:pPr>
           <a:r>
             <a:rPr lang="fr-FR" sz="900" kern="1200" dirty="0" smtClean="0"/>
-            <a:t>Pas de compétition</a:t>
+            <a:t>Pas de </a:t>
+          </a:r>
+          <a:r>
+            <a:rPr lang="fr-FR" sz="900" kern="1200" dirty="0" smtClean="0"/>
+            <a:t>concurrents</a:t>
           </a:r>
           <a:endParaRPr lang="fr-FR" sz="900" kern="1200" dirty="0"/>
         </a:p>
@@ -3960,7 +3980,11 @@
           </a:pPr>
           <a:r>
             <a:rPr lang="fr-FR" sz="900" kern="1200" dirty="0" smtClean="0"/>
-            <a:t>Mauvaise documentation</a:t>
+            <a:t>Faible </a:t>
+          </a:r>
+          <a:r>
+            <a:rPr lang="fr-FR" sz="900" kern="1200" dirty="0" smtClean="0"/>
+            <a:t>documentation</a:t>
           </a:r>
           <a:endParaRPr lang="fr-FR" sz="900" kern="1200" dirty="0"/>
         </a:p>
@@ -4028,7 +4052,7 @@
         <a:fontRef idx="minor"/>
       </dsp:style>
       <dsp:txBody>
-        <a:bodyPr spcFirstLastPara="0" vert="horz" wrap="square" lIns="45720" tIns="45720" rIns="45720" bIns="45720" numCol="1" spcCol="1270" anchor="t" anchorCtr="0">
+        <a:bodyPr spcFirstLastPara="0" vert="horz" wrap="square" lIns="34290" tIns="34290" rIns="34290" bIns="34290" numCol="1" spcCol="1270" anchor="t" anchorCtr="0">
           <a:noAutofit/>
         </a:bodyPr>
         <a:lstStyle/>
@@ -4047,7 +4071,11 @@
           </a:pPr>
           <a:r>
             <a:rPr lang="fr-FR" sz="900" kern="1200" dirty="0" smtClean="0"/>
-            <a:t>Diverses compétences</a:t>
+            <a:t>Différentes </a:t>
+          </a:r>
+          <a:r>
+            <a:rPr lang="fr-FR" sz="900" kern="1200" dirty="0" smtClean="0"/>
+            <a:t>compétences</a:t>
           </a:r>
           <a:endParaRPr lang="fr-FR" sz="900" kern="1200" dirty="0"/>
         </a:p>
@@ -4066,7 +4094,11 @@
           </a:pPr>
           <a:r>
             <a:rPr lang="fr-FR" sz="900" kern="1200" dirty="0" smtClean="0"/>
-            <a:t>Accès à un expert</a:t>
+            <a:t>Contact avec un </a:t>
+          </a:r>
+          <a:r>
+            <a:rPr lang="fr-FR" sz="900" kern="1200" dirty="0" smtClean="0"/>
+            <a:t>expert</a:t>
           </a:r>
           <a:endParaRPr lang="fr-FR" sz="900" kern="1200" dirty="0"/>
         </a:p>
@@ -23801,7 +23833,7 @@
           <p:nvPr>
             <p:extLst>
               <p:ext uri="{D42A27DB-BD31-4B8C-83A1-F6EECF244321}">
-                <p14:modId xmlns:p14="http://schemas.microsoft.com/office/powerpoint/2010/main" val="1172731708"/>
+                <p14:modId xmlns:p14="http://schemas.microsoft.com/office/powerpoint/2010/main" val="3941913306"/>
               </p:ext>
             </p:extLst>
           </p:nvPr>

</xml_diff>